<commit_message>
updated performance metrics section of midreview ppt
</commit_message>
<xml_diff>
--- a/doc/AugRealityMidReview.pptx
+++ b/doc/AugRealityMidReview.pptx
@@ -6,7 +6,7 @@
     <p:sldMasterId id="2147483708" r:id="rId2"/>
   </p:sldMasterIdLst>
   <p:notesMasterIdLst>
-    <p:notesMasterId r:id="rId19"/>
+    <p:notesMasterId r:id="rId20"/>
   </p:notesMasterIdLst>
   <p:sldIdLst>
     <p:sldId id="256" r:id="rId3"/>
@@ -18,13 +18,14 @@
     <p:sldId id="269" r:id="rId9"/>
     <p:sldId id="280" r:id="rId10"/>
     <p:sldId id="281" r:id="rId11"/>
-    <p:sldId id="279" r:id="rId12"/>
-    <p:sldId id="270" r:id="rId13"/>
-    <p:sldId id="271" r:id="rId14"/>
-    <p:sldId id="282" r:id="rId15"/>
-    <p:sldId id="283" r:id="rId16"/>
-    <p:sldId id="274" r:id="rId17"/>
-    <p:sldId id="267" r:id="rId18"/>
+    <p:sldId id="284" r:id="rId12"/>
+    <p:sldId id="279" r:id="rId13"/>
+    <p:sldId id="270" r:id="rId14"/>
+    <p:sldId id="271" r:id="rId15"/>
+    <p:sldId id="282" r:id="rId16"/>
+    <p:sldId id="283" r:id="rId17"/>
+    <p:sldId id="274" r:id="rId18"/>
+    <p:sldId id="267" r:id="rId19"/>
   </p:sldIdLst>
   <p:sldSz cx="9144000" cy="6858000" type="screen4x3"/>
   <p:notesSz cx="6858000" cy="9144000"/>
@@ -125,7 +126,7 @@
   </p:defaultTextStyle>
   <p:extLst>
     <p:ext uri="{EFAFB233-063F-42B5-8137-9DF3F51BA10A}">
-      <p15:sldGuideLst xmlns="" xmlns:p15="http://schemas.microsoft.com/office/powerpoint/2012/main">
+      <p15:sldGuideLst xmlns:p15="http://schemas.microsoft.com/office/powerpoint/2012/main">
         <p15:guide id="1" orient="horz" pos="2160">
           <p15:clr>
             <a:srgbClr val="A4A3A4"/>
@@ -224,7 +225,7 @@
           <a:p>
             <a:fld id="{7A466098-8D44-47E3-A6D0-3EBDA642D1D9}" type="datetimeFigureOut">
               <a:rPr lang="en-US" smtClean="0"/>
-              <a:t>2/10/2014</a:t>
+              <a:t>2/11/2014</a:t>
             </a:fld>
             <a:endParaRPr lang="en-US"/>
           </a:p>
@@ -745,7 +746,7 @@
           <a:p>
             <a:fld id="{CC2990F0-8476-4A68-82FA-873BDD6B740E}" type="datetimeFigureOut">
               <a:rPr lang="en-US" smtClean="0"/>
-              <a:t>2/10/2014</a:t>
+              <a:t>2/11/2014</a:t>
             </a:fld>
             <a:endParaRPr lang="en-US"/>
           </a:p>
@@ -958,7 +959,7 @@
           <a:p>
             <a:fld id="{CC2990F0-8476-4A68-82FA-873BDD6B740E}" type="datetimeFigureOut">
               <a:rPr lang="en-US" smtClean="0"/>
-              <a:t>2/10/2014</a:t>
+              <a:t>2/11/2014</a:t>
             </a:fld>
             <a:endParaRPr lang="en-US"/>
           </a:p>
@@ -1225,7 +1226,7 @@
           <a:p>
             <a:fld id="{CC2990F0-8476-4A68-82FA-873BDD6B740E}" type="datetimeFigureOut">
               <a:rPr lang="en-US" smtClean="0"/>
-              <a:t>2/10/2014</a:t>
+              <a:t>2/11/2014</a:t>
             </a:fld>
             <a:endParaRPr lang="en-US"/>
           </a:p>
@@ -1477,7 +1478,7 @@
                 </a:solidFill>
               </a:rPr>
               <a:pPr/>
-              <a:t>2/10/2014</a:t>
+              <a:t>2/11/2014</a:t>
             </a:fld>
             <a:endParaRPr lang="en-US">
               <a:solidFill>
@@ -1679,7 +1680,7 @@
                 </a:solidFill>
               </a:rPr>
               <a:pPr/>
-              <a:t>2/10/2014</a:t>
+              <a:t>2/11/2014</a:t>
             </a:fld>
             <a:endParaRPr lang="en-US">
               <a:solidFill>
@@ -1957,7 +1958,7 @@
                 </a:solidFill>
               </a:rPr>
               <a:pPr/>
-              <a:t>2/10/2014</a:t>
+              <a:t>2/11/2014</a:t>
             </a:fld>
             <a:endParaRPr lang="en-US">
               <a:solidFill>
@@ -2277,7 +2278,7 @@
                 </a:solidFill>
               </a:rPr>
               <a:pPr/>
-              <a:t>2/10/2014</a:t>
+              <a:t>2/11/2014</a:t>
             </a:fld>
             <a:endParaRPr lang="en-US">
               <a:solidFill>
@@ -2731,7 +2732,7 @@
                 </a:solidFill>
               </a:rPr>
               <a:pPr/>
-              <a:t>2/10/2014</a:t>
+              <a:t>2/11/2014</a:t>
             </a:fld>
             <a:endParaRPr lang="en-US">
               <a:solidFill>
@@ -2881,7 +2882,7 @@
                 </a:solidFill>
               </a:rPr>
               <a:pPr/>
-              <a:t>2/10/2014</a:t>
+              <a:t>2/11/2014</a:t>
             </a:fld>
             <a:endParaRPr lang="en-US">
               <a:solidFill>
@@ -3008,7 +3009,7 @@
                 </a:solidFill>
               </a:rPr>
               <a:pPr/>
-              <a:t>2/10/2014</a:t>
+              <a:t>2/11/2014</a:t>
             </a:fld>
             <a:endParaRPr lang="en-US">
               <a:solidFill>
@@ -3317,7 +3318,7 @@
                 </a:solidFill>
               </a:rPr>
               <a:pPr/>
-              <a:t>2/10/2014</a:t>
+              <a:t>2/11/2014</a:t>
             </a:fld>
             <a:endParaRPr lang="en-US">
               <a:solidFill>
@@ -3489,7 +3490,7 @@
           <a:p>
             <a:fld id="{CC2990F0-8476-4A68-82FA-873BDD6B740E}" type="datetimeFigureOut">
               <a:rPr lang="en-US" smtClean="0"/>
-              <a:t>2/10/2014</a:t>
+              <a:t>2/11/2014</a:t>
             </a:fld>
             <a:endParaRPr lang="en-US"/>
           </a:p>
@@ -3774,7 +3775,7 @@
                 </a:solidFill>
               </a:rPr>
               <a:pPr/>
-              <a:t>2/10/2014</a:t>
+              <a:t>2/11/2014</a:t>
             </a:fld>
             <a:endParaRPr lang="en-US">
               <a:solidFill>
@@ -3976,7 +3977,7 @@
                 </a:solidFill>
               </a:rPr>
               <a:pPr/>
-              <a:t>2/10/2014</a:t>
+              <a:t>2/11/2014</a:t>
             </a:fld>
             <a:endParaRPr lang="en-US">
               <a:solidFill>
@@ -4188,7 +4189,7 @@
                 </a:solidFill>
               </a:rPr>
               <a:pPr/>
-              <a:t>2/10/2014</a:t>
+              <a:t>2/11/2014</a:t>
             </a:fld>
             <a:endParaRPr lang="en-US">
               <a:solidFill>
@@ -4525,7 +4526,7 @@
           <a:p>
             <a:fld id="{CC2990F0-8476-4A68-82FA-873BDD6B740E}" type="datetimeFigureOut">
               <a:rPr lang="en-US" smtClean="0"/>
-              <a:t>2/10/2014</a:t>
+              <a:t>2/11/2014</a:t>
             </a:fld>
             <a:endParaRPr lang="en-US"/>
           </a:p>
@@ -4833,7 +4834,7 @@
           <a:p>
             <a:fld id="{CC2990F0-8476-4A68-82FA-873BDD6B740E}" type="datetimeFigureOut">
               <a:rPr lang="en-US" smtClean="0"/>
-              <a:t>2/10/2014</a:t>
+              <a:t>2/11/2014</a:t>
             </a:fld>
             <a:endParaRPr lang="en-US"/>
           </a:p>
@@ -5254,7 +5255,7 @@
           <a:p>
             <a:fld id="{CC2990F0-8476-4A68-82FA-873BDD6B740E}" type="datetimeFigureOut">
               <a:rPr lang="en-US" smtClean="0"/>
-              <a:t>2/10/2014</a:t>
+              <a:t>2/11/2014</a:t>
             </a:fld>
             <a:endParaRPr lang="en-US"/>
           </a:p>
@@ -5367,7 +5368,7 @@
           <a:p>
             <a:fld id="{CC2990F0-8476-4A68-82FA-873BDD6B740E}" type="datetimeFigureOut">
               <a:rPr lang="en-US" smtClean="0"/>
-              <a:t>2/10/2014</a:t>
+              <a:t>2/11/2014</a:t>
             </a:fld>
             <a:endParaRPr lang="en-US"/>
           </a:p>
@@ -5526,7 +5527,7 @@
           <a:p>
             <a:fld id="{CC2990F0-8476-4A68-82FA-873BDD6B740E}" type="datetimeFigureOut">
               <a:rPr lang="en-US" smtClean="0"/>
-              <a:t>2/10/2014</a:t>
+              <a:t>2/11/2014</a:t>
             </a:fld>
             <a:endParaRPr lang="en-US"/>
           </a:p>
@@ -5910,7 +5911,7 @@
           <a:p>
             <a:fld id="{CC2990F0-8476-4A68-82FA-873BDD6B740E}" type="datetimeFigureOut">
               <a:rPr lang="en-US" smtClean="0"/>
-              <a:t>2/10/2014</a:t>
+              <a:t>2/11/2014</a:t>
             </a:fld>
             <a:endParaRPr lang="en-US"/>
           </a:p>
@@ -6272,7 +6273,7 @@
           <a:p>
             <a:fld id="{CC2990F0-8476-4A68-82FA-873BDD6B740E}" type="datetimeFigureOut">
               <a:rPr lang="en-US" smtClean="0"/>
-              <a:t>2/10/2014</a:t>
+              <a:t>2/11/2014</a:t>
             </a:fld>
             <a:endParaRPr lang="en-US"/>
           </a:p>
@@ -6606,7 +6607,7 @@
           <a:p>
             <a:fld id="{CC2990F0-8476-4A68-82FA-873BDD6B740E}" type="datetimeFigureOut">
               <a:rPr lang="en-US" smtClean="0"/>
-              <a:t>2/10/2014</a:t>
+              <a:t>2/11/2014</a:t>
             </a:fld>
             <a:endParaRPr lang="en-US"/>
           </a:p>
@@ -7155,7 +7156,7 @@
                 </a:solidFill>
               </a:rPr>
               <a:pPr/>
-              <a:t>2/10/2014</a:t>
+              <a:t>2/11/2014</a:t>
             </a:fld>
             <a:endParaRPr lang="en-US" smtClean="0">
               <a:solidFill>
@@ -7859,220 +7860,741 @@
           <a:chExt cx="0" cy="0"/>
         </a:xfrm>
       </p:grpSpPr>
-      <p:sp>
-        <p:nvSpPr>
-          <p:cNvPr id="2" name="Content Placeholder 1"/>
-          <p:cNvSpPr>
-            <a:spLocks noGrp="1"/>
-          </p:cNvSpPr>
+      <p:graphicFrame>
+        <p:nvGraphicFramePr>
+          <p:cNvPr id="6" name="Content Placeholder 5"/>
+          <p:cNvGraphicFramePr>
+            <a:graphicFrameLocks noGrp="1"/>
+          </p:cNvGraphicFramePr>
           <p:nvPr>
             <p:ph idx="1"/>
+            <p:extLst>
+              <p:ext uri="{D42A27DB-BD31-4B8C-83A1-F6EECF244321}">
+                <p14:modId xmlns:p14="http://schemas.microsoft.com/office/powerpoint/2010/main" val="346593744"/>
+              </p:ext>
+            </p:extLst>
+          </p:nvPr>
+        </p:nvGraphicFramePr>
+        <p:xfrm>
+          <a:off x="152400" y="1371600"/>
+          <a:ext cx="8839200" cy="5334001"/>
+        </p:xfrm>
+        <a:graphic>
+          <a:graphicData uri="http://schemas.openxmlformats.org/drawingml/2006/table">
+            <a:tbl>
+              <a:tblPr firstRow="1" firstCol="1" bandRow="1">
+                <a:tableStyleId>{5C22544A-7EE6-4342-B048-85BDC9FD1C3A}</a:tableStyleId>
+              </a:tblPr>
+              <a:tblGrid>
+                <a:gridCol w="1579996"/>
+                <a:gridCol w="1399174"/>
+                <a:gridCol w="5860030"/>
+              </a:tblGrid>
+              <a:tr h="242455">
+                <a:tc>
+                  <a:txBody>
+                    <a:bodyPr/>
+                    <a:lstStyle/>
+                    <a:p>
+                      <a:pPr marL="0" marR="0" algn="ctr">
+                        <a:spcBef>
+                          <a:spcPts val="0"/>
+                        </a:spcBef>
+                        <a:spcAft>
+                          <a:spcPts val="0"/>
+                        </a:spcAft>
+                      </a:pPr>
+                      <a:r>
+                        <a:rPr lang="en-US" sz="1100">
+                          <a:effectLst/>
+                        </a:rPr>
+                        <a:t>Metric</a:t>
+                      </a:r>
+                      <a:endParaRPr lang="en-US" sz="1100">
+                        <a:effectLst/>
+                        <a:latin typeface="Calibri" panose="020F0502020204030204" pitchFamily="34" charset="0"/>
+                        <a:ea typeface="Calibri" panose="020F0502020204030204" pitchFamily="34" charset="0"/>
+                        <a:cs typeface="Times New Roman" panose="02020603050405020304" pitchFamily="18" charset="0"/>
+                      </a:endParaRPr>
+                    </a:p>
+                  </a:txBody>
+                  <a:tcPr marL="68580" marR="68580" marT="0" marB="0"/>
+                </a:tc>
+                <a:tc>
+                  <a:txBody>
+                    <a:bodyPr/>
+                    <a:lstStyle/>
+                    <a:p>
+                      <a:pPr marL="0" marR="0" algn="ctr">
+                        <a:spcBef>
+                          <a:spcPts val="0"/>
+                        </a:spcBef>
+                        <a:spcAft>
+                          <a:spcPts val="0"/>
+                        </a:spcAft>
+                      </a:pPr>
+                      <a:r>
+                        <a:rPr lang="en-US" sz="1100">
+                          <a:effectLst/>
+                        </a:rPr>
+                        <a:t>Target</a:t>
+                      </a:r>
+                      <a:endParaRPr lang="en-US" sz="1100">
+                        <a:effectLst/>
+                        <a:latin typeface="Calibri" panose="020F0502020204030204" pitchFamily="34" charset="0"/>
+                        <a:ea typeface="Calibri" panose="020F0502020204030204" pitchFamily="34" charset="0"/>
+                        <a:cs typeface="Times New Roman" panose="02020603050405020304" pitchFamily="18" charset="0"/>
+                      </a:endParaRPr>
+                    </a:p>
+                  </a:txBody>
+                  <a:tcPr marL="68580" marR="68580" marT="0" marB="0"/>
+                </a:tc>
+                <a:tc>
+                  <a:txBody>
+                    <a:bodyPr/>
+                    <a:lstStyle/>
+                    <a:p>
+                      <a:pPr marL="0" marR="0" algn="ctr">
+                        <a:spcBef>
+                          <a:spcPts val="0"/>
+                        </a:spcBef>
+                        <a:spcAft>
+                          <a:spcPts val="0"/>
+                        </a:spcAft>
+                      </a:pPr>
+                      <a:r>
+                        <a:rPr lang="en-US" sz="1100">
+                          <a:effectLst/>
+                        </a:rPr>
+                        <a:t>Description</a:t>
+                      </a:r>
+                      <a:endParaRPr lang="en-US" sz="1100">
+                        <a:effectLst/>
+                        <a:latin typeface="Calibri" panose="020F0502020204030204" pitchFamily="34" charset="0"/>
+                        <a:ea typeface="Calibri" panose="020F0502020204030204" pitchFamily="34" charset="0"/>
+                        <a:cs typeface="Times New Roman" panose="02020603050405020304" pitchFamily="18" charset="0"/>
+                      </a:endParaRPr>
+                    </a:p>
+                  </a:txBody>
+                  <a:tcPr marL="68580" marR="68580" marT="0" marB="0"/>
+                </a:tc>
+              </a:tr>
+              <a:tr h="727364">
+                <a:tc>
+                  <a:txBody>
+                    <a:bodyPr/>
+                    <a:lstStyle/>
+                    <a:p>
+                      <a:pPr marL="0" marR="0" algn="ctr">
+                        <a:spcBef>
+                          <a:spcPts val="0"/>
+                        </a:spcBef>
+                        <a:spcAft>
+                          <a:spcPts val="0"/>
+                        </a:spcAft>
+                      </a:pPr>
+                      <a:r>
+                        <a:rPr lang="en-US" sz="1100">
+                          <a:effectLst/>
+                        </a:rPr>
+                        <a:t>3D Graphics</a:t>
+                      </a:r>
+                      <a:endParaRPr lang="en-US" sz="1100">
+                        <a:effectLst/>
+                        <a:latin typeface="Calibri" panose="020F0502020204030204" pitchFamily="34" charset="0"/>
+                        <a:ea typeface="Calibri" panose="020F0502020204030204" pitchFamily="34" charset="0"/>
+                        <a:cs typeface="Times New Roman" panose="02020603050405020304" pitchFamily="18" charset="0"/>
+                      </a:endParaRPr>
+                    </a:p>
+                  </a:txBody>
+                  <a:tcPr marL="68580" marR="68580" marT="0" marB="0"/>
+                </a:tc>
+                <a:tc>
+                  <a:txBody>
+                    <a:bodyPr/>
+                    <a:lstStyle/>
+                    <a:p>
+                      <a:pPr marL="0" marR="0">
+                        <a:spcBef>
+                          <a:spcPts val="0"/>
+                        </a:spcBef>
+                        <a:spcAft>
+                          <a:spcPts val="0"/>
+                        </a:spcAft>
+                      </a:pPr>
+                      <a:r>
+                        <a:rPr lang="en-US" sz="1100">
+                          <a:effectLst/>
+                        </a:rPr>
+                        <a:t>Minimum 5000 polygon count</a:t>
+                      </a:r>
+                      <a:endParaRPr lang="en-US" sz="1100">
+                        <a:effectLst/>
+                        <a:latin typeface="Calibri" panose="020F0502020204030204" pitchFamily="34" charset="0"/>
+                        <a:ea typeface="Calibri" panose="020F0502020204030204" pitchFamily="34" charset="0"/>
+                        <a:cs typeface="Times New Roman" panose="02020603050405020304" pitchFamily="18" charset="0"/>
+                      </a:endParaRPr>
+                    </a:p>
+                  </a:txBody>
+                  <a:tcPr marL="68580" marR="68580" marT="0" marB="0"/>
+                </a:tc>
+                <a:tc>
+                  <a:txBody>
+                    <a:bodyPr/>
+                    <a:lstStyle/>
+                    <a:p>
+                      <a:pPr marL="0" marR="0">
+                        <a:spcBef>
+                          <a:spcPts val="0"/>
+                        </a:spcBef>
+                        <a:spcAft>
+                          <a:spcPts val="0"/>
+                        </a:spcAft>
+                      </a:pPr>
+                      <a:r>
+                        <a:rPr lang="en-US" sz="1100">
+                          <a:effectLst/>
+                        </a:rPr>
+                        <a:t>The user will expect to see a good 3d image. Phase 2 offers opportunities to increase graphical performance.</a:t>
+                      </a:r>
+                      <a:endParaRPr lang="en-US" sz="1100">
+                        <a:effectLst/>
+                        <a:latin typeface="Calibri" panose="020F0502020204030204" pitchFamily="34" charset="0"/>
+                        <a:ea typeface="Calibri" panose="020F0502020204030204" pitchFamily="34" charset="0"/>
+                        <a:cs typeface="Times New Roman" panose="02020603050405020304" pitchFamily="18" charset="0"/>
+                      </a:endParaRPr>
+                    </a:p>
+                  </a:txBody>
+                  <a:tcPr marL="68580" marR="68580" marT="0" marB="0"/>
+                </a:tc>
+              </a:tr>
+              <a:tr h="727364">
+                <a:tc>
+                  <a:txBody>
+                    <a:bodyPr/>
+                    <a:lstStyle/>
+                    <a:p>
+                      <a:pPr marL="0" marR="0" algn="r">
+                        <a:spcBef>
+                          <a:spcPts val="0"/>
+                        </a:spcBef>
+                        <a:spcAft>
+                          <a:spcPts val="0"/>
+                        </a:spcAft>
+                      </a:pPr>
+                      <a:r>
+                        <a:rPr lang="en-US" sz="1100">
+                          <a:effectLst/>
+                        </a:rPr>
+                        <a:t>Graphics</a:t>
+                      </a:r>
+                      <a:endParaRPr lang="en-US" sz="1100">
+                        <a:effectLst/>
+                        <a:latin typeface="Calibri" panose="020F0502020204030204" pitchFamily="34" charset="0"/>
+                        <a:ea typeface="Calibri" panose="020F0502020204030204" pitchFamily="34" charset="0"/>
+                        <a:cs typeface="Times New Roman" panose="02020603050405020304" pitchFamily="18" charset="0"/>
+                      </a:endParaRPr>
+                    </a:p>
+                  </a:txBody>
+                  <a:tcPr marL="68580" marR="68580" marT="0" marB="0"/>
+                </a:tc>
+                <a:tc>
+                  <a:txBody>
+                    <a:bodyPr/>
+                    <a:lstStyle/>
+                    <a:p>
+                      <a:pPr marL="0" marR="0">
+                        <a:spcBef>
+                          <a:spcPts val="0"/>
+                        </a:spcBef>
+                        <a:spcAft>
+                          <a:spcPts val="0"/>
+                        </a:spcAft>
+                      </a:pPr>
+                      <a:r>
+                        <a:rPr lang="en-US" sz="1100">
+                          <a:effectLst/>
+                        </a:rPr>
+                        <a:t>Minimum 20 Hz update rate</a:t>
+                      </a:r>
+                      <a:endParaRPr lang="en-US" sz="1100">
+                        <a:effectLst/>
+                        <a:latin typeface="Calibri" panose="020F0502020204030204" pitchFamily="34" charset="0"/>
+                        <a:ea typeface="Calibri" panose="020F0502020204030204" pitchFamily="34" charset="0"/>
+                        <a:cs typeface="Times New Roman" panose="02020603050405020304" pitchFamily="18" charset="0"/>
+                      </a:endParaRPr>
+                    </a:p>
+                  </a:txBody>
+                  <a:tcPr marL="68580" marR="68580" marT="0" marB="0"/>
+                </a:tc>
+                <a:tc>
+                  <a:txBody>
+                    <a:bodyPr/>
+                    <a:lstStyle/>
+                    <a:p>
+                      <a:pPr marL="0" marR="0">
+                        <a:spcBef>
+                          <a:spcPts val="0"/>
+                        </a:spcBef>
+                        <a:spcAft>
+                          <a:spcPts val="0"/>
+                        </a:spcAft>
+                      </a:pPr>
+                      <a:r>
+                        <a:rPr lang="en-US" sz="1100">
+                          <a:effectLst/>
+                        </a:rPr>
+                        <a:t>We will need to render ghosts and the maze walls in real time according to the user’s geospatial location and their head orientation.</a:t>
+                      </a:r>
+                      <a:endParaRPr lang="en-US" sz="1100">
+                        <a:effectLst/>
+                        <a:latin typeface="Calibri" panose="020F0502020204030204" pitchFamily="34" charset="0"/>
+                        <a:ea typeface="Calibri" panose="020F0502020204030204" pitchFamily="34" charset="0"/>
+                        <a:cs typeface="Times New Roman" panose="02020603050405020304" pitchFamily="18" charset="0"/>
+                      </a:endParaRPr>
+                    </a:p>
+                  </a:txBody>
+                  <a:tcPr marL="68580" marR="68580" marT="0" marB="0"/>
+                </a:tc>
+              </a:tr>
+              <a:tr h="969818">
+                <a:tc>
+                  <a:txBody>
+                    <a:bodyPr/>
+                    <a:lstStyle/>
+                    <a:p>
+                      <a:pPr marL="0" marR="0" algn="r">
+                        <a:spcBef>
+                          <a:spcPts val="0"/>
+                        </a:spcBef>
+                        <a:spcAft>
+                          <a:spcPts val="0"/>
+                        </a:spcAft>
+                      </a:pPr>
+                      <a:r>
+                        <a:rPr lang="en-US" sz="1100">
+                          <a:effectLst/>
+                        </a:rPr>
+                        <a:t>Collision Detection</a:t>
+                      </a:r>
+                      <a:endParaRPr lang="en-US" sz="1100">
+                        <a:effectLst/>
+                        <a:latin typeface="Calibri" panose="020F0502020204030204" pitchFamily="34" charset="0"/>
+                        <a:ea typeface="Calibri" panose="020F0502020204030204" pitchFamily="34" charset="0"/>
+                        <a:cs typeface="Times New Roman" panose="02020603050405020304" pitchFamily="18" charset="0"/>
+                      </a:endParaRPr>
+                    </a:p>
+                  </a:txBody>
+                  <a:tcPr marL="68580" marR="68580" marT="0" marB="0"/>
+                </a:tc>
+                <a:tc>
+                  <a:txBody>
+                    <a:bodyPr/>
+                    <a:lstStyle/>
+                    <a:p>
+                      <a:pPr marL="0" marR="0">
+                        <a:spcBef>
+                          <a:spcPts val="0"/>
+                        </a:spcBef>
+                        <a:spcAft>
+                          <a:spcPts val="0"/>
+                        </a:spcAft>
+                      </a:pPr>
+                      <a:r>
+                        <a:rPr lang="en-US" sz="1100">
+                          <a:effectLst/>
+                        </a:rPr>
+                        <a:t>Minimum 2 meter accuracy and precision</a:t>
+                      </a:r>
+                      <a:endParaRPr lang="en-US" sz="1100">
+                        <a:effectLst/>
+                        <a:latin typeface="Calibri" panose="020F0502020204030204" pitchFamily="34" charset="0"/>
+                        <a:ea typeface="Calibri" panose="020F0502020204030204" pitchFamily="34" charset="0"/>
+                        <a:cs typeface="Times New Roman" panose="02020603050405020304" pitchFamily="18" charset="0"/>
+                      </a:endParaRPr>
+                    </a:p>
+                  </a:txBody>
+                  <a:tcPr marL="68580" marR="68580" marT="0" marB="0"/>
+                </a:tc>
+                <a:tc>
+                  <a:txBody>
+                    <a:bodyPr/>
+                    <a:lstStyle/>
+                    <a:p>
+                      <a:pPr marL="0" marR="0">
+                        <a:spcBef>
+                          <a:spcPts val="0"/>
+                        </a:spcBef>
+                        <a:spcAft>
+                          <a:spcPts val="0"/>
+                        </a:spcAft>
+                      </a:pPr>
+                      <a:r>
+                        <a:rPr lang="en-US" sz="1100">
+                          <a:effectLst/>
+                        </a:rPr>
+                        <a:t>The ability of the software to detect collision detection will be affected by the accuracy of the GPS. The minimum required to be meaningful cannot exceed a couple of meters. This means ghosts could be 2 m</a:t>
+                      </a:r>
+                      <a:r>
+                        <a:rPr lang="en-US" sz="1100" baseline="30000">
+                          <a:effectLst/>
+                        </a:rPr>
+                        <a:t>2</a:t>
+                      </a:r>
+                      <a:r>
+                        <a:rPr lang="en-US" sz="1100">
+                          <a:effectLst/>
+                        </a:rPr>
+                        <a:t> to account for accuracy of GPS.</a:t>
+                      </a:r>
+                      <a:endParaRPr lang="en-US" sz="1100">
+                        <a:effectLst/>
+                        <a:latin typeface="Calibri" panose="020F0502020204030204" pitchFamily="34" charset="0"/>
+                        <a:ea typeface="Calibri" panose="020F0502020204030204" pitchFamily="34" charset="0"/>
+                        <a:cs typeface="Times New Roman" panose="02020603050405020304" pitchFamily="18" charset="0"/>
+                      </a:endParaRPr>
+                    </a:p>
+                  </a:txBody>
+                  <a:tcPr marL="68580" marR="68580" marT="0" marB="0"/>
+                </a:tc>
+              </a:tr>
+              <a:tr h="969818">
+                <a:tc>
+                  <a:txBody>
+                    <a:bodyPr/>
+                    <a:lstStyle/>
+                    <a:p>
+                      <a:pPr marL="0" marR="0" algn="r">
+                        <a:spcBef>
+                          <a:spcPts val="0"/>
+                        </a:spcBef>
+                        <a:spcAft>
+                          <a:spcPts val="0"/>
+                        </a:spcAft>
+                      </a:pPr>
+                      <a:r>
+                        <a:rPr lang="en-US" sz="1100">
+                          <a:effectLst/>
+                        </a:rPr>
+                        <a:t>Network </a:t>
+                      </a:r>
+                    </a:p>
+                    <a:p>
+                      <a:pPr marL="0" marR="0" algn="r">
+                        <a:spcBef>
+                          <a:spcPts val="0"/>
+                        </a:spcBef>
+                        <a:spcAft>
+                          <a:spcPts val="0"/>
+                        </a:spcAft>
+                      </a:pPr>
+                      <a:r>
+                        <a:rPr lang="en-US" sz="1100">
+                          <a:effectLst/>
+                        </a:rPr>
+                        <a:t>User Position Update Rate </a:t>
+                      </a:r>
+                      <a:endParaRPr lang="en-US" sz="1100">
+                        <a:effectLst/>
+                        <a:latin typeface="Calibri" panose="020F0502020204030204" pitchFamily="34" charset="0"/>
+                        <a:ea typeface="Calibri" panose="020F0502020204030204" pitchFamily="34" charset="0"/>
+                        <a:cs typeface="Times New Roman" panose="02020603050405020304" pitchFamily="18" charset="0"/>
+                      </a:endParaRPr>
+                    </a:p>
+                  </a:txBody>
+                  <a:tcPr marL="68580" marR="68580" marT="0" marB="0"/>
+                </a:tc>
+                <a:tc>
+                  <a:txBody>
+                    <a:bodyPr/>
+                    <a:lstStyle/>
+                    <a:p>
+                      <a:pPr marL="0" marR="0">
+                        <a:spcBef>
+                          <a:spcPts val="0"/>
+                        </a:spcBef>
+                        <a:spcAft>
+                          <a:spcPts val="0"/>
+                        </a:spcAft>
+                      </a:pPr>
+                      <a:r>
+                        <a:rPr lang="en-US" sz="1100">
+                          <a:effectLst/>
+                        </a:rPr>
+                        <a:t>Minimum of 20Hz (50ms).</a:t>
+                      </a:r>
+                      <a:endParaRPr lang="en-US" sz="1100">
+                        <a:effectLst/>
+                        <a:latin typeface="Calibri" panose="020F0502020204030204" pitchFamily="34" charset="0"/>
+                        <a:ea typeface="Calibri" panose="020F0502020204030204" pitchFamily="34" charset="0"/>
+                        <a:cs typeface="Times New Roman" panose="02020603050405020304" pitchFamily="18" charset="0"/>
+                      </a:endParaRPr>
+                    </a:p>
+                  </a:txBody>
+                  <a:tcPr marL="68580" marR="68580" marT="0" marB="0"/>
+                </a:tc>
+                <a:tc>
+                  <a:txBody>
+                    <a:bodyPr/>
+                    <a:lstStyle/>
+                    <a:p>
+                      <a:pPr marL="0" marR="0">
+                        <a:spcBef>
+                          <a:spcPts val="0"/>
+                        </a:spcBef>
+                        <a:spcAft>
+                          <a:spcPts val="0"/>
+                        </a:spcAft>
+                      </a:pPr>
+                      <a:r>
+                        <a:rPr lang="en-US" sz="1100">
+                          <a:effectLst/>
+                        </a:rPr>
+                        <a:t>The position and orientation of each headset will need to be communicated wirelessly at least every 50ms to keep up with the GPS and provide meaningful feedback about collisions to each headset.</a:t>
+                      </a:r>
+                      <a:endParaRPr lang="en-US" sz="1100">
+                        <a:effectLst/>
+                        <a:latin typeface="Calibri" panose="020F0502020204030204" pitchFamily="34" charset="0"/>
+                        <a:ea typeface="Calibri" panose="020F0502020204030204" pitchFamily="34" charset="0"/>
+                        <a:cs typeface="Times New Roman" panose="02020603050405020304" pitchFamily="18" charset="0"/>
+                      </a:endParaRPr>
+                    </a:p>
+                  </a:txBody>
+                  <a:tcPr marL="68580" marR="68580" marT="0" marB="0"/>
+                </a:tc>
+              </a:tr>
+              <a:tr h="727364">
+                <a:tc>
+                  <a:txBody>
+                    <a:bodyPr/>
+                    <a:lstStyle/>
+                    <a:p>
+                      <a:pPr marL="0" marR="0" algn="r">
+                        <a:spcBef>
+                          <a:spcPts val="0"/>
+                        </a:spcBef>
+                        <a:spcAft>
+                          <a:spcPts val="0"/>
+                        </a:spcAft>
+                      </a:pPr>
+                      <a:r>
+                        <a:rPr lang="en-US" sz="1100">
+                          <a:effectLst/>
+                        </a:rPr>
+                        <a:t>Network</a:t>
+                      </a:r>
+                    </a:p>
+                    <a:p>
+                      <a:pPr marL="0" marR="0" algn="r">
+                        <a:spcBef>
+                          <a:spcPts val="0"/>
+                        </a:spcBef>
+                        <a:spcAft>
+                          <a:spcPts val="0"/>
+                        </a:spcAft>
+                      </a:pPr>
+                      <a:r>
+                        <a:rPr lang="en-US" sz="1100">
+                          <a:effectLst/>
+                        </a:rPr>
+                        <a:t>Graphic Position Update Rate </a:t>
+                      </a:r>
+                      <a:endParaRPr lang="en-US" sz="1100">
+                        <a:effectLst/>
+                        <a:latin typeface="Calibri" panose="020F0502020204030204" pitchFamily="34" charset="0"/>
+                        <a:ea typeface="Calibri" panose="020F0502020204030204" pitchFamily="34" charset="0"/>
+                        <a:cs typeface="Times New Roman" panose="02020603050405020304" pitchFamily="18" charset="0"/>
+                      </a:endParaRPr>
+                    </a:p>
+                  </a:txBody>
+                  <a:tcPr marL="68580" marR="68580" marT="0" marB="0"/>
+                </a:tc>
+                <a:tc>
+                  <a:txBody>
+                    <a:bodyPr/>
+                    <a:lstStyle/>
+                    <a:p>
+                      <a:pPr marL="0" marR="0">
+                        <a:spcBef>
+                          <a:spcPts val="0"/>
+                        </a:spcBef>
+                        <a:spcAft>
+                          <a:spcPts val="0"/>
+                        </a:spcAft>
+                      </a:pPr>
+                      <a:r>
+                        <a:rPr lang="en-US" sz="1100">
+                          <a:effectLst/>
+                        </a:rPr>
+                        <a:t>Minimum of 20Hz</a:t>
+                      </a:r>
+                    </a:p>
+                    <a:p>
+                      <a:pPr marL="0" marR="0">
+                        <a:spcBef>
+                          <a:spcPts val="0"/>
+                        </a:spcBef>
+                        <a:spcAft>
+                          <a:spcPts val="0"/>
+                        </a:spcAft>
+                      </a:pPr>
+                      <a:r>
+                        <a:rPr lang="en-US" sz="1100">
+                          <a:effectLst/>
+                        </a:rPr>
+                        <a:t>(50ms)</a:t>
+                      </a:r>
+                      <a:endParaRPr lang="en-US" sz="1100">
+                        <a:effectLst/>
+                        <a:latin typeface="Calibri" panose="020F0502020204030204" pitchFamily="34" charset="0"/>
+                        <a:ea typeface="Calibri" panose="020F0502020204030204" pitchFamily="34" charset="0"/>
+                        <a:cs typeface="Times New Roman" panose="02020603050405020304" pitchFamily="18" charset="0"/>
+                      </a:endParaRPr>
+                    </a:p>
+                  </a:txBody>
+                  <a:tcPr marL="68580" marR="68580" marT="0" marB="0"/>
+                </a:tc>
+                <a:tc>
+                  <a:txBody>
+                    <a:bodyPr/>
+                    <a:lstStyle/>
+                    <a:p>
+                      <a:pPr marL="0" marR="0">
+                        <a:spcBef>
+                          <a:spcPts val="0"/>
+                        </a:spcBef>
+                        <a:spcAft>
+                          <a:spcPts val="0"/>
+                        </a:spcAft>
+                      </a:pPr>
+                      <a:r>
+                        <a:rPr lang="en-US" sz="1100">
+                          <a:effectLst/>
+                        </a:rPr>
+                        <a:t>The position information about positions of ghosts and other virtual objects needs to be updated in a timely manner and should at least be as fast as the update rate of the player’s position.</a:t>
+                      </a:r>
+                      <a:endParaRPr lang="en-US" sz="1100">
+                        <a:effectLst/>
+                        <a:latin typeface="Calibri" panose="020F0502020204030204" pitchFamily="34" charset="0"/>
+                        <a:ea typeface="Calibri" panose="020F0502020204030204" pitchFamily="34" charset="0"/>
+                        <a:cs typeface="Times New Roman" panose="02020603050405020304" pitchFamily="18" charset="0"/>
+                      </a:endParaRPr>
+                    </a:p>
+                  </a:txBody>
+                  <a:tcPr marL="68580" marR="68580" marT="0" marB="0"/>
+                </a:tc>
+              </a:tr>
+              <a:tr h="969818">
+                <a:tc>
+                  <a:txBody>
+                    <a:bodyPr/>
+                    <a:lstStyle/>
+                    <a:p>
+                      <a:pPr marL="0" marR="0" algn="r">
+                        <a:spcBef>
+                          <a:spcPts val="0"/>
+                        </a:spcBef>
+                        <a:spcAft>
+                          <a:spcPts val="0"/>
+                        </a:spcAft>
+                      </a:pPr>
+                      <a:r>
+                        <a:rPr lang="en-US" sz="1100">
+                          <a:effectLst/>
+                        </a:rPr>
+                        <a:t>User Interface Usability</a:t>
+                      </a:r>
+                      <a:endParaRPr lang="en-US" sz="1100">
+                        <a:effectLst/>
+                        <a:latin typeface="Calibri" panose="020F0502020204030204" pitchFamily="34" charset="0"/>
+                        <a:ea typeface="Calibri" panose="020F0502020204030204" pitchFamily="34" charset="0"/>
+                        <a:cs typeface="Times New Roman" panose="02020603050405020304" pitchFamily="18" charset="0"/>
+                      </a:endParaRPr>
+                    </a:p>
+                  </a:txBody>
+                  <a:tcPr marL="68580" marR="68580" marT="0" marB="0"/>
+                </a:tc>
+                <a:tc>
+                  <a:txBody>
+                    <a:bodyPr/>
+                    <a:lstStyle/>
+                    <a:p>
+                      <a:pPr marL="0" marR="0">
+                        <a:spcBef>
+                          <a:spcPts val="0"/>
+                        </a:spcBef>
+                        <a:spcAft>
+                          <a:spcPts val="0"/>
+                        </a:spcAft>
+                      </a:pPr>
+                      <a:r>
+                        <a:rPr lang="en-US" sz="1100">
+                          <a:effectLst/>
+                        </a:rPr>
+                        <a:t>End user can navigate the user interface intuitively.</a:t>
+                      </a:r>
+                      <a:endParaRPr lang="en-US" sz="1100">
+                        <a:effectLst/>
+                        <a:latin typeface="Calibri" panose="020F0502020204030204" pitchFamily="34" charset="0"/>
+                        <a:ea typeface="Calibri" panose="020F0502020204030204" pitchFamily="34" charset="0"/>
+                        <a:cs typeface="Times New Roman" panose="02020603050405020304" pitchFamily="18" charset="0"/>
+                      </a:endParaRPr>
+                    </a:p>
+                  </a:txBody>
+                  <a:tcPr marL="68580" marR="68580" marT="0" marB="0"/>
+                </a:tc>
+                <a:tc>
+                  <a:txBody>
+                    <a:bodyPr/>
+                    <a:lstStyle/>
+                    <a:p>
+                      <a:pPr marL="0" marR="0">
+                        <a:spcBef>
+                          <a:spcPts val="0"/>
+                        </a:spcBef>
+                        <a:spcAft>
+                          <a:spcPts val="0"/>
+                        </a:spcAft>
+                      </a:pPr>
+                      <a:r>
+                        <a:rPr lang="en-US" sz="1100" dirty="0">
+                          <a:effectLst/>
+                        </a:rPr>
+                        <a:t>A user unfamiliar with the operation of the software should be able to figure it out with minimal references to the user manual. For phase 1 this will be displayed from the control unit. In phase 2 the user interface will migrate to the headset’s display.</a:t>
+                      </a:r>
+                      <a:endParaRPr lang="en-US" sz="1100" dirty="0">
+                        <a:effectLst/>
+                        <a:latin typeface="Calibri" panose="020F0502020204030204" pitchFamily="34" charset="0"/>
+                        <a:ea typeface="Calibri" panose="020F0502020204030204" pitchFamily="34" charset="0"/>
+                        <a:cs typeface="Times New Roman" panose="02020603050405020304" pitchFamily="18" charset="0"/>
+                      </a:endParaRPr>
+                    </a:p>
+                  </a:txBody>
+                  <a:tcPr marL="68580" marR="68580" marT="0" marB="0"/>
+                </a:tc>
+              </a:tr>
+            </a:tbl>
+          </a:graphicData>
+        </a:graphic>
+      </p:graphicFrame>
+      <p:sp>
+        <p:nvSpPr>
+          <p:cNvPr id="3" name="Title 2"/>
+          <p:cNvSpPr>
+            <a:spLocks noGrp="1"/>
+          </p:cNvSpPr>
+          <p:nvPr>
+            <p:ph type="title"/>
           </p:nvPr>
         </p:nvSpPr>
         <p:spPr/>
         <p:txBody>
-          <a:bodyPr>
-            <a:normAutofit/>
-          </a:bodyPr>
-          <a:lstStyle/>
-          <a:p>
-            <a:r>
-              <a:rPr lang="en-US" sz="2400" dirty="0" smtClean="0"/>
-              <a:t>Power consumption </a:t>
-            </a:r>
-            <a:r>
-              <a:rPr lang="en-US" sz="2400" dirty="0" smtClean="0"/>
-              <a:t>testing</a:t>
-            </a:r>
-          </a:p>
-          <a:p>
-            <a:pPr lvl="1"/>
-            <a:r>
-              <a:rPr lang="en-US" sz="2000" dirty="0" smtClean="0"/>
-              <a:t>Provided </a:t>
-            </a:r>
-            <a:r>
-              <a:rPr lang="en-US" sz="2000" dirty="0" err="1" smtClean="0"/>
-              <a:t>Terasic</a:t>
-            </a:r>
-            <a:r>
-              <a:rPr lang="en-US" sz="2000" dirty="0" smtClean="0"/>
-              <a:t> board uses 1.2 A typical (14.4 W)</a:t>
-            </a:r>
-          </a:p>
-          <a:p>
-            <a:pPr lvl="1"/>
-            <a:r>
-              <a:rPr lang="en-US" sz="2000" dirty="0" smtClean="0"/>
-              <a:t>Acceptable battery life with 60 </a:t>
-            </a:r>
-            <a:r>
-              <a:rPr lang="en-US" sz="2000" dirty="0" err="1" smtClean="0"/>
-              <a:t>Whr</a:t>
-            </a:r>
-            <a:r>
-              <a:rPr lang="en-US" sz="2000" dirty="0" smtClean="0"/>
-              <a:t> capacity</a:t>
-            </a:r>
-          </a:p>
-          <a:p>
-            <a:r>
-              <a:rPr lang="en-US" sz="2400" dirty="0" smtClean="0"/>
-              <a:t>Hardware </a:t>
-            </a:r>
-            <a:r>
-              <a:rPr lang="en-US" sz="2400" dirty="0" smtClean="0"/>
-              <a:t>design for Phase 2</a:t>
-            </a:r>
-          </a:p>
-          <a:p>
-            <a:pPr lvl="1"/>
-            <a:r>
-              <a:rPr lang="en-US" sz="2000" dirty="0" smtClean="0"/>
-              <a:t>Power </a:t>
-            </a:r>
-            <a:r>
-              <a:rPr lang="en-US" sz="2000" dirty="0" smtClean="0"/>
-              <a:t>supply design</a:t>
-            </a:r>
-          </a:p>
-          <a:p>
-            <a:pPr lvl="2"/>
+          <a:bodyPr/>
+          <a:lstStyle/>
+          <a:p>
             <a:r>
               <a:rPr lang="en-US" dirty="0" smtClean="0"/>
-              <a:t>Battery and regulator selection</a:t>
-            </a:r>
-            <a:endParaRPr lang="en-US" dirty="0" smtClean="0"/>
-          </a:p>
-          <a:p>
-            <a:pPr lvl="1"/>
-            <a:r>
-              <a:rPr lang="en-US" sz="2000" dirty="0" smtClean="0"/>
-              <a:t>Headset interfacing </a:t>
-            </a:r>
-            <a:r>
-              <a:rPr lang="en-US" sz="2000" dirty="0" smtClean="0"/>
-              <a:t>board</a:t>
-            </a:r>
-          </a:p>
-          <a:p>
-            <a:pPr lvl="2"/>
-            <a:r>
-              <a:rPr lang="en-US" dirty="0" smtClean="0"/>
-              <a:t>Re-use GPS, inertial measurement unit, microcontroller</a:t>
-            </a:r>
-            <a:endParaRPr lang="en-US" dirty="0" smtClean="0"/>
-          </a:p>
-          <a:p>
-            <a:r>
-              <a:rPr lang="en-US" sz="2400" dirty="0" smtClean="0"/>
-              <a:t>Packaging</a:t>
-            </a:r>
-            <a:endParaRPr lang="en-US" sz="2400" dirty="0" smtClean="0"/>
-          </a:p>
-          <a:p>
-            <a:pPr lvl="1"/>
-            <a:r>
-              <a:rPr lang="en-US" sz="2000" dirty="0" smtClean="0"/>
-              <a:t>Re-use optics</a:t>
-            </a:r>
-          </a:p>
-          <a:p>
-            <a:pPr lvl="1"/>
-            <a:r>
-              <a:rPr lang="en-US" sz="2000" dirty="0" smtClean="0"/>
-              <a:t>Selected new display</a:t>
-            </a:r>
-            <a:endParaRPr lang="en-US" sz="2000" dirty="0" smtClean="0"/>
-          </a:p>
-          <a:p>
-            <a:pPr lvl="1"/>
-            <a:r>
-              <a:rPr lang="en-US" sz="2000" dirty="0" smtClean="0"/>
-              <a:t>Selected helmet and backpack</a:t>
-            </a:r>
-            <a:endParaRPr lang="en-US" sz="2000" dirty="0"/>
-          </a:p>
-        </p:txBody>
-      </p:sp>
-      <p:sp>
-        <p:nvSpPr>
-          <p:cNvPr id="3" name="Title 2"/>
-          <p:cNvSpPr>
-            <a:spLocks noGrp="1"/>
-          </p:cNvSpPr>
-          <p:nvPr>
-            <p:ph type="title"/>
-          </p:nvPr>
-        </p:nvSpPr>
-        <p:spPr/>
-        <p:txBody>
-          <a:bodyPr/>
-          <a:lstStyle/>
-          <a:p>
-            <a:r>
-              <a:rPr lang="en-US" dirty="0" smtClean="0"/>
-              <a:t>Accomplishments To Date (PHA2)</a:t>
-            </a:r>
-            <a:endParaRPr lang="en-US" dirty="0"/>
-          </a:p>
-        </p:txBody>
-      </p:sp>
-      <p:sp>
-        <p:nvSpPr>
-          <p:cNvPr id="4" name="TextBox 3"/>
-          <p:cNvSpPr txBox="1"/>
-          <p:nvPr/>
-        </p:nvSpPr>
-        <p:spPr>
-          <a:xfrm>
-            <a:off x="6324600" y="2751307"/>
-            <a:ext cx="2633798" cy="369332"/>
-          </a:xfrm>
-          <a:prstGeom prst="rect">
-            <a:avLst/>
-          </a:prstGeom>
-          <a:noFill/>
-        </p:spPr>
-        <p:txBody>
-          <a:bodyPr wrap="none" rtlCol="0">
-            <a:spAutoFit/>
-          </a:bodyPr>
-          <a:lstStyle/>
-          <a:p>
-            <a:r>
-              <a:rPr lang="en-US" dirty="0" smtClean="0"/>
-              <a:t>[POWER CONSUMPTION]</a:t>
-            </a:r>
-            <a:endParaRPr lang="en-US" dirty="0"/>
-          </a:p>
-        </p:txBody>
-      </p:sp>
-      <p:sp>
-        <p:nvSpPr>
-          <p:cNvPr id="5" name="TextBox 4"/>
-          <p:cNvSpPr txBox="1"/>
-          <p:nvPr/>
-        </p:nvSpPr>
-        <p:spPr>
-          <a:xfrm>
-            <a:off x="6400800" y="4495800"/>
-            <a:ext cx="729687" cy="369332"/>
-          </a:xfrm>
-          <a:prstGeom prst="rect">
-            <a:avLst/>
-          </a:prstGeom>
-          <a:noFill/>
-        </p:spPr>
-        <p:txBody>
-          <a:bodyPr wrap="none" rtlCol="0">
-            <a:spAutoFit/>
-          </a:bodyPr>
-          <a:lstStyle/>
-          <a:p>
-            <a:r>
-              <a:rPr lang="en-US" dirty="0" smtClean="0"/>
-              <a:t>[PCB]</a:t>
+              <a:t>Software metrics</a:t>
             </a:r>
             <a:endParaRPr lang="en-US" dirty="0"/>
           </a:p>
@@ -8081,7 +8603,7 @@
     </p:spTree>
     <p:extLst>
       <p:ext uri="{BB962C8B-B14F-4D97-AF65-F5344CB8AC3E}">
-        <p14:creationId xmlns:p14="http://schemas.microsoft.com/office/powerpoint/2010/main" val="3540674889"/>
+        <p14:creationId xmlns:p14="http://schemas.microsoft.com/office/powerpoint/2010/main" val="3252650435"/>
       </p:ext>
     </p:extLst>
   </p:cSld>
@@ -8127,78 +8649,100 @@
           <a:p>
             <a:r>
               <a:rPr lang="en-US" sz="2400" dirty="0" smtClean="0"/>
-              <a:t>Display virtual environment overlay on real world</a:t>
+              <a:t>Power consumption testing</a:t>
             </a:r>
           </a:p>
           <a:p>
             <a:pPr lvl="1"/>
             <a:r>
               <a:rPr lang="en-US" sz="2000" dirty="0" smtClean="0"/>
-              <a:t>Preserves real-world depth perception</a:t>
+              <a:t>Provided </a:t>
+            </a:r>
+            <a:r>
+              <a:rPr lang="en-US" sz="2000" dirty="0" err="1" smtClean="0"/>
+              <a:t>Terasic</a:t>
+            </a:r>
+            <a:r>
+              <a:rPr lang="en-US" sz="2000" dirty="0" smtClean="0"/>
+              <a:t> board uses 1.2 A typical (14.4 W)</a:t>
             </a:r>
           </a:p>
           <a:p>
             <a:pPr lvl="1"/>
             <a:r>
               <a:rPr lang="en-US" sz="2000" dirty="0" smtClean="0"/>
-              <a:t>Large field of </a:t>
+              <a:t>Acceptable battery life with 60 </a:t>
+            </a:r>
+            <a:r>
+              <a:rPr lang="en-US" sz="2000" dirty="0" err="1" smtClean="0"/>
+              <a:t>Whr</a:t>
             </a:r>
             <a:r>
               <a:rPr lang="en-US" sz="2000" dirty="0" smtClean="0"/>
-              <a:t>view</a:t>
+              <a:t> capacity</a:t>
+            </a:r>
+          </a:p>
+          <a:p>
+            <a:r>
+              <a:rPr lang="en-US" sz="2400" dirty="0" smtClean="0"/>
+              <a:t>Hardware design for Phase 2</a:t>
             </a:r>
           </a:p>
           <a:p>
             <a:pPr lvl="1"/>
             <a:r>
               <a:rPr lang="en-US" sz="2000" dirty="0" smtClean="0"/>
-              <a:t>Both worlds perceptible simultaneously</a:t>
-            </a:r>
-            <a:endParaRPr lang="en-US" sz="2000" dirty="0" smtClean="0"/>
+              <a:t>Power supply design</a:t>
+            </a:r>
+          </a:p>
+          <a:p>
+            <a:pPr lvl="2"/>
+            <a:r>
+              <a:rPr lang="en-US" dirty="0" smtClean="0"/>
+              <a:t>Battery and regulator selection</a:t>
+            </a:r>
+          </a:p>
+          <a:p>
+            <a:pPr lvl="1"/>
+            <a:r>
+              <a:rPr lang="en-US" sz="2000" dirty="0" smtClean="0"/>
+              <a:t>Headset interfacing board</a:t>
+            </a:r>
+          </a:p>
+          <a:p>
+            <a:pPr lvl="2"/>
+            <a:r>
+              <a:rPr lang="en-US" dirty="0" smtClean="0"/>
+              <a:t>Re-use GPS, inertial measurement unit, microcontroller</a:t>
+            </a:r>
           </a:p>
           <a:p>
             <a:r>
               <a:rPr lang="en-US" sz="2400" dirty="0" smtClean="0"/>
-              <a:t>User head and position tracking</a:t>
+              <a:t>Packaging</a:t>
             </a:r>
           </a:p>
           <a:p>
             <a:pPr lvl="1"/>
             <a:r>
               <a:rPr lang="en-US" sz="2000" dirty="0" smtClean="0"/>
-              <a:t>Filtering algorithm for inertial measurement </a:t>
-            </a:r>
+              <a:t>Re-use optics</a:t>
+            </a:r>
+          </a:p>
+          <a:p>
+            <a:pPr lvl="1"/>
             <a:r>
               <a:rPr lang="en-US" sz="2000" dirty="0" smtClean="0"/>
-              <a:t>data</a:t>
-            </a:r>
-          </a:p>
-          <a:p>
-            <a:r>
-              <a:rPr lang="en-US" sz="2400" dirty="0" smtClean="0"/>
-              <a:t>Portability </a:t>
-            </a:r>
-            <a:r>
-              <a:rPr lang="en-US" sz="2400" dirty="0" smtClean="0"/>
-              <a:t>and battery operation</a:t>
-            </a:r>
-          </a:p>
-          <a:p>
-            <a:r>
-              <a:rPr lang="en-US" sz="2400" dirty="0" smtClean="0"/>
-              <a:t>Wireless communication to other headsets</a:t>
+              <a:t>Selected new display</a:t>
             </a:r>
           </a:p>
           <a:p>
             <a:pPr lvl="1"/>
             <a:r>
               <a:rPr lang="en-US" sz="2000" dirty="0" smtClean="0"/>
-              <a:t>Multi-user augmented </a:t>
-            </a:r>
-            <a:r>
-              <a:rPr lang="en-US" sz="2000" dirty="0" smtClean="0"/>
-              <a:t>reality</a:t>
-            </a:r>
+              <a:t>Selected helmet and backpack</a:t>
+            </a:r>
+            <a:endParaRPr lang="en-US" sz="2000" dirty="0"/>
           </a:p>
         </p:txBody>
       </p:sp>
@@ -8219,7 +8763,67 @@
           <a:p>
             <a:r>
               <a:rPr lang="en-US" dirty="0" smtClean="0"/>
-              <a:t>Technical Ingenuity</a:t>
+              <a:t>Accomplishments To Date (PHA2)</a:t>
+            </a:r>
+            <a:endParaRPr lang="en-US" dirty="0"/>
+          </a:p>
+        </p:txBody>
+      </p:sp>
+      <p:sp>
+        <p:nvSpPr>
+          <p:cNvPr id="4" name="TextBox 3"/>
+          <p:cNvSpPr txBox="1"/>
+          <p:nvPr/>
+        </p:nvSpPr>
+        <p:spPr>
+          <a:xfrm>
+            <a:off x="6324600" y="2751307"/>
+            <a:ext cx="2633798" cy="369332"/>
+          </a:xfrm>
+          <a:prstGeom prst="rect">
+            <a:avLst/>
+          </a:prstGeom>
+          <a:noFill/>
+        </p:spPr>
+        <p:txBody>
+          <a:bodyPr wrap="none" rtlCol="0">
+            <a:spAutoFit/>
+          </a:bodyPr>
+          <a:lstStyle/>
+          <a:p>
+            <a:r>
+              <a:rPr lang="en-US" dirty="0" smtClean="0"/>
+              <a:t>[POWER CONSUMPTION]</a:t>
+            </a:r>
+            <a:endParaRPr lang="en-US" dirty="0"/>
+          </a:p>
+        </p:txBody>
+      </p:sp>
+      <p:sp>
+        <p:nvSpPr>
+          <p:cNvPr id="5" name="TextBox 4"/>
+          <p:cNvSpPr txBox="1"/>
+          <p:nvPr/>
+        </p:nvSpPr>
+        <p:spPr>
+          <a:xfrm>
+            <a:off x="6400800" y="4495800"/>
+            <a:ext cx="729687" cy="369332"/>
+          </a:xfrm>
+          <a:prstGeom prst="rect">
+            <a:avLst/>
+          </a:prstGeom>
+          <a:noFill/>
+        </p:spPr>
+        <p:txBody>
+          <a:bodyPr wrap="none" rtlCol="0">
+            <a:spAutoFit/>
+          </a:bodyPr>
+          <a:lstStyle/>
+          <a:p>
+            <a:r>
+              <a:rPr lang="en-US" dirty="0" smtClean="0"/>
+              <a:t>[PCB]</a:t>
             </a:r>
             <a:endParaRPr lang="en-US" dirty="0"/>
           </a:p>
@@ -8228,7 +8832,7 @@
     </p:spTree>
     <p:extLst>
       <p:ext uri="{BB962C8B-B14F-4D97-AF65-F5344CB8AC3E}">
-        <p14:creationId xmlns:p14="http://schemas.microsoft.com/office/powerpoint/2010/main" val="2791106075"/>
+        <p14:creationId xmlns:p14="http://schemas.microsoft.com/office/powerpoint/2010/main" val="3540674889"/>
       </p:ext>
     </p:extLst>
   </p:cSld>
@@ -8267,31 +8871,89 @@
         </p:nvSpPr>
         <p:spPr/>
         <p:txBody>
+          <a:bodyPr>
+            <a:normAutofit/>
+          </a:bodyPr>
+          <a:lstStyle/>
+          <a:p>
+            <a:r>
+              <a:rPr lang="en-US" sz="2400" dirty="0" smtClean="0"/>
+              <a:t>Display virtual environment overlay on real world</a:t>
+            </a:r>
+          </a:p>
+          <a:p>
+            <a:pPr lvl="1"/>
+            <a:r>
+              <a:rPr lang="en-US" sz="2000" dirty="0" smtClean="0"/>
+              <a:t>Preserves real-world depth perception</a:t>
+            </a:r>
+          </a:p>
+          <a:p>
+            <a:pPr lvl="1"/>
+            <a:r>
+              <a:rPr lang="en-US" sz="2000" dirty="0" smtClean="0"/>
+              <a:t>Large field of view</a:t>
+            </a:r>
+          </a:p>
+          <a:p>
+            <a:pPr lvl="1"/>
+            <a:r>
+              <a:rPr lang="en-US" sz="2000" dirty="0" smtClean="0"/>
+              <a:t>Both worlds perceptible simultaneously</a:t>
+            </a:r>
+          </a:p>
+          <a:p>
+            <a:r>
+              <a:rPr lang="en-US" sz="2400" dirty="0" smtClean="0"/>
+              <a:t>User head and position tracking</a:t>
+            </a:r>
+          </a:p>
+          <a:p>
+            <a:pPr lvl="1"/>
+            <a:r>
+              <a:rPr lang="en-US" sz="2000" dirty="0" smtClean="0"/>
+              <a:t>Filtering algorithm for inertial measurement data</a:t>
+            </a:r>
+          </a:p>
+          <a:p>
+            <a:r>
+              <a:rPr lang="en-US" sz="2400" dirty="0" smtClean="0"/>
+              <a:t>Portability and battery operation</a:t>
+            </a:r>
+          </a:p>
+          <a:p>
+            <a:r>
+              <a:rPr lang="en-US" sz="2400" dirty="0" smtClean="0"/>
+              <a:t>Wireless communication to other headsets</a:t>
+            </a:r>
+          </a:p>
+          <a:p>
+            <a:pPr lvl="1"/>
+            <a:r>
+              <a:rPr lang="en-US" sz="2000" dirty="0" smtClean="0"/>
+              <a:t>Multi-user augmented reality</a:t>
+            </a:r>
+          </a:p>
+        </p:txBody>
+      </p:sp>
+      <p:sp>
+        <p:nvSpPr>
+          <p:cNvPr id="3" name="Title 2"/>
+          <p:cNvSpPr>
+            <a:spLocks noGrp="1"/>
+          </p:cNvSpPr>
+          <p:nvPr>
+            <p:ph type="title"/>
+          </p:nvPr>
+        </p:nvSpPr>
+        <p:spPr/>
+        <p:txBody>
           <a:bodyPr/>
           <a:lstStyle/>
           <a:p>
-            <a:endParaRPr lang="en-US"/>
-          </a:p>
-        </p:txBody>
-      </p:sp>
-      <p:sp>
-        <p:nvSpPr>
-          <p:cNvPr id="3" name="Title 2"/>
-          <p:cNvSpPr>
-            <a:spLocks noGrp="1"/>
-          </p:cNvSpPr>
-          <p:nvPr>
-            <p:ph type="title"/>
-          </p:nvPr>
-        </p:nvSpPr>
-        <p:spPr/>
-        <p:txBody>
-          <a:bodyPr/>
-          <a:lstStyle/>
-          <a:p>
             <a:r>
               <a:rPr lang="en-US" dirty="0" smtClean="0"/>
-              <a:t>Execution overview</a:t>
+              <a:t>Technical Ingenuity</a:t>
             </a:r>
             <a:endParaRPr lang="en-US" dirty="0"/>
           </a:p>
@@ -8300,7 +8962,7 @@
     </p:spTree>
     <p:extLst>
       <p:ext uri="{BB962C8B-B14F-4D97-AF65-F5344CB8AC3E}">
-        <p14:creationId xmlns:p14="http://schemas.microsoft.com/office/powerpoint/2010/main" val="4157361893"/>
+        <p14:creationId xmlns:p14="http://schemas.microsoft.com/office/powerpoint/2010/main" val="2791106075"/>
       </p:ext>
     </p:extLst>
   </p:cSld>
@@ -8342,95 +9004,28 @@
           <a:bodyPr/>
           <a:lstStyle/>
           <a:p>
+            <a:endParaRPr lang="en-US"/>
+          </a:p>
+        </p:txBody>
+      </p:sp>
+      <p:sp>
+        <p:nvSpPr>
+          <p:cNvPr id="3" name="Title 2"/>
+          <p:cNvSpPr>
+            <a:spLocks noGrp="1"/>
+          </p:cNvSpPr>
+          <p:nvPr>
+            <p:ph type="title"/>
+          </p:nvPr>
+        </p:nvSpPr>
+        <p:spPr/>
+        <p:txBody>
+          <a:bodyPr/>
+          <a:lstStyle/>
+          <a:p>
             <a:r>
               <a:rPr lang="en-US" dirty="0" smtClean="0"/>
-              <a:t>Patent Liability</a:t>
-            </a:r>
-          </a:p>
-          <a:p>
-            <a:pPr lvl="1"/>
-            <a:r>
-              <a:rPr lang="en-US" dirty="0" smtClean="0"/>
-              <a:t>Novelty of design avoids many AR patents</a:t>
-            </a:r>
-          </a:p>
-          <a:p>
-            <a:pPr lvl="2"/>
-            <a:r>
-              <a:rPr lang="en-US" dirty="0" smtClean="0"/>
-              <a:t>Large fraction specifically mention cameras</a:t>
-            </a:r>
-          </a:p>
-          <a:p>
-            <a:pPr lvl="1"/>
-            <a:r>
-              <a:rPr lang="en-US" dirty="0" smtClean="0"/>
-              <a:t>Licensing may be required</a:t>
-            </a:r>
-          </a:p>
-          <a:p>
-            <a:pPr lvl="1"/>
-            <a:r>
-              <a:rPr lang="en-US" dirty="0" smtClean="0"/>
-              <a:t>Could file new patents and cross-license</a:t>
-            </a:r>
-            <a:endParaRPr lang="en-US" dirty="0"/>
-          </a:p>
-          <a:p>
-            <a:r>
-              <a:rPr lang="en-US" dirty="0" smtClean="0"/>
-              <a:t>User Safety</a:t>
-            </a:r>
-          </a:p>
-          <a:p>
-            <a:pPr lvl="1"/>
-            <a:r>
-              <a:rPr lang="en-US" dirty="0" smtClean="0"/>
-              <a:t>LiFePO</a:t>
-            </a:r>
-            <a:r>
-              <a:rPr lang="en-US" baseline="-25000" dirty="0" smtClean="0"/>
-              <a:t>4</a:t>
-            </a:r>
-            <a:r>
-              <a:rPr lang="en-US" dirty="0" smtClean="0"/>
-              <a:t> much safer than other Lithium battery chemistries</a:t>
-            </a:r>
-          </a:p>
-          <a:p>
-            <a:pPr lvl="1"/>
-            <a:r>
-              <a:rPr lang="en-US" dirty="0" smtClean="0"/>
-              <a:t>Translucent display keeps user aware of environment</a:t>
-            </a:r>
-          </a:p>
-          <a:p>
-            <a:pPr lvl="1"/>
-            <a:r>
-              <a:rPr lang="en-US" dirty="0" smtClean="0"/>
-              <a:t>Product unsuitable for use while driving, operating heavy machinery</a:t>
-            </a:r>
-          </a:p>
-        </p:txBody>
-      </p:sp>
-      <p:sp>
-        <p:nvSpPr>
-          <p:cNvPr id="3" name="Title 2"/>
-          <p:cNvSpPr>
-            <a:spLocks noGrp="1"/>
-          </p:cNvSpPr>
-          <p:nvPr>
-            <p:ph type="title"/>
-          </p:nvPr>
-        </p:nvSpPr>
-        <p:spPr/>
-        <p:txBody>
-          <a:bodyPr/>
-          <a:lstStyle/>
-          <a:p>
-            <a:r>
-              <a:rPr lang="en-US" dirty="0" smtClean="0"/>
-              <a:t>COMPLICATIONS</a:t>
+              <a:t>Execution overview</a:t>
             </a:r>
             <a:endParaRPr lang="en-US" dirty="0"/>
           </a:p>
@@ -8439,7 +9034,7 @@
     </p:spTree>
     <p:extLst>
       <p:ext uri="{BB962C8B-B14F-4D97-AF65-F5344CB8AC3E}">
-        <p14:creationId xmlns:p14="http://schemas.microsoft.com/office/powerpoint/2010/main" val="90168761"/>
+        <p14:creationId xmlns:p14="http://schemas.microsoft.com/office/powerpoint/2010/main" val="4157361893"/>
       </p:ext>
     </p:extLst>
   </p:cSld>
@@ -8483,33 +9078,72 @@
           <a:p>
             <a:r>
               <a:rPr lang="en-US" dirty="0" smtClean="0"/>
-              <a:t>Selling software to users after purchase of device</a:t>
+              <a:t>Patent Liability</a:t>
             </a:r>
           </a:p>
           <a:p>
             <a:pPr lvl="1"/>
             <a:r>
               <a:rPr lang="en-US" dirty="0" smtClean="0"/>
-              <a:t>Need to set up distribution network</a:t>
+              <a:t>Novelty of design avoids many AR patents</a:t>
+            </a:r>
+          </a:p>
+          <a:p>
+            <a:pPr lvl="2"/>
+            <a:r>
+              <a:rPr lang="en-US" dirty="0" smtClean="0"/>
+              <a:t>Large fraction specifically mention cameras</a:t>
             </a:r>
           </a:p>
           <a:p>
             <a:pPr lvl="1"/>
             <a:r>
               <a:rPr lang="en-US" dirty="0" smtClean="0"/>
-              <a:t>Encourage third party development</a:t>
+              <a:t>Licensing may be required</a:t>
             </a:r>
           </a:p>
           <a:p>
             <a:pPr lvl="1"/>
             <a:r>
               <a:rPr lang="en-US" dirty="0" smtClean="0"/>
-              <a:t>Anti-piracy solutions</a:t>
+              <a:t>Could file new patents and cross-license</a:t>
+            </a:r>
+            <a:endParaRPr lang="en-US" dirty="0"/>
+          </a:p>
+          <a:p>
+            <a:r>
+              <a:rPr lang="en-US" dirty="0" smtClean="0"/>
+              <a:t>User Safety</a:t>
             </a:r>
           </a:p>
           <a:p>
             <a:pPr lvl="1"/>
-            <a:endParaRPr lang="en-US" dirty="0"/>
+            <a:r>
+              <a:rPr lang="en-US" dirty="0" smtClean="0"/>
+              <a:t>LiFePO</a:t>
+            </a:r>
+            <a:r>
+              <a:rPr lang="en-US" baseline="-25000" dirty="0" smtClean="0"/>
+              <a:t>4</a:t>
+            </a:r>
+            <a:r>
+              <a:rPr lang="en-US" dirty="0" smtClean="0"/>
+              <a:t> much safer than other Lithium battery chemistries</a:t>
+            </a:r>
+          </a:p>
+          <a:p>
+            <a:pPr lvl="1"/>
+            <a:r>
+              <a:rPr lang="en-US" dirty="0" smtClean="0"/>
+              <a:t>Translucent display keeps user aware of environment</a:t>
+            </a:r>
+          </a:p>
+          <a:p>
+            <a:pPr lvl="1"/>
+            <a:r>
+              <a:rPr lang="en-US" dirty="0" smtClean="0"/>
+              <a:t>Product unsuitable for use while driving, operating heavy machinery</a:t>
+            </a:r>
           </a:p>
         </p:txBody>
       </p:sp>
@@ -8530,7 +9164,7 @@
           <a:p>
             <a:r>
               <a:rPr lang="en-US" dirty="0" smtClean="0"/>
-              <a:t>Opportunities</a:t>
+              <a:t>COMPLICATIONS</a:t>
             </a:r>
             <a:endParaRPr lang="en-US" dirty="0"/>
           </a:p>
@@ -8539,7 +9173,7 @@
     </p:spTree>
     <p:extLst>
       <p:ext uri="{BB962C8B-B14F-4D97-AF65-F5344CB8AC3E}">
-        <p14:creationId xmlns:p14="http://schemas.microsoft.com/office/powerpoint/2010/main" val="2759559370"/>
+        <p14:creationId xmlns:p14="http://schemas.microsoft.com/office/powerpoint/2010/main" val="90168761"/>
       </p:ext>
     </p:extLst>
   </p:cSld>
@@ -8578,6 +9212,106 @@
         </p:nvSpPr>
         <p:spPr/>
         <p:txBody>
+          <a:bodyPr/>
+          <a:lstStyle/>
+          <a:p>
+            <a:r>
+              <a:rPr lang="en-US" dirty="0" smtClean="0"/>
+              <a:t>Selling software to users after purchase of device</a:t>
+            </a:r>
+          </a:p>
+          <a:p>
+            <a:pPr lvl="1"/>
+            <a:r>
+              <a:rPr lang="en-US" dirty="0" smtClean="0"/>
+              <a:t>Need to set up distribution network</a:t>
+            </a:r>
+          </a:p>
+          <a:p>
+            <a:pPr lvl="1"/>
+            <a:r>
+              <a:rPr lang="en-US" dirty="0" smtClean="0"/>
+              <a:t>Encourage third party development</a:t>
+            </a:r>
+          </a:p>
+          <a:p>
+            <a:pPr lvl="1"/>
+            <a:r>
+              <a:rPr lang="en-US" dirty="0" smtClean="0"/>
+              <a:t>Anti-piracy solutions</a:t>
+            </a:r>
+          </a:p>
+          <a:p>
+            <a:pPr lvl="1"/>
+            <a:endParaRPr lang="en-US" dirty="0"/>
+          </a:p>
+        </p:txBody>
+      </p:sp>
+      <p:sp>
+        <p:nvSpPr>
+          <p:cNvPr id="3" name="Title 2"/>
+          <p:cNvSpPr>
+            <a:spLocks noGrp="1"/>
+          </p:cNvSpPr>
+          <p:nvPr>
+            <p:ph type="title"/>
+          </p:nvPr>
+        </p:nvSpPr>
+        <p:spPr/>
+        <p:txBody>
+          <a:bodyPr/>
+          <a:lstStyle/>
+          <a:p>
+            <a:r>
+              <a:rPr lang="en-US" dirty="0" smtClean="0"/>
+              <a:t>Opportunities</a:t>
+            </a:r>
+            <a:endParaRPr lang="en-US" dirty="0"/>
+          </a:p>
+        </p:txBody>
+      </p:sp>
+    </p:spTree>
+    <p:extLst>
+      <p:ext uri="{BB962C8B-B14F-4D97-AF65-F5344CB8AC3E}">
+        <p14:creationId xmlns:p14="http://schemas.microsoft.com/office/powerpoint/2010/main" val="2759559370"/>
+      </p:ext>
+    </p:extLst>
+  </p:cSld>
+  <p:clrMapOvr>
+    <a:masterClrMapping/>
+  </p:clrMapOvr>
+</p:sld>
+</file>
+
+<file path=ppt/slides/slide16.xml><?xml version="1.0" encoding="utf-8"?>
+<p:sld xmlns:a="http://schemas.openxmlformats.org/drawingml/2006/main" xmlns:r="http://schemas.openxmlformats.org/officeDocument/2006/relationships" xmlns:p="http://schemas.openxmlformats.org/presentationml/2006/main">
+  <p:cSld>
+    <p:spTree>
+      <p:nvGrpSpPr>
+        <p:cNvPr id="1" name=""/>
+        <p:cNvGrpSpPr/>
+        <p:nvPr/>
+      </p:nvGrpSpPr>
+      <p:grpSpPr>
+        <a:xfrm>
+          <a:off x="0" y="0"/>
+          <a:ext cx="0" cy="0"/>
+          <a:chOff x="0" y="0"/>
+          <a:chExt cx="0" cy="0"/>
+        </a:xfrm>
+      </p:grpSpPr>
+      <p:sp>
+        <p:nvSpPr>
+          <p:cNvPr id="2" name="Content Placeholder 1"/>
+          <p:cNvSpPr>
+            <a:spLocks noGrp="1"/>
+          </p:cNvSpPr>
+          <p:nvPr>
+            <p:ph idx="1"/>
+          </p:nvPr>
+        </p:nvSpPr>
+        <p:spPr/>
+        <p:txBody>
           <a:bodyPr>
             <a:normAutofit/>
           </a:bodyPr>
@@ -8613,7 +9347,6 @@
               <a:rPr lang="en-US" sz="2200" dirty="0" smtClean="0"/>
               <a:t>Finalize packaging modifications for larger display</a:t>
             </a:r>
-            <a:endParaRPr lang="en-US" sz="2200" dirty="0" smtClean="0"/>
           </a:p>
           <a:p>
             <a:r>
@@ -8625,11 +9358,7 @@
             <a:pPr lvl="1"/>
             <a:r>
               <a:rPr lang="en-US" sz="2000" dirty="0" smtClean="0"/>
-              <a:t>Battery </a:t>
-            </a:r>
-            <a:r>
-              <a:rPr lang="en-US" sz="2000" dirty="0" smtClean="0"/>
-              <a:t>power and charging</a:t>
+              <a:t>Battery power and charging</a:t>
             </a:r>
           </a:p>
           <a:p>
@@ -8646,7 +9375,6 @@
               <a:rPr lang="en-US" sz="2000" dirty="0" smtClean="0"/>
               <a:t> board with existing microcontroller</a:t>
             </a:r>
-            <a:endParaRPr lang="en-US" sz="2000" dirty="0" smtClean="0"/>
           </a:p>
           <a:p>
             <a:pPr lvl="1"/>
@@ -8654,7 +9382,6 @@
               <a:rPr lang="en-US" sz="2000" dirty="0" smtClean="0"/>
               <a:t>Display</a:t>
             </a:r>
-            <a:endParaRPr lang="en-US" sz="2000" dirty="0" smtClean="0"/>
           </a:p>
         </p:txBody>
       </p:sp>
@@ -8694,7 +9421,7 @@
 </p:sld>
 </file>
 
-<file path=ppt/slides/slide16.xml><?xml version="1.0" encoding="utf-8"?>
+<file path=ppt/slides/slide17.xml><?xml version="1.0" encoding="utf-8"?>
 <p:sld xmlns:a="http://schemas.openxmlformats.org/drawingml/2006/main" xmlns:r="http://schemas.openxmlformats.org/officeDocument/2006/relationships" xmlns:p="http://schemas.openxmlformats.org/presentationml/2006/main">
   <p:cSld>
     <p:spTree>
@@ -9468,33 +10195,21 @@
             <a:pPr lvl="1"/>
             <a:r>
               <a:rPr lang="en-US" sz="2000" dirty="0" smtClean="0"/>
-              <a:t>Power </a:t>
-            </a:r>
-            <a:r>
-              <a:rPr lang="en-US" sz="2000" dirty="0" smtClean="0"/>
-              <a:t>management</a:t>
+              <a:t>Power management</a:t>
             </a:r>
           </a:p>
           <a:p>
             <a:pPr lvl="2"/>
             <a:r>
               <a:rPr lang="en-US" dirty="0" smtClean="0"/>
-              <a:t>Battery c</a:t>
-            </a:r>
+              <a:t>Battery charging</a:t>
+            </a:r>
+          </a:p>
+          <a:p>
+            <a:pPr lvl="2"/>
             <a:r>
               <a:rPr lang="en-US" dirty="0" smtClean="0"/>
-              <a:t>harging</a:t>
-            </a:r>
-          </a:p>
-          <a:p>
-            <a:pPr lvl="2"/>
-            <a:r>
-              <a:rPr lang="en-US" dirty="0" smtClean="0"/>
-              <a:t>Battery f</a:t>
-            </a:r>
-            <a:r>
-              <a:rPr lang="en-US" dirty="0" smtClean="0"/>
-              <a:t>uel gauge</a:t>
+              <a:t>Battery fuel gauge</a:t>
             </a:r>
           </a:p>
           <a:p>
@@ -9503,7 +10218,6 @@
               <a:rPr lang="en-US" dirty="0" smtClean="0"/>
               <a:t>Voltage regulation</a:t>
             </a:r>
-            <a:endParaRPr lang="en-US" dirty="0" smtClean="0"/>
           </a:p>
         </p:txBody>
       </p:sp>
@@ -9618,11 +10332,7 @@
           <a:p>
             <a:r>
               <a:rPr lang="en-US" sz="2400" dirty="0" smtClean="0"/>
-              <a:t>Self-contained </a:t>
-            </a:r>
-            <a:r>
-              <a:rPr lang="en-US" sz="2400" dirty="0" smtClean="0"/>
-              <a:t>headset</a:t>
+              <a:t>Self-contained headset</a:t>
             </a:r>
           </a:p>
           <a:p>
@@ -9642,13 +10352,8 @@
             </a:r>
             <a:r>
               <a:rPr lang="en-US" sz="2000" dirty="0" smtClean="0"/>
-              <a:t>  electronics mounted to </a:t>
-            </a:r>
-            <a:r>
-              <a:rPr lang="en-US" sz="2000" dirty="0" smtClean="0"/>
-              <a:t>rails</a:t>
-            </a:r>
-            <a:endParaRPr lang="en-US" sz="2000" dirty="0" smtClean="0"/>
+              <a:t>  electronics mounted to rails</a:t>
+            </a:r>
           </a:p>
           <a:p>
             <a:endParaRPr lang="en-US" sz="2400" dirty="0" smtClean="0"/>
@@ -9685,22 +10390,14 @@
             <a:pPr lvl="1"/>
             <a:r>
               <a:rPr lang="en-US" sz="2000" dirty="0" smtClean="0"/>
-              <a:t>SPI communication </a:t>
-            </a:r>
-            <a:r>
-              <a:rPr lang="en-US" sz="2000" dirty="0" smtClean="0"/>
-              <a:t>between</a:t>
+              <a:t>SPI communication between</a:t>
             </a:r>
             <a:br>
               <a:rPr lang="en-US" sz="2000" dirty="0" smtClean="0"/>
             </a:br>
             <a:r>
               <a:rPr lang="en-US" sz="2000" dirty="0" smtClean="0"/>
-              <a:t>Pi </a:t>
-            </a:r>
-            <a:r>
-              <a:rPr lang="en-US" sz="2000" dirty="0" smtClean="0"/>
-              <a:t>and micro</a:t>
+              <a:t>Pi and micro</a:t>
             </a:r>
           </a:p>
           <a:p>
@@ -9733,11 +10430,7 @@
           <a:p>
             <a:r>
               <a:rPr lang="en-US" dirty="0" smtClean="0"/>
-              <a:t>Accomplishments To </a:t>
-            </a:r>
-            <a:r>
-              <a:rPr lang="en-US" dirty="0" smtClean="0"/>
-              <a:t>Date (PHA1)</a:t>
+              <a:t>Accomplishments To Date (PHA1)</a:t>
             </a:r>
             <a:endParaRPr lang="en-US" dirty="0"/>
           </a:p>
@@ -9856,12 +10549,8 @@
           <a:lstStyle/>
           <a:p>
             <a:r>
-              <a:rPr lang="en-US" dirty="0"/>
-              <a:t>Accomplishments To </a:t>
-            </a:r>
-            <a:r>
               <a:rPr lang="en-US" dirty="0" smtClean="0"/>
-              <a:t>Date (Pha1)</a:t>
+              <a:t>Hardware metrics</a:t>
             </a:r>
             <a:endParaRPr lang="en-US" dirty="0"/>
           </a:p>
@@ -9869,7 +10558,7 @@
       </p:sp>
       <p:graphicFrame>
         <p:nvGraphicFramePr>
-          <p:cNvPr id="6" name="Content Placeholder 5"/>
+          <p:cNvPr id="5" name="Content Placeholder 4"/>
           <p:cNvGraphicFramePr>
             <a:graphicFrameLocks noGrp="1"/>
           </p:cNvGraphicFramePr>
@@ -9877,340 +10566,752 @@
             <p:ph idx="1"/>
             <p:extLst>
               <p:ext uri="{D42A27DB-BD31-4B8C-83A1-F6EECF244321}">
-                <p14:modId xmlns:p14="http://schemas.microsoft.com/office/powerpoint/2010/main" val="995713166"/>
+                <p14:modId xmlns:p14="http://schemas.microsoft.com/office/powerpoint/2010/main" val="2392140367"/>
               </p:ext>
             </p:extLst>
           </p:nvPr>
         </p:nvGraphicFramePr>
         <p:xfrm>
-          <a:off x="381000" y="1524000"/>
-          <a:ext cx="8407401" cy="2595880"/>
+          <a:off x="152400" y="1371600"/>
+          <a:ext cx="8839200" cy="5334000"/>
         </p:xfrm>
         <a:graphic>
           <a:graphicData uri="http://schemas.openxmlformats.org/drawingml/2006/table">
             <a:tbl>
-              <a:tblPr firstRow="1" bandRow="1">
+              <a:tblPr firstRow="1" firstCol="1" bandRow="1">
                 <a:tableStyleId>{5C22544A-7EE6-4342-B048-85BDC9FD1C3A}</a:tableStyleId>
               </a:tblPr>
               <a:tblGrid>
-                <a:gridCol w="2802467"/>
-                <a:gridCol w="2802467"/>
-                <a:gridCol w="2802467"/>
+                <a:gridCol w="1016464"/>
+                <a:gridCol w="1966217"/>
+                <a:gridCol w="5856519"/>
               </a:tblGrid>
-              <a:tr h="370840">
+              <a:tr h="209488">
                 <a:tc>
                   <a:txBody>
                     <a:bodyPr/>
                     <a:lstStyle/>
                     <a:p>
+                      <a:pPr marL="0" marR="0" algn="ctr">
+                        <a:spcBef>
+                          <a:spcPts val="0"/>
+                        </a:spcBef>
+                        <a:spcAft>
+                          <a:spcPts val="0"/>
+                        </a:spcAft>
+                      </a:pPr>
                       <a:r>
-                        <a:rPr lang="en-US" dirty="0" smtClean="0"/>
-                        <a:t>Performance Metric</a:t>
+                        <a:rPr lang="en-US" sz="1100" dirty="0">
+                          <a:effectLst/>
+                        </a:rPr>
+                        <a:t>Metric</a:t>
                       </a:r>
-                      <a:endParaRPr lang="en-US" dirty="0"/>
+                      <a:endParaRPr lang="en-US" sz="1100" dirty="0">
+                        <a:effectLst/>
+                        <a:latin typeface="Calibri" panose="020F0502020204030204" pitchFamily="34" charset="0"/>
+                        <a:ea typeface="Calibri" panose="020F0502020204030204" pitchFamily="34" charset="0"/>
+                        <a:cs typeface="Times New Roman" panose="02020603050405020304" pitchFamily="18" charset="0"/>
+                      </a:endParaRPr>
                     </a:p>
                   </a:txBody>
-                  <a:tcPr/>
+                  <a:tcPr marL="68580" marR="68580" marT="0" marB="0"/>
                 </a:tc>
                 <a:tc>
                   <a:txBody>
                     <a:bodyPr/>
                     <a:lstStyle/>
                     <a:p>
+                      <a:pPr marL="0" marR="0" algn="ctr">
+                        <a:spcBef>
+                          <a:spcPts val="0"/>
+                        </a:spcBef>
+                        <a:spcAft>
+                          <a:spcPts val="0"/>
+                        </a:spcAft>
+                      </a:pPr>
                       <a:r>
-                        <a:rPr lang="en-US" dirty="0" smtClean="0"/>
-                        <a:t>Phase</a:t>
+                        <a:rPr lang="en-US" sz="1100">
+                          <a:effectLst/>
+                        </a:rPr>
+                        <a:t>Target</a:t>
                       </a:r>
-                      <a:r>
-                        <a:rPr lang="en-US" baseline="0" dirty="0" smtClean="0"/>
-                        <a:t> One</a:t>
-                      </a:r>
-                      <a:endParaRPr lang="en-US" dirty="0"/>
+                      <a:endParaRPr lang="en-US" sz="1100">
+                        <a:effectLst/>
+                        <a:latin typeface="Calibri" panose="020F0502020204030204" pitchFamily="34" charset="0"/>
+                        <a:ea typeface="Calibri" panose="020F0502020204030204" pitchFamily="34" charset="0"/>
+                        <a:cs typeface="Times New Roman" panose="02020603050405020304" pitchFamily="18" charset="0"/>
+                      </a:endParaRPr>
                     </a:p>
                   </a:txBody>
-                  <a:tcPr/>
+                  <a:tcPr marL="68580" marR="68580" marT="0" marB="0"/>
                 </a:tc>
                 <a:tc>
                   <a:txBody>
                     <a:bodyPr/>
                     <a:lstStyle/>
                     <a:p>
+                      <a:pPr marL="0" marR="0" algn="ctr">
+                        <a:spcBef>
+                          <a:spcPts val="0"/>
+                        </a:spcBef>
+                        <a:spcAft>
+                          <a:spcPts val="0"/>
+                        </a:spcAft>
+                      </a:pPr>
                       <a:r>
-                        <a:rPr lang="en-US" dirty="0" smtClean="0"/>
-                        <a:t>Target</a:t>
+                        <a:rPr lang="en-US" sz="1100">
+                          <a:effectLst/>
+                        </a:rPr>
+                        <a:t>Description</a:t>
                       </a:r>
-                      <a:endParaRPr lang="en-US" dirty="0"/>
+                      <a:endParaRPr lang="en-US" sz="1100">
+                        <a:effectLst/>
+                        <a:latin typeface="Calibri" panose="020F0502020204030204" pitchFamily="34" charset="0"/>
+                        <a:ea typeface="Calibri" panose="020F0502020204030204" pitchFamily="34" charset="0"/>
+                        <a:cs typeface="Times New Roman" panose="02020603050405020304" pitchFamily="18" charset="0"/>
+                      </a:endParaRPr>
                     </a:p>
                   </a:txBody>
-                  <a:tcPr/>
+                  <a:tcPr marL="68580" marR="68580" marT="0" marB="0"/>
                 </a:tc>
               </a:tr>
-              <a:tr h="370840">
+              <a:tr h="418975">
                 <a:tc>
                   <a:txBody>
                     <a:bodyPr/>
                     <a:lstStyle/>
                     <a:p>
+                      <a:pPr marL="0" marR="0" algn="r">
+                        <a:spcBef>
+                          <a:spcPts val="0"/>
+                        </a:spcBef>
+                        <a:spcAft>
+                          <a:spcPts val="0"/>
+                        </a:spcAft>
+                      </a:pPr>
                       <a:r>
-                        <a:rPr lang="en-US" dirty="0" smtClean="0"/>
-                        <a:t>Weight</a:t>
+                        <a:rPr lang="en-US" sz="1100">
+                          <a:effectLst/>
+                        </a:rPr>
+                        <a:t>Mass</a:t>
                       </a:r>
-                      <a:endParaRPr lang="en-US" dirty="0"/>
+                      <a:endParaRPr lang="en-US" sz="1100">
+                        <a:effectLst/>
+                        <a:latin typeface="Calibri" panose="020F0502020204030204" pitchFamily="34" charset="0"/>
+                        <a:ea typeface="Calibri" panose="020F0502020204030204" pitchFamily="34" charset="0"/>
+                        <a:cs typeface="Times New Roman" panose="02020603050405020304" pitchFamily="18" charset="0"/>
+                      </a:endParaRPr>
                     </a:p>
                   </a:txBody>
-                  <a:tcPr/>
+                  <a:tcPr marL="68580" marR="68580" marT="0" marB="0"/>
                 </a:tc>
                 <a:tc>
                   <a:txBody>
                     <a:bodyPr/>
                     <a:lstStyle/>
                     <a:p>
+                      <a:pPr marL="0" marR="0">
+                        <a:spcBef>
+                          <a:spcPts val="0"/>
+                        </a:spcBef>
+                        <a:spcAft>
+                          <a:spcPts val="0"/>
+                        </a:spcAft>
+                      </a:pPr>
                       <a:r>
-                        <a:rPr lang="en-US" dirty="0" smtClean="0"/>
-                        <a:t>2 kg [???]</a:t>
+                        <a:rPr lang="en-US" sz="1100" dirty="0">
+                          <a:effectLst/>
+                        </a:rPr>
+                        <a:t>Headset: 1 kg</a:t>
                       </a:r>
-                      <a:endParaRPr lang="en-US" dirty="0"/>
+                    </a:p>
+                    <a:p>
+                      <a:pPr marL="0" marR="0">
+                        <a:spcBef>
+                          <a:spcPts val="0"/>
+                        </a:spcBef>
+                        <a:spcAft>
+                          <a:spcPts val="0"/>
+                        </a:spcAft>
+                      </a:pPr>
+                      <a:r>
+                        <a:rPr lang="en-US" sz="1100">
+                          <a:effectLst/>
+                        </a:rPr>
+                        <a:t>Backpack: 3 kg</a:t>
+                      </a:r>
+                      <a:endParaRPr lang="en-US" sz="1100">
+                        <a:effectLst/>
+                        <a:latin typeface="Calibri" panose="020F0502020204030204" pitchFamily="34" charset="0"/>
+                        <a:ea typeface="Calibri" panose="020F0502020204030204" pitchFamily="34" charset="0"/>
+                        <a:cs typeface="Times New Roman" panose="02020603050405020304" pitchFamily="18" charset="0"/>
+                      </a:endParaRPr>
                     </a:p>
                   </a:txBody>
-                  <a:tcPr/>
+                  <a:tcPr marL="68580" marR="68580" marT="0" marB="0"/>
                 </a:tc>
                 <a:tc>
                   <a:txBody>
                     <a:bodyPr/>
                     <a:lstStyle/>
                     <a:p>
+                      <a:pPr marL="0" marR="0">
+                        <a:spcBef>
+                          <a:spcPts val="0"/>
+                        </a:spcBef>
+                        <a:spcAft>
+                          <a:spcPts val="0"/>
+                        </a:spcAft>
+                      </a:pPr>
                       <a:r>
-                        <a:rPr lang="en-US" dirty="0" smtClean="0"/>
-                        <a:t>4 kg</a:t>
+                        <a:rPr lang="en-US" sz="1100">
+                          <a:effectLst/>
+                        </a:rPr>
+                        <a:t>Neither the headset nor the backpack can be too heavy to impede the performance of typical activities by the user.</a:t>
                       </a:r>
-                      <a:endParaRPr lang="en-US" dirty="0"/>
+                      <a:endParaRPr lang="en-US" sz="1100">
+                        <a:effectLst/>
+                        <a:latin typeface="Calibri" panose="020F0502020204030204" pitchFamily="34" charset="0"/>
+                        <a:ea typeface="Calibri" panose="020F0502020204030204" pitchFamily="34" charset="0"/>
+                        <a:cs typeface="Times New Roman" panose="02020603050405020304" pitchFamily="18" charset="0"/>
+                      </a:endParaRPr>
                     </a:p>
                   </a:txBody>
-                  <a:tcPr/>
+                  <a:tcPr marL="68580" marR="68580" marT="0" marB="0"/>
                 </a:tc>
               </a:tr>
-              <a:tr h="370840">
+              <a:tr h="628463">
                 <a:tc>
                   <a:txBody>
                     <a:bodyPr/>
                     <a:lstStyle/>
                     <a:p>
+                      <a:pPr marL="0" marR="0" algn="r">
+                        <a:spcBef>
+                          <a:spcPts val="0"/>
+                        </a:spcBef>
+                        <a:spcAft>
+                          <a:spcPts val="0"/>
+                        </a:spcAft>
+                      </a:pPr>
                       <a:r>
-                        <a:rPr lang="en-US" dirty="0" smtClean="0"/>
-                        <a:t>Battery life</a:t>
+                        <a:rPr lang="en-US" sz="1100">
+                          <a:effectLst/>
+                        </a:rPr>
+                        <a:t>Power</a:t>
                       </a:r>
-                      <a:endParaRPr lang="en-US" dirty="0"/>
+                      <a:endParaRPr lang="en-US" sz="1100">
+                        <a:effectLst/>
+                        <a:latin typeface="Calibri" panose="020F0502020204030204" pitchFamily="34" charset="0"/>
+                        <a:ea typeface="Calibri" panose="020F0502020204030204" pitchFamily="34" charset="0"/>
+                        <a:cs typeface="Times New Roman" panose="02020603050405020304" pitchFamily="18" charset="0"/>
+                      </a:endParaRPr>
                     </a:p>
                   </a:txBody>
-                  <a:tcPr/>
+                  <a:tcPr marL="68580" marR="68580" marT="0" marB="0"/>
                 </a:tc>
                 <a:tc>
                   <a:txBody>
                     <a:bodyPr/>
                     <a:lstStyle/>
                     <a:p>
+                      <a:pPr marL="0" marR="0">
+                        <a:spcBef>
+                          <a:spcPts val="0"/>
+                        </a:spcBef>
+                        <a:spcAft>
+                          <a:spcPts val="0"/>
+                        </a:spcAft>
+                      </a:pPr>
                       <a:r>
-                        <a:rPr lang="en-US" dirty="0" smtClean="0"/>
-                        <a:t>3 hours</a:t>
+                        <a:rPr lang="en-US" sz="1100">
+                          <a:effectLst/>
+                        </a:rPr>
+                        <a:t>3 hours runtime</a:t>
                       </a:r>
-                      <a:endParaRPr lang="en-US" dirty="0"/>
+                      <a:endParaRPr lang="en-US" sz="1100">
+                        <a:effectLst/>
+                        <a:latin typeface="Calibri" panose="020F0502020204030204" pitchFamily="34" charset="0"/>
+                        <a:ea typeface="Calibri" panose="020F0502020204030204" pitchFamily="34" charset="0"/>
+                        <a:cs typeface="Times New Roman" panose="02020603050405020304" pitchFamily="18" charset="0"/>
+                      </a:endParaRPr>
                     </a:p>
                   </a:txBody>
-                  <a:tcPr/>
+                  <a:tcPr marL="68580" marR="68580" marT="0" marB="0"/>
                 </a:tc>
                 <a:tc>
                   <a:txBody>
                     <a:bodyPr/>
                     <a:lstStyle/>
                     <a:p>
+                      <a:pPr marL="0" marR="0">
+                        <a:spcBef>
+                          <a:spcPts val="0"/>
+                        </a:spcBef>
+                        <a:spcAft>
+                          <a:spcPts val="0"/>
+                        </a:spcAft>
+                      </a:pPr>
                       <a:r>
-                        <a:rPr lang="en-US" dirty="0" smtClean="0"/>
-                        <a:t>5 hours</a:t>
+                        <a:rPr lang="en-US" sz="1100">
+                          <a:effectLst/>
+                        </a:rPr>
+                        <a:t>Augmented reality applications run for long durations, so the device must operate long enough on battery power to be usable. The remaining battery capacity should be displayed to the user.</a:t>
                       </a:r>
-                      <a:endParaRPr lang="en-US" dirty="0"/>
+                      <a:endParaRPr lang="en-US" sz="1100">
+                        <a:effectLst/>
+                        <a:latin typeface="Calibri" panose="020F0502020204030204" pitchFamily="34" charset="0"/>
+                        <a:ea typeface="Calibri" panose="020F0502020204030204" pitchFamily="34" charset="0"/>
+                        <a:cs typeface="Times New Roman" panose="02020603050405020304" pitchFamily="18" charset="0"/>
+                      </a:endParaRPr>
                     </a:p>
                   </a:txBody>
-                  <a:tcPr/>
+                  <a:tcPr marL="68580" marR="68580" marT="0" marB="0"/>
                 </a:tc>
               </a:tr>
-              <a:tr h="370840">
+              <a:tr h="628463">
                 <a:tc>
                   <a:txBody>
                     <a:bodyPr/>
                     <a:lstStyle/>
                     <a:p>
+                      <a:pPr marL="0" marR="0" algn="r">
+                        <a:spcBef>
+                          <a:spcPts val="0"/>
+                        </a:spcBef>
+                        <a:spcAft>
+                          <a:spcPts val="0"/>
+                        </a:spcAft>
+                      </a:pPr>
                       <a:r>
-                        <a:rPr lang="en-US" dirty="0" err="1" smtClean="0"/>
-                        <a:t>Framerate</a:t>
+                        <a:rPr lang="en-US" sz="1100">
+                          <a:effectLst/>
+                        </a:rPr>
+                        <a:t>Location</a:t>
                       </a:r>
-                      <a:endParaRPr lang="en-US" dirty="0"/>
+                      <a:endParaRPr lang="en-US" sz="1100">
+                        <a:effectLst/>
+                        <a:latin typeface="Calibri" panose="020F0502020204030204" pitchFamily="34" charset="0"/>
+                        <a:ea typeface="Calibri" panose="020F0502020204030204" pitchFamily="34" charset="0"/>
+                        <a:cs typeface="Times New Roman" panose="02020603050405020304" pitchFamily="18" charset="0"/>
+                      </a:endParaRPr>
                     </a:p>
                   </a:txBody>
-                  <a:tcPr/>
+                  <a:tcPr marL="68580" marR="68580" marT="0" marB="0"/>
                 </a:tc>
                 <a:tc>
                   <a:txBody>
                     <a:bodyPr/>
                     <a:lstStyle/>
                     <a:p>
+                      <a:pPr marL="0" marR="0">
+                        <a:spcBef>
+                          <a:spcPts val="0"/>
+                        </a:spcBef>
+                        <a:spcAft>
+                          <a:spcPts val="0"/>
+                        </a:spcAft>
+                      </a:pPr>
                       <a:r>
-                        <a:rPr lang="en-US" dirty="0" smtClean="0"/>
-                        <a:t>30 FPS</a:t>
+                        <a:rPr lang="en-US" sz="1100">
+                          <a:effectLst/>
+                        </a:rPr>
+                        <a:t>Minimum 2 meter accuracy and precision</a:t>
                       </a:r>
-                      <a:endParaRPr lang="en-US" dirty="0"/>
+                      <a:endParaRPr lang="en-US" sz="1100">
+                        <a:effectLst/>
+                        <a:latin typeface="Calibri" panose="020F0502020204030204" pitchFamily="34" charset="0"/>
+                        <a:ea typeface="Calibri" panose="020F0502020204030204" pitchFamily="34" charset="0"/>
+                        <a:cs typeface="Times New Roman" panose="02020603050405020304" pitchFamily="18" charset="0"/>
+                      </a:endParaRPr>
                     </a:p>
                   </a:txBody>
-                  <a:tcPr/>
+                  <a:tcPr marL="68580" marR="68580" marT="0" marB="0"/>
                 </a:tc>
                 <a:tc>
                   <a:txBody>
                     <a:bodyPr/>
                     <a:lstStyle/>
                     <a:p>
+                      <a:pPr marL="0" marR="0">
+                        <a:spcBef>
+                          <a:spcPts val="0"/>
+                        </a:spcBef>
+                        <a:spcAft>
+                          <a:spcPts val="0"/>
+                        </a:spcAft>
+                      </a:pPr>
                       <a:r>
-                        <a:rPr lang="en-US" dirty="0" smtClean="0"/>
-                        <a:t>60 FPS</a:t>
+                        <a:rPr lang="en-US" sz="1100">
+                          <a:effectLst/>
+                        </a:rPr>
+                        <a:t>The accuracy of the rendered virtual world depends heavily on the accuracy and precision of the user’s geospatial position.</a:t>
                       </a:r>
-                      <a:endParaRPr lang="en-US" dirty="0"/>
+                      <a:endParaRPr lang="en-US" sz="1100">
+                        <a:effectLst/>
+                        <a:latin typeface="Calibri" panose="020F0502020204030204" pitchFamily="34" charset="0"/>
+                        <a:ea typeface="Calibri" panose="020F0502020204030204" pitchFamily="34" charset="0"/>
+                        <a:cs typeface="Times New Roman" panose="02020603050405020304" pitchFamily="18" charset="0"/>
+                      </a:endParaRPr>
                     </a:p>
                   </a:txBody>
-                  <a:tcPr/>
+                  <a:tcPr marL="68580" marR="68580" marT="0" marB="0"/>
                 </a:tc>
               </a:tr>
-              <a:tr h="370840">
+              <a:tr h="934759">
                 <a:tc>
                   <a:txBody>
                     <a:bodyPr/>
                     <a:lstStyle/>
                     <a:p>
+                      <a:pPr marL="0" marR="0" algn="r">
+                        <a:spcBef>
+                          <a:spcPts val="0"/>
+                        </a:spcBef>
+                        <a:spcAft>
+                          <a:spcPts val="0"/>
+                        </a:spcAft>
+                      </a:pPr>
                       <a:r>
-                        <a:rPr lang="en-US" dirty="0" smtClean="0"/>
-                        <a:t>Head tracking Latency</a:t>
+                        <a:rPr lang="en-US" sz="1100">
+                          <a:effectLst/>
+                        </a:rPr>
+                        <a:t>Wireless</a:t>
                       </a:r>
-                      <a:endParaRPr lang="en-US" dirty="0"/>
+                      <a:endParaRPr lang="en-US" sz="1100">
+                        <a:effectLst/>
+                        <a:latin typeface="Calibri" panose="020F0502020204030204" pitchFamily="34" charset="0"/>
+                        <a:ea typeface="Calibri" panose="020F0502020204030204" pitchFamily="34" charset="0"/>
+                        <a:cs typeface="Times New Roman" panose="02020603050405020304" pitchFamily="18" charset="0"/>
+                      </a:endParaRPr>
                     </a:p>
                   </a:txBody>
-                  <a:tcPr/>
+                  <a:tcPr marL="68580" marR="68580" marT="0" marB="0"/>
                 </a:tc>
                 <a:tc>
                   <a:txBody>
                     <a:bodyPr/>
                     <a:lstStyle/>
                     <a:p>
+                      <a:pPr marL="0" marR="0">
+                        <a:spcBef>
+                          <a:spcPts val="0"/>
+                        </a:spcBef>
+                        <a:spcAft>
+                          <a:spcPts val="0"/>
+                        </a:spcAft>
+                      </a:pPr>
                       <a:r>
-                        <a:rPr lang="en-US" dirty="0" smtClean="0"/>
-                        <a:t>[???]</a:t>
+                        <a:rPr lang="en-US" sz="1100">
+                          <a:effectLst/>
+                        </a:rPr>
+                        <a:t>80 m range, line of sight</a:t>
                       </a:r>
-                      <a:endParaRPr lang="en-US" dirty="0"/>
+                      <a:endParaRPr lang="en-US" sz="1100">
+                        <a:effectLst/>
+                        <a:latin typeface="Calibri" panose="020F0502020204030204" pitchFamily="34" charset="0"/>
+                        <a:ea typeface="Calibri" panose="020F0502020204030204" pitchFamily="34" charset="0"/>
+                        <a:cs typeface="Times New Roman" panose="02020603050405020304" pitchFamily="18" charset="0"/>
+                      </a:endParaRPr>
                     </a:p>
                   </a:txBody>
-                  <a:tcPr/>
+                  <a:tcPr marL="68580" marR="68580" marT="0" marB="0"/>
                 </a:tc>
                 <a:tc>
                   <a:txBody>
                     <a:bodyPr/>
                     <a:lstStyle/>
                     <a:p>
+                      <a:pPr marL="0" marR="0">
+                        <a:spcBef>
+                          <a:spcPts val="0"/>
+                        </a:spcBef>
+                        <a:spcAft>
+                          <a:spcPts val="0"/>
+                        </a:spcAft>
+                      </a:pPr>
                       <a:r>
-                        <a:rPr lang="en-US" dirty="0" smtClean="0"/>
-                        <a:t>60 </a:t>
+                        <a:rPr lang="en-US" sz="1100">
+                          <a:effectLst/>
+                        </a:rPr>
+                        <a:t>A unique feature of this device is the wireless coordination capability of multiple headsets in the same virtual environment. The current wireless signal strength should be reported to the user.</a:t>
                       </a:r>
-                      <a:r>
-                        <a:rPr lang="en-US" dirty="0" err="1" smtClean="0"/>
-                        <a:t>ms</a:t>
-                      </a:r>
-                      <a:endParaRPr lang="en-US" dirty="0"/>
+                      <a:endParaRPr lang="en-US" sz="1100">
+                        <a:effectLst/>
+                        <a:latin typeface="Calibri" panose="020F0502020204030204" pitchFamily="34" charset="0"/>
+                        <a:ea typeface="Calibri" panose="020F0502020204030204" pitchFamily="34" charset="0"/>
+                        <a:cs typeface="Times New Roman" panose="02020603050405020304" pitchFamily="18" charset="0"/>
+                      </a:endParaRPr>
                     </a:p>
                   </a:txBody>
-                  <a:tcPr/>
+                  <a:tcPr marL="68580" marR="68580" marT="0" marB="0"/>
                 </a:tc>
               </a:tr>
-              <a:tr h="370840">
+              <a:tr h="1047438">
                 <a:tc>
                   <a:txBody>
                     <a:bodyPr/>
                     <a:lstStyle/>
                     <a:p>
+                      <a:pPr marL="0" marR="0" algn="r">
+                        <a:spcBef>
+                          <a:spcPts val="0"/>
+                        </a:spcBef>
+                        <a:spcAft>
+                          <a:spcPts val="0"/>
+                        </a:spcAft>
+                      </a:pPr>
                       <a:r>
-                        <a:rPr lang="en-US" dirty="0" smtClean="0"/>
-                        <a:t>Location accuracy</a:t>
+                        <a:rPr lang="en-US" sz="1100">
+                          <a:effectLst/>
+                        </a:rPr>
+                        <a:t>Comfort</a:t>
                       </a:r>
-                      <a:endParaRPr lang="en-US" dirty="0"/>
+                      <a:endParaRPr lang="en-US" sz="1100">
+                        <a:effectLst/>
+                        <a:latin typeface="Calibri" panose="020F0502020204030204" pitchFamily="34" charset="0"/>
+                        <a:ea typeface="Calibri" panose="020F0502020204030204" pitchFamily="34" charset="0"/>
+                        <a:cs typeface="Times New Roman" panose="02020603050405020304" pitchFamily="18" charset="0"/>
+                      </a:endParaRPr>
                     </a:p>
                   </a:txBody>
-                  <a:tcPr/>
+                  <a:tcPr marL="68580" marR="68580" marT="0" marB="0"/>
                 </a:tc>
                 <a:tc>
                   <a:txBody>
                     <a:bodyPr/>
                     <a:lstStyle/>
                     <a:p>
-                      <a:endParaRPr lang="en-US" dirty="0"/>
+                      <a:pPr marL="0" marR="0">
+                        <a:spcBef>
+                          <a:spcPts val="0"/>
+                        </a:spcBef>
+                        <a:spcAft>
+                          <a:spcPts val="0"/>
+                        </a:spcAft>
+                      </a:pPr>
+                      <a:r>
+                        <a:rPr lang="en-US" sz="1100">
+                          <a:effectLst/>
+                        </a:rPr>
+                        <a:t>No running speed or vision reduction</a:t>
+                      </a:r>
+                      <a:endParaRPr lang="en-US" sz="1100">
+                        <a:effectLst/>
+                        <a:latin typeface="Calibri" panose="020F0502020204030204" pitchFamily="34" charset="0"/>
+                        <a:ea typeface="Calibri" panose="020F0502020204030204" pitchFamily="34" charset="0"/>
+                        <a:cs typeface="Times New Roman" panose="02020603050405020304" pitchFamily="18" charset="0"/>
+                      </a:endParaRPr>
                     </a:p>
                   </a:txBody>
-                  <a:tcPr/>
+                  <a:tcPr marL="68580" marR="68580" marT="0" marB="0"/>
                 </a:tc>
                 <a:tc>
                   <a:txBody>
                     <a:bodyPr/>
                     <a:lstStyle/>
                     <a:p>
-                      <a:endParaRPr lang="en-US"/>
+                      <a:pPr marL="0" marR="0">
+                        <a:spcBef>
+                          <a:spcPts val="0"/>
+                        </a:spcBef>
+                        <a:spcAft>
+                          <a:spcPts val="0"/>
+                        </a:spcAft>
+                      </a:pPr>
+                      <a:r>
+                        <a:rPr lang="en-US" sz="1100">
+                          <a:effectLst/>
+                        </a:rPr>
+                        <a:t>Ideally, the user would be able to perform actions without a noticeable burden on the user. It is difficult to quantitatively measure comfort, but the user should be able to orient their head, see the environment, and move from place to place as effectively as if the device was not worn.</a:t>
+                      </a:r>
+                      <a:endParaRPr lang="en-US" sz="1100">
+                        <a:effectLst/>
+                        <a:latin typeface="Calibri" panose="020F0502020204030204" pitchFamily="34" charset="0"/>
+                        <a:ea typeface="Calibri" panose="020F0502020204030204" pitchFamily="34" charset="0"/>
+                        <a:cs typeface="Times New Roman" panose="02020603050405020304" pitchFamily="18" charset="0"/>
+                      </a:endParaRPr>
                     </a:p>
                   </a:txBody>
-                  <a:tcPr/>
+                  <a:tcPr marL="68580" marR="68580" marT="0" marB="0"/>
                 </a:tc>
               </a:tr>
-              <a:tr h="370840">
+              <a:tr h="837951">
                 <a:tc>
                   <a:txBody>
                     <a:bodyPr/>
                     <a:lstStyle/>
                     <a:p>
+                      <a:pPr marL="0" marR="0" algn="r">
+                        <a:spcBef>
+                          <a:spcPts val="0"/>
+                        </a:spcBef>
+                        <a:spcAft>
+                          <a:spcPts val="0"/>
+                        </a:spcAft>
+                      </a:pPr>
                       <a:r>
-                        <a:rPr lang="en-US" dirty="0" smtClean="0"/>
-                        <a:t>Display</a:t>
+                        <a:rPr lang="en-US" sz="1100">
+                          <a:effectLst/>
+                        </a:rPr>
+                        <a:t>Durability</a:t>
                       </a:r>
-                      <a:r>
-                        <a:rPr lang="en-US" baseline="0" dirty="0" smtClean="0"/>
-                        <a:t> Brightness</a:t>
-                      </a:r>
-                      <a:endParaRPr lang="en-US" dirty="0"/>
+                      <a:endParaRPr lang="en-US" sz="1100">
+                        <a:effectLst/>
+                        <a:latin typeface="Calibri" panose="020F0502020204030204" pitchFamily="34" charset="0"/>
+                        <a:ea typeface="Calibri" panose="020F0502020204030204" pitchFamily="34" charset="0"/>
+                        <a:cs typeface="Times New Roman" panose="02020603050405020304" pitchFamily="18" charset="0"/>
+                      </a:endParaRPr>
                     </a:p>
                   </a:txBody>
-                  <a:tcPr/>
+                  <a:tcPr marL="68580" marR="68580" marT="0" marB="0"/>
                 </a:tc>
                 <a:tc>
                   <a:txBody>
                     <a:bodyPr/>
                     <a:lstStyle/>
                     <a:p>
+                      <a:pPr marL="0" marR="0">
+                        <a:spcBef>
+                          <a:spcPts val="0"/>
+                        </a:spcBef>
+                        <a:spcAft>
+                          <a:spcPts val="0"/>
+                        </a:spcAft>
+                      </a:pPr>
                       <a:r>
-                        <a:rPr lang="en-US" dirty="0" smtClean="0"/>
-                        <a:t>200</a:t>
+                        <a:rPr lang="en-US" sz="1100">
+                          <a:effectLst/>
+                        </a:rPr>
+                        <a:t>Operate from 0 to 40 C indoors and outdoors in dry conditions</a:t>
                       </a:r>
-                      <a:r>
-                        <a:rPr lang="en-US" baseline="0" dirty="0" smtClean="0"/>
-                        <a:t> nits</a:t>
-                      </a:r>
-                      <a:endParaRPr lang="en-US" dirty="0"/>
+                      <a:endParaRPr lang="en-US" sz="1100">
+                        <a:effectLst/>
+                        <a:latin typeface="Calibri" panose="020F0502020204030204" pitchFamily="34" charset="0"/>
+                        <a:ea typeface="Calibri" panose="020F0502020204030204" pitchFamily="34" charset="0"/>
+                        <a:cs typeface="Times New Roman" panose="02020603050405020304" pitchFamily="18" charset="0"/>
+                      </a:endParaRPr>
                     </a:p>
                   </a:txBody>
-                  <a:tcPr/>
+                  <a:tcPr marL="68580" marR="68580" marT="0" marB="0"/>
                 </a:tc>
                 <a:tc>
                   <a:txBody>
                     <a:bodyPr/>
                     <a:lstStyle/>
                     <a:p>
+                      <a:pPr marL="0" marR="0">
+                        <a:spcBef>
+                          <a:spcPts val="0"/>
+                        </a:spcBef>
+                        <a:spcAft>
+                          <a:spcPts val="0"/>
+                        </a:spcAft>
+                      </a:pPr>
                       <a:r>
-                        <a:rPr lang="en-US" dirty="0" smtClean="0"/>
-                        <a:t>300 nits</a:t>
+                        <a:rPr lang="en-US" sz="1100">
+                          <a:effectLst/>
+                        </a:rPr>
+                        <a:t>Most augmented reality applications involve users walking or running, which will subject the device to vibration and light impacts. In addition, sunlight, humidity, and dust are inherent concerns for a portable device.</a:t>
                       </a:r>
-                      <a:endParaRPr lang="en-US" dirty="0"/>
+                      <a:endParaRPr lang="en-US" sz="1100">
+                        <a:effectLst/>
+                        <a:latin typeface="Calibri" panose="020F0502020204030204" pitchFamily="34" charset="0"/>
+                        <a:ea typeface="Calibri" panose="020F0502020204030204" pitchFamily="34" charset="0"/>
+                        <a:cs typeface="Times New Roman" panose="02020603050405020304" pitchFamily="18" charset="0"/>
+                      </a:endParaRPr>
                     </a:p>
                   </a:txBody>
-                  <a:tcPr/>
+                  <a:tcPr marL="68580" marR="68580" marT="0" marB="0"/>
+                </a:tc>
+              </a:tr>
+              <a:tr h="628463">
+                <a:tc>
+                  <a:txBody>
+                    <a:bodyPr/>
+                    <a:lstStyle/>
+                    <a:p>
+                      <a:pPr marL="0" marR="0" algn="r">
+                        <a:spcBef>
+                          <a:spcPts val="0"/>
+                        </a:spcBef>
+                        <a:spcAft>
+                          <a:spcPts val="0"/>
+                        </a:spcAft>
+                      </a:pPr>
+                      <a:r>
+                        <a:rPr lang="en-US" sz="1100">
+                          <a:effectLst/>
+                        </a:rPr>
+                        <a:t>Usability</a:t>
+                      </a:r>
+                      <a:endParaRPr lang="en-US" sz="1100">
+                        <a:effectLst/>
+                        <a:latin typeface="Calibri" panose="020F0502020204030204" pitchFamily="34" charset="0"/>
+                        <a:ea typeface="Calibri" panose="020F0502020204030204" pitchFamily="34" charset="0"/>
+                        <a:cs typeface="Times New Roman" panose="02020603050405020304" pitchFamily="18" charset="0"/>
+                      </a:endParaRPr>
+                    </a:p>
+                  </a:txBody>
+                  <a:tcPr marL="68580" marR="68580" marT="0" marB="0"/>
+                </a:tc>
+                <a:tc>
+                  <a:txBody>
+                    <a:bodyPr/>
+                    <a:lstStyle/>
+                    <a:p>
+                      <a:pPr marL="0" marR="0">
+                        <a:spcBef>
+                          <a:spcPts val="0"/>
+                        </a:spcBef>
+                        <a:spcAft>
+                          <a:spcPts val="0"/>
+                        </a:spcAft>
+                      </a:pPr>
+                      <a:r>
+                        <a:rPr lang="en-US" sz="1100">
+                          <a:effectLst/>
+                        </a:rPr>
+                        <a:t>End user can start up and use device without a technician</a:t>
+                      </a:r>
+                      <a:endParaRPr lang="en-US" sz="1100">
+                        <a:effectLst/>
+                        <a:latin typeface="Calibri" panose="020F0502020204030204" pitchFamily="34" charset="0"/>
+                        <a:ea typeface="Calibri" panose="020F0502020204030204" pitchFamily="34" charset="0"/>
+                        <a:cs typeface="Times New Roman" panose="02020603050405020304" pitchFamily="18" charset="0"/>
+                      </a:endParaRPr>
+                    </a:p>
+                  </a:txBody>
+                  <a:tcPr marL="68580" marR="68580" marT="0" marB="0"/>
+                </a:tc>
+                <a:tc>
+                  <a:txBody>
+                    <a:bodyPr/>
+                    <a:lstStyle/>
+                    <a:p>
+                      <a:pPr marL="0" marR="0">
+                        <a:spcBef>
+                          <a:spcPts val="0"/>
+                        </a:spcBef>
+                        <a:spcAft>
+                          <a:spcPts val="0"/>
+                        </a:spcAft>
+                      </a:pPr>
+                      <a:r>
+                        <a:rPr lang="en-US" sz="1100" dirty="0">
+                          <a:effectLst/>
+                        </a:rPr>
+                        <a:t>A user unfamiliar with the device technical details must be able to power on the device, perform start-up procedures such as wireless connection, and load the desired application.</a:t>
+                      </a:r>
+                      <a:endParaRPr lang="en-US" sz="1100" dirty="0">
+                        <a:effectLst/>
+                        <a:latin typeface="Calibri" panose="020F0502020204030204" pitchFamily="34" charset="0"/>
+                        <a:ea typeface="Calibri" panose="020F0502020204030204" pitchFamily="34" charset="0"/>
+                        <a:cs typeface="Times New Roman" panose="02020603050405020304" pitchFamily="18" charset="0"/>
+                      </a:endParaRPr>
+                    </a:p>
+                  </a:txBody>
+                  <a:tcPr marL="68580" marR="68580" marT="0" marB="0"/>
                 </a:tc>
               </a:tr>
             </a:tbl>
@@ -11011,7 +12112,7 @@
   <a:extraClrSchemeLst/>
   <a:extLst>
     <a:ext uri="{05A4C25C-085E-4340-85A3-A5531E510DB2}">
-      <thm15:themeFamily xmlns="" xmlns:thm15="http://schemas.microsoft.com/office/thememl/2012/main" name="Office Theme" id="{62F939B6-93AF-4DB8-9C6B-D6C7DFDC589F}" vid="{4A3C46E8-61CC-4603-A589-7422A47A8E4A}"/>
+      <thm15:themeFamily xmlns:thm15="http://schemas.microsoft.com/office/thememl/2012/main" name="Office Theme" id="{62F939B6-93AF-4DB8-9C6B-D6C7DFDC589F}" vid="{4A3C46E8-61CC-4603-A589-7422A47A8E4A}"/>
     </a:ext>
   </a:extLst>
 </a:theme>

</xml_diff>

<commit_message>
Added pcb and schematic slides to presentation.
</commit_message>
<xml_diff>
--- a/doc/AugRealityMidReview.pptx
+++ b/doc/AugRealityMidReview.pptx
@@ -6,7 +6,7 @@
     <p:sldMasterId id="2147483708" r:id="rId2"/>
   </p:sldMasterIdLst>
   <p:notesMasterIdLst>
-    <p:notesMasterId r:id="rId24"/>
+    <p:notesMasterId r:id="rId26"/>
   </p:notesMasterIdLst>
   <p:sldIdLst>
     <p:sldId id="256" r:id="rId3"/>
@@ -30,6 +30,8 @@
     <p:sldId id="283" r:id="rId21"/>
     <p:sldId id="274" r:id="rId22"/>
     <p:sldId id="267" r:id="rId23"/>
+    <p:sldId id="290" r:id="rId24"/>
+    <p:sldId id="291" r:id="rId25"/>
   </p:sldIdLst>
   <p:sldSz cx="9144000" cy="6858000" type="screen4x3"/>
   <p:notesSz cx="6858000" cy="9144000"/>
@@ -130,7 +132,7 @@
   </p:defaultTextStyle>
   <p:extLst>
     <p:ext uri="{EFAFB233-063F-42B5-8137-9DF3F51BA10A}">
-      <p15:sldGuideLst xmlns:p15="http://schemas.microsoft.com/office/powerpoint/2012/main" xmlns="">
+      <p15:sldGuideLst xmlns:p15="http://schemas.microsoft.com/office/powerpoint/2012/main">
         <p15:guide id="1" orient="horz" pos="2160">
           <p15:clr>
             <a:srgbClr val="A4A3A4"/>
@@ -9436,6 +9438,13 @@
   <p:clrMapOvr>
     <a:masterClrMapping/>
   </p:clrMapOvr>
+  <p:timing>
+    <p:tnLst>
+      <p:par>
+        <p:cTn id="1" dur="indefinite" restart="never" nodeType="tmRoot"/>
+      </p:par>
+    </p:tnLst>
+  </p:timing>
 </p:sld>
 </file>
 
@@ -9665,6 +9674,13 @@
   <p:clrMapOvr>
     <a:masterClrMapping/>
   </p:clrMapOvr>
+  <p:timing>
+    <p:tnLst>
+      <p:par>
+        <p:cTn id="1" dur="indefinite" restart="never" nodeType="tmRoot"/>
+      </p:par>
+    </p:tnLst>
+  </p:timing>
 </p:sld>
 </file>
 
@@ -9917,11 +9933,7 @@
           <a:p>
             <a:r>
               <a:rPr lang="en-US" dirty="0" smtClean="0"/>
-              <a:t>Execution overview – </a:t>
-            </a:r>
-            <a:r>
-              <a:rPr lang="en-US" dirty="0" smtClean="0"/>
-              <a:t>Timeline 2/3</a:t>
+              <a:t>Execution overview – Timeline 2/3</a:t>
             </a:r>
             <a:endParaRPr lang="en-US" dirty="0"/>
           </a:p>
@@ -13611,6 +13623,184 @@
 </p:sld>
 </file>
 
+<file path=ppt/slides/slide22.xml><?xml version="1.0" encoding="utf-8"?>
+<p:sld xmlns:a="http://schemas.openxmlformats.org/drawingml/2006/main" xmlns:r="http://schemas.openxmlformats.org/officeDocument/2006/relationships" xmlns:p="http://schemas.openxmlformats.org/presentationml/2006/main">
+  <p:cSld>
+    <p:spTree>
+      <p:nvGrpSpPr>
+        <p:cNvPr id="1" name=""/>
+        <p:cNvGrpSpPr/>
+        <p:nvPr/>
+      </p:nvGrpSpPr>
+      <p:grpSpPr>
+        <a:xfrm>
+          <a:off x="0" y="0"/>
+          <a:ext cx="0" cy="0"/>
+          <a:chOff x="0" y="0"/>
+          <a:chExt cx="0" cy="0"/>
+        </a:xfrm>
+      </p:grpSpPr>
+      <p:pic>
+        <p:nvPicPr>
+          <p:cNvPr id="4" name="Content Placeholder 3"/>
+          <p:cNvPicPr>
+            <a:picLocks noGrp="1" noChangeAspect="1"/>
+          </p:cNvPicPr>
+          <p:nvPr>
+            <p:ph idx="1"/>
+          </p:nvPr>
+        </p:nvPicPr>
+        <p:blipFill>
+          <a:blip r:embed="rId2" cstate="print">
+            <a:extLst>
+              <a:ext uri="{28A0092B-C50C-407E-A947-70E740481C1C}">
+                <a14:useLocalDpi xmlns:a14="http://schemas.microsoft.com/office/drawing/2010/main" val="0"/>
+              </a:ext>
+            </a:extLst>
+          </a:blip>
+          <a:stretch>
+            <a:fillRect/>
+          </a:stretch>
+        </p:blipFill>
+        <p:spPr>
+          <a:xfrm>
+            <a:off x="1637930" y="1371600"/>
+            <a:ext cx="5867400" cy="5319954"/>
+          </a:xfrm>
+        </p:spPr>
+      </p:pic>
+      <p:sp>
+        <p:nvSpPr>
+          <p:cNvPr id="3" name="Title 2"/>
+          <p:cNvSpPr>
+            <a:spLocks noGrp="1"/>
+          </p:cNvSpPr>
+          <p:nvPr>
+            <p:ph type="title"/>
+          </p:nvPr>
+        </p:nvSpPr>
+        <p:spPr/>
+        <p:txBody>
+          <a:bodyPr/>
+          <a:lstStyle/>
+          <a:p>
+            <a:r>
+              <a:rPr lang="en-US" dirty="0" smtClean="0"/>
+              <a:t>PCB</a:t>
+            </a:r>
+            <a:endParaRPr lang="en-US" dirty="0"/>
+          </a:p>
+        </p:txBody>
+      </p:sp>
+    </p:spTree>
+    <p:extLst>
+      <p:ext uri="{BB962C8B-B14F-4D97-AF65-F5344CB8AC3E}">
+        <p14:creationId xmlns:p14="http://schemas.microsoft.com/office/powerpoint/2010/main" val="2623386836"/>
+      </p:ext>
+    </p:extLst>
+  </p:cSld>
+  <p:clrMapOvr>
+    <a:masterClrMapping/>
+  </p:clrMapOvr>
+  <p:timing>
+    <p:tnLst>
+      <p:par>
+        <p:cTn id="1" dur="indefinite" restart="never" nodeType="tmRoot"/>
+      </p:par>
+    </p:tnLst>
+  </p:timing>
+</p:sld>
+</file>
+
+<file path=ppt/slides/slide23.xml><?xml version="1.0" encoding="utf-8"?>
+<p:sld xmlns:a="http://schemas.openxmlformats.org/drawingml/2006/main" xmlns:r="http://schemas.openxmlformats.org/officeDocument/2006/relationships" xmlns:p="http://schemas.openxmlformats.org/presentationml/2006/main">
+  <p:cSld>
+    <p:spTree>
+      <p:nvGrpSpPr>
+        <p:cNvPr id="1" name=""/>
+        <p:cNvGrpSpPr/>
+        <p:nvPr/>
+      </p:nvGrpSpPr>
+      <p:grpSpPr>
+        <a:xfrm>
+          <a:off x="0" y="0"/>
+          <a:ext cx="0" cy="0"/>
+          <a:chOff x="0" y="0"/>
+          <a:chExt cx="0" cy="0"/>
+        </a:xfrm>
+      </p:grpSpPr>
+      <p:pic>
+        <p:nvPicPr>
+          <p:cNvPr id="4" name="Content Placeholder 3"/>
+          <p:cNvPicPr>
+            <a:picLocks noGrp="1" noChangeAspect="1"/>
+          </p:cNvPicPr>
+          <p:nvPr>
+            <p:ph idx="1"/>
+          </p:nvPr>
+        </p:nvPicPr>
+        <p:blipFill>
+          <a:blip r:embed="rId2" cstate="print">
+            <a:extLst>
+              <a:ext uri="{28A0092B-C50C-407E-A947-70E740481C1C}">
+                <a14:useLocalDpi xmlns:a14="http://schemas.microsoft.com/office/drawing/2010/main" val="0"/>
+              </a:ext>
+            </a:extLst>
+          </a:blip>
+          <a:stretch>
+            <a:fillRect/>
+          </a:stretch>
+        </p:blipFill>
+        <p:spPr>
+          <a:xfrm>
+            <a:off x="685800" y="1371600"/>
+            <a:ext cx="7696570" cy="5304242"/>
+          </a:xfrm>
+        </p:spPr>
+      </p:pic>
+      <p:sp>
+        <p:nvSpPr>
+          <p:cNvPr id="3" name="Title 2"/>
+          <p:cNvSpPr>
+            <a:spLocks noGrp="1"/>
+          </p:cNvSpPr>
+          <p:nvPr>
+            <p:ph type="title"/>
+          </p:nvPr>
+        </p:nvSpPr>
+        <p:spPr/>
+        <p:txBody>
+          <a:bodyPr/>
+          <a:lstStyle/>
+          <a:p>
+            <a:r>
+              <a:rPr lang="en-US" dirty="0" smtClean="0"/>
+              <a:t>Schematic</a:t>
+            </a:r>
+            <a:endParaRPr lang="en-US" dirty="0"/>
+          </a:p>
+        </p:txBody>
+      </p:sp>
+    </p:spTree>
+    <p:extLst>
+      <p:ext uri="{BB962C8B-B14F-4D97-AF65-F5344CB8AC3E}">
+        <p14:creationId xmlns:p14="http://schemas.microsoft.com/office/powerpoint/2010/main" val="1278752022"/>
+      </p:ext>
+    </p:extLst>
+  </p:cSld>
+  <p:clrMapOvr>
+    <a:masterClrMapping/>
+  </p:clrMapOvr>
+  <p:timing>
+    <p:tnLst>
+      <p:par>
+        <p:cTn id="1" dur="indefinite" restart="never" nodeType="tmRoot"/>
+      </p:par>
+    </p:tnLst>
+  </p:timing>
+</p:sld>
+</file>
+
 <file path=ppt/slides/slide3.xml><?xml version="1.0" encoding="utf-8"?>
 <p:sld xmlns:a="http://schemas.openxmlformats.org/drawingml/2006/main" xmlns:r="http://schemas.openxmlformats.org/officeDocument/2006/relationships" xmlns:p="http://schemas.openxmlformats.org/presentationml/2006/main">
   <p:cSld>
@@ -13829,6 +14019,13 @@
   <p:clrMapOvr>
     <a:masterClrMapping/>
   </p:clrMapOvr>
+  <p:timing>
+    <p:tnLst>
+      <p:par>
+        <p:cTn id="1" dur="indefinite" restart="never" nodeType="tmRoot"/>
+      </p:par>
+    </p:tnLst>
+  </p:timing>
 </p:sld>
 </file>
 
@@ -14316,6 +14513,13 @@
   <p:clrMapOvr>
     <a:masterClrMapping/>
   </p:clrMapOvr>
+  <p:timing>
+    <p:tnLst>
+      <p:par>
+        <p:cTn id="1" dur="indefinite" restart="never" nodeType="tmRoot"/>
+      </p:par>
+    </p:tnLst>
+  </p:timing>
 </p:sld>
 </file>
 
@@ -14386,6 +14590,13 @@
   <p:clrMapOvr>
     <a:masterClrMapping/>
   </p:clrMapOvr>
+  <p:timing>
+    <p:tnLst>
+      <p:par>
+        <p:cTn id="1" dur="indefinite" restart="never" nodeType="tmRoot"/>
+      </p:par>
+    </p:tnLst>
+  </p:timing>
 </p:sld>
 </file>
 
@@ -14473,6 +14684,13 @@
   <p:clrMapOvr>
     <a:masterClrMapping/>
   </p:clrMapOvr>
+  <p:timing>
+    <p:tnLst>
+      <p:par>
+        <p:cTn id="1" dur="indefinite" restart="never" nodeType="tmRoot"/>
+      </p:par>
+    </p:tnLst>
+  </p:timing>
 </p:sld>
 </file>
 
@@ -14631,6 +14849,13 @@
   <p:clrMapOvr>
     <a:masterClrMapping/>
   </p:clrMapOvr>
+  <p:timing>
+    <p:tnLst>
+      <p:par>
+        <p:cTn id="1" dur="indefinite" restart="never" nodeType="tmRoot"/>
+      </p:par>
+    </p:tnLst>
+  </p:timing>
 </p:sld>
 </file>
 
@@ -15628,7 +15853,7 @@
   <a:extraClrSchemeLst/>
   <a:extLst>
     <a:ext uri="{05A4C25C-085E-4340-85A3-A5531E510DB2}">
-      <thm15:themeFamily xmlns:thm15="http://schemas.microsoft.com/office/thememl/2012/main" xmlns="" name="Office Theme" id="{62F939B6-93AF-4DB8-9C6B-D6C7DFDC589F}" vid="{4A3C46E8-61CC-4603-A589-7422A47A8E4A}"/>
+      <thm15:themeFamily xmlns:thm15="http://schemas.microsoft.com/office/thememl/2012/main" name="Office Theme" id="{62F939B6-93AF-4DB8-9C6B-D6C7DFDC589F}" vid="{4A3C46E8-61CC-4603-A589-7422A47A8E4A}"/>
     </a:ext>
   </a:extLst>
 </a:theme>

</xml_diff>

<commit_message>
Update presentation with some of the changes from Dr. J and GH.
</commit_message>
<xml_diff>
--- a/doc/AugRealityMidReview.pptx
+++ b/doc/AugRealityMidReview.pptx
@@ -131,7 +131,7 @@
   </p:defaultTextStyle>
   <p:extLst>
     <p:ext uri="{EFAFB233-063F-42B5-8137-9DF3F51BA10A}">
-      <p15:sldGuideLst xmlns:p15="http://schemas.microsoft.com/office/powerpoint/2012/main" xmlns="">
+      <p15:sldGuideLst xmlns="" xmlns:p15="http://schemas.microsoft.com/office/powerpoint/2012/main">
         <p15:guide id="1" orient="horz" pos="2160">
           <p15:clr>
             <a:srgbClr val="A4A3A4"/>
@@ -7579,22 +7579,22 @@
           <a:lstStyle/>
           <a:p>
             <a:r>
-              <a:rPr lang="en-US" dirty="0" smtClean="0"/>
+              <a:rPr lang="en-US" sz="1600" dirty="0" smtClean="0"/>
               <a:t>Stephen Carlson</a:t>
             </a:r>
           </a:p>
           <a:p>
             <a:r>
-              <a:rPr lang="en-US" dirty="0" smtClean="0"/>
+              <a:rPr lang="en-US" sz="1600" dirty="0" smtClean="0"/>
               <a:t>Stephen Ellis</a:t>
             </a:r>
           </a:p>
           <a:p>
             <a:r>
-              <a:rPr lang="en-US" dirty="0" smtClean="0"/>
+              <a:rPr lang="en-US" sz="1600" dirty="0" smtClean="0"/>
               <a:t>Thor Smith</a:t>
             </a:r>
-            <a:endParaRPr lang="en-US" dirty="0"/>
+            <a:endParaRPr lang="en-US" sz="1600" dirty="0"/>
           </a:p>
         </p:txBody>
       </p:sp>
@@ -7898,14 +7898,14 @@
             <p:ph idx="1"/>
             <p:extLst>
               <p:ext uri="{D42A27DB-BD31-4B8C-83A1-F6EECF244321}">
-                <p14:modId xmlns:p14="http://schemas.microsoft.com/office/powerpoint/2010/main" val="4103441069"/>
+                <p14:modId xmlns:p14="http://schemas.microsoft.com/office/powerpoint/2010/main" val="1173024867"/>
               </p:ext>
             </p:extLst>
           </p:nvPr>
         </p:nvGraphicFramePr>
         <p:xfrm>
           <a:off x="152400" y="1173729"/>
-          <a:ext cx="8839201" cy="5531871"/>
+          <a:ext cx="8821039" cy="5166111"/>
         </p:xfrm>
         <a:graphic>
           <a:graphicData uri="http://schemas.openxmlformats.org/drawingml/2006/table">
@@ -7914,10 +7914,10 @@
                 <a:tableStyleId>{5C22544A-7EE6-4342-B048-85BDC9FD1C3A}</a:tableStyleId>
               </a:tblPr>
               <a:tblGrid>
-                <a:gridCol w="762000"/>
-                <a:gridCol w="1295400"/>
-                <a:gridCol w="3259214"/>
-                <a:gridCol w="3522587"/>
+                <a:gridCol w="1905000"/>
+                <a:gridCol w="1929447"/>
+                <a:gridCol w="2566353"/>
+                <a:gridCol w="2420239"/>
               </a:tblGrid>
               <a:tr h="209488">
                 <a:tc>
@@ -7934,12 +7934,12 @@
                         </a:spcAft>
                       </a:pPr>
                       <a:r>
-                        <a:rPr lang="en-US" sz="1200" dirty="0">
+                        <a:rPr lang="en-US" sz="1600" dirty="0">
                           <a:effectLst/>
                         </a:rPr>
                         <a:t>Metric</a:t>
                       </a:r>
-                      <a:endParaRPr lang="en-US" sz="1200" dirty="0">
+                      <a:endParaRPr lang="en-US" sz="1600" dirty="0">
                         <a:effectLst/>
                         <a:latin typeface="Calibri" panose="020F0502020204030204" pitchFamily="34" charset="0"/>
                         <a:ea typeface="Calibri" panose="020F0502020204030204" pitchFamily="34" charset="0"/>
@@ -7963,12 +7963,12 @@
                         </a:spcAft>
                       </a:pPr>
                       <a:r>
-                        <a:rPr lang="en-US" sz="1200" dirty="0" smtClean="0">
+                        <a:rPr lang="en-US" sz="1600" dirty="0" smtClean="0">
                           <a:effectLst/>
                         </a:rPr>
-                        <a:t>Initial Target</a:t>
+                        <a:t>Phase 1 (Measured)</a:t>
                       </a:r>
-                      <a:endParaRPr lang="en-US" sz="1200" dirty="0">
+                      <a:endParaRPr lang="en-US" sz="1600" dirty="0">
                         <a:effectLst/>
                         <a:latin typeface="Calibri" panose="020F0502020204030204" pitchFamily="34" charset="0"/>
                         <a:ea typeface="Calibri" panose="020F0502020204030204" pitchFamily="34" charset="0"/>
@@ -7992,12 +7992,12 @@
                         </a:spcAft>
                       </a:pPr>
                       <a:r>
-                        <a:rPr lang="en-US" sz="1200" dirty="0" smtClean="0">
+                        <a:rPr lang="en-US" sz="1600" dirty="0" smtClean="0">
                           <a:effectLst/>
                         </a:rPr>
-                        <a:t>Phase 1 (Measured)</a:t>
+                        <a:t>Phase 2 Target</a:t>
                       </a:r>
-                      <a:endParaRPr lang="en-US" sz="1200" dirty="0">
+                      <a:endParaRPr lang="en-US" sz="1600" dirty="0">
                         <a:effectLst/>
                         <a:latin typeface="Calibri" panose="020F0502020204030204" pitchFamily="34" charset="0"/>
                         <a:ea typeface="Calibri" panose="020F0502020204030204" pitchFamily="34" charset="0"/>
@@ -8021,7 +8021,7 @@
                         </a:spcAft>
                       </a:pPr>
                       <a:r>
-                        <a:rPr lang="en-US" sz="1200" dirty="0" smtClean="0">
+                        <a:rPr lang="en-US" sz="1600" dirty="0" smtClean="0">
                           <a:effectLst/>
                           <a:latin typeface="Calibri" panose="020F0502020204030204" pitchFamily="34" charset="0"/>
                           <a:ea typeface="Calibri" panose="020F0502020204030204" pitchFamily="34" charset="0"/>
@@ -8030,7 +8030,7 @@
                         <a:t>Phase 2 (Current</a:t>
                       </a:r>
                       <a:r>
-                        <a:rPr lang="en-US" sz="1200" baseline="0" dirty="0" smtClean="0">
+                        <a:rPr lang="en-US" sz="1600" baseline="0" dirty="0" smtClean="0">
                           <a:effectLst/>
                           <a:latin typeface="Calibri" panose="020F0502020204030204" pitchFamily="34" charset="0"/>
                           <a:ea typeface="Calibri" panose="020F0502020204030204" pitchFamily="34" charset="0"/>
@@ -8038,7 +8038,7 @@
                         </a:rPr>
                         <a:t> Estimate)</a:t>
                       </a:r>
-                      <a:endParaRPr lang="en-US" sz="1200" dirty="0">
+                      <a:endParaRPr lang="en-US" sz="1600" dirty="0">
                         <a:effectLst/>
                         <a:latin typeface="Calibri" panose="020F0502020204030204" pitchFamily="34" charset="0"/>
                         <a:ea typeface="Calibri" panose="020F0502020204030204" pitchFamily="34" charset="0"/>
@@ -8064,12 +8064,12 @@
                         </a:spcAft>
                       </a:pPr>
                       <a:r>
-                        <a:rPr lang="en-US" sz="1200">
+                        <a:rPr lang="en-US" sz="1800">
                           <a:effectLst/>
                         </a:rPr>
                         <a:t>Mass</a:t>
                       </a:r>
-                      <a:endParaRPr lang="en-US" sz="1200">
+                      <a:endParaRPr lang="en-US" sz="1800">
                         <a:effectLst/>
                         <a:latin typeface="Calibri" panose="020F0502020204030204" pitchFamily="34" charset="0"/>
                         <a:ea typeface="Calibri" panose="020F0502020204030204" pitchFamily="34" charset="0"/>
@@ -8093,10 +8093,13 @@
                         </a:spcAft>
                       </a:pPr>
                       <a:r>
-                        <a:rPr lang="en-US" sz="1200" dirty="0">
+                        <a:rPr lang="en-US" sz="1800" dirty="0" smtClean="0">
                           <a:effectLst/>
+                          <a:latin typeface="Calibri" panose="020F0502020204030204" pitchFamily="34" charset="0"/>
+                          <a:ea typeface="Calibri" panose="020F0502020204030204" pitchFamily="34" charset="0"/>
+                          <a:cs typeface="Times New Roman" panose="02020603050405020304" pitchFamily="18" charset="0"/>
                         </a:rPr>
-                        <a:t>Headset: 1 kg</a:t>
+                        <a:t>Headset: 1.3kg</a:t>
                       </a:r>
                     </a:p>
                     <a:p>
@@ -8109,12 +8112,24 @@
                         </a:spcAft>
                       </a:pPr>
                       <a:r>
-                        <a:rPr lang="en-US" sz="1200">
+                        <a:rPr lang="en-US" sz="1800" dirty="0" smtClean="0">
                           <a:effectLst/>
+                          <a:latin typeface="Calibri" panose="020F0502020204030204" pitchFamily="34" charset="0"/>
+                          <a:ea typeface="Calibri" panose="020F0502020204030204" pitchFamily="34" charset="0"/>
+                          <a:cs typeface="Times New Roman" panose="02020603050405020304" pitchFamily="18" charset="0"/>
                         </a:rPr>
-                        <a:t>Backpack: 3 kg</a:t>
+                        <a:t>Backpack:</a:t>
                       </a:r>
-                      <a:endParaRPr lang="en-US" sz="1200">
+                      <a:r>
+                        <a:rPr lang="en-US" sz="1800" baseline="0" dirty="0" smtClean="0">
+                          <a:effectLst/>
+                          <a:latin typeface="Calibri" panose="020F0502020204030204" pitchFamily="34" charset="0"/>
+                          <a:ea typeface="Calibri" panose="020F0502020204030204" pitchFamily="34" charset="0"/>
+                          <a:cs typeface="Times New Roman" panose="02020603050405020304" pitchFamily="18" charset="0"/>
+                        </a:rPr>
+                        <a:t> N/A</a:t>
+                      </a:r>
+                      <a:endParaRPr lang="en-US" sz="1800" dirty="0">
                         <a:effectLst/>
                         <a:latin typeface="Calibri" panose="020F0502020204030204" pitchFamily="34" charset="0"/>
                         <a:ea typeface="Calibri" panose="020F0502020204030204" pitchFamily="34" charset="0"/>
@@ -8138,13 +8153,10 @@
                         </a:spcAft>
                       </a:pPr>
                       <a:r>
-                        <a:rPr lang="en-US" sz="1200" dirty="0" smtClean="0">
+                        <a:rPr lang="en-US" sz="1800" dirty="0">
                           <a:effectLst/>
-                          <a:latin typeface="Calibri" panose="020F0502020204030204" pitchFamily="34" charset="0"/>
-                          <a:ea typeface="Calibri" panose="020F0502020204030204" pitchFamily="34" charset="0"/>
-                          <a:cs typeface="Times New Roman" panose="02020603050405020304" pitchFamily="18" charset="0"/>
                         </a:rPr>
-                        <a:t>Headset: 1.3kg</a:t>
+                        <a:t>Headset: 1 kg</a:t>
                       </a:r>
                     </a:p>
                     <a:p>
@@ -8157,24 +8169,12 @@
                         </a:spcAft>
                       </a:pPr>
                       <a:r>
-                        <a:rPr lang="en-US" sz="1200" dirty="0" smtClean="0">
+                        <a:rPr lang="en-US" sz="1800" dirty="0">
                           <a:effectLst/>
-                          <a:latin typeface="Calibri" panose="020F0502020204030204" pitchFamily="34" charset="0"/>
-                          <a:ea typeface="Calibri" panose="020F0502020204030204" pitchFamily="34" charset="0"/>
-                          <a:cs typeface="Times New Roman" panose="02020603050405020304" pitchFamily="18" charset="0"/>
                         </a:rPr>
-                        <a:t>Backpack:</a:t>
+                        <a:t>Backpack: 3 kg</a:t>
                       </a:r>
-                      <a:r>
-                        <a:rPr lang="en-US" sz="1200" baseline="0" dirty="0" smtClean="0">
-                          <a:effectLst/>
-                          <a:latin typeface="Calibri" panose="020F0502020204030204" pitchFamily="34" charset="0"/>
-                          <a:ea typeface="Calibri" panose="020F0502020204030204" pitchFamily="34" charset="0"/>
-                          <a:cs typeface="Times New Roman" panose="02020603050405020304" pitchFamily="18" charset="0"/>
-                        </a:rPr>
-                        <a:t> N/A</a:t>
-                      </a:r>
-                      <a:endParaRPr lang="en-US" sz="1200" dirty="0">
+                      <a:endParaRPr lang="en-US" sz="1800" dirty="0">
                         <a:effectLst/>
                         <a:latin typeface="Calibri" panose="020F0502020204030204" pitchFamily="34" charset="0"/>
                         <a:ea typeface="Calibri" panose="020F0502020204030204" pitchFamily="34" charset="0"/>
@@ -8198,7 +8198,7 @@
                         </a:spcAft>
                       </a:pPr>
                       <a:r>
-                        <a:rPr lang="en-US" sz="1200" dirty="0" smtClean="0">
+                        <a:rPr lang="en-US" sz="1800" dirty="0" smtClean="0">
                           <a:effectLst/>
                           <a:latin typeface="Calibri" panose="020F0502020204030204" pitchFamily="34" charset="0"/>
                           <a:ea typeface="Calibri" panose="020F0502020204030204" pitchFamily="34" charset="0"/>
@@ -8217,7 +8217,7 @@
                         </a:spcAft>
                       </a:pPr>
                       <a:r>
-                        <a:rPr lang="en-US" sz="1200" dirty="0" smtClean="0">
+                        <a:rPr lang="en-US" sz="1800" dirty="0" smtClean="0">
                           <a:effectLst/>
                           <a:latin typeface="Calibri" panose="020F0502020204030204" pitchFamily="34" charset="0"/>
                           <a:ea typeface="Calibri" panose="020F0502020204030204" pitchFamily="34" charset="0"/>
@@ -8226,7 +8226,7 @@
                         <a:t>Backpack:</a:t>
                       </a:r>
                       <a:r>
-                        <a:rPr lang="en-US" sz="1200" baseline="0" dirty="0" smtClean="0">
+                        <a:rPr lang="en-US" sz="1800" baseline="0" dirty="0" smtClean="0">
                           <a:effectLst/>
                           <a:latin typeface="Calibri" panose="020F0502020204030204" pitchFamily="34" charset="0"/>
                           <a:ea typeface="Calibri" panose="020F0502020204030204" pitchFamily="34" charset="0"/>
@@ -8234,7 +8234,131 @@
                         </a:rPr>
                         <a:t> ~2.5kg</a:t>
                       </a:r>
-                      <a:endParaRPr lang="en-US" sz="1200" dirty="0">
+                      <a:endParaRPr lang="en-US" sz="1800" dirty="0">
+                        <a:effectLst/>
+                        <a:latin typeface="Calibri" panose="020F0502020204030204" pitchFamily="34" charset="0"/>
+                        <a:ea typeface="Calibri" panose="020F0502020204030204" pitchFamily="34" charset="0"/>
+                        <a:cs typeface="Times New Roman" panose="02020603050405020304" pitchFamily="18" charset="0"/>
+                      </a:endParaRPr>
+                    </a:p>
+                  </a:txBody>
+                  <a:tcPr marL="68580" marR="68580" marT="0" marB="0"/>
+                </a:tc>
+              </a:tr>
+              <a:tr h="315919">
+                <a:tc>
+                  <a:txBody>
+                    <a:bodyPr/>
+                    <a:lstStyle/>
+                    <a:p>
+                      <a:pPr marL="0" marR="0" algn="r">
+                        <a:spcBef>
+                          <a:spcPts val="0"/>
+                        </a:spcBef>
+                        <a:spcAft>
+                          <a:spcPts val="0"/>
+                        </a:spcAft>
+                      </a:pPr>
+                      <a:r>
+                        <a:rPr lang="en-US" sz="1800">
+                          <a:effectLst/>
+                        </a:rPr>
+                        <a:t>Power</a:t>
+                      </a:r>
+                      <a:endParaRPr lang="en-US" sz="1800">
+                        <a:effectLst/>
+                        <a:latin typeface="Calibri" panose="020F0502020204030204" pitchFamily="34" charset="0"/>
+                        <a:ea typeface="Calibri" panose="020F0502020204030204" pitchFamily="34" charset="0"/>
+                        <a:cs typeface="Times New Roman" panose="02020603050405020304" pitchFamily="18" charset="0"/>
+                      </a:endParaRPr>
+                    </a:p>
+                  </a:txBody>
+                  <a:tcPr marL="68580" marR="68580" marT="0" marB="0"/>
+                </a:tc>
+                <a:tc>
+                  <a:txBody>
+                    <a:bodyPr/>
+                    <a:lstStyle/>
+                    <a:p>
+                      <a:pPr marL="0" marR="0">
+                        <a:spcBef>
+                          <a:spcPts val="0"/>
+                        </a:spcBef>
+                        <a:spcAft>
+                          <a:spcPts val="0"/>
+                        </a:spcAft>
+                      </a:pPr>
+                      <a:r>
+                        <a:rPr lang="en-US" sz="1800" dirty="0" smtClean="0">
+                          <a:effectLst/>
+                          <a:latin typeface="Calibri" panose="020F0502020204030204" pitchFamily="34" charset="0"/>
+                          <a:ea typeface="Calibri" panose="020F0502020204030204" pitchFamily="34" charset="0"/>
+                          <a:cs typeface="Times New Roman" panose="02020603050405020304" pitchFamily="18" charset="0"/>
+                        </a:rPr>
+                        <a:t>~3 hours</a:t>
+                      </a:r>
+                      <a:endParaRPr lang="en-US" sz="1800" dirty="0">
+                        <a:effectLst/>
+                        <a:latin typeface="Calibri" panose="020F0502020204030204" pitchFamily="34" charset="0"/>
+                        <a:ea typeface="Calibri" panose="020F0502020204030204" pitchFamily="34" charset="0"/>
+                        <a:cs typeface="Times New Roman" panose="02020603050405020304" pitchFamily="18" charset="0"/>
+                      </a:endParaRPr>
+                    </a:p>
+                  </a:txBody>
+                  <a:tcPr marL="68580" marR="68580" marT="0" marB="0"/>
+                </a:tc>
+                <a:tc>
+                  <a:txBody>
+                    <a:bodyPr/>
+                    <a:lstStyle/>
+                    <a:p>
+                      <a:pPr marL="0" marR="0">
+                        <a:spcBef>
+                          <a:spcPts val="0"/>
+                        </a:spcBef>
+                        <a:spcAft>
+                          <a:spcPts val="0"/>
+                        </a:spcAft>
+                      </a:pPr>
+                      <a:r>
+                        <a:rPr lang="en-US" sz="1800" dirty="0">
+                          <a:effectLst/>
+                        </a:rPr>
+                        <a:t>3 hours runtime</a:t>
+                      </a:r>
+                      <a:endParaRPr lang="en-US" sz="1800" dirty="0">
+                        <a:effectLst/>
+                        <a:latin typeface="Calibri" panose="020F0502020204030204" pitchFamily="34" charset="0"/>
+                        <a:ea typeface="Calibri" panose="020F0502020204030204" pitchFamily="34" charset="0"/>
+                        <a:cs typeface="Times New Roman" panose="02020603050405020304" pitchFamily="18" charset="0"/>
+                      </a:endParaRPr>
+                    </a:p>
+                  </a:txBody>
+                  <a:tcPr marL="68580" marR="68580" marT="0" marB="0"/>
+                </a:tc>
+                <a:tc>
+                  <a:txBody>
+                    <a:bodyPr/>
+                    <a:lstStyle/>
+                    <a:p>
+                      <a:pPr marL="0" marR="0">
+                        <a:spcBef>
+                          <a:spcPts val="0"/>
+                        </a:spcBef>
+                        <a:spcAft>
+                          <a:spcPts val="0"/>
+                        </a:spcAft>
+                      </a:pPr>
+                      <a:r>
+                        <a:rPr lang="en-US" sz="1800" dirty="0" smtClean="0">
+                          <a:effectLst/>
+                          <a:latin typeface="Calibri" panose="020F0502020204030204" pitchFamily="34" charset="0"/>
+                          <a:ea typeface="Calibri" panose="020F0502020204030204" pitchFamily="34" charset="0"/>
+                          <a:cs typeface="Times New Roman" panose="02020603050405020304" pitchFamily="18" charset="0"/>
+                        </a:rPr>
+                        <a:t>~4 hours</a:t>
+                      </a:r>
+                      <a:endParaRPr lang="en-US" sz="1800" dirty="0">
                         <a:effectLst/>
                         <a:latin typeface="Calibri" panose="020F0502020204030204" pitchFamily="34" charset="0"/>
                         <a:ea typeface="Calibri" panose="020F0502020204030204" pitchFamily="34" charset="0"/>
@@ -8260,12 +8384,58 @@
                         </a:spcAft>
                       </a:pPr>
                       <a:r>
-                        <a:rPr lang="en-US" sz="1200">
+                        <a:rPr lang="en-US" sz="1800" dirty="0" smtClean="0">
                           <a:effectLst/>
                         </a:rPr>
-                        <a:t>Power</a:t>
+                        <a:t>Location</a:t>
                       </a:r>
-                      <a:endParaRPr lang="en-US" sz="1200">
+                      <a:r>
+                        <a:rPr lang="en-US" sz="1800" baseline="0" dirty="0">
+                          <a:effectLst/>
+                          <a:latin typeface="Calibri" panose="020F0502020204030204" pitchFamily="34" charset="0"/>
+                          <a:cs typeface="Times New Roman" panose="02020603050405020304" pitchFamily="18" charset="0"/>
+                        </a:rPr>
+                        <a:t> </a:t>
+                      </a:r>
+                      <a:r>
+                        <a:rPr lang="en-US" sz="1800" b="1" baseline="0" dirty="0" smtClean="0">
+                          <a:effectLst/>
+                          <a:latin typeface="+mj-lt"/>
+                          <a:cs typeface="Times New Roman" panose="02020603050405020304" pitchFamily="18" charset="0"/>
+                        </a:rPr>
+                        <a:t>Accuracy</a:t>
+                      </a:r>
+                      <a:endParaRPr lang="en-US" sz="1800" b="1" dirty="0" smtClean="0">
+                        <a:effectLst/>
+                        <a:latin typeface="+mj-lt"/>
+                      </a:endParaRPr>
+                    </a:p>
+                  </a:txBody>
+                  <a:tcPr marL="68580" marR="68580" marT="0" marB="0"/>
+                </a:tc>
+                <a:tc>
+                  <a:txBody>
+                    <a:bodyPr/>
+                    <a:lstStyle/>
+                    <a:p>
+                      <a:pPr marL="0" marR="0">
+                        <a:spcBef>
+                          <a:spcPts val="0"/>
+                        </a:spcBef>
+                        <a:spcAft>
+                          <a:spcPts val="0"/>
+                        </a:spcAft>
+                      </a:pPr>
+                      <a:r>
+                        <a:rPr lang="en-US" sz="1800" dirty="0" smtClean="0">
+                          <a:effectLst/>
+                          <a:latin typeface="Calibri" panose="020F0502020204030204" pitchFamily="34" charset="0"/>
+                          <a:ea typeface="Calibri" panose="020F0502020204030204" pitchFamily="34" charset="0"/>
+                          <a:cs typeface="Times New Roman" panose="02020603050405020304" pitchFamily="18" charset="0"/>
+                        </a:rPr>
+                        <a:t>TODO</a:t>
+                      </a:r>
+                      <a:endParaRPr lang="en-US" sz="1800" dirty="0">
                         <a:effectLst/>
                         <a:latin typeface="Calibri" panose="020F0502020204030204" pitchFamily="34" charset="0"/>
                         <a:ea typeface="Calibri" panose="020F0502020204030204" pitchFamily="34" charset="0"/>
@@ -8289,12 +8459,12 @@
                         </a:spcAft>
                       </a:pPr>
                       <a:r>
-                        <a:rPr lang="en-US" sz="1200" dirty="0">
+                        <a:rPr lang="en-US" sz="1800" dirty="0" smtClean="0">
                           <a:effectLst/>
                         </a:rPr>
-                        <a:t>3 hours runtime</a:t>
+                        <a:t>2 meters</a:t>
                       </a:r>
-                      <a:endParaRPr lang="en-US" sz="1200" dirty="0">
+                      <a:endParaRPr lang="en-US" sz="1800" dirty="0">
                         <a:effectLst/>
                         <a:latin typeface="Calibri" panose="020F0502020204030204" pitchFamily="34" charset="0"/>
                         <a:ea typeface="Calibri" panose="020F0502020204030204" pitchFamily="34" charset="0"/>
@@ -8318,47 +8488,15 @@
                         </a:spcAft>
                       </a:pPr>
                       <a:r>
-                        <a:rPr lang="en-US" sz="1200" dirty="0" smtClean="0">
+                        <a:rPr lang="en-US" sz="1800" dirty="0" smtClean="0">
                           <a:effectLst/>
                           <a:latin typeface="Calibri" panose="020F0502020204030204" pitchFamily="34" charset="0"/>
                           <a:ea typeface="Calibri" panose="020F0502020204030204" pitchFamily="34" charset="0"/>
                           <a:cs typeface="Times New Roman" panose="02020603050405020304" pitchFamily="18" charset="0"/>
                         </a:rPr>
-                        <a:t>~3 hours</a:t>
+                        <a:t>Same as Phase 1</a:t>
                       </a:r>
-                      <a:endParaRPr lang="en-US" sz="1200" dirty="0">
-                        <a:effectLst/>
-                        <a:latin typeface="Calibri" panose="020F0502020204030204" pitchFamily="34" charset="0"/>
-                        <a:ea typeface="Calibri" panose="020F0502020204030204" pitchFamily="34" charset="0"/>
-                        <a:cs typeface="Times New Roman" panose="02020603050405020304" pitchFamily="18" charset="0"/>
-                      </a:endParaRPr>
-                    </a:p>
-                  </a:txBody>
-                  <a:tcPr marL="68580" marR="68580" marT="0" marB="0"/>
-                </a:tc>
-                <a:tc>
-                  <a:txBody>
-                    <a:bodyPr/>
-                    <a:lstStyle/>
-                    <a:p>
-                      <a:pPr marL="0" marR="0">
-                        <a:spcBef>
-                          <a:spcPts val="0"/>
-                        </a:spcBef>
-                        <a:spcAft>
-                          <a:spcPts val="0"/>
-                        </a:spcAft>
-                      </a:pPr>
-                      <a:r>
-                        <a:rPr lang="en-US" sz="1200" dirty="0" smtClean="0">
-                          <a:effectLst/>
-                          <a:latin typeface="Calibri" panose="020F0502020204030204" pitchFamily="34" charset="0"/>
-                          <a:ea typeface="Calibri" panose="020F0502020204030204" pitchFamily="34" charset="0"/>
-                          <a:cs typeface="Times New Roman" panose="02020603050405020304" pitchFamily="18" charset="0"/>
-                        </a:rPr>
-                        <a:t>~4 hours</a:t>
-                      </a:r>
-                      <a:endParaRPr lang="en-US" sz="1200" dirty="0">
+                      <a:endParaRPr lang="en-US" sz="1800" dirty="0">
                         <a:effectLst/>
                         <a:latin typeface="Calibri" panose="020F0502020204030204" pitchFamily="34" charset="0"/>
                         <a:ea typeface="Calibri" panose="020F0502020204030204" pitchFamily="34" charset="0"/>
@@ -8369,7 +8507,7 @@
                   <a:tcPr marL="68580" marR="68580" marT="0" marB="0"/>
                 </a:tc>
               </a:tr>
-              <a:tr h="762000">
+              <a:tr h="381000">
                 <a:tc>
                   <a:txBody>
                     <a:bodyPr/>
@@ -8384,189 +8522,22 @@
                         </a:spcAft>
                       </a:pPr>
                       <a:r>
-                        <a:rPr lang="en-US" sz="1200" dirty="0" smtClean="0">
-                          <a:effectLst/>
-                        </a:rPr>
-                        <a:t>Location</a:t>
-                      </a:r>
-                      <a:r>
-                        <a:rPr lang="en-US" sz="1200" baseline="0" dirty="0">
-                          <a:effectLst/>
-                          <a:latin typeface="Calibri" panose="020F0502020204030204" pitchFamily="34" charset="0"/>
-                          <a:cs typeface="Times New Roman" panose="02020603050405020304" pitchFamily="18" charset="0"/>
-                        </a:rPr>
-                        <a:t> </a:t>
-                      </a:r>
-                      <a:r>
-                        <a:rPr lang="en-US" sz="1200" b="1" baseline="0" dirty="0" smtClean="0">
-                          <a:effectLst/>
-                          <a:latin typeface="+mj-lt"/>
-                          <a:cs typeface="Times New Roman" panose="02020603050405020304" pitchFamily="18" charset="0"/>
-                        </a:rPr>
-                        <a:t>Accuracy</a:t>
-                      </a:r>
-                      <a:endParaRPr lang="en-US" sz="1200" b="1" dirty="0" smtClean="0">
-                        <a:effectLst/>
-                        <a:latin typeface="+mj-lt"/>
-                      </a:endParaRPr>
-                    </a:p>
-                  </a:txBody>
-                  <a:tcPr marL="68580" marR="68580" marT="0" marB="0"/>
-                </a:tc>
-                <a:tc>
-                  <a:txBody>
-                    <a:bodyPr/>
-                    <a:lstStyle/>
-                    <a:p>
-                      <a:pPr marL="0" marR="0">
-                        <a:spcBef>
-                          <a:spcPts val="0"/>
-                        </a:spcBef>
-                        <a:spcAft>
-                          <a:spcPts val="0"/>
-                        </a:spcAft>
-                      </a:pPr>
-                      <a:r>
-                        <a:rPr lang="en-US" sz="1200" dirty="0" smtClean="0">
-                          <a:effectLst/>
-                        </a:rPr>
-                        <a:t>2 meters</a:t>
-                      </a:r>
-                      <a:endParaRPr lang="en-US" sz="1200" dirty="0">
-                        <a:effectLst/>
-                        <a:latin typeface="Calibri" panose="020F0502020204030204" pitchFamily="34" charset="0"/>
-                        <a:ea typeface="Calibri" panose="020F0502020204030204" pitchFamily="34" charset="0"/>
-                        <a:cs typeface="Times New Roman" panose="02020603050405020304" pitchFamily="18" charset="0"/>
-                      </a:endParaRPr>
-                    </a:p>
-                  </a:txBody>
-                  <a:tcPr marL="68580" marR="68580" marT="0" marB="0"/>
-                </a:tc>
-                <a:tc>
-                  <a:txBody>
-                    <a:bodyPr/>
-                    <a:lstStyle/>
-                    <a:p>
-                      <a:pPr marL="0" marR="0">
-                        <a:spcBef>
-                          <a:spcPts val="0"/>
-                        </a:spcBef>
-                        <a:spcAft>
-                          <a:spcPts val="0"/>
-                        </a:spcAft>
-                      </a:pPr>
-                      <a:r>
-                        <a:rPr lang="en-US" sz="1200" dirty="0" smtClean="0">
-                          <a:effectLst/>
-                          <a:latin typeface="Calibri" panose="020F0502020204030204" pitchFamily="34" charset="0"/>
-                          <a:ea typeface="Calibri" panose="020F0502020204030204" pitchFamily="34" charset="0"/>
-                          <a:cs typeface="Times New Roman" panose="02020603050405020304" pitchFamily="18" charset="0"/>
-                        </a:rPr>
-                        <a:t>TODO</a:t>
-                      </a:r>
-                      <a:endParaRPr lang="en-US" sz="1200" dirty="0">
-                        <a:effectLst/>
-                        <a:latin typeface="Calibri" panose="020F0502020204030204" pitchFamily="34" charset="0"/>
-                        <a:ea typeface="Calibri" panose="020F0502020204030204" pitchFamily="34" charset="0"/>
-                        <a:cs typeface="Times New Roman" panose="02020603050405020304" pitchFamily="18" charset="0"/>
-                      </a:endParaRPr>
-                    </a:p>
-                  </a:txBody>
-                  <a:tcPr marL="68580" marR="68580" marT="0" marB="0"/>
-                </a:tc>
-                <a:tc>
-                  <a:txBody>
-                    <a:bodyPr/>
-                    <a:lstStyle/>
-                    <a:p>
-                      <a:pPr marL="0" marR="0">
-                        <a:spcBef>
-                          <a:spcPts val="0"/>
-                        </a:spcBef>
-                        <a:spcAft>
-                          <a:spcPts val="0"/>
-                        </a:spcAft>
-                      </a:pPr>
-                      <a:r>
-                        <a:rPr lang="en-US" sz="1200" dirty="0" smtClean="0">
-                          <a:effectLst/>
-                          <a:latin typeface="Calibri" panose="020F0502020204030204" pitchFamily="34" charset="0"/>
-                          <a:ea typeface="Calibri" panose="020F0502020204030204" pitchFamily="34" charset="0"/>
-                          <a:cs typeface="Times New Roman" panose="02020603050405020304" pitchFamily="18" charset="0"/>
-                        </a:rPr>
-                        <a:t>Same as Phase 1</a:t>
-                      </a:r>
-                      <a:endParaRPr lang="en-US" sz="1200" dirty="0">
-                        <a:effectLst/>
-                        <a:latin typeface="Calibri" panose="020F0502020204030204" pitchFamily="34" charset="0"/>
-                        <a:ea typeface="Calibri" panose="020F0502020204030204" pitchFamily="34" charset="0"/>
-                        <a:cs typeface="Times New Roman" panose="02020603050405020304" pitchFamily="18" charset="0"/>
-                      </a:endParaRPr>
-                    </a:p>
-                  </a:txBody>
-                  <a:tcPr marL="68580" marR="68580" marT="0" marB="0"/>
-                </a:tc>
-              </a:tr>
-              <a:tr h="685800">
-                <a:tc>
-                  <a:txBody>
-                    <a:bodyPr/>
-                    <a:lstStyle/>
-                    <a:p>
-                      <a:pPr marL="0" marR="0" algn="r">
-                        <a:spcBef>
-                          <a:spcPts val="0"/>
-                        </a:spcBef>
-                        <a:spcAft>
-                          <a:spcPts val="0"/>
-                        </a:spcAft>
-                      </a:pPr>
-                      <a:r>
-                        <a:rPr lang="en-US" sz="1200" dirty="0" smtClean="0">
+                        <a:rPr lang="en-US" sz="1800" dirty="0" smtClean="0">
                           <a:effectLst/>
                         </a:rPr>
                         <a:t>Wireless </a:t>
                       </a:r>
                       <a:r>
-                        <a:rPr lang="en-US" sz="1200" dirty="0" smtClean="0">
+                        <a:rPr lang="en-US" sz="1800" dirty="0" smtClean="0">
                           <a:effectLst/>
                           <a:latin typeface="+mj-lt"/>
                           <a:cs typeface="Times New Roman" panose="02020603050405020304" pitchFamily="18" charset="0"/>
                         </a:rPr>
                         <a:t>Range</a:t>
                       </a:r>
-                      <a:endParaRPr lang="en-US" sz="1200" dirty="0" smtClean="0">
+                      <a:endParaRPr lang="en-US" sz="1800" dirty="0" smtClean="0">
                         <a:effectLst/>
                         <a:latin typeface="+mj-lt"/>
-                      </a:endParaRPr>
-                    </a:p>
-                  </a:txBody>
-                  <a:tcPr marL="68580" marR="68580" marT="0" marB="0"/>
-                </a:tc>
-                <a:tc>
-                  <a:txBody>
-                    <a:bodyPr/>
-                    <a:lstStyle/>
-                    <a:p>
-                      <a:pPr marL="0" marR="0">
-                        <a:spcBef>
-                          <a:spcPts val="0"/>
-                        </a:spcBef>
-                        <a:spcAft>
-                          <a:spcPts val="0"/>
-                        </a:spcAft>
-                      </a:pPr>
-                      <a:r>
-                        <a:rPr lang="en-US" sz="1200" dirty="0">
-                          <a:effectLst/>
-                        </a:rPr>
-                        <a:t>80 m range, line of sight</a:t>
-                      </a:r>
-                      <a:endParaRPr lang="en-US" sz="1200" dirty="0">
-                        <a:effectLst/>
-                        <a:latin typeface="Calibri" panose="020F0502020204030204" pitchFamily="34" charset="0"/>
-                        <a:ea typeface="Calibri" panose="020F0502020204030204" pitchFamily="34" charset="0"/>
-                        <a:cs typeface="Times New Roman" panose="02020603050405020304" pitchFamily="18" charset="0"/>
                       </a:endParaRPr>
                     </a:p>
                   </a:txBody>
@@ -8595,103 +8566,15 @@
                         <a:defRPr/>
                       </a:pPr>
                       <a:r>
-                        <a:rPr lang="en-US" sz="1200" dirty="0" smtClean="0">
+                        <a:rPr lang="en-US" sz="1800" dirty="0" smtClean="0">
                           <a:effectLst/>
                           <a:latin typeface="Calibri" panose="020F0502020204030204" pitchFamily="34" charset="0"/>
                           <a:ea typeface="Calibri" panose="020F0502020204030204" pitchFamily="34" charset="0"/>
                           <a:cs typeface="Times New Roman" panose="02020603050405020304" pitchFamily="18" charset="0"/>
                         </a:rPr>
-                        <a:t>TODO</a:t>
+                        <a:t>250 m</a:t>
                       </a:r>
-                    </a:p>
-                  </a:txBody>
-                  <a:tcPr marL="68580" marR="68580" marT="0" marB="0"/>
-                </a:tc>
-                <a:tc>
-                  <a:txBody>
-                    <a:bodyPr/>
-                    <a:lstStyle/>
-                    <a:p>
-                      <a:pPr marL="0" marR="0">
-                        <a:spcBef>
-                          <a:spcPts val="0"/>
-                        </a:spcBef>
-                        <a:spcAft>
-                          <a:spcPts val="0"/>
-                        </a:spcAft>
-                      </a:pPr>
-                      <a:r>
-                        <a:rPr lang="en-US" sz="1200" dirty="0" smtClean="0">
-                          <a:effectLst/>
-                          <a:latin typeface="Calibri" panose="020F0502020204030204" pitchFamily="34" charset="0"/>
-                          <a:ea typeface="Calibri" panose="020F0502020204030204" pitchFamily="34" charset="0"/>
-                          <a:cs typeface="Times New Roman" panose="02020603050405020304" pitchFamily="18" charset="0"/>
-                        </a:rPr>
-                        <a:t>TODO</a:t>
-                      </a:r>
-                      <a:endParaRPr lang="en-US" sz="1200" dirty="0">
-                        <a:effectLst/>
-                        <a:latin typeface="Calibri" panose="020F0502020204030204" pitchFamily="34" charset="0"/>
-                        <a:ea typeface="Calibri" panose="020F0502020204030204" pitchFamily="34" charset="0"/>
-                        <a:cs typeface="Times New Roman" panose="02020603050405020304" pitchFamily="18" charset="0"/>
-                      </a:endParaRPr>
-                    </a:p>
-                  </a:txBody>
-                  <a:tcPr marL="68580" marR="68580" marT="0" marB="0"/>
-                </a:tc>
-              </a:tr>
-              <a:tr h="914400">
-                <a:tc>
-                  <a:txBody>
-                    <a:bodyPr/>
-                    <a:lstStyle/>
-                    <a:p>
-                      <a:pPr marL="0" marR="0" algn="r">
-                        <a:spcBef>
-                          <a:spcPts val="0"/>
-                        </a:spcBef>
-                        <a:spcAft>
-                          <a:spcPts val="0"/>
-                        </a:spcAft>
-                      </a:pPr>
-                      <a:r>
-                        <a:rPr lang="en-US" sz="1200" dirty="0" smtClean="0">
-                          <a:effectLst/>
-                          <a:latin typeface="+mn-lt"/>
-                          <a:ea typeface="+mn-ea"/>
-                          <a:cs typeface="+mn-cs"/>
-                        </a:rPr>
-                        <a:t>Display</a:t>
-                      </a:r>
-                      <a:r>
-                        <a:rPr lang="en-US" sz="1200" baseline="0" dirty="0" smtClean="0">
-                          <a:effectLst/>
-                          <a:latin typeface="+mn-lt"/>
-                          <a:ea typeface="+mn-ea"/>
-                          <a:cs typeface="+mn-cs"/>
-                        </a:rPr>
-                        <a:t> Refresh</a:t>
-                      </a:r>
-                    </a:p>
-                    <a:p>
-                      <a:pPr marL="0" marR="0" algn="r">
-                        <a:spcBef>
-                          <a:spcPts val="0"/>
-                        </a:spcBef>
-                        <a:spcAft>
-                          <a:spcPts val="0"/>
-                        </a:spcAft>
-                      </a:pPr>
-                      <a:r>
-                        <a:rPr lang="en-US" sz="1200" baseline="0" dirty="0" smtClean="0">
-                          <a:effectLst/>
-                          <a:latin typeface="+mn-lt"/>
-                          <a:ea typeface="+mn-ea"/>
-                          <a:cs typeface="+mn-cs"/>
-                        </a:rPr>
-                        <a:t>Rate</a:t>
-                      </a:r>
-                      <a:endParaRPr lang="en-US" sz="1200" dirty="0">
+                      <a:endParaRPr lang="en-US" sz="1800" dirty="0" smtClean="0">
                         <a:effectLst/>
                         <a:latin typeface="Calibri" panose="020F0502020204030204" pitchFamily="34" charset="0"/>
                         <a:ea typeface="Calibri" panose="020F0502020204030204" pitchFamily="34" charset="0"/>
@@ -8715,18 +8598,12 @@
                         </a:spcAft>
                       </a:pPr>
                       <a:r>
-                        <a:rPr lang="en-US" sz="1200" dirty="0" smtClean="0">
+                        <a:rPr lang="en-US" sz="1800" dirty="0">
                           <a:effectLst/>
                         </a:rPr>
-                        <a:t>20</a:t>
+                        <a:t>80 m range, line of sight</a:t>
                       </a:r>
-                      <a:r>
-                        <a:rPr lang="en-US" sz="1200" baseline="0" dirty="0" smtClean="0">
-                          <a:effectLst/>
-                        </a:rPr>
-                        <a:t> FPS</a:t>
-                      </a:r>
-                      <a:endParaRPr lang="en-US" sz="1200" dirty="0">
+                      <a:endParaRPr lang="en-US" sz="1800" dirty="0">
                         <a:effectLst/>
                         <a:latin typeface="Calibri" panose="020F0502020204030204" pitchFamily="34" charset="0"/>
                         <a:ea typeface="Calibri" panose="020F0502020204030204" pitchFamily="34" charset="0"/>
@@ -8750,15 +8627,77 @@
                         </a:spcAft>
                       </a:pPr>
                       <a:r>
-                        <a:rPr lang="en-US" sz="1200" dirty="0" smtClean="0">
+                        <a:rPr lang="en-US" sz="1800" dirty="0" smtClean="0">
                           <a:effectLst/>
                           <a:latin typeface="Calibri" panose="020F0502020204030204" pitchFamily="34" charset="0"/>
                           <a:ea typeface="Calibri" panose="020F0502020204030204" pitchFamily="34" charset="0"/>
                           <a:cs typeface="Times New Roman" panose="02020603050405020304" pitchFamily="18" charset="0"/>
                         </a:rPr>
-                        <a:t>30 FPS</a:t>
+                        <a:t>TODO</a:t>
                       </a:r>
-                      <a:endParaRPr lang="en-US" sz="1200" dirty="0">
+                      <a:endParaRPr lang="en-US" sz="1800" dirty="0">
+                        <a:effectLst/>
+                        <a:latin typeface="Calibri" panose="020F0502020204030204" pitchFamily="34" charset="0"/>
+                        <a:ea typeface="Calibri" panose="020F0502020204030204" pitchFamily="34" charset="0"/>
+                        <a:cs typeface="Times New Roman" panose="02020603050405020304" pitchFamily="18" charset="0"/>
+                      </a:endParaRPr>
+                    </a:p>
+                  </a:txBody>
+                  <a:tcPr marL="68580" marR="68580" marT="0" marB="0"/>
+                </a:tc>
+              </a:tr>
+              <a:tr h="609600">
+                <a:tc>
+                  <a:txBody>
+                    <a:bodyPr/>
+                    <a:lstStyle/>
+                    <a:p>
+                      <a:pPr marL="0" marR="0" algn="r">
+                        <a:spcBef>
+                          <a:spcPts val="0"/>
+                        </a:spcBef>
+                        <a:spcAft>
+                          <a:spcPts val="0"/>
+                        </a:spcAft>
+                      </a:pPr>
+                      <a:r>
+                        <a:rPr lang="en-US" sz="1800" dirty="0" smtClean="0">
+                          <a:effectLst/>
+                          <a:latin typeface="+mn-lt"/>
+                          <a:ea typeface="+mn-ea"/>
+                          <a:cs typeface="+mn-cs"/>
+                        </a:rPr>
+                        <a:t>Display</a:t>
+                      </a:r>
+                      <a:r>
+                        <a:rPr lang="en-US" sz="1800" baseline="0" dirty="0" smtClean="0">
+                          <a:effectLst/>
+                          <a:latin typeface="+mn-lt"/>
+                          <a:ea typeface="+mn-ea"/>
+                          <a:cs typeface="+mn-cs"/>
+                        </a:rPr>
+                        <a:t> Refresh</a:t>
+                      </a:r>
+                    </a:p>
+                    <a:p>
+                      <a:pPr marL="0" marR="0" algn="r">
+                        <a:spcBef>
+                          <a:spcPts val="0"/>
+                        </a:spcBef>
+                        <a:spcAft>
+                          <a:spcPts val="0"/>
+                        </a:spcAft>
+                      </a:pPr>
+                      <a:r>
+                        <a:rPr lang="en-US" sz="1800" baseline="0" dirty="0" smtClean="0">
+                          <a:effectLst/>
+                          <a:latin typeface="+mn-lt"/>
+                          <a:ea typeface="+mn-ea"/>
+                          <a:cs typeface="+mn-cs"/>
+                        </a:rPr>
+                        <a:t>Rate</a:t>
+                      </a:r>
+                      <a:endParaRPr lang="en-US" sz="1800" dirty="0">
                         <a:effectLst/>
                         <a:latin typeface="Calibri" panose="020F0502020204030204" pitchFamily="34" charset="0"/>
                         <a:ea typeface="Calibri" panose="020F0502020204030204" pitchFamily="34" charset="0"/>
@@ -8782,7 +8721,74 @@
                         </a:spcAft>
                       </a:pPr>
                       <a:r>
-                        <a:rPr lang="en-US" sz="1200" dirty="0" smtClean="0">
+                        <a:rPr lang="en-US" sz="1800" dirty="0" smtClean="0">
+                          <a:effectLst/>
+                          <a:latin typeface="Calibri" panose="020F0502020204030204" pitchFamily="34" charset="0"/>
+                          <a:ea typeface="Calibri" panose="020F0502020204030204" pitchFamily="34" charset="0"/>
+                          <a:cs typeface="Times New Roman" panose="02020603050405020304" pitchFamily="18" charset="0"/>
+                        </a:rPr>
+                        <a:t>30 FPS</a:t>
+                      </a:r>
+                      <a:endParaRPr lang="en-US" sz="1800" dirty="0">
+                        <a:effectLst/>
+                        <a:latin typeface="Calibri" panose="020F0502020204030204" pitchFamily="34" charset="0"/>
+                        <a:ea typeface="Calibri" panose="020F0502020204030204" pitchFamily="34" charset="0"/>
+                        <a:cs typeface="Times New Roman" panose="02020603050405020304" pitchFamily="18" charset="0"/>
+                      </a:endParaRPr>
+                    </a:p>
+                  </a:txBody>
+                  <a:tcPr marL="68580" marR="68580" marT="0" marB="0"/>
+                </a:tc>
+                <a:tc>
+                  <a:txBody>
+                    <a:bodyPr/>
+                    <a:lstStyle/>
+                    <a:p>
+                      <a:pPr marL="0" marR="0">
+                        <a:spcBef>
+                          <a:spcPts val="0"/>
+                        </a:spcBef>
+                        <a:spcAft>
+                          <a:spcPts val="0"/>
+                        </a:spcAft>
+                      </a:pPr>
+                      <a:r>
+                        <a:rPr lang="en-US" sz="1800" dirty="0" smtClean="0">
+                          <a:effectLst/>
+                        </a:rPr>
+                        <a:t>20</a:t>
+                      </a:r>
+                      <a:r>
+                        <a:rPr lang="en-US" sz="1800" baseline="0" dirty="0" smtClean="0">
+                          <a:effectLst/>
+                        </a:rPr>
+                        <a:t> FPS</a:t>
+                      </a:r>
+                      <a:endParaRPr lang="en-US" sz="1800" dirty="0">
+                        <a:effectLst/>
+                        <a:latin typeface="Calibri" panose="020F0502020204030204" pitchFamily="34" charset="0"/>
+                        <a:ea typeface="Calibri" panose="020F0502020204030204" pitchFamily="34" charset="0"/>
+                        <a:cs typeface="Times New Roman" panose="02020603050405020304" pitchFamily="18" charset="0"/>
+                      </a:endParaRPr>
+                    </a:p>
+                  </a:txBody>
+                  <a:tcPr marL="68580" marR="68580" marT="0" marB="0"/>
+                </a:tc>
+                <a:tc>
+                  <a:txBody>
+                    <a:bodyPr/>
+                    <a:lstStyle/>
+                    <a:p>
+                      <a:pPr marL="0" marR="0">
+                        <a:spcBef>
+                          <a:spcPts val="0"/>
+                        </a:spcBef>
+                        <a:spcAft>
+                          <a:spcPts val="0"/>
+                        </a:spcAft>
+                      </a:pPr>
+                      <a:r>
+                        <a:rPr lang="en-US" sz="1800" dirty="0" smtClean="0">
                           <a:effectLst/>
                           <a:latin typeface="Calibri" panose="020F0502020204030204" pitchFamily="34" charset="0"/>
                           <a:ea typeface="Calibri" panose="020F0502020204030204" pitchFamily="34" charset="0"/>
@@ -8790,7 +8796,7 @@
                         </a:rPr>
                         <a:t>60 FPS</a:t>
                       </a:r>
-                      <a:endParaRPr lang="en-US" sz="1200" dirty="0">
+                      <a:endParaRPr lang="en-US" sz="1800" dirty="0">
                         <a:effectLst/>
                         <a:latin typeface="Calibri" panose="020F0502020204030204" pitchFamily="34" charset="0"/>
                         <a:ea typeface="Calibri" panose="020F0502020204030204" pitchFamily="34" charset="0"/>
@@ -8801,7 +8807,7 @@
                   <a:tcPr marL="68580" marR="68580" marT="0" marB="0"/>
                 </a:tc>
               </a:tr>
-              <a:tr h="837951">
+              <a:tr h="609600">
                 <a:tc>
                   <a:txBody>
                     <a:bodyPr/>
@@ -8816,7 +8822,7 @@
                         </a:spcAft>
                       </a:pPr>
                       <a:r>
-                        <a:rPr lang="en-US" sz="1200" b="1" dirty="0" smtClean="0">
+                        <a:rPr lang="en-US" sz="1800" b="1" dirty="0" smtClean="0">
                           <a:effectLst/>
                           <a:latin typeface="+mj-lt"/>
                           <a:ea typeface="Calibri" panose="020F0502020204030204" pitchFamily="34" charset="0"/>
@@ -8825,7 +8831,7 @@
                         <a:t>Network Refresh</a:t>
                       </a:r>
                       <a:r>
-                        <a:rPr lang="en-US" sz="1200" b="1" baseline="0" dirty="0" smtClean="0">
+                        <a:rPr lang="en-US" sz="1800" b="1" baseline="0" dirty="0" smtClean="0">
                           <a:effectLst/>
                           <a:latin typeface="+mj-lt"/>
                           <a:ea typeface="Calibri" panose="020F0502020204030204" pitchFamily="34" charset="0"/>
@@ -8833,7 +8839,7 @@
                         </a:rPr>
                         <a:t> Rate</a:t>
                       </a:r>
-                      <a:endParaRPr lang="en-US" sz="1200" b="1" dirty="0">
+                      <a:endParaRPr lang="en-US" sz="1800" b="1" dirty="0">
                         <a:effectLst/>
                         <a:latin typeface="+mj-lt"/>
                         <a:ea typeface="Calibri" panose="020F0502020204030204" pitchFamily="34" charset="0"/>
@@ -8857,15 +8863,15 @@
                         </a:spcAft>
                       </a:pPr>
                       <a:r>
-                        <a:rPr lang="en-US" sz="1200" b="1" dirty="0" smtClean="0">
+                        <a:rPr lang="en-US" sz="1800" dirty="0" smtClean="0">
                           <a:effectLst/>
                           <a:latin typeface="Calibri" panose="020F0502020204030204" pitchFamily="34" charset="0"/>
                           <a:ea typeface="Calibri" panose="020F0502020204030204" pitchFamily="34" charset="0"/>
                           <a:cs typeface="Times New Roman" panose="02020603050405020304" pitchFamily="18" charset="0"/>
                         </a:rPr>
-                        <a:t>20 FPS</a:t>
+                        <a:t>N/A</a:t>
                       </a:r>
-                      <a:endParaRPr lang="en-US" sz="1200" b="1" dirty="0">
+                      <a:endParaRPr lang="en-US" sz="1800" dirty="0">
                         <a:effectLst/>
                         <a:latin typeface="Calibri" panose="020F0502020204030204" pitchFamily="34" charset="0"/>
                         <a:ea typeface="Calibri" panose="020F0502020204030204" pitchFamily="34" charset="0"/>
@@ -8889,17 +8895,17 @@
                         </a:spcAft>
                       </a:pPr>
                       <a:r>
-                        <a:rPr lang="en-US" sz="1200" dirty="0" smtClean="0">
+                        <a:rPr lang="en-US" sz="1800" b="0" dirty="0" smtClean="0">
                           <a:effectLst/>
-                          <a:latin typeface="Calibri" panose="020F0502020204030204" pitchFamily="34" charset="0"/>
+                          <a:latin typeface="+mn-lt"/>
                           <a:ea typeface="Calibri" panose="020F0502020204030204" pitchFamily="34" charset="0"/>
                           <a:cs typeface="Times New Roman" panose="02020603050405020304" pitchFamily="18" charset="0"/>
                         </a:rPr>
-                        <a:t>N/A</a:t>
+                        <a:t>20 FPS</a:t>
                       </a:r>
-                      <a:endParaRPr lang="en-US" sz="1200" dirty="0">
+                      <a:endParaRPr lang="en-US" sz="1800" b="0" dirty="0">
                         <a:effectLst/>
-                        <a:latin typeface="Calibri" panose="020F0502020204030204" pitchFamily="34" charset="0"/>
+                        <a:latin typeface="+mn-lt"/>
                         <a:ea typeface="Calibri" panose="020F0502020204030204" pitchFamily="34" charset="0"/>
                         <a:cs typeface="Times New Roman" panose="02020603050405020304" pitchFamily="18" charset="0"/>
                       </a:endParaRPr>
@@ -8921,7 +8927,7 @@
                         </a:spcAft>
                       </a:pPr>
                       <a:r>
-                        <a:rPr lang="en-US" sz="1200" dirty="0" smtClean="0">
+                        <a:rPr lang="en-US" sz="1800" dirty="0" smtClean="0">
                           <a:effectLst/>
                           <a:latin typeface="Calibri" panose="020F0502020204030204" pitchFamily="34" charset="0"/>
                           <a:ea typeface="Calibri" panose="020F0502020204030204" pitchFamily="34" charset="0"/>
@@ -8929,7 +8935,7 @@
                         </a:rPr>
                         <a:t>60 FPS</a:t>
                       </a:r>
-                      <a:endParaRPr lang="en-US" sz="1200" dirty="0">
+                      <a:endParaRPr lang="en-US" sz="1800" dirty="0">
                         <a:effectLst/>
                         <a:latin typeface="Calibri" panose="020F0502020204030204" pitchFamily="34" charset="0"/>
                         <a:ea typeface="Calibri" panose="020F0502020204030204" pitchFamily="34" charset="0"/>
@@ -8955,12 +8961,12 @@
                         </a:spcAft>
                       </a:pPr>
                       <a:r>
-                        <a:rPr lang="en-US" sz="1200" dirty="0">
+                        <a:rPr lang="en-US" sz="1800" dirty="0">
                           <a:effectLst/>
                         </a:rPr>
                         <a:t>Usability</a:t>
                       </a:r>
-                      <a:endParaRPr lang="en-US" sz="1200" dirty="0">
+                      <a:endParaRPr lang="en-US" sz="1800" dirty="0">
                         <a:effectLst/>
                         <a:latin typeface="Calibri" panose="020F0502020204030204" pitchFamily="34" charset="0"/>
                         <a:ea typeface="Calibri" panose="020F0502020204030204" pitchFamily="34" charset="0"/>
@@ -8984,12 +8990,15 @@
                         </a:spcAft>
                       </a:pPr>
                       <a:r>
-                        <a:rPr lang="en-US" sz="1200" dirty="0">
+                        <a:rPr lang="en-US" sz="1800" dirty="0" smtClean="0">
                           <a:effectLst/>
+                          <a:latin typeface="Calibri" panose="020F0502020204030204" pitchFamily="34" charset="0"/>
+                          <a:ea typeface="Calibri" panose="020F0502020204030204" pitchFamily="34" charset="0"/>
+                          <a:cs typeface="Times New Roman" panose="02020603050405020304" pitchFamily="18" charset="0"/>
                         </a:rPr>
-                        <a:t>End user can start up and use device without a technician</a:t>
+                        <a:t>Turnkey startup</a:t>
                       </a:r>
-                      <a:endParaRPr lang="en-US" sz="1200" dirty="0">
+                      <a:endParaRPr lang="en-US" sz="1800" dirty="0">
                         <a:effectLst/>
                         <a:latin typeface="Calibri" panose="020F0502020204030204" pitchFamily="34" charset="0"/>
                         <a:ea typeface="Calibri" panose="020F0502020204030204" pitchFamily="34" charset="0"/>
@@ -9013,15 +9022,12 @@
                         </a:spcAft>
                       </a:pPr>
                       <a:r>
-                        <a:rPr lang="en-US" sz="1200" dirty="0" smtClean="0">
+                        <a:rPr lang="en-US" sz="1800" dirty="0">
                           <a:effectLst/>
-                          <a:latin typeface="Calibri" panose="020F0502020204030204" pitchFamily="34" charset="0"/>
-                          <a:ea typeface="Calibri" panose="020F0502020204030204" pitchFamily="34" charset="0"/>
-                          <a:cs typeface="Times New Roman" panose="02020603050405020304" pitchFamily="18" charset="0"/>
                         </a:rPr>
-                        <a:t>Turnkey startup</a:t>
+                        <a:t>End user can start up and use device without a technician</a:t>
                       </a:r>
-                      <a:endParaRPr lang="en-US" sz="1200" dirty="0">
+                      <a:endParaRPr lang="en-US" sz="1800" dirty="0">
                         <a:effectLst/>
                         <a:latin typeface="Calibri" panose="020F0502020204030204" pitchFamily="34" charset="0"/>
                         <a:ea typeface="Calibri" panose="020F0502020204030204" pitchFamily="34" charset="0"/>
@@ -9045,7 +9051,7 @@
                         </a:spcAft>
                       </a:pPr>
                       <a:r>
-                        <a:rPr lang="en-US" sz="1200" dirty="0" smtClean="0">
+                        <a:rPr lang="en-US" sz="1800" dirty="0" smtClean="0">
                           <a:effectLst/>
                           <a:latin typeface="Calibri" panose="020F0502020204030204" pitchFamily="34" charset="0"/>
                           <a:ea typeface="Calibri" panose="020F0502020204030204" pitchFamily="34" charset="0"/>
@@ -9053,7 +9059,146 @@
                         </a:rPr>
                         <a:t>Turnkey startup</a:t>
                       </a:r>
-                      <a:endParaRPr lang="en-US" sz="1200" dirty="0">
+                      <a:endParaRPr lang="en-US" sz="1800" dirty="0">
+                        <a:effectLst/>
+                        <a:latin typeface="Calibri" panose="020F0502020204030204" pitchFamily="34" charset="0"/>
+                        <a:ea typeface="Calibri" panose="020F0502020204030204" pitchFamily="34" charset="0"/>
+                        <a:cs typeface="Times New Roman" panose="02020603050405020304" pitchFamily="18" charset="0"/>
+                      </a:endParaRPr>
+                    </a:p>
+                  </a:txBody>
+                  <a:tcPr marL="68580" marR="68580" marT="0" marB="0"/>
+                </a:tc>
+              </a:tr>
+              <a:tr h="883920">
+                <a:tc>
+                  <a:txBody>
+                    <a:bodyPr/>
+                    <a:lstStyle/>
+                    <a:p>
+                      <a:pPr marL="0" marR="0" algn="r">
+                        <a:spcBef>
+                          <a:spcPts val="0"/>
+                        </a:spcBef>
+                        <a:spcAft>
+                          <a:spcPts val="0"/>
+                        </a:spcAft>
+                      </a:pPr>
+                      <a:r>
+                        <a:rPr lang="en-US" sz="2000" dirty="0" smtClean="0">
+                          <a:effectLst/>
+                          <a:latin typeface="+mn-lt"/>
+                          <a:ea typeface="Calibri" panose="020F0502020204030204" pitchFamily="34" charset="0"/>
+                          <a:cs typeface="Times New Roman" panose="02020603050405020304" pitchFamily="18" charset="0"/>
+                        </a:rPr>
+                        <a:t># of Simultaneous</a:t>
+                      </a:r>
+                      <a:endParaRPr lang="en-US" sz="2000" dirty="0">
+                        <a:effectLst/>
+                        <a:latin typeface="+mn-lt"/>
+                        <a:ea typeface="Calibri" panose="020F0502020204030204" pitchFamily="34" charset="0"/>
+                        <a:cs typeface="Times New Roman" panose="02020603050405020304" pitchFamily="18" charset="0"/>
+                      </a:endParaRPr>
+                    </a:p>
+                  </a:txBody>
+                  <a:tcPr marL="68580" marR="68580" marT="0" marB="0"/>
+                </a:tc>
+                <a:tc>
+                  <a:txBody>
+                    <a:bodyPr/>
+                    <a:lstStyle/>
+                    <a:p>
+                      <a:pPr marL="0" marR="0">
+                        <a:spcBef>
+                          <a:spcPts val="0"/>
+                        </a:spcBef>
+                        <a:spcAft>
+                          <a:spcPts val="0"/>
+                        </a:spcAft>
+                      </a:pPr>
+                      <a:r>
+                        <a:rPr lang="en-US" sz="1800" dirty="0" smtClean="0">
+                          <a:effectLst/>
+                          <a:latin typeface="Calibri" panose="020F0502020204030204" pitchFamily="34" charset="0"/>
+                          <a:ea typeface="Calibri" panose="020F0502020204030204" pitchFamily="34" charset="0"/>
+                          <a:cs typeface="Times New Roman" panose="02020603050405020304" pitchFamily="18" charset="0"/>
+                        </a:rPr>
+                        <a:t>5-6</a:t>
+                      </a:r>
+                      <a:endParaRPr lang="en-US" sz="1800" dirty="0">
+                        <a:effectLst/>
+                        <a:latin typeface="Calibri" panose="020F0502020204030204" pitchFamily="34" charset="0"/>
+                        <a:ea typeface="Calibri" panose="020F0502020204030204" pitchFamily="34" charset="0"/>
+                        <a:cs typeface="Times New Roman" panose="02020603050405020304" pitchFamily="18" charset="0"/>
+                      </a:endParaRPr>
+                    </a:p>
+                  </a:txBody>
+                  <a:tcPr marL="68580" marR="68580" marT="0" marB="0"/>
+                </a:tc>
+                <a:tc>
+                  <a:txBody>
+                    <a:bodyPr/>
+                    <a:lstStyle/>
+                    <a:p>
+                      <a:pPr marL="0" marR="0">
+                        <a:spcBef>
+                          <a:spcPts val="0"/>
+                        </a:spcBef>
+                        <a:spcAft>
+                          <a:spcPts val="0"/>
+                        </a:spcAft>
+                      </a:pPr>
+                      <a:r>
+                        <a:rPr lang="en-US" sz="1800" dirty="0" smtClean="0">
+                          <a:effectLst/>
+                          <a:latin typeface="Calibri" panose="020F0502020204030204" pitchFamily="34" charset="0"/>
+                          <a:ea typeface="Calibri" panose="020F0502020204030204" pitchFamily="34" charset="0"/>
+                          <a:cs typeface="Times New Roman" panose="02020603050405020304" pitchFamily="18" charset="0"/>
+                        </a:rPr>
+                        <a:t>&gt;</a:t>
+                      </a:r>
+                      <a:r>
+                        <a:rPr lang="en-US" sz="1800" baseline="0" dirty="0" smtClean="0">
+                          <a:effectLst/>
+                          <a:latin typeface="Calibri" panose="020F0502020204030204" pitchFamily="34" charset="0"/>
+                          <a:ea typeface="Calibri" panose="020F0502020204030204" pitchFamily="34" charset="0"/>
+                          <a:cs typeface="Times New Roman" panose="02020603050405020304" pitchFamily="18" charset="0"/>
+                        </a:rPr>
+                        <a:t> Phase 1</a:t>
+                      </a:r>
+                      <a:endParaRPr lang="en-US" sz="1800" dirty="0">
+                        <a:effectLst/>
+                        <a:latin typeface="Calibri" panose="020F0502020204030204" pitchFamily="34" charset="0"/>
+                        <a:ea typeface="Calibri" panose="020F0502020204030204" pitchFamily="34" charset="0"/>
+                        <a:cs typeface="Times New Roman" panose="02020603050405020304" pitchFamily="18" charset="0"/>
+                      </a:endParaRPr>
+                    </a:p>
+                  </a:txBody>
+                  <a:tcPr marL="68580" marR="68580" marT="0" marB="0"/>
+                </a:tc>
+                <a:tc>
+                  <a:txBody>
+                    <a:bodyPr/>
+                    <a:lstStyle/>
+                    <a:p>
+                      <a:pPr marL="0" marR="0">
+                        <a:spcBef>
+                          <a:spcPts val="0"/>
+                        </a:spcBef>
+                        <a:spcAft>
+                          <a:spcPts val="0"/>
+                        </a:spcAft>
+                      </a:pPr>
+                      <a:r>
+                        <a:rPr lang="en-US" sz="1800" dirty="0" smtClean="0">
+                          <a:effectLst/>
+                          <a:latin typeface="Calibri" panose="020F0502020204030204" pitchFamily="34" charset="0"/>
+                          <a:ea typeface="Calibri" panose="020F0502020204030204" pitchFamily="34" charset="0"/>
+                          <a:cs typeface="Times New Roman" panose="02020603050405020304" pitchFamily="18" charset="0"/>
+                        </a:rPr>
+                        <a:t>32+</a:t>
+                      </a:r>
+                      <a:endParaRPr lang="en-US" sz="1800" dirty="0">
                         <a:effectLst/>
                         <a:latin typeface="Calibri" panose="020F0502020204030204" pitchFamily="34" charset="0"/>
                         <a:ea typeface="Calibri" panose="020F0502020204030204" pitchFamily="34" charset="0"/>
@@ -9150,11 +9295,15 @@
             </a:r>
             <a:r>
               <a:rPr lang="en-US" sz="2000" dirty="0" err="1" smtClean="0"/>
-              <a:t>Whr</a:t>
+              <a:t>Wh</a:t>
             </a:r>
             <a:r>
               <a:rPr lang="en-US" sz="2000" dirty="0" smtClean="0"/>
-              <a:t> capacity</a:t>
+              <a:t> </a:t>
+            </a:r>
+            <a:r>
+              <a:rPr lang="en-US" sz="2000" dirty="0" smtClean="0"/>
+              <a:t>capacity</a:t>
             </a:r>
           </a:p>
           <a:p>
@@ -9188,11 +9337,7 @@
             <a:pPr lvl="2"/>
             <a:r>
               <a:rPr lang="en-US" dirty="0" smtClean="0"/>
-              <a:t>Re-use GPS, inertial measurement unit</a:t>
-            </a:r>
-            <a:r>
-              <a:rPr lang="en-US" dirty="0" smtClean="0"/>
-              <a:t>,</a:t>
+              <a:t>Re-use GPS, inertial measurement unit,</a:t>
             </a:r>
           </a:p>
           <a:p>
@@ -9205,15 +9350,7 @@
             </a:r>
             <a:r>
               <a:rPr lang="en-US" dirty="0" smtClean="0"/>
-              <a:t> </a:t>
-            </a:r>
-            <a:r>
-              <a:rPr lang="en-US" dirty="0" smtClean="0"/>
-              <a:t> </a:t>
-            </a:r>
-            <a:r>
-              <a:rPr lang="en-US" dirty="0" smtClean="0"/>
-              <a:t>microcontroller</a:t>
+              <a:t>  microcontroller</a:t>
             </a:r>
           </a:p>
           <a:p>
@@ -9264,66 +9401,6 @@
             <a:r>
               <a:rPr lang="en-US" dirty="0" smtClean="0"/>
               <a:t>Accomplishments To Date (PHA2)</a:t>
-            </a:r>
-            <a:endParaRPr lang="en-US" dirty="0"/>
-          </a:p>
-        </p:txBody>
-      </p:sp>
-      <p:sp>
-        <p:nvSpPr>
-          <p:cNvPr id="4" name="TextBox 3"/>
-          <p:cNvSpPr txBox="1"/>
-          <p:nvPr/>
-        </p:nvSpPr>
-        <p:spPr>
-          <a:xfrm>
-            <a:off x="5715000" y="2751307"/>
-            <a:ext cx="2633798" cy="369332"/>
-          </a:xfrm>
-          <a:prstGeom prst="rect">
-            <a:avLst/>
-          </a:prstGeom>
-          <a:noFill/>
-        </p:spPr>
-        <p:txBody>
-          <a:bodyPr wrap="none" rtlCol="0">
-            <a:spAutoFit/>
-          </a:bodyPr>
-          <a:lstStyle/>
-          <a:p>
-            <a:r>
-              <a:rPr lang="en-US" dirty="0" smtClean="0"/>
-              <a:t>[POWER CONSUMPTION]</a:t>
-            </a:r>
-            <a:endParaRPr lang="en-US" dirty="0"/>
-          </a:p>
-        </p:txBody>
-      </p:sp>
-      <p:sp>
-        <p:nvSpPr>
-          <p:cNvPr id="5" name="TextBox 4"/>
-          <p:cNvSpPr txBox="1"/>
-          <p:nvPr/>
-        </p:nvSpPr>
-        <p:spPr>
-          <a:xfrm>
-            <a:off x="6236451" y="5105400"/>
-            <a:ext cx="729687" cy="369332"/>
-          </a:xfrm>
-          <a:prstGeom prst="rect">
-            <a:avLst/>
-          </a:prstGeom>
-          <a:noFill/>
-        </p:spPr>
-        <p:txBody>
-          <a:bodyPr wrap="none" rtlCol="0">
-            <a:spAutoFit/>
-          </a:bodyPr>
-          <a:lstStyle/>
-          <a:p>
-            <a:r>
-              <a:rPr lang="en-US" dirty="0" smtClean="0"/>
-              <a:t>[PCB]</a:t>
             </a:r>
             <a:endParaRPr lang="en-US" dirty="0"/>
           </a:p>
@@ -9337,7 +9414,7 @@
           </p:cNvPicPr>
           <p:nvPr/>
         </p:nvPicPr>
-        <p:blipFill>
+        <p:blipFill rotWithShape="1">
           <a:blip r:embed="rId2" cstate="print">
             <a:extLst>
               <a:ext uri="{28A0092B-C50C-407E-A947-70E740481C1C}">
@@ -9346,14 +9423,12 @@
             </a:extLst>
           </a:blip>
           <a:srcRect/>
-          <a:stretch>
-            <a:fillRect/>
-          </a:stretch>
+          <a:stretch/>
         </p:blipFill>
         <p:spPr bwMode="auto">
           <a:xfrm>
-            <a:off x="5524944" y="2590800"/>
-            <a:ext cx="3161856" cy="2101125"/>
+            <a:off x="5749752" y="2667000"/>
+            <a:ext cx="2559802" cy="1935952"/>
           </a:xfrm>
           <a:prstGeom prst="rect">
             <a:avLst/>
@@ -9368,6 +9443,36 @@
               </a14:hiddenFill>
             </a:ext>
           </a:extLst>
+        </p:spPr>
+      </p:pic>
+      <p:pic>
+        <p:nvPicPr>
+          <p:cNvPr id="7" name="Content Placeholder 3"/>
+          <p:cNvPicPr>
+            <a:picLocks noChangeAspect="1"/>
+          </p:cNvPicPr>
+          <p:nvPr/>
+        </p:nvPicPr>
+        <p:blipFill>
+          <a:blip r:embed="rId3" cstate="print">
+            <a:extLst>
+              <a:ext uri="{28A0092B-C50C-407E-A947-70E740481C1C}">
+                <a14:useLocalDpi xmlns:a14="http://schemas.microsoft.com/office/drawing/2010/main"/>
+              </a:ext>
+            </a:extLst>
+          </a:blip>
+          <a:stretch>
+            <a:fillRect/>
+          </a:stretch>
+        </p:blipFill>
+        <p:spPr>
+          <a:xfrm>
+            <a:off x="6172200" y="4814786"/>
+            <a:ext cx="1714907" cy="1554901"/>
+          </a:xfrm>
+          <a:prstGeom prst="rect">
+            <a:avLst/>
+          </a:prstGeom>
         </p:spPr>
       </p:pic>
     </p:spTree>
@@ -9517,6 +9622,13 @@
   <p:clrMapOvr>
     <a:masterClrMapping/>
   </p:clrMapOvr>
+  <p:timing>
+    <p:tnLst>
+      <p:par>
+        <p:cTn id="1" dur="indefinite" restart="never" nodeType="tmRoot"/>
+      </p:par>
+    </p:tnLst>
+  </p:timing>
 </p:sld>
 </file>
 
@@ -9602,6 +9714,13 @@
   <p:clrMapOvr>
     <a:masterClrMapping/>
   </p:clrMapOvr>
+  <p:timing>
+    <p:tnLst>
+      <p:par>
+        <p:cTn id="1" dur="indefinite" restart="never" nodeType="tmRoot"/>
+      </p:par>
+    </p:tnLst>
+  </p:timing>
 </p:sld>
 </file>
 
@@ -9683,6 +9802,13 @@
   <p:clrMapOvr>
     <a:masterClrMapping/>
   </p:clrMapOvr>
+  <p:timing>
+    <p:tnLst>
+      <p:par>
+        <p:cTn id="1" dur="indefinite" restart="never" nodeType="tmRoot"/>
+      </p:par>
+    </p:tnLst>
+  </p:timing>
 </p:sld>
 </file>
 
@@ -9764,6 +9890,13 @@
   <p:clrMapOvr>
     <a:masterClrMapping/>
   </p:clrMapOvr>
+  <p:timing>
+    <p:tnLst>
+      <p:par>
+        <p:cTn id="1" dur="indefinite" restart="never" nodeType="tmRoot"/>
+      </p:par>
+    </p:tnLst>
+  </p:timing>
 </p:sld>
 </file>
 
@@ -9817,14 +9950,14 @@
             <p:ph idx="1"/>
             <p:extLst>
               <p:ext uri="{D42A27DB-BD31-4B8C-83A1-F6EECF244321}">
-                <p14:modId xmlns:p14="http://schemas.microsoft.com/office/powerpoint/2010/main" val="3049841390"/>
+                <p14:modId xmlns:p14="http://schemas.microsoft.com/office/powerpoint/2010/main" val="1485766992"/>
               </p:ext>
             </p:extLst>
           </p:nvPr>
         </p:nvGraphicFramePr>
         <p:xfrm>
           <a:off x="152400" y="1371599"/>
-          <a:ext cx="8839199" cy="5334000"/>
+          <a:ext cx="5212116" cy="4270000"/>
         </p:xfrm>
         <a:graphic>
           <a:graphicData uri="http://schemas.openxmlformats.org/drawingml/2006/table">
@@ -9834,9 +9967,7 @@
               </a:tblPr>
               <a:tblGrid>
                 <a:gridCol w="1556019"/>
-                <a:gridCol w="2698551"/>
                 <a:gridCol w="1015583"/>
-                <a:gridCol w="928532"/>
                 <a:gridCol w="928532"/>
                 <a:gridCol w="928532"/>
                 <a:gridCol w="783450"/>
@@ -9849,12 +9980,12 @@
                     <a:p>
                       <a:pPr algn="l" fontAlgn="b"/>
                       <a:r>
-                        <a:rPr lang="en-US" sz="1100" u="none" strike="noStrike">
+                        <a:rPr lang="en-US" sz="1100" u="none" strike="noStrike" dirty="0">
                           <a:effectLst/>
                         </a:rPr>
                         <a:t>Name</a:t>
                       </a:r>
-                      <a:endParaRPr lang="en-US" sz="1100" b="1" i="0" u="none" strike="noStrike">
+                      <a:endParaRPr lang="en-US" sz="1100" b="1" i="0" u="none" strike="noStrike" dirty="0">
                         <a:solidFill>
                           <a:srgbClr val="000000"/>
                         </a:solidFill>
@@ -9872,35 +10003,12 @@
                     <a:p>
                       <a:pPr algn="l" fontAlgn="b"/>
                       <a:r>
-                        <a:rPr lang="en-US" sz="1100" u="none" strike="noStrike">
-                          <a:effectLst/>
-                        </a:rPr>
-                        <a:t>Item</a:t>
-                      </a:r>
-                      <a:endParaRPr lang="en-US" sz="1100" b="1" i="0" u="none" strike="noStrike">
-                        <a:solidFill>
-                          <a:srgbClr val="000000"/>
-                        </a:solidFill>
-                        <a:effectLst/>
-                        <a:latin typeface="Liberation Sans"/>
-                      </a:endParaRPr>
-                    </a:p>
-                  </a:txBody>
-                  <a:tcPr marL="9525" marR="9525" marT="9525" marB="0" anchor="b"/>
-                </a:tc>
-                <a:tc>
-                  <a:txBody>
-                    <a:bodyPr/>
-                    <a:lstStyle/>
-                    <a:p>
-                      <a:pPr algn="l" fontAlgn="b"/>
-                      <a:r>
-                        <a:rPr lang="en-US" sz="1100" u="none" strike="noStrike">
+                        <a:rPr lang="en-US" sz="1100" u="none" strike="noStrike" dirty="0">
                           <a:effectLst/>
                         </a:rPr>
                         <a:t>Vendor</a:t>
                       </a:r>
-                      <a:endParaRPr lang="en-US" sz="1100" b="1" i="0" u="none" strike="noStrike">
+                      <a:endParaRPr lang="en-US" sz="1100" b="1" i="0" u="none" strike="noStrike" dirty="0">
                         <a:solidFill>
                           <a:srgbClr val="000000"/>
                         </a:solidFill>
@@ -9941,35 +10049,12 @@
                     <a:p>
                       <a:pPr algn="l" fontAlgn="b"/>
                       <a:r>
-                        <a:rPr lang="en-US" sz="1100" u="none" strike="noStrike">
-                          <a:effectLst/>
-                        </a:rPr>
-                        <a:t>Shipping</a:t>
-                      </a:r>
-                      <a:endParaRPr lang="en-US" sz="1100" b="1" i="0" u="none" strike="noStrike">
-                        <a:solidFill>
-                          <a:srgbClr val="000000"/>
-                        </a:solidFill>
-                        <a:effectLst/>
-                        <a:latin typeface="Liberation Sans"/>
-                      </a:endParaRPr>
-                    </a:p>
-                  </a:txBody>
-                  <a:tcPr marL="9525" marR="9525" marT="9525" marB="0" anchor="b"/>
-                </a:tc>
-                <a:tc>
-                  <a:txBody>
-                    <a:bodyPr/>
-                    <a:lstStyle/>
-                    <a:p>
-                      <a:pPr algn="l" fontAlgn="b"/>
-                      <a:r>
-                        <a:rPr lang="en-US" sz="1100" u="none" strike="noStrike">
+                        <a:rPr lang="en-US" sz="1100" u="none" strike="noStrike" dirty="0">
                           <a:effectLst/>
                         </a:rPr>
                         <a:t>Quantity</a:t>
                       </a:r>
-                      <a:endParaRPr lang="en-US" sz="1100" b="1" i="0" u="none" strike="noStrike">
+                      <a:endParaRPr lang="en-US" sz="1100" b="1" i="0" u="none" strike="noStrike" dirty="0">
                         <a:solidFill>
                           <a:srgbClr val="000000"/>
                         </a:solidFill>
@@ -10034,30 +10119,13 @@
                     <a:lstStyle/>
                     <a:p>
                       <a:pPr algn="l" fontAlgn="b"/>
-                      <a:endParaRPr lang="en-US" sz="1100" b="0" i="0" u="none" strike="noStrike">
-                        <a:solidFill>
-                          <a:srgbClr val="000000"/>
-                        </a:solidFill>
-                        <a:effectLst/>
-                        <a:latin typeface="Liberation Sans"/>
-                      </a:endParaRPr>
-                    </a:p>
-                  </a:txBody>
-                  <a:tcPr marL="9525" marR="9525" marT="9525" marB="0" anchor="b"/>
-                </a:tc>
-                <a:tc>
-                  <a:txBody>
-                    <a:bodyPr/>
-                    <a:lstStyle/>
-                    <a:p>
-                      <a:pPr algn="l" fontAlgn="b"/>
                       <a:r>
-                        <a:rPr lang="en-US" sz="1100" u="none" strike="noStrike">
+                        <a:rPr lang="en-US" sz="1100" u="none" strike="noStrike" dirty="0" err="1">
                           <a:effectLst/>
                         </a:rPr>
                         <a:t>BatterySpace</a:t>
                       </a:r>
-                      <a:endParaRPr lang="en-US" sz="1100" b="0" i="0" u="none" strike="noStrike">
+                      <a:endParaRPr lang="en-US" sz="1100" b="0" i="0" u="none" strike="noStrike" dirty="0">
                         <a:solidFill>
                           <a:srgbClr val="000000"/>
                         </a:solidFill>
@@ -10080,23 +10148,6 @@
                         </a:rPr>
                         <a:t>66.95</a:t>
                       </a:r>
-                      <a:endParaRPr lang="en-US" sz="1100" b="0" i="0" u="none" strike="noStrike">
-                        <a:solidFill>
-                          <a:srgbClr val="000000"/>
-                        </a:solidFill>
-                        <a:effectLst/>
-                        <a:latin typeface="Liberation Sans"/>
-                      </a:endParaRPr>
-                    </a:p>
-                  </a:txBody>
-                  <a:tcPr marL="9525" marR="9525" marT="9525" marB="0" anchor="b"/>
-                </a:tc>
-                <a:tc>
-                  <a:txBody>
-                    <a:bodyPr/>
-                    <a:lstStyle/>
-                    <a:p>
-                      <a:pPr algn="l" fontAlgn="b"/>
                       <a:endParaRPr lang="en-US" sz="1100" b="0" i="0" u="none" strike="noStrike">
                         <a:solidFill>
                           <a:srgbClr val="000000"/>
@@ -10185,30 +10236,13 @@
                     <a:lstStyle/>
                     <a:p>
                       <a:pPr algn="l" fontAlgn="b"/>
-                      <a:endParaRPr lang="en-US" sz="1100" b="0" i="0" u="none" strike="noStrike">
-                        <a:solidFill>
-                          <a:srgbClr val="000000"/>
-                        </a:solidFill>
-                        <a:effectLst/>
-                        <a:latin typeface="Liberation Sans"/>
-                      </a:endParaRPr>
-                    </a:p>
-                  </a:txBody>
-                  <a:tcPr marL="9525" marR="9525" marT="9525" marB="0" anchor="b"/>
-                </a:tc>
-                <a:tc>
-                  <a:txBody>
-                    <a:bodyPr/>
-                    <a:lstStyle/>
-                    <a:p>
-                      <a:pPr algn="l" fontAlgn="b"/>
                       <a:r>
-                        <a:rPr lang="en-US" sz="1100" u="none" strike="noStrike">
+                        <a:rPr lang="en-US" sz="1100" u="none" strike="noStrike" dirty="0" err="1" smtClean="0">
                           <a:effectLst/>
                         </a:rPr>
-                        <a:t>AdaFruit</a:t>
+                        <a:t>Adafruit</a:t>
                       </a:r>
-                      <a:endParaRPr lang="en-US" sz="1100" b="0" i="0" u="none" strike="noStrike">
+                      <a:endParaRPr lang="en-US" sz="1100" b="0" i="0" u="none" strike="noStrike" dirty="0">
                         <a:solidFill>
                           <a:srgbClr val="000000"/>
                         </a:solidFill>
@@ -10231,23 +10265,6 @@
                         </a:rPr>
                         <a:t>139.95</a:t>
                       </a:r>
-                      <a:endParaRPr lang="en-US" sz="1100" b="0" i="0" u="none" strike="noStrike">
-                        <a:solidFill>
-                          <a:srgbClr val="000000"/>
-                        </a:solidFill>
-                        <a:effectLst/>
-                        <a:latin typeface="Liberation Sans"/>
-                      </a:endParaRPr>
-                    </a:p>
-                  </a:txBody>
-                  <a:tcPr marL="9525" marR="9525" marT="9525" marB="0" anchor="b"/>
-                </a:tc>
-                <a:tc>
-                  <a:txBody>
-                    <a:bodyPr/>
-                    <a:lstStyle/>
-                    <a:p>
-                      <a:pPr algn="l" fontAlgn="b"/>
                       <a:endParaRPr lang="en-US" sz="1100" b="0" i="0" u="none" strike="noStrike">
                         <a:solidFill>
                           <a:srgbClr val="000000"/>
@@ -10336,30 +10353,13 @@
                     <a:lstStyle/>
                     <a:p>
                       <a:pPr algn="l" fontAlgn="b"/>
-                      <a:endParaRPr lang="en-US" sz="1100" b="0" i="0" u="none" strike="noStrike">
-                        <a:solidFill>
-                          <a:srgbClr val="000000"/>
-                        </a:solidFill>
-                        <a:effectLst/>
-                        <a:latin typeface="Liberation Sans"/>
-                      </a:endParaRPr>
-                    </a:p>
-                  </a:txBody>
-                  <a:tcPr marL="9525" marR="9525" marT="9525" marB="0" anchor="b"/>
-                </a:tc>
-                <a:tc>
-                  <a:txBody>
-                    <a:bodyPr/>
-                    <a:lstStyle/>
-                    <a:p>
-                      <a:pPr algn="l" fontAlgn="b"/>
                       <a:r>
-                        <a:rPr lang="en-US" sz="1100" u="none" strike="noStrike">
+                        <a:rPr lang="en-US" sz="1100" u="none" strike="noStrike" dirty="0" err="1" smtClean="0">
                           <a:effectLst/>
                         </a:rPr>
-                        <a:t>AdaFruit</a:t>
+                        <a:t>Adafruit</a:t>
                       </a:r>
-                      <a:endParaRPr lang="en-US" sz="1100" b="0" i="0" u="none" strike="noStrike">
+                      <a:endParaRPr lang="en-US" sz="1100" b="0" i="0" u="none" strike="noStrike" dirty="0">
                         <a:solidFill>
                           <a:srgbClr val="000000"/>
                         </a:solidFill>
@@ -10382,23 +10382,6 @@
                         </a:rPr>
                         <a:t>64.95</a:t>
                       </a:r>
-                      <a:endParaRPr lang="en-US" sz="1100" b="0" i="0" u="none" strike="noStrike">
-                        <a:solidFill>
-                          <a:srgbClr val="000000"/>
-                        </a:solidFill>
-                        <a:effectLst/>
-                        <a:latin typeface="Liberation Sans"/>
-                      </a:endParaRPr>
-                    </a:p>
-                  </a:txBody>
-                  <a:tcPr marL="9525" marR="9525" marT="9525" marB="0" anchor="b"/>
-                </a:tc>
-                <a:tc>
-                  <a:txBody>
-                    <a:bodyPr/>
-                    <a:lstStyle/>
-                    <a:p>
-                      <a:pPr algn="l" fontAlgn="b"/>
                       <a:endParaRPr lang="en-US" sz="1100" b="0" i="0" u="none" strike="noStrike">
                         <a:solidFill>
                           <a:srgbClr val="000000"/>
@@ -10487,30 +10470,13 @@
                     <a:lstStyle/>
                     <a:p>
                       <a:pPr algn="l" fontAlgn="b"/>
-                      <a:endParaRPr lang="en-US" sz="1100" b="0" i="0" u="none" strike="noStrike">
-                        <a:solidFill>
-                          <a:srgbClr val="000000"/>
-                        </a:solidFill>
-                        <a:effectLst/>
-                        <a:latin typeface="Liberation Sans"/>
-                      </a:endParaRPr>
-                    </a:p>
-                  </a:txBody>
-                  <a:tcPr marL="9525" marR="9525" marT="9525" marB="0" anchor="b"/>
-                </a:tc>
-                <a:tc>
-                  <a:txBody>
-                    <a:bodyPr/>
-                    <a:lstStyle/>
-                    <a:p>
-                      <a:pPr algn="l" fontAlgn="b"/>
                       <a:r>
-                        <a:rPr lang="en-US" sz="1100" u="none" strike="noStrike">
+                        <a:rPr lang="en-US" sz="1100" u="none" strike="noStrike" dirty="0">
                           <a:effectLst/>
                         </a:rPr>
                         <a:t>Mouser</a:t>
                       </a:r>
-                      <a:endParaRPr lang="en-US" sz="1100" b="0" i="0" u="none" strike="noStrike">
+                      <a:endParaRPr lang="en-US" sz="1100" b="0" i="0" u="none" strike="noStrike" dirty="0">
                         <a:solidFill>
                           <a:srgbClr val="000000"/>
                         </a:solidFill>
@@ -10533,23 +10499,6 @@
                         </a:rPr>
                         <a:t>$28.75 </a:t>
                       </a:r>
-                      <a:endParaRPr lang="en-US" sz="1100" b="0" i="0" u="none" strike="noStrike">
-                        <a:solidFill>
-                          <a:srgbClr val="000000"/>
-                        </a:solidFill>
-                        <a:effectLst/>
-                        <a:latin typeface="Liberation Sans"/>
-                      </a:endParaRPr>
-                    </a:p>
-                  </a:txBody>
-                  <a:tcPr marL="9525" marR="9525" marT="9525" marB="0" anchor="b"/>
-                </a:tc>
-                <a:tc>
-                  <a:txBody>
-                    <a:bodyPr/>
-                    <a:lstStyle/>
-                    <a:p>
-                      <a:pPr algn="l" fontAlgn="b"/>
                       <a:endParaRPr lang="en-US" sz="1100" b="0" i="0" u="none" strike="noStrike">
                         <a:solidFill>
                           <a:srgbClr val="000000"/>
@@ -10638,30 +10587,13 @@
                     <a:lstStyle/>
                     <a:p>
                       <a:pPr algn="l" fontAlgn="b"/>
-                      <a:endParaRPr lang="en-US" sz="1100" b="0" i="0" u="none" strike="noStrike">
-                        <a:solidFill>
-                          <a:srgbClr val="000000"/>
-                        </a:solidFill>
-                        <a:effectLst/>
-                        <a:latin typeface="Liberation Sans"/>
-                      </a:endParaRPr>
-                    </a:p>
-                  </a:txBody>
-                  <a:tcPr marL="9525" marR="9525" marT="9525" marB="0" anchor="b"/>
-                </a:tc>
-                <a:tc>
-                  <a:txBody>
-                    <a:bodyPr/>
-                    <a:lstStyle/>
-                    <a:p>
-                      <a:pPr algn="l" fontAlgn="b"/>
                       <a:r>
-                        <a:rPr lang="en-US" sz="1100" u="none" strike="noStrike">
+                        <a:rPr lang="en-US" sz="1100" u="none" strike="noStrike" dirty="0" err="1" smtClean="0">
                           <a:effectLst/>
                         </a:rPr>
-                        <a:t>SparkFun</a:t>
+                        <a:t>Sparkfun</a:t>
                       </a:r>
-                      <a:endParaRPr lang="en-US" sz="1100" b="0" i="0" u="none" strike="noStrike">
+                      <a:endParaRPr lang="en-US" sz="1100" b="0" i="0" u="none" strike="noStrike" dirty="0">
                         <a:solidFill>
                           <a:srgbClr val="000000"/>
                         </a:solidFill>
@@ -10684,23 +10616,6 @@
                         </a:rPr>
                         <a:t>49.99</a:t>
                       </a:r>
-                      <a:endParaRPr lang="en-US" sz="1100" b="0" i="0" u="none" strike="noStrike">
-                        <a:solidFill>
-                          <a:srgbClr val="000000"/>
-                        </a:solidFill>
-                        <a:effectLst/>
-                        <a:latin typeface="Liberation Sans"/>
-                      </a:endParaRPr>
-                    </a:p>
-                  </a:txBody>
-                  <a:tcPr marL="9525" marR="9525" marT="9525" marB="0" anchor="b"/>
-                </a:tc>
-                <a:tc>
-                  <a:txBody>
-                    <a:bodyPr/>
-                    <a:lstStyle/>
-                    <a:p>
-                      <a:pPr algn="l" fontAlgn="b"/>
                       <a:endParaRPr lang="en-US" sz="1100" b="0" i="0" u="none" strike="noStrike">
                         <a:solidFill>
                           <a:srgbClr val="000000"/>
@@ -10789,30 +10704,13 @@
                     <a:lstStyle/>
                     <a:p>
                       <a:pPr algn="l" fontAlgn="b"/>
-                      <a:endParaRPr lang="en-US" sz="1100" b="0" i="0" u="none" strike="noStrike">
-                        <a:solidFill>
-                          <a:srgbClr val="000000"/>
-                        </a:solidFill>
-                        <a:effectLst/>
-                        <a:latin typeface="Liberation Sans"/>
-                      </a:endParaRPr>
-                    </a:p>
-                  </a:txBody>
-                  <a:tcPr marL="9525" marR="9525" marT="9525" marB="0" anchor="b"/>
-                </a:tc>
-                <a:tc>
-                  <a:txBody>
-                    <a:bodyPr/>
-                    <a:lstStyle/>
-                    <a:p>
-                      <a:pPr algn="l" fontAlgn="b"/>
                       <a:r>
-                        <a:rPr lang="en-US" sz="1100" u="none" strike="noStrike">
+                        <a:rPr lang="en-US" sz="1100" u="none" strike="noStrike" dirty="0">
                           <a:effectLst/>
                         </a:rPr>
                         <a:t>Various</a:t>
                       </a:r>
-                      <a:endParaRPr lang="en-US" sz="1100" b="0" i="0" u="none" strike="noStrike">
+                      <a:endParaRPr lang="en-US" sz="1100" b="0" i="0" u="none" strike="noStrike" dirty="0">
                         <a:solidFill>
                           <a:srgbClr val="000000"/>
                         </a:solidFill>
@@ -10835,23 +10733,6 @@
                         </a:rPr>
                         <a:t>10</a:t>
                       </a:r>
-                      <a:endParaRPr lang="en-US" sz="1100" b="0" i="0" u="none" strike="noStrike">
-                        <a:solidFill>
-                          <a:srgbClr val="000000"/>
-                        </a:solidFill>
-                        <a:effectLst/>
-                        <a:latin typeface="Liberation Sans"/>
-                      </a:endParaRPr>
-                    </a:p>
-                  </a:txBody>
-                  <a:tcPr marL="9525" marR="9525" marT="9525" marB="0" anchor="b"/>
-                </a:tc>
-                <a:tc>
-                  <a:txBody>
-                    <a:bodyPr/>
-                    <a:lstStyle/>
-                    <a:p>
-                      <a:pPr algn="l" fontAlgn="b"/>
                       <a:endParaRPr lang="en-US" sz="1100" b="0" i="0" u="none" strike="noStrike">
                         <a:solidFill>
                           <a:srgbClr val="000000"/>
@@ -10940,30 +10821,13 @@
                     <a:lstStyle/>
                     <a:p>
                       <a:pPr algn="l" fontAlgn="b"/>
-                      <a:endParaRPr lang="en-US" sz="1100" b="0" i="0" u="none" strike="noStrike">
-                        <a:solidFill>
-                          <a:srgbClr val="000000"/>
-                        </a:solidFill>
-                        <a:effectLst/>
-                        <a:latin typeface="Liberation Sans"/>
-                      </a:endParaRPr>
-                    </a:p>
-                  </a:txBody>
-                  <a:tcPr marL="9525" marR="9525" marT="9525" marB="0" anchor="b"/>
-                </a:tc>
-                <a:tc>
-                  <a:txBody>
-                    <a:bodyPr/>
-                    <a:lstStyle/>
-                    <a:p>
-                      <a:pPr algn="l" fontAlgn="b"/>
                       <a:r>
-                        <a:rPr lang="en-US" sz="1100" u="none" strike="noStrike">
+                        <a:rPr lang="en-US" sz="1100" u="none" strike="noStrike" dirty="0" smtClean="0">
                           <a:effectLst/>
                         </a:rPr>
-                        <a:t>Oshpark</a:t>
+                        <a:t>OSH Park</a:t>
                       </a:r>
-                      <a:endParaRPr lang="en-US" sz="1100" b="0" i="0" u="none" strike="noStrike">
+                      <a:endParaRPr lang="en-US" sz="1100" b="0" i="0" u="none" strike="noStrike" dirty="0">
                         <a:solidFill>
                           <a:srgbClr val="000000"/>
                         </a:solidFill>
@@ -10986,23 +10850,6 @@
                         </a:rPr>
                         <a:t>40</a:t>
                       </a:r>
-                      <a:endParaRPr lang="en-US" sz="1100" b="0" i="0" u="none" strike="noStrike">
-                        <a:solidFill>
-                          <a:srgbClr val="000000"/>
-                        </a:solidFill>
-                        <a:effectLst/>
-                        <a:latin typeface="Liberation Sans"/>
-                      </a:endParaRPr>
-                    </a:p>
-                  </a:txBody>
-                  <a:tcPr marL="9525" marR="9525" marT="9525" marB="0" anchor="b"/>
-                </a:tc>
-                <a:tc>
-                  <a:txBody>
-                    <a:bodyPr/>
-                    <a:lstStyle/>
-                    <a:p>
-                      <a:pPr algn="l" fontAlgn="b"/>
                       <a:endParaRPr lang="en-US" sz="1100" b="0" i="0" u="none" strike="noStrike">
                         <a:solidFill>
                           <a:srgbClr val="000000"/>
@@ -11091,30 +10938,13 @@
                     <a:lstStyle/>
                     <a:p>
                       <a:pPr algn="l" fontAlgn="b"/>
-                      <a:endParaRPr lang="en-US" sz="1100" b="0" i="0" u="none" strike="noStrike">
-                        <a:solidFill>
-                          <a:srgbClr val="000000"/>
-                        </a:solidFill>
-                        <a:effectLst/>
-                        <a:latin typeface="Liberation Sans"/>
-                      </a:endParaRPr>
-                    </a:p>
-                  </a:txBody>
-                  <a:tcPr marL="9525" marR="9525" marT="9525" marB="0" anchor="b"/>
-                </a:tc>
-                <a:tc>
-                  <a:txBody>
-                    <a:bodyPr/>
-                    <a:lstStyle/>
-                    <a:p>
-                      <a:pPr algn="l" fontAlgn="b"/>
                       <a:r>
-                        <a:rPr lang="en-US" sz="1100" u="none" strike="noStrike">
+                        <a:rPr lang="en-US" sz="1100" u="none" strike="noStrike" dirty="0" err="1">
                           <a:effectLst/>
                         </a:rPr>
                         <a:t>DigiKey</a:t>
                       </a:r>
-                      <a:endParaRPr lang="en-US" sz="1100" b="0" i="0" u="none" strike="noStrike">
+                      <a:endParaRPr lang="en-US" sz="1100" b="0" i="0" u="none" strike="noStrike" dirty="0">
                         <a:solidFill>
                           <a:srgbClr val="000000"/>
                         </a:solidFill>
@@ -11137,23 +10967,6 @@
                         </a:rPr>
                         <a:t>11.45</a:t>
                       </a:r>
-                      <a:endParaRPr lang="en-US" sz="1100" b="0" i="0" u="none" strike="noStrike">
-                        <a:solidFill>
-                          <a:srgbClr val="000000"/>
-                        </a:solidFill>
-                        <a:effectLst/>
-                        <a:latin typeface="Liberation Sans"/>
-                      </a:endParaRPr>
-                    </a:p>
-                  </a:txBody>
-                  <a:tcPr marL="9525" marR="9525" marT="9525" marB="0" anchor="b"/>
-                </a:tc>
-                <a:tc>
-                  <a:txBody>
-                    <a:bodyPr/>
-                    <a:lstStyle/>
-                    <a:p>
-                      <a:pPr algn="l" fontAlgn="b"/>
                       <a:endParaRPr lang="en-US" sz="1100" b="0" i="0" u="none" strike="noStrike">
                         <a:solidFill>
                           <a:srgbClr val="000000"/>
@@ -11242,30 +11055,13 @@
                     <a:lstStyle/>
                     <a:p>
                       <a:pPr algn="l" fontAlgn="b"/>
-                      <a:endParaRPr lang="en-US" sz="1100" b="0" i="0" u="none" strike="noStrike">
-                        <a:solidFill>
-                          <a:srgbClr val="000000"/>
-                        </a:solidFill>
-                        <a:effectLst/>
-                        <a:latin typeface="Liberation Sans"/>
-                      </a:endParaRPr>
-                    </a:p>
-                  </a:txBody>
-                  <a:tcPr marL="9525" marR="9525" marT="9525" marB="0" anchor="b"/>
-                </a:tc>
-                <a:tc>
-                  <a:txBody>
-                    <a:bodyPr/>
-                    <a:lstStyle/>
-                    <a:p>
-                      <a:pPr algn="l" fontAlgn="b"/>
                       <a:r>
-                        <a:rPr lang="en-US" sz="1100" u="none" strike="noStrike">
+                        <a:rPr lang="en-US" sz="1100" u="none" strike="noStrike" dirty="0" err="1">
                           <a:effectLst/>
                         </a:rPr>
                         <a:t>BatterySpace</a:t>
                       </a:r>
-                      <a:endParaRPr lang="en-US" sz="1100" b="0" i="0" u="none" strike="noStrike">
+                      <a:endParaRPr lang="en-US" sz="1100" b="0" i="0" u="none" strike="noStrike" dirty="0">
                         <a:solidFill>
                           <a:srgbClr val="000000"/>
                         </a:solidFill>
@@ -11288,23 +11084,6 @@
                         </a:rPr>
                         <a:t>39.95</a:t>
                       </a:r>
-                      <a:endParaRPr lang="en-US" sz="1100" b="0" i="0" u="none" strike="noStrike">
-                        <a:solidFill>
-                          <a:srgbClr val="000000"/>
-                        </a:solidFill>
-                        <a:effectLst/>
-                        <a:latin typeface="Liberation Sans"/>
-                      </a:endParaRPr>
-                    </a:p>
-                  </a:txBody>
-                  <a:tcPr marL="9525" marR="9525" marT="9525" marB="0" anchor="b"/>
-                </a:tc>
-                <a:tc>
-                  <a:txBody>
-                    <a:bodyPr/>
-                    <a:lstStyle/>
-                    <a:p>
-                      <a:pPr algn="l" fontAlgn="b"/>
                       <a:endParaRPr lang="en-US" sz="1100" b="0" i="0" u="none" strike="noStrike">
                         <a:solidFill>
                           <a:srgbClr val="000000"/>
@@ -11393,30 +11172,13 @@
                     <a:lstStyle/>
                     <a:p>
                       <a:pPr algn="l" fontAlgn="b"/>
-                      <a:endParaRPr lang="en-US" sz="1100" b="0" i="0" u="none" strike="noStrike">
-                        <a:solidFill>
-                          <a:srgbClr val="000000"/>
-                        </a:solidFill>
-                        <a:effectLst/>
-                        <a:latin typeface="Liberation Sans"/>
-                      </a:endParaRPr>
-                    </a:p>
-                  </a:txBody>
-                  <a:tcPr marL="9525" marR="9525" marT="9525" marB="0" anchor="b"/>
-                </a:tc>
-                <a:tc>
-                  <a:txBody>
-                    <a:bodyPr/>
-                    <a:lstStyle/>
-                    <a:p>
-                      <a:pPr algn="l" fontAlgn="b"/>
                       <a:r>
-                        <a:rPr lang="en-US" sz="1100" u="none" strike="noStrike">
+                        <a:rPr lang="en-US" sz="1100" u="none" strike="noStrike" dirty="0">
                           <a:effectLst/>
                         </a:rPr>
                         <a:t>Mouser</a:t>
                       </a:r>
-                      <a:endParaRPr lang="en-US" sz="1100" b="0" i="0" u="none" strike="noStrike">
+                      <a:endParaRPr lang="en-US" sz="1100" b="0" i="0" u="none" strike="noStrike" dirty="0">
                         <a:solidFill>
                           <a:srgbClr val="000000"/>
                         </a:solidFill>
@@ -11439,23 +11201,6 @@
                         </a:rPr>
                         <a:t>13.23</a:t>
                       </a:r>
-                      <a:endParaRPr lang="en-US" sz="1100" b="0" i="0" u="none" strike="noStrike">
-                        <a:solidFill>
-                          <a:srgbClr val="000000"/>
-                        </a:solidFill>
-                        <a:effectLst/>
-                        <a:latin typeface="Liberation Sans"/>
-                      </a:endParaRPr>
-                    </a:p>
-                  </a:txBody>
-                  <a:tcPr marL="9525" marR="9525" marT="9525" marB="0" anchor="b"/>
-                </a:tc>
-                <a:tc>
-                  <a:txBody>
-                    <a:bodyPr/>
-                    <a:lstStyle/>
-                    <a:p>
-                      <a:pPr algn="l" fontAlgn="b"/>
                       <a:endParaRPr lang="en-US" sz="1100" b="0" i="0" u="none" strike="noStrike">
                         <a:solidFill>
                           <a:srgbClr val="000000"/>
@@ -11544,30 +11289,13 @@
                     <a:lstStyle/>
                     <a:p>
                       <a:pPr algn="l" fontAlgn="b"/>
-                      <a:endParaRPr lang="en-US" sz="1100" b="0" i="0" u="none" strike="noStrike">
-                        <a:solidFill>
-                          <a:srgbClr val="000000"/>
-                        </a:solidFill>
-                        <a:effectLst/>
-                        <a:latin typeface="Liberation Sans"/>
-                      </a:endParaRPr>
-                    </a:p>
-                  </a:txBody>
-                  <a:tcPr marL="9525" marR="9525" marT="9525" marB="0" anchor="b"/>
-                </a:tc>
-                <a:tc>
-                  <a:txBody>
-                    <a:bodyPr/>
-                    <a:lstStyle/>
-                    <a:p>
-                      <a:pPr algn="l" fontAlgn="b"/>
                       <a:r>
-                        <a:rPr lang="en-US" sz="1100" u="none" strike="noStrike">
+                        <a:rPr lang="en-US" sz="1100" u="none" strike="noStrike" dirty="0" err="1">
                           <a:effectLst/>
                         </a:rPr>
                         <a:t>DigiKey</a:t>
                       </a:r>
-                      <a:endParaRPr lang="en-US" sz="1100" b="0" i="0" u="none" strike="noStrike">
+                      <a:endParaRPr lang="en-US" sz="1100" b="0" i="0" u="none" strike="noStrike" dirty="0">
                         <a:solidFill>
                           <a:srgbClr val="000000"/>
                         </a:solidFill>
@@ -11590,23 +11318,6 @@
                         </a:rPr>
                         <a:t>6.43</a:t>
                       </a:r>
-                      <a:endParaRPr lang="en-US" sz="1100" b="0" i="0" u="none" strike="noStrike">
-                        <a:solidFill>
-                          <a:srgbClr val="000000"/>
-                        </a:solidFill>
-                        <a:effectLst/>
-                        <a:latin typeface="Liberation Sans"/>
-                      </a:endParaRPr>
-                    </a:p>
-                  </a:txBody>
-                  <a:tcPr marL="9525" marR="9525" marT="9525" marB="0" anchor="b"/>
-                </a:tc>
-                <a:tc>
-                  <a:txBody>
-                    <a:bodyPr/>
-                    <a:lstStyle/>
-                    <a:p>
-                      <a:pPr algn="l" fontAlgn="b"/>
                       <a:endParaRPr lang="en-US" sz="1100" b="0" i="0" u="none" strike="noStrike">
                         <a:solidFill>
                           <a:srgbClr val="000000"/>
@@ -11695,30 +11406,13 @@
                     <a:lstStyle/>
                     <a:p>
                       <a:pPr algn="l" fontAlgn="b"/>
-                      <a:endParaRPr lang="en-US" sz="1100" b="0" i="0" u="none" strike="noStrike">
-                        <a:solidFill>
-                          <a:srgbClr val="000000"/>
-                        </a:solidFill>
-                        <a:effectLst/>
-                        <a:latin typeface="Liberation Sans"/>
-                      </a:endParaRPr>
-                    </a:p>
-                  </a:txBody>
-                  <a:tcPr marL="9525" marR="9525" marT="9525" marB="0" anchor="b"/>
-                </a:tc>
-                <a:tc>
-                  <a:txBody>
-                    <a:bodyPr/>
-                    <a:lstStyle/>
-                    <a:p>
-                      <a:pPr algn="l" fontAlgn="b"/>
                       <a:r>
-                        <a:rPr lang="en-US" sz="1100" u="none" strike="noStrike">
+                        <a:rPr lang="en-US" sz="1100" u="none" strike="noStrike" dirty="0">
                           <a:effectLst/>
                         </a:rPr>
                         <a:t>Purdue IEEE</a:t>
                       </a:r>
-                      <a:endParaRPr lang="en-US" sz="1100" b="0" i="0" u="none" strike="noStrike">
+                      <a:endParaRPr lang="en-US" sz="1100" b="0" i="0" u="none" strike="noStrike" dirty="0">
                         <a:solidFill>
                           <a:srgbClr val="000000"/>
                         </a:solidFill>
@@ -11741,23 +11435,6 @@
                         </a:rPr>
                         <a:t>40</a:t>
                       </a:r>
-                      <a:endParaRPr lang="en-US" sz="1100" b="0" i="0" u="none" strike="noStrike">
-                        <a:solidFill>
-                          <a:srgbClr val="000000"/>
-                        </a:solidFill>
-                        <a:effectLst/>
-                        <a:latin typeface="Liberation Sans"/>
-                      </a:endParaRPr>
-                    </a:p>
-                  </a:txBody>
-                  <a:tcPr marL="9525" marR="9525" marT="9525" marB="0" anchor="b"/>
-                </a:tc>
-                <a:tc>
-                  <a:txBody>
-                    <a:bodyPr/>
-                    <a:lstStyle/>
-                    <a:p>
-                      <a:pPr algn="l" fontAlgn="b"/>
                       <a:endParaRPr lang="en-US" sz="1100" b="0" i="0" u="none" strike="noStrike">
                         <a:solidFill>
                           <a:srgbClr val="000000"/>
@@ -11847,35 +11524,12 @@
                     <a:p>
                       <a:pPr algn="l" fontAlgn="b"/>
                       <a:r>
-                        <a:rPr lang="en-US" sz="1100" u="none" strike="noStrike">
+                        <a:rPr lang="en-US" sz="1100" u="none" strike="noStrike" dirty="0" smtClean="0">
                           <a:effectLst/>
                         </a:rPr>
-                        <a:t>Draw String Backpack</a:t>
+                        <a:t>N/A</a:t>
                       </a:r>
-                      <a:endParaRPr lang="en-US" sz="1100" b="0" i="0" u="none" strike="noStrike">
-                        <a:solidFill>
-                          <a:srgbClr val="000000"/>
-                        </a:solidFill>
-                        <a:effectLst/>
-                        <a:latin typeface="Liberation Sans"/>
-                      </a:endParaRPr>
-                    </a:p>
-                  </a:txBody>
-                  <a:tcPr marL="9525" marR="9525" marT="9525" marB="0" anchor="b"/>
-                </a:tc>
-                <a:tc>
-                  <a:txBody>
-                    <a:bodyPr/>
-                    <a:lstStyle/>
-                    <a:p>
-                      <a:pPr algn="l" fontAlgn="b"/>
-                      <a:r>
-                        <a:rPr lang="en-US" sz="1100" u="none" strike="noStrike">
-                          <a:effectLst/>
-                        </a:rPr>
-                        <a:t>Supplied</a:t>
-                      </a:r>
-                      <a:endParaRPr lang="en-US" sz="1100" b="0" i="0" u="none" strike="noStrike">
+                      <a:endParaRPr lang="en-US" sz="1100" b="0" i="0" u="none" strike="noStrike" dirty="0">
                         <a:solidFill>
                           <a:srgbClr val="000000"/>
                         </a:solidFill>
@@ -11898,23 +11552,6 @@
                         </a:rPr>
                         <a:t>10</a:t>
                       </a:r>
-                      <a:endParaRPr lang="en-US" sz="1100" b="0" i="0" u="none" strike="noStrike">
-                        <a:solidFill>
-                          <a:srgbClr val="000000"/>
-                        </a:solidFill>
-                        <a:effectLst/>
-                        <a:latin typeface="Liberation Sans"/>
-                      </a:endParaRPr>
-                    </a:p>
-                  </a:txBody>
-                  <a:tcPr marL="9525" marR="9525" marT="9525" marB="0" anchor="b"/>
-                </a:tc>
-                <a:tc>
-                  <a:txBody>
-                    <a:bodyPr/>
-                    <a:lstStyle/>
-                    <a:p>
-                      <a:pPr algn="l" fontAlgn="b"/>
                       <a:endParaRPr lang="en-US" sz="1100" b="0" i="0" u="none" strike="noStrike">
                         <a:solidFill>
                           <a:srgbClr val="000000"/>
@@ -12014,531 +11651,13 @@
                     <a:lstStyle/>
                     <a:p>
                       <a:pPr algn="l" fontAlgn="b"/>
-                      <a:endParaRPr lang="en-US" sz="1100" b="0" i="0" u="none" strike="noStrike">
-                        <a:solidFill>
-                          <a:srgbClr val="000000"/>
-                        </a:solidFill>
-                        <a:effectLst/>
-                        <a:latin typeface="Liberation Sans"/>
-                      </a:endParaRPr>
-                    </a:p>
-                  </a:txBody>
-                  <a:tcPr marL="9525" marR="9525" marT="9525" marB="0" anchor="b"/>
-                </a:tc>
-                <a:tc>
-                  <a:txBody>
-                    <a:bodyPr/>
-                    <a:lstStyle/>
-                    <a:p>
-                      <a:pPr algn="l" fontAlgn="b"/>
                       <a:r>
-                        <a:rPr lang="en-US" sz="1100" u="none" strike="noStrike">
+                        <a:rPr lang="en-US" sz="1100" u="none" strike="noStrike" dirty="0">
                           <a:effectLst/>
                         </a:rPr>
                         <a:t> </a:t>
                       </a:r>
-                      <a:endParaRPr lang="en-US" sz="1100" b="0" i="0" u="none" strike="noStrike">
-                        <a:solidFill>
-                          <a:srgbClr val="000000"/>
-                        </a:solidFill>
-                        <a:effectLst/>
-                        <a:latin typeface="Liberation Sans"/>
-                      </a:endParaRPr>
-                    </a:p>
-                  </a:txBody>
-                  <a:tcPr marL="9525" marR="9525" marT="9525" marB="0" anchor="b"/>
-                </a:tc>
-                <a:tc>
-                  <a:txBody>
-                    <a:bodyPr/>
-                    <a:lstStyle/>
-                    <a:p>
-                      <a:pPr algn="l" fontAlgn="b"/>
-                      <a:endParaRPr lang="en-US" sz="1100" b="0" i="0" u="none" strike="noStrike">
-                        <a:solidFill>
-                          <a:srgbClr val="000000"/>
-                        </a:solidFill>
-                        <a:effectLst/>
-                        <a:latin typeface="Liberation Sans"/>
-                      </a:endParaRPr>
-                    </a:p>
-                  </a:txBody>
-                  <a:tcPr marL="9525" marR="9525" marT="9525" marB="0" anchor="b"/>
-                </a:tc>
-                <a:tc>
-                  <a:txBody>
-                    <a:bodyPr/>
-                    <a:lstStyle/>
-                    <a:p>
-                      <a:pPr algn="l" fontAlgn="b"/>
-                      <a:endParaRPr lang="en-US" sz="1100" b="0" i="0" u="none" strike="noStrike">
-                        <a:solidFill>
-                          <a:srgbClr val="000000"/>
-                        </a:solidFill>
-                        <a:effectLst/>
-                        <a:latin typeface="Liberation Sans"/>
-                      </a:endParaRPr>
-                    </a:p>
-                  </a:txBody>
-                  <a:tcPr marL="9525" marR="9525" marT="9525" marB="0" anchor="b"/>
-                </a:tc>
-                <a:tc>
-                  <a:txBody>
-                    <a:bodyPr/>
-                    <a:lstStyle/>
-                    <a:p>
-                      <a:pPr algn="l" fontAlgn="b"/>
-                      <a:endParaRPr lang="en-US" sz="1100" b="0" i="0" u="none" strike="noStrike">
-                        <a:solidFill>
-                          <a:srgbClr val="000000"/>
-                        </a:solidFill>
-                        <a:effectLst/>
-                        <a:latin typeface="Liberation Sans"/>
-                      </a:endParaRPr>
-                    </a:p>
-                  </a:txBody>
-                  <a:tcPr marL="9525" marR="9525" marT="9525" marB="0" anchor="b"/>
-                </a:tc>
-              </a:tr>
-              <a:tr h="266000">
-                <a:tc>
-                  <a:txBody>
-                    <a:bodyPr/>
-                    <a:lstStyle/>
-                    <a:p>
-                      <a:pPr algn="l" fontAlgn="b"/>
-                      <a:endParaRPr lang="en-US" sz="1100" b="0" i="0" u="none" strike="noStrike">
-                        <a:solidFill>
-                          <a:srgbClr val="000000"/>
-                        </a:solidFill>
-                        <a:effectLst/>
-                        <a:latin typeface="Liberation Sans"/>
-                      </a:endParaRPr>
-                    </a:p>
-                  </a:txBody>
-                  <a:tcPr marL="9525" marR="9525" marT="9525" marB="0" anchor="b"/>
-                </a:tc>
-                <a:tc>
-                  <a:txBody>
-                    <a:bodyPr/>
-                    <a:lstStyle/>
-                    <a:p>
-                      <a:pPr algn="l" fontAlgn="b"/>
-                      <a:endParaRPr lang="en-US" sz="1100" b="0" i="0" u="none" strike="noStrike">
-                        <a:solidFill>
-                          <a:srgbClr val="000000"/>
-                        </a:solidFill>
-                        <a:effectLst/>
-                        <a:latin typeface="Liberation Sans"/>
-                      </a:endParaRPr>
-                    </a:p>
-                  </a:txBody>
-                  <a:tcPr marL="9525" marR="9525" marT="9525" marB="0" anchor="b"/>
-                </a:tc>
-                <a:tc>
-                  <a:txBody>
-                    <a:bodyPr/>
-                    <a:lstStyle/>
-                    <a:p>
-                      <a:pPr algn="l" fontAlgn="b"/>
-                      <a:endParaRPr lang="en-US" sz="1100" b="0" i="0" u="none" strike="noStrike">
-                        <a:solidFill>
-                          <a:srgbClr val="000000"/>
-                        </a:solidFill>
-                        <a:effectLst/>
-                        <a:latin typeface="Liberation Sans"/>
-                      </a:endParaRPr>
-                    </a:p>
-                  </a:txBody>
-                  <a:tcPr marL="9525" marR="9525" marT="9525" marB="0" anchor="b"/>
-                </a:tc>
-                <a:tc>
-                  <a:txBody>
-                    <a:bodyPr/>
-                    <a:lstStyle/>
-                    <a:p>
-                      <a:pPr algn="l" fontAlgn="b"/>
-                      <a:endParaRPr lang="en-US" sz="1100" b="0" i="0" u="none" strike="noStrike">
-                        <a:solidFill>
-                          <a:srgbClr val="000000"/>
-                        </a:solidFill>
-                        <a:effectLst/>
-                        <a:latin typeface="Liberation Sans"/>
-                      </a:endParaRPr>
-                    </a:p>
-                  </a:txBody>
-                  <a:tcPr marL="9525" marR="9525" marT="9525" marB="0" anchor="b"/>
-                </a:tc>
-                <a:tc>
-                  <a:txBody>
-                    <a:bodyPr/>
-                    <a:lstStyle/>
-                    <a:p>
-                      <a:pPr algn="l" fontAlgn="b"/>
-                      <a:endParaRPr lang="en-US" sz="1100" b="0" i="0" u="none" strike="noStrike">
-                        <a:solidFill>
-                          <a:srgbClr val="000000"/>
-                        </a:solidFill>
-                        <a:effectLst/>
-                        <a:latin typeface="Liberation Sans"/>
-                      </a:endParaRPr>
-                    </a:p>
-                  </a:txBody>
-                  <a:tcPr marL="9525" marR="9525" marT="9525" marB="0" anchor="b"/>
-                </a:tc>
-                <a:tc>
-                  <a:txBody>
-                    <a:bodyPr/>
-                    <a:lstStyle/>
-                    <a:p>
-                      <a:pPr algn="l" fontAlgn="b"/>
-                      <a:endParaRPr lang="en-US" sz="1100" b="0" i="0" u="none" strike="noStrike">
-                        <a:solidFill>
-                          <a:srgbClr val="000000"/>
-                        </a:solidFill>
-                        <a:effectLst/>
-                        <a:latin typeface="Liberation Sans"/>
-                      </a:endParaRPr>
-                    </a:p>
-                  </a:txBody>
-                  <a:tcPr marL="9525" marR="9525" marT="9525" marB="0" anchor="b"/>
-                </a:tc>
-                <a:tc>
-                  <a:txBody>
-                    <a:bodyPr/>
-                    <a:lstStyle/>
-                    <a:p>
-                      <a:pPr algn="l" fontAlgn="b"/>
-                      <a:endParaRPr lang="en-US" sz="1100" b="0" i="0" u="none" strike="noStrike">
-                        <a:solidFill>
-                          <a:srgbClr val="000000"/>
-                        </a:solidFill>
-                        <a:effectLst/>
-                        <a:latin typeface="Liberation Sans"/>
-                      </a:endParaRPr>
-                    </a:p>
-                  </a:txBody>
-                  <a:tcPr marL="9525" marR="9525" marT="9525" marB="0" anchor="b"/>
-                </a:tc>
-              </a:tr>
-              <a:tr h="266000">
-                <a:tc>
-                  <a:txBody>
-                    <a:bodyPr/>
-                    <a:lstStyle/>
-                    <a:p>
-                      <a:pPr algn="l" fontAlgn="b"/>
-                      <a:endParaRPr lang="en-US" sz="1100" b="0" i="0" u="none" strike="noStrike">
-                        <a:solidFill>
-                          <a:srgbClr val="000000"/>
-                        </a:solidFill>
-                        <a:effectLst/>
-                        <a:latin typeface="Liberation Sans"/>
-                      </a:endParaRPr>
-                    </a:p>
-                  </a:txBody>
-                  <a:tcPr marL="9525" marR="9525" marT="9525" marB="0" anchor="b"/>
-                </a:tc>
-                <a:tc>
-                  <a:txBody>
-                    <a:bodyPr/>
-                    <a:lstStyle/>
-                    <a:p>
-                      <a:pPr algn="l" fontAlgn="b"/>
-                      <a:endParaRPr lang="en-US" sz="1100" b="0" i="0" u="none" strike="noStrike">
-                        <a:solidFill>
-                          <a:srgbClr val="000000"/>
-                        </a:solidFill>
-                        <a:effectLst/>
-                        <a:latin typeface="Liberation Sans"/>
-                      </a:endParaRPr>
-                    </a:p>
-                  </a:txBody>
-                  <a:tcPr marL="9525" marR="9525" marT="9525" marB="0" anchor="b"/>
-                </a:tc>
-                <a:tc>
-                  <a:txBody>
-                    <a:bodyPr/>
-                    <a:lstStyle/>
-                    <a:p>
-                      <a:pPr algn="l" fontAlgn="b"/>
-                      <a:endParaRPr lang="en-US" sz="1100" b="0" i="0" u="none" strike="noStrike">
-                        <a:solidFill>
-                          <a:srgbClr val="000000"/>
-                        </a:solidFill>
-                        <a:effectLst/>
-                        <a:latin typeface="Liberation Sans"/>
-                      </a:endParaRPr>
-                    </a:p>
-                  </a:txBody>
-                  <a:tcPr marL="9525" marR="9525" marT="9525" marB="0" anchor="b"/>
-                </a:tc>
-                <a:tc>
-                  <a:txBody>
-                    <a:bodyPr/>
-                    <a:lstStyle/>
-                    <a:p>
-                      <a:pPr algn="l" fontAlgn="b"/>
-                      <a:endParaRPr lang="en-US" sz="1100" b="0" i="0" u="none" strike="noStrike">
-                        <a:solidFill>
-                          <a:srgbClr val="000000"/>
-                        </a:solidFill>
-                        <a:effectLst/>
-                        <a:latin typeface="Liberation Sans"/>
-                      </a:endParaRPr>
-                    </a:p>
-                  </a:txBody>
-                  <a:tcPr marL="9525" marR="9525" marT="9525" marB="0" anchor="b"/>
-                </a:tc>
-                <a:tc>
-                  <a:txBody>
-                    <a:bodyPr/>
-                    <a:lstStyle/>
-                    <a:p>
-                      <a:pPr algn="l" fontAlgn="b"/>
-                      <a:endParaRPr lang="en-US" sz="1100" b="0" i="0" u="none" strike="noStrike">
-                        <a:solidFill>
-                          <a:srgbClr val="000000"/>
-                        </a:solidFill>
-                        <a:effectLst/>
-                        <a:latin typeface="Liberation Sans"/>
-                      </a:endParaRPr>
-                    </a:p>
-                  </a:txBody>
-                  <a:tcPr marL="9525" marR="9525" marT="9525" marB="0" anchor="b"/>
-                </a:tc>
-                <a:tc>
-                  <a:txBody>
-                    <a:bodyPr/>
-                    <a:lstStyle/>
-                    <a:p>
-                      <a:pPr algn="l" fontAlgn="b"/>
-                      <a:endParaRPr lang="en-US" sz="1100" b="0" i="0" u="none" strike="noStrike">
-                        <a:solidFill>
-                          <a:srgbClr val="000000"/>
-                        </a:solidFill>
-                        <a:effectLst/>
-                        <a:latin typeface="Liberation Sans"/>
-                      </a:endParaRPr>
-                    </a:p>
-                  </a:txBody>
-                  <a:tcPr marL="9525" marR="9525" marT="9525" marB="0" anchor="b"/>
-                </a:tc>
-                <a:tc>
-                  <a:txBody>
-                    <a:bodyPr/>
-                    <a:lstStyle/>
-                    <a:p>
-                      <a:pPr algn="l" fontAlgn="b"/>
-                      <a:endParaRPr lang="en-US" sz="1100" b="0" i="0" u="none" strike="noStrike">
-                        <a:solidFill>
-                          <a:srgbClr val="000000"/>
-                        </a:solidFill>
-                        <a:effectLst/>
-                        <a:latin typeface="Liberation Sans"/>
-                      </a:endParaRPr>
-                    </a:p>
-                  </a:txBody>
-                  <a:tcPr marL="9525" marR="9525" marT="9525" marB="0" anchor="b"/>
-                </a:tc>
-              </a:tr>
-              <a:tr h="266000">
-                <a:tc>
-                  <a:txBody>
-                    <a:bodyPr/>
-                    <a:lstStyle/>
-                    <a:p>
-                      <a:pPr algn="l" fontAlgn="b"/>
-                      <a:endParaRPr lang="en-US" sz="1100" b="0" i="0" u="none" strike="noStrike">
-                        <a:solidFill>
-                          <a:srgbClr val="000000"/>
-                        </a:solidFill>
-                        <a:effectLst/>
-                        <a:latin typeface="Liberation Sans"/>
-                      </a:endParaRPr>
-                    </a:p>
-                  </a:txBody>
-                  <a:tcPr marL="9525" marR="9525" marT="9525" marB="0" anchor="b"/>
-                </a:tc>
-                <a:tc>
-                  <a:txBody>
-                    <a:bodyPr/>
-                    <a:lstStyle/>
-                    <a:p>
-                      <a:pPr algn="l" fontAlgn="b"/>
-                      <a:endParaRPr lang="en-US" sz="1100" b="0" i="0" u="none" strike="noStrike">
-                        <a:solidFill>
-                          <a:srgbClr val="000000"/>
-                        </a:solidFill>
-                        <a:effectLst/>
-                        <a:latin typeface="Liberation Sans"/>
-                      </a:endParaRPr>
-                    </a:p>
-                  </a:txBody>
-                  <a:tcPr marL="9525" marR="9525" marT="9525" marB="0" anchor="b"/>
-                </a:tc>
-                <a:tc>
-                  <a:txBody>
-                    <a:bodyPr/>
-                    <a:lstStyle/>
-                    <a:p>
-                      <a:pPr algn="l" fontAlgn="b"/>
-                      <a:endParaRPr lang="en-US" sz="1100" b="0" i="0" u="none" strike="noStrike">
-                        <a:solidFill>
-                          <a:srgbClr val="000000"/>
-                        </a:solidFill>
-                        <a:effectLst/>
-                        <a:latin typeface="Liberation Sans"/>
-                      </a:endParaRPr>
-                    </a:p>
-                  </a:txBody>
-                  <a:tcPr marL="9525" marR="9525" marT="9525" marB="0" anchor="b"/>
-                </a:tc>
-                <a:tc>
-                  <a:txBody>
-                    <a:bodyPr/>
-                    <a:lstStyle/>
-                    <a:p>
-                      <a:pPr algn="l" fontAlgn="b"/>
-                      <a:endParaRPr lang="en-US" sz="1100" b="0" i="0" u="none" strike="noStrike">
-                        <a:solidFill>
-                          <a:srgbClr val="000000"/>
-                        </a:solidFill>
-                        <a:effectLst/>
-                        <a:latin typeface="Liberation Sans"/>
-                      </a:endParaRPr>
-                    </a:p>
-                  </a:txBody>
-                  <a:tcPr marL="9525" marR="9525" marT="9525" marB="0" anchor="b"/>
-                </a:tc>
-                <a:tc>
-                  <a:txBody>
-                    <a:bodyPr/>
-                    <a:lstStyle/>
-                    <a:p>
-                      <a:pPr algn="l" fontAlgn="b"/>
-                      <a:endParaRPr lang="en-US" sz="1100" b="0" i="0" u="none" strike="noStrike">
-                        <a:solidFill>
-                          <a:srgbClr val="000000"/>
-                        </a:solidFill>
-                        <a:effectLst/>
-                        <a:latin typeface="Liberation Sans"/>
-                      </a:endParaRPr>
-                    </a:p>
-                  </a:txBody>
-                  <a:tcPr marL="9525" marR="9525" marT="9525" marB="0" anchor="b"/>
-                </a:tc>
-                <a:tc>
-                  <a:txBody>
-                    <a:bodyPr/>
-                    <a:lstStyle/>
-                    <a:p>
-                      <a:pPr algn="l" fontAlgn="b"/>
-                      <a:endParaRPr lang="en-US" sz="1100" b="0" i="0" u="none" strike="noStrike">
-                        <a:solidFill>
-                          <a:srgbClr val="000000"/>
-                        </a:solidFill>
-                        <a:effectLst/>
-                        <a:latin typeface="Liberation Sans"/>
-                      </a:endParaRPr>
-                    </a:p>
-                  </a:txBody>
-                  <a:tcPr marL="9525" marR="9525" marT="9525" marB="0" anchor="b"/>
-                </a:tc>
-                <a:tc>
-                  <a:txBody>
-                    <a:bodyPr/>
-                    <a:lstStyle/>
-                    <a:p>
-                      <a:pPr algn="l" fontAlgn="b"/>
-                      <a:endParaRPr lang="en-US" sz="1100" b="0" i="0" u="none" strike="noStrike">
-                        <a:solidFill>
-                          <a:srgbClr val="000000"/>
-                        </a:solidFill>
-                        <a:effectLst/>
-                        <a:latin typeface="Liberation Sans"/>
-                      </a:endParaRPr>
-                    </a:p>
-                  </a:txBody>
-                  <a:tcPr marL="9525" marR="9525" marT="9525" marB="0" anchor="b"/>
-                </a:tc>
-              </a:tr>
-              <a:tr h="266000">
-                <a:tc>
-                  <a:txBody>
-                    <a:bodyPr/>
-                    <a:lstStyle/>
-                    <a:p>
-                      <a:pPr algn="l" fontAlgn="b"/>
-                      <a:endParaRPr lang="en-US" sz="1100" b="0" i="0" u="none" strike="noStrike">
-                        <a:solidFill>
-                          <a:srgbClr val="000000"/>
-                        </a:solidFill>
-                        <a:effectLst/>
-                        <a:latin typeface="Liberation Sans"/>
-                      </a:endParaRPr>
-                    </a:p>
-                  </a:txBody>
-                  <a:tcPr marL="9525" marR="9525" marT="9525" marB="0" anchor="b"/>
-                </a:tc>
-                <a:tc>
-                  <a:txBody>
-                    <a:bodyPr/>
-                    <a:lstStyle/>
-                    <a:p>
-                      <a:pPr algn="l" fontAlgn="b"/>
-                      <a:endParaRPr lang="en-US" sz="1100" b="0" i="0" u="none" strike="noStrike">
-                        <a:solidFill>
-                          <a:srgbClr val="000000"/>
-                        </a:solidFill>
-                        <a:effectLst/>
-                        <a:latin typeface="Liberation Sans"/>
-                      </a:endParaRPr>
-                    </a:p>
-                  </a:txBody>
-                  <a:tcPr marL="9525" marR="9525" marT="9525" marB="0" anchor="b"/>
-                </a:tc>
-                <a:tc>
-                  <a:txBody>
-                    <a:bodyPr/>
-                    <a:lstStyle/>
-                    <a:p>
-                      <a:pPr algn="l" fontAlgn="b"/>
-                      <a:endParaRPr lang="en-US" sz="1100" b="0" i="0" u="none" strike="noStrike">
-                        <a:solidFill>
-                          <a:srgbClr val="000000"/>
-                        </a:solidFill>
-                        <a:effectLst/>
-                        <a:latin typeface="Liberation Sans"/>
-                      </a:endParaRPr>
-                    </a:p>
-                  </a:txBody>
-                  <a:tcPr marL="9525" marR="9525" marT="9525" marB="0" anchor="b"/>
-                </a:tc>
-                <a:tc>
-                  <a:txBody>
-                    <a:bodyPr/>
-                    <a:lstStyle/>
-                    <a:p>
-                      <a:pPr algn="l" fontAlgn="b"/>
-                      <a:endParaRPr lang="en-US" sz="1100" b="0" i="0" u="none" strike="noStrike">
-                        <a:solidFill>
-                          <a:srgbClr val="000000"/>
-                        </a:solidFill>
-                        <a:effectLst/>
-                        <a:latin typeface="Liberation Sans"/>
-                      </a:endParaRPr>
-                    </a:p>
-                  </a:txBody>
-                  <a:tcPr marL="9525" marR="9525" marT="9525" marB="0" anchor="b"/>
-                </a:tc>
-                <a:tc>
-                  <a:txBody>
-                    <a:bodyPr/>
-                    <a:lstStyle/>
-                    <a:p>
-                      <a:pPr algn="l" fontAlgn="b"/>
-                      <a:endParaRPr lang="en-US" sz="1100" b="0" i="0" u="none" strike="noStrike">
+                      <a:endParaRPr lang="en-US" sz="1100" b="0" i="0" u="none" strike="noStrike" dirty="0">
                         <a:solidFill>
                           <a:srgbClr val="000000"/>
                         </a:solidFill>
@@ -12592,29 +11711,12 @@
                     <a:p>
                       <a:pPr algn="l" fontAlgn="b"/>
                       <a:r>
-                        <a:rPr lang="en-US" sz="1100" u="none" strike="noStrike">
+                        <a:rPr lang="en-US" sz="1100" u="none" strike="noStrike" dirty="0">
                           <a:effectLst/>
                         </a:rPr>
                         <a:t>Total</a:t>
                       </a:r>
-                      <a:endParaRPr lang="en-US" sz="1100" b="0" i="0" u="none" strike="noStrike">
-                        <a:solidFill>
-                          <a:srgbClr val="000000"/>
-                        </a:solidFill>
-                        <a:effectLst/>
-                        <a:latin typeface="Liberation Sans"/>
-                      </a:endParaRPr>
-                    </a:p>
-                  </a:txBody>
-                  <a:tcPr marL="9525" marR="9525" marT="9525" marB="0" anchor="b"/>
-                </a:tc>
-                <a:tc>
-                  <a:txBody>
-                    <a:bodyPr/>
-                    <a:lstStyle/>
-                    <a:p>
-                      <a:pPr algn="l" fontAlgn="b"/>
-                      <a:endParaRPr lang="en-US" sz="1100" b="0" i="0" u="none" strike="noStrike">
+                      <a:endParaRPr lang="en-US" sz="1100" b="0" i="0" u="none" strike="noStrike" dirty="0">
                         <a:solidFill>
                           <a:srgbClr val="000000"/>
                         </a:solidFill>
@@ -12687,23 +11789,6 @@
                     <a:bodyPr/>
                     <a:lstStyle/>
                     <a:p>
-                      <a:pPr algn="l" fontAlgn="b"/>
-                      <a:endParaRPr lang="en-US" sz="1100" b="0" i="0" u="none" strike="noStrike">
-                        <a:solidFill>
-                          <a:srgbClr val="000000"/>
-                        </a:solidFill>
-                        <a:effectLst/>
-                        <a:latin typeface="Liberation Sans"/>
-                      </a:endParaRPr>
-                    </a:p>
-                  </a:txBody>
-                  <a:tcPr marL="9525" marR="9525" marT="9525" marB="0" anchor="b"/>
-                </a:tc>
-                <a:tc>
-                  <a:txBody>
-                    <a:bodyPr/>
-                    <a:lstStyle/>
-                    <a:p>
                       <a:pPr algn="r" fontAlgn="b"/>
                       <a:r>
                         <a:rPr lang="en-US" sz="1100" u="none" strike="noStrike" dirty="0">
@@ -12737,6 +11822,13 @@
   <p:clrMapOvr>
     <a:masterClrMapping/>
   </p:clrMapOvr>
+  <p:timing>
+    <p:tnLst>
+      <p:par>
+        <p:cTn id="1" dur="indefinite" restart="never" nodeType="tmRoot"/>
+      </p:par>
+    </p:tnLst>
+  </p:timing>
 </p:sld>
 </file>
 
@@ -12878,6 +11970,13 @@
   <p:clrMapOvr>
     <a:masterClrMapping/>
   </p:clrMapOvr>
+  <p:timing>
+    <p:tnLst>
+      <p:par>
+        <p:cTn id="1" dur="indefinite" restart="never" nodeType="tmRoot"/>
+      </p:par>
+    </p:tnLst>
+  </p:timing>
 </p:sld>
 </file>
 
@@ -12978,6 +12077,13 @@
   <p:clrMapOvr>
     <a:masterClrMapping/>
   </p:clrMapOvr>
+  <p:timing>
+    <p:tnLst>
+      <p:par>
+        <p:cTn id="1" dur="indefinite" restart="never" nodeType="tmRoot"/>
+      </p:par>
+    </p:tnLst>
+  </p:timing>
 </p:sld>
 </file>
 
@@ -13116,6 +12222,13 @@
   <p:clrMapOvr>
     <a:masterClrMapping/>
   </p:clrMapOvr>
+  <p:timing>
+    <p:tnLst>
+      <p:par>
+        <p:cTn id="1" dur="indefinite" restart="never" nodeType="tmRoot"/>
+      </p:par>
+    </p:tnLst>
+  </p:timing>
 </p:sld>
 </file>
 
@@ -13544,8 +12657,12 @@
               <a:t>Wearable </a:t>
             </a:r>
             <a:r>
+              <a:rPr lang="en-US" dirty="0" smtClean="0"/>
+              <a:t>augmented reality </a:t>
+            </a:r>
+            <a:r>
               <a:rPr lang="en-US" dirty="0"/>
-              <a:t>computing is </a:t>
+              <a:t>is </a:t>
             </a:r>
             <a:r>
               <a:rPr lang="en-US" dirty="0" smtClean="0"/>
@@ -13556,60 +12673,36 @@
             <a:pPr lvl="1"/>
             <a:r>
               <a:rPr lang="en-US" dirty="0" smtClean="0"/>
-              <a:t>Google Glass, Samsung </a:t>
-            </a:r>
-            <a:r>
-              <a:rPr lang="en-US" dirty="0"/>
-              <a:t>Galaxy </a:t>
+              <a:t>Google Glass, </a:t>
             </a:r>
             <a:r>
               <a:rPr lang="en-US" dirty="0" smtClean="0"/>
-              <a:t>Gear</a:t>
-            </a:r>
-            <a:r>
-              <a:rPr lang="en-US" dirty="0"/>
-              <a:t>, </a:t>
-            </a:r>
+              <a:t>Oculus Rift, Epson BT-100</a:t>
+            </a:r>
+            <a:endParaRPr lang="en-US" dirty="0" smtClean="0"/>
+          </a:p>
+          <a:p>
+            <a:pPr lvl="1"/>
             <a:r>
               <a:rPr lang="en-US" dirty="0" smtClean="0"/>
-              <a:t>and </a:t>
-            </a:r>
-            <a:r>
-              <a:rPr lang="en-US" dirty="0"/>
-              <a:t>Oculus Rift</a:t>
+              <a:t>Provide </a:t>
             </a:r>
             <a:r>
               <a:rPr lang="en-US" dirty="0" smtClean="0"/>
-              <a:t>.</a:t>
-            </a:r>
-          </a:p>
-          <a:p>
+              <a:t>information</a:t>
+            </a:r>
+          </a:p>
+          <a:p>
+            <a:pPr lvl="1"/>
             <a:r>
               <a:rPr lang="en-US" dirty="0" smtClean="0"/>
-              <a:t>Combine </a:t>
-            </a:r>
-            <a:r>
-              <a:rPr lang="en-US" dirty="0"/>
-              <a:t>virtual reality with reality to create augmented </a:t>
+              <a:t>Promote </a:t>
             </a:r>
             <a:r>
               <a:rPr lang="en-US" dirty="0" smtClean="0"/>
-              <a:t>reality</a:t>
-            </a:r>
-          </a:p>
-          <a:p>
-            <a:pPr lvl="1"/>
-            <a:r>
-              <a:rPr lang="en-US" dirty="0" smtClean="0"/>
-              <a:t>Provide information</a:t>
-            </a:r>
-          </a:p>
-          <a:p>
-            <a:pPr lvl="1"/>
-            <a:r>
-              <a:rPr lang="en-US" dirty="0" smtClean="0"/>
-              <a:t>Promote Teamwork</a:t>
-            </a:r>
+              <a:t>teamwork</a:t>
+            </a:r>
+            <a:endParaRPr lang="en-US" dirty="0" smtClean="0"/>
           </a:p>
           <a:p>
             <a:pPr lvl="1"/>
@@ -13620,13 +12713,10 @@
           </a:p>
           <a:p>
             <a:r>
-              <a:rPr lang="en-US" dirty="0"/>
-              <a:t>The design will need to satisfy the following </a:t>
-            </a:r>
-            <a:r>
               <a:rPr lang="en-US" dirty="0" smtClean="0"/>
-              <a:t>requirements:</a:t>
-            </a:r>
+              <a:t>Design Requirements:</a:t>
+            </a:r>
+            <a:endParaRPr lang="en-US" dirty="0" smtClean="0"/>
           </a:p>
           <a:p>
             <a:pPr lvl="1"/>
@@ -13790,8 +12880,13 @@
             </a:r>
             <a:r>
               <a:rPr lang="en-US" sz="2200" dirty="0"/>
-              <a:t>be and when.</a:t>
-            </a:r>
+              <a:t>be and </a:t>
+            </a:r>
+            <a:r>
+              <a:rPr lang="en-US" sz="2200" dirty="0" smtClean="0"/>
+              <a:t>when</a:t>
+            </a:r>
+            <a:endParaRPr lang="en-US" sz="2200" dirty="0"/>
           </a:p>
           <a:p>
             <a:r>
@@ -13826,9 +12921,53 @@
             </a:r>
             <a:r>
               <a:rPr lang="en-US" sz="2200" dirty="0" smtClean="0"/>
-              <a:t>observe machinery in operation.</a:t>
+              <a:t>observe machinery in </a:t>
+            </a:r>
+            <a:r>
+              <a:rPr lang="en-US" sz="2200" dirty="0" smtClean="0"/>
+              <a:t>operation</a:t>
             </a:r>
             <a:endParaRPr lang="en-US" sz="2200" dirty="0"/>
+          </a:p>
+          <a:p>
+            <a:r>
+              <a:rPr lang="en-US" sz="2400" dirty="0" smtClean="0"/>
+              <a:t>Educational </a:t>
+            </a:r>
+            <a:r>
+              <a:rPr lang="en-US" sz="2400" dirty="0" smtClean="0"/>
+              <a:t>Demonstrations</a:t>
+            </a:r>
+          </a:p>
+          <a:p>
+            <a:pPr lvl="1"/>
+            <a:r>
+              <a:rPr lang="en-US" sz="2200" dirty="0" smtClean="0"/>
+              <a:t>Place virtual </a:t>
+            </a:r>
+            <a:r>
+              <a:rPr lang="en-US" sz="2200" dirty="0" smtClean="0"/>
+              <a:t>resources </a:t>
+            </a:r>
+            <a:r>
+              <a:rPr lang="en-US" sz="2200" dirty="0" smtClean="0"/>
+              <a:t>in </a:t>
+            </a:r>
+            <a:r>
+              <a:rPr lang="en-US" sz="2200" dirty="0"/>
+              <a:t>appropriate </a:t>
+            </a:r>
+            <a:r>
+              <a:rPr lang="en-US" sz="2200" dirty="0" smtClean="0"/>
+              <a:t>locations</a:t>
+            </a:r>
+          </a:p>
+          <a:p>
+            <a:r>
+              <a:rPr lang="en-US" sz="2400" dirty="0" smtClean="0"/>
+              <a:t>Virtual tour, guide, or navigation</a:t>
+            </a:r>
+            <a:endParaRPr lang="en-US" sz="2400" dirty="0" smtClean="0"/>
           </a:p>
           <a:p>
             <a:r>
@@ -13837,23 +12976,7 @@
                   <a:srgbClr val="FF0000"/>
                 </a:solidFill>
               </a:rPr>
-              <a:t>Children </a:t>
-            </a:r>
-            <a:r>
-              <a:rPr lang="en-US" sz="2400" dirty="0">
-                <a:solidFill>
-                  <a:srgbClr val="FF0000"/>
-                </a:solidFill>
-              </a:rPr>
-              <a:t>P</a:t>
-            </a:r>
-            <a:r>
-              <a:rPr lang="en-US" sz="2400" dirty="0" smtClean="0">
-                <a:solidFill>
-                  <a:srgbClr val="FF0000"/>
-                </a:solidFill>
-              </a:rPr>
-              <a:t>laying Games</a:t>
+              <a:t>Children Playing Games</a:t>
             </a:r>
           </a:p>
           <a:p>
@@ -13864,38 +12987,8 @@
                   <a:srgbClr val="FF0000"/>
                 </a:solidFill>
               </a:rPr>
-              <a:t>Children Rely </a:t>
-            </a:r>
-            <a:r>
-              <a:rPr lang="en-US" sz="2200" dirty="0">
-                <a:solidFill>
-                  <a:srgbClr val="FF0000"/>
-                </a:solidFill>
-              </a:rPr>
-              <a:t>on “imaginary” objects placed in a select location.</a:t>
-            </a:r>
-          </a:p>
-          <a:p>
-            <a:r>
-              <a:rPr lang="en-US" sz="2400" dirty="0" smtClean="0"/>
-              <a:t>Educational Demonstrations</a:t>
-            </a:r>
-          </a:p>
-          <a:p>
-            <a:pPr lvl="1"/>
-            <a:r>
-              <a:rPr lang="en-US" sz="2200" dirty="0" smtClean="0"/>
-              <a:t> Replace resources with virtual resources placed </a:t>
-            </a:r>
-            <a:r>
-              <a:rPr lang="en-US" sz="2200" dirty="0"/>
-              <a:t>in appropriate locations</a:t>
-            </a:r>
-            <a:r>
-              <a:rPr lang="en-US" sz="2200" dirty="0" smtClean="0"/>
-              <a:t>.</a:t>
-            </a:r>
-            <a:endParaRPr lang="en-US" sz="2200" dirty="0"/>
+              <a:t>Rely on “imaginary” objects placed in a select location</a:t>
+            </a:r>
           </a:p>
         </p:txBody>
       </p:sp>
@@ -13986,29 +13079,26 @@
           <a:p>
             <a:r>
               <a:rPr lang="en-US" sz="2800" dirty="0" smtClean="0"/>
-              <a:t>Will </a:t>
-            </a:r>
-            <a:r>
-              <a:rPr lang="en-US" sz="2800" dirty="0"/>
-              <a:t>not focus on internet </a:t>
+              <a:t>Focus </a:t>
             </a:r>
             <a:r>
               <a:rPr lang="en-US" sz="2800" dirty="0" smtClean="0"/>
-              <a:t>connectivity</a:t>
+              <a:t>on Gaming</a:t>
             </a:r>
           </a:p>
           <a:p>
             <a:r>
               <a:rPr lang="en-US" sz="2800" dirty="0" smtClean="0"/>
-              <a:t>Allow for multiple simulations.</a:t>
-            </a:r>
-            <a:endParaRPr lang="en-US" sz="2800" dirty="0"/>
-          </a:p>
-          <a:p>
-            <a:r>
-              <a:rPr lang="en-US" sz="2800" dirty="0" smtClean="0"/>
-              <a:t>Focus on Gaming</a:t>
-            </a:r>
+              <a:t>Allow for multiple simulations</a:t>
+            </a:r>
+          </a:p>
+          <a:p>
+            <a:pPr lvl="1"/>
+            <a:r>
+              <a:rPr lang="en-US" sz="2600" dirty="0" smtClean="0"/>
+              <a:t>Different permutations of same simulation</a:t>
+            </a:r>
+            <a:endParaRPr lang="en-US" sz="2600" dirty="0"/>
           </a:p>
         </p:txBody>
       </p:sp>
@@ -14342,8 +13432,13 @@
           <a:p>
             <a:r>
               <a:rPr lang="en-US" sz="8000" dirty="0" smtClean="0"/>
-              <a:t>PHASE 1</a:t>
-            </a:r>
+              <a:t>PHASE </a:t>
+            </a:r>
+            <a:r>
+              <a:rPr lang="en-US" sz="8000" dirty="0" smtClean="0"/>
+              <a:t>1 S/D</a:t>
+            </a:r>
+            <a:endParaRPr lang="en-US" sz="8000" dirty="0" smtClean="0"/>
           </a:p>
           <a:p>
             <a:endParaRPr lang="en-US" sz="8000" dirty="0"/>
@@ -14351,7 +13446,11 @@
           <a:p>
             <a:r>
               <a:rPr lang="en-US" sz="8000" dirty="0" smtClean="0"/>
-              <a:t>PHASE 2</a:t>
+              <a:t>PHASE </a:t>
+            </a:r>
+            <a:r>
+              <a:rPr lang="en-US" sz="8000" dirty="0" smtClean="0"/>
+              <a:t>2 CCUP</a:t>
             </a:r>
             <a:endParaRPr lang="en-US" sz="8000" dirty="0"/>
           </a:p>
@@ -14650,10 +13749,7 @@
               <a:rPr lang="en-US" sz="2000" dirty="0" err="1" smtClean="0"/>
               <a:t>XBees</a:t>
             </a:r>
-            <a:r>
-              <a:rPr lang="en-US" sz="2000" dirty="0" smtClean="0"/>
-              <a:t> with CCU</a:t>
-            </a:r>
+            <a:endParaRPr lang="en-US" sz="2000" dirty="0" smtClean="0"/>
           </a:p>
           <a:p>
             <a:pPr lvl="1"/>
@@ -14673,11 +13769,23 @@
             <a:pPr lvl="1"/>
             <a:r>
               <a:rPr lang="en-US" sz="2000" dirty="0" err="1" smtClean="0"/>
-              <a:t>MacPan</a:t>
+              <a:t>P</a:t>
+            </a:r>
+            <a:r>
+              <a:rPr lang="en-US" sz="2000" dirty="0" err="1" smtClean="0"/>
+              <a:t>acMan</a:t>
+            </a:r>
+            <a:r>
+              <a:rPr lang="en-US" sz="2000" dirty="0"/>
+              <a:t>-</a:t>
             </a:r>
             <a:r>
               <a:rPr lang="en-US" sz="2000" dirty="0" smtClean="0"/>
-              <a:t> game</a:t>
+              <a:t>like </a:t>
+            </a:r>
+            <a:r>
+              <a:rPr lang="en-US" sz="2000" dirty="0" smtClean="0"/>
+              <a:t>game</a:t>
             </a:r>
           </a:p>
         </p:txBody>
@@ -15559,7 +14667,7 @@
   <a:extraClrSchemeLst/>
   <a:extLst>
     <a:ext uri="{05A4C25C-085E-4340-85A3-A5531E510DB2}">
-      <thm15:themeFamily xmlns:thm15="http://schemas.microsoft.com/office/thememl/2012/main" xmlns="" name="Office Theme" id="{62F939B6-93AF-4DB8-9C6B-D6C7DFDC589F}" vid="{4A3C46E8-61CC-4603-A589-7422A47A8E4A}"/>
+      <thm15:themeFamily xmlns="" xmlns:thm15="http://schemas.microsoft.com/office/thememl/2012/main" name="Office Theme" id="{62F939B6-93AF-4DB8-9C6B-D6C7DFDC589F}" vid="{4A3C46E8-61CC-4603-A589-7422A47A8E4A}"/>
     </a:ext>
   </a:extLst>
 </a:theme>

</xml_diff>

<commit_message>
Improve block diagram contrast in powerpoint
</commit_message>
<xml_diff>
--- a/doc/AugRealityMidReview.pptx
+++ b/doc/AugRealityMidReview.pptx
@@ -131,7 +131,7 @@
   </p:defaultTextStyle>
   <p:extLst>
     <p:ext uri="{EFAFB233-063F-42B5-8137-9DF3F51BA10A}">
-      <p15:sldGuideLst xmlns="" xmlns:p15="http://schemas.microsoft.com/office/powerpoint/2012/main">
+      <p15:sldGuideLst xmlns:p15="http://schemas.microsoft.com/office/powerpoint/2012/main" xmlns="">
         <p15:guide id="1" orient="horz" pos="2160">
           <p15:clr>
             <a:srgbClr val="A4A3A4"/>
@@ -230,7 +230,7 @@
           <a:p>
             <a:fld id="{7A466098-8D44-47E3-A6D0-3EBDA642D1D9}" type="datetimeFigureOut">
               <a:rPr lang="en-US" smtClean="0"/>
-              <a:t>2/13/2014</a:t>
+              <a:t>2/14/2014</a:t>
             </a:fld>
             <a:endParaRPr lang="en-US"/>
           </a:p>
@@ -751,7 +751,7 @@
           <a:p>
             <a:fld id="{CC2990F0-8476-4A68-82FA-873BDD6B740E}" type="datetimeFigureOut">
               <a:rPr lang="en-US" smtClean="0"/>
-              <a:t>2/13/2014</a:t>
+              <a:t>2/14/2014</a:t>
             </a:fld>
             <a:endParaRPr lang="en-US"/>
           </a:p>
@@ -964,7 +964,7 @@
           <a:p>
             <a:fld id="{CC2990F0-8476-4A68-82FA-873BDD6B740E}" type="datetimeFigureOut">
               <a:rPr lang="en-US" smtClean="0"/>
-              <a:t>2/13/2014</a:t>
+              <a:t>2/14/2014</a:t>
             </a:fld>
             <a:endParaRPr lang="en-US"/>
           </a:p>
@@ -1231,7 +1231,7 @@
           <a:p>
             <a:fld id="{CC2990F0-8476-4A68-82FA-873BDD6B740E}" type="datetimeFigureOut">
               <a:rPr lang="en-US" smtClean="0"/>
-              <a:t>2/13/2014</a:t>
+              <a:t>2/14/2014</a:t>
             </a:fld>
             <a:endParaRPr lang="en-US"/>
           </a:p>
@@ -1483,7 +1483,7 @@
                 </a:solidFill>
               </a:rPr>
               <a:pPr/>
-              <a:t>2/13/2014</a:t>
+              <a:t>2/14/2014</a:t>
             </a:fld>
             <a:endParaRPr lang="en-US">
               <a:solidFill>
@@ -1685,7 +1685,7 @@
                 </a:solidFill>
               </a:rPr>
               <a:pPr/>
-              <a:t>2/13/2014</a:t>
+              <a:t>2/14/2014</a:t>
             </a:fld>
             <a:endParaRPr lang="en-US">
               <a:solidFill>
@@ -1963,7 +1963,7 @@
                 </a:solidFill>
               </a:rPr>
               <a:pPr/>
-              <a:t>2/13/2014</a:t>
+              <a:t>2/14/2014</a:t>
             </a:fld>
             <a:endParaRPr lang="en-US">
               <a:solidFill>
@@ -2283,7 +2283,7 @@
                 </a:solidFill>
               </a:rPr>
               <a:pPr/>
-              <a:t>2/13/2014</a:t>
+              <a:t>2/14/2014</a:t>
             </a:fld>
             <a:endParaRPr lang="en-US">
               <a:solidFill>
@@ -2737,7 +2737,7 @@
                 </a:solidFill>
               </a:rPr>
               <a:pPr/>
-              <a:t>2/13/2014</a:t>
+              <a:t>2/14/2014</a:t>
             </a:fld>
             <a:endParaRPr lang="en-US">
               <a:solidFill>
@@ -2887,7 +2887,7 @@
                 </a:solidFill>
               </a:rPr>
               <a:pPr/>
-              <a:t>2/13/2014</a:t>
+              <a:t>2/14/2014</a:t>
             </a:fld>
             <a:endParaRPr lang="en-US">
               <a:solidFill>
@@ -3014,7 +3014,7 @@
                 </a:solidFill>
               </a:rPr>
               <a:pPr/>
-              <a:t>2/13/2014</a:t>
+              <a:t>2/14/2014</a:t>
             </a:fld>
             <a:endParaRPr lang="en-US">
               <a:solidFill>
@@ -3323,7 +3323,7 @@
                 </a:solidFill>
               </a:rPr>
               <a:pPr/>
-              <a:t>2/13/2014</a:t>
+              <a:t>2/14/2014</a:t>
             </a:fld>
             <a:endParaRPr lang="en-US">
               <a:solidFill>
@@ -3495,7 +3495,7 @@
           <a:p>
             <a:fld id="{CC2990F0-8476-4A68-82FA-873BDD6B740E}" type="datetimeFigureOut">
               <a:rPr lang="en-US" smtClean="0"/>
-              <a:t>2/13/2014</a:t>
+              <a:t>2/14/2014</a:t>
             </a:fld>
             <a:endParaRPr lang="en-US"/>
           </a:p>
@@ -3780,7 +3780,7 @@
                 </a:solidFill>
               </a:rPr>
               <a:pPr/>
-              <a:t>2/13/2014</a:t>
+              <a:t>2/14/2014</a:t>
             </a:fld>
             <a:endParaRPr lang="en-US">
               <a:solidFill>
@@ -3982,7 +3982,7 @@
                 </a:solidFill>
               </a:rPr>
               <a:pPr/>
-              <a:t>2/13/2014</a:t>
+              <a:t>2/14/2014</a:t>
             </a:fld>
             <a:endParaRPr lang="en-US">
               <a:solidFill>
@@ -4194,7 +4194,7 @@
                 </a:solidFill>
               </a:rPr>
               <a:pPr/>
-              <a:t>2/13/2014</a:t>
+              <a:t>2/14/2014</a:t>
             </a:fld>
             <a:endParaRPr lang="en-US">
               <a:solidFill>
@@ -4531,7 +4531,7 @@
           <a:p>
             <a:fld id="{CC2990F0-8476-4A68-82FA-873BDD6B740E}" type="datetimeFigureOut">
               <a:rPr lang="en-US" smtClean="0"/>
-              <a:t>2/13/2014</a:t>
+              <a:t>2/14/2014</a:t>
             </a:fld>
             <a:endParaRPr lang="en-US"/>
           </a:p>
@@ -4839,7 +4839,7 @@
           <a:p>
             <a:fld id="{CC2990F0-8476-4A68-82FA-873BDD6B740E}" type="datetimeFigureOut">
               <a:rPr lang="en-US" smtClean="0"/>
-              <a:t>2/13/2014</a:t>
+              <a:t>2/14/2014</a:t>
             </a:fld>
             <a:endParaRPr lang="en-US"/>
           </a:p>
@@ -5260,7 +5260,7 @@
           <a:p>
             <a:fld id="{CC2990F0-8476-4A68-82FA-873BDD6B740E}" type="datetimeFigureOut">
               <a:rPr lang="en-US" smtClean="0"/>
-              <a:t>2/13/2014</a:t>
+              <a:t>2/14/2014</a:t>
             </a:fld>
             <a:endParaRPr lang="en-US"/>
           </a:p>
@@ -5373,7 +5373,7 @@
           <a:p>
             <a:fld id="{CC2990F0-8476-4A68-82FA-873BDD6B740E}" type="datetimeFigureOut">
               <a:rPr lang="en-US" smtClean="0"/>
-              <a:t>2/13/2014</a:t>
+              <a:t>2/14/2014</a:t>
             </a:fld>
             <a:endParaRPr lang="en-US"/>
           </a:p>
@@ -5532,7 +5532,7 @@
           <a:p>
             <a:fld id="{CC2990F0-8476-4A68-82FA-873BDD6B740E}" type="datetimeFigureOut">
               <a:rPr lang="en-US" smtClean="0"/>
-              <a:t>2/13/2014</a:t>
+              <a:t>2/14/2014</a:t>
             </a:fld>
             <a:endParaRPr lang="en-US"/>
           </a:p>
@@ -5916,7 +5916,7 @@
           <a:p>
             <a:fld id="{CC2990F0-8476-4A68-82FA-873BDD6B740E}" type="datetimeFigureOut">
               <a:rPr lang="en-US" smtClean="0"/>
-              <a:t>2/13/2014</a:t>
+              <a:t>2/14/2014</a:t>
             </a:fld>
             <a:endParaRPr lang="en-US"/>
           </a:p>
@@ -6278,7 +6278,7 @@
           <a:p>
             <a:fld id="{CC2990F0-8476-4A68-82FA-873BDD6B740E}" type="datetimeFigureOut">
               <a:rPr lang="en-US" smtClean="0"/>
-              <a:t>2/13/2014</a:t>
+              <a:t>2/14/2014</a:t>
             </a:fld>
             <a:endParaRPr lang="en-US"/>
           </a:p>
@@ -6612,7 +6612,7 @@
           <a:p>
             <a:fld id="{CC2990F0-8476-4A68-82FA-873BDD6B740E}" type="datetimeFigureOut">
               <a:rPr lang="en-US" smtClean="0"/>
-              <a:t>2/13/2014</a:t>
+              <a:t>2/14/2014</a:t>
             </a:fld>
             <a:endParaRPr lang="en-US"/>
           </a:p>
@@ -7161,7 +7161,7 @@
                 </a:solidFill>
               </a:rPr>
               <a:pPr/>
-              <a:t>2/13/2014</a:t>
+              <a:t>2/14/2014</a:t>
             </a:fld>
             <a:endParaRPr lang="en-US" smtClean="0">
               <a:solidFill>
@@ -8574,12 +8574,6 @@
                         </a:rPr>
                         <a:t>250 m</a:t>
                       </a:r>
-                      <a:endParaRPr lang="en-US" sz="1800" dirty="0" smtClean="0">
-                        <a:effectLst/>
-                        <a:latin typeface="Calibri" panose="020F0502020204030204" pitchFamily="34" charset="0"/>
-                        <a:ea typeface="Calibri" panose="020F0502020204030204" pitchFamily="34" charset="0"/>
-                        <a:cs typeface="Times New Roman" panose="02020603050405020304" pitchFamily="18" charset="0"/>
-                      </a:endParaRPr>
                     </a:p>
                   </a:txBody>
                   <a:tcPr marL="68580" marR="68580" marT="0" marB="0"/>
@@ -9299,11 +9293,7 @@
             </a:r>
             <a:r>
               <a:rPr lang="en-US" sz="2000" dirty="0" smtClean="0"/>
-              <a:t> </a:t>
-            </a:r>
-            <a:r>
-              <a:rPr lang="en-US" sz="2000" dirty="0" smtClean="0"/>
-              <a:t>capacity</a:t>
+              <a:t> capacity</a:t>
             </a:r>
           </a:p>
           <a:p>
@@ -12654,11 +12644,7 @@
           <a:p>
             <a:r>
               <a:rPr lang="en-US" dirty="0" smtClean="0"/>
-              <a:t>Wearable </a:t>
-            </a:r>
-            <a:r>
-              <a:rPr lang="en-US" dirty="0" smtClean="0"/>
-              <a:t>augmented reality </a:t>
+              <a:t>Wearable augmented reality </a:t>
             </a:r>
             <a:r>
               <a:rPr lang="en-US" dirty="0"/>
@@ -12673,36 +12659,22 @@
             <a:pPr lvl="1"/>
             <a:r>
               <a:rPr lang="en-US" dirty="0" smtClean="0"/>
-              <a:t>Google Glass, </a:t>
-            </a:r>
+              <a:t>Google Glass, Oculus Rift, Epson BT-100</a:t>
+            </a:r>
+          </a:p>
+          <a:p>
+            <a:pPr lvl="1"/>
             <a:r>
               <a:rPr lang="en-US" dirty="0" smtClean="0"/>
-              <a:t>Oculus Rift, Epson BT-100</a:t>
-            </a:r>
-            <a:endParaRPr lang="en-US" dirty="0" smtClean="0"/>
+              <a:t>Provide information</a:t>
+            </a:r>
           </a:p>
           <a:p>
             <a:pPr lvl="1"/>
             <a:r>
               <a:rPr lang="en-US" dirty="0" smtClean="0"/>
-              <a:t>Provide </a:t>
-            </a:r>
-            <a:r>
-              <a:rPr lang="en-US" dirty="0" smtClean="0"/>
-              <a:t>information</a:t>
-            </a:r>
-          </a:p>
-          <a:p>
-            <a:pPr lvl="1"/>
-            <a:r>
-              <a:rPr lang="en-US" dirty="0" smtClean="0"/>
-              <a:t>Promote </a:t>
-            </a:r>
-            <a:r>
-              <a:rPr lang="en-US" dirty="0" smtClean="0"/>
-              <a:t>teamwork</a:t>
-            </a:r>
-            <a:endParaRPr lang="en-US" dirty="0" smtClean="0"/>
+              <a:t>Promote teamwork</a:t>
+            </a:r>
           </a:p>
           <a:p>
             <a:pPr lvl="1"/>
@@ -12716,7 +12688,6 @@
               <a:rPr lang="en-US" dirty="0" smtClean="0"/>
               <a:t>Design Requirements:</a:t>
             </a:r>
-            <a:endParaRPr lang="en-US" dirty="0" smtClean="0"/>
           </a:p>
           <a:p>
             <a:pPr lvl="1"/>
@@ -12921,37 +12892,21 @@
             </a:r>
             <a:r>
               <a:rPr lang="en-US" sz="2200" dirty="0" smtClean="0"/>
-              <a:t>observe machinery in </a:t>
-            </a:r>
+              <a:t>observe machinery in operation</a:t>
+            </a:r>
+            <a:endParaRPr lang="en-US" sz="2200" dirty="0"/>
+          </a:p>
+          <a:p>
+            <a:r>
+              <a:rPr lang="en-US" sz="2400" dirty="0" smtClean="0"/>
+              <a:t>Educational Demonstrations</a:t>
+            </a:r>
+          </a:p>
+          <a:p>
+            <a:pPr lvl="1"/>
             <a:r>
               <a:rPr lang="en-US" sz="2200" dirty="0" smtClean="0"/>
-              <a:t>operation</a:t>
-            </a:r>
-            <a:endParaRPr lang="en-US" sz="2200" dirty="0"/>
-          </a:p>
-          <a:p>
-            <a:r>
-              <a:rPr lang="en-US" sz="2400" dirty="0" smtClean="0"/>
-              <a:t>Educational </a:t>
-            </a:r>
-            <a:r>
-              <a:rPr lang="en-US" sz="2400" dirty="0" smtClean="0"/>
-              <a:t>Demonstrations</a:t>
-            </a:r>
-          </a:p>
-          <a:p>
-            <a:pPr lvl="1"/>
-            <a:r>
-              <a:rPr lang="en-US" sz="2200" dirty="0" smtClean="0"/>
-              <a:t>Place virtual </a:t>
-            </a:r>
-            <a:r>
-              <a:rPr lang="en-US" sz="2200" dirty="0" smtClean="0"/>
-              <a:t>resources </a:t>
-            </a:r>
-            <a:r>
-              <a:rPr lang="en-US" sz="2200" dirty="0" smtClean="0"/>
-              <a:t>in </a:t>
+              <a:t>Place virtual resources in </a:t>
             </a:r>
             <a:r>
               <a:rPr lang="en-US" sz="2200" dirty="0"/>
@@ -12967,7 +12922,6 @@
               <a:rPr lang="en-US" sz="2400" dirty="0" smtClean="0"/>
               <a:t>Virtual tour, guide, or navigation</a:t>
             </a:r>
-            <a:endParaRPr lang="en-US" sz="2400" dirty="0" smtClean="0"/>
           </a:p>
           <a:p>
             <a:r>
@@ -13079,11 +13033,7 @@
           <a:p>
             <a:r>
               <a:rPr lang="en-US" sz="2800" dirty="0" smtClean="0"/>
-              <a:t>Focus </a:t>
-            </a:r>
-            <a:r>
-              <a:rPr lang="en-US" sz="2800" dirty="0" smtClean="0"/>
-              <a:t>on Gaming</a:t>
+              <a:t>Focus on Gaming</a:t>
             </a:r>
           </a:p>
           <a:p>
@@ -13346,34 +13296,43 @@
       </p:grpSpPr>
       <p:pic>
         <p:nvPicPr>
-          <p:cNvPr id="2" name="Picture 1"/>
-          <p:cNvPicPr/>
+          <p:cNvPr id="1186" name="Picture 483" descr="U:\Users\Stephen\Documents\Backup\PRGM\Robotics\STM32\SeniorDesign\doc\BlockDiagram_CC.emf"/>
+          <p:cNvPicPr>
+            <a:picLocks noChangeAspect="1" noChangeArrowheads="1"/>
+          </p:cNvPicPr>
           <p:nvPr/>
         </p:nvPicPr>
         <p:blipFill>
-          <a:blip r:embed="rId2">
+          <a:blip r:embed="rId3">
             <a:extLst>
               <a:ext uri="{28A0092B-C50C-407E-A947-70E740481C1C}">
-                <a14:useLocalDpi xmlns:a14="http://schemas.microsoft.com/office/drawing/2010/main"/>
+                <a14:useLocalDpi xmlns:a14="http://schemas.microsoft.com/office/drawing/2010/main" val="0"/>
               </a:ext>
             </a:extLst>
           </a:blip>
+          <a:srcRect/>
           <a:stretch>
             <a:fillRect/>
           </a:stretch>
         </p:blipFill>
         <p:spPr bwMode="auto">
           <a:xfrm>
-            <a:off x="76200" y="228600"/>
-            <a:ext cx="9067800" cy="6400800"/>
+            <a:off x="285750" y="539750"/>
+            <a:ext cx="8648700" cy="5778500"/>
           </a:xfrm>
           <a:prstGeom prst="rect">
             <a:avLst/>
           </a:prstGeom>
           <a:noFill/>
-          <a:ln>
-            <a:noFill/>
-          </a:ln>
+          <a:extLst>
+            <a:ext uri="{909E8E84-426E-40DD-AFC4-6F175D3DCCD1}">
+              <a14:hiddenFill xmlns:a14="http://schemas.microsoft.com/office/drawing/2010/main">
+                <a:solidFill>
+                  <a:srgbClr val="FFFFFF"/>
+                </a:solidFill>
+              </a14:hiddenFill>
+            </a:ext>
+          </a:extLst>
         </p:spPr>
       </p:pic>
     </p:spTree>
@@ -13432,25 +13391,16 @@
           <a:p>
             <a:r>
               <a:rPr lang="en-US" sz="8000" dirty="0" smtClean="0"/>
-              <a:t>PHASE </a:t>
-            </a:r>
+              <a:t>PHASE 1 S/D</a:t>
+            </a:r>
+          </a:p>
+          <a:p>
+            <a:endParaRPr lang="en-US" sz="8000" dirty="0"/>
+          </a:p>
+          <a:p>
             <a:r>
               <a:rPr lang="en-US" sz="8000" dirty="0" smtClean="0"/>
-              <a:t>1 S/D</a:t>
-            </a:r>
-            <a:endParaRPr lang="en-US" sz="8000" dirty="0" smtClean="0"/>
-          </a:p>
-          <a:p>
-            <a:endParaRPr lang="en-US" sz="8000" dirty="0"/>
-          </a:p>
-          <a:p>
-            <a:r>
-              <a:rPr lang="en-US" sz="8000" dirty="0" smtClean="0"/>
-              <a:t>PHASE </a:t>
-            </a:r>
-            <a:r>
-              <a:rPr lang="en-US" sz="8000" dirty="0" smtClean="0"/>
-              <a:t>2 CCUP</a:t>
+              <a:t>PHASE 2 CCUP</a:t>
             </a:r>
             <a:endParaRPr lang="en-US" sz="8000" dirty="0"/>
           </a:p>
@@ -13769,11 +13719,7 @@
             <a:pPr lvl="1"/>
             <a:r>
               <a:rPr lang="en-US" sz="2000" dirty="0" err="1" smtClean="0"/>
-              <a:t>P</a:t>
-            </a:r>
-            <a:r>
-              <a:rPr lang="en-US" sz="2000" dirty="0" err="1" smtClean="0"/>
-              <a:t>acMan</a:t>
+              <a:t>PacMan</a:t>
             </a:r>
             <a:r>
               <a:rPr lang="en-US" sz="2000" dirty="0"/>
@@ -13781,11 +13727,7 @@
             </a:r>
             <a:r>
               <a:rPr lang="en-US" sz="2000" dirty="0" smtClean="0"/>
-              <a:t>like </a:t>
-            </a:r>
-            <a:r>
-              <a:rPr lang="en-US" sz="2000" dirty="0" smtClean="0"/>
-              <a:t>game</a:t>
+              <a:t>like game</a:t>
             </a:r>
           </a:p>
         </p:txBody>
@@ -14667,7 +14609,7 @@
   <a:extraClrSchemeLst/>
   <a:extLst>
     <a:ext uri="{05A4C25C-085E-4340-85A3-A5531E510DB2}">
-      <thm15:themeFamily xmlns="" xmlns:thm15="http://schemas.microsoft.com/office/thememl/2012/main" name="Office Theme" id="{62F939B6-93AF-4DB8-9C6B-D6C7DFDC589F}" vid="{4A3C46E8-61CC-4603-A589-7422A47A8E4A}"/>
+      <thm15:themeFamily xmlns:thm15="http://schemas.microsoft.com/office/thememl/2012/main" xmlns="" name="Office Theme" id="{62F939B6-93AF-4DB8-9C6B-D6C7DFDC589F}" vid="{4A3C46E8-61CC-4603-A589-7422A47A8E4A}"/>
     </a:ext>
   </a:extLst>
 </a:theme>

</xml_diff>

<commit_message>
Change line and space color on the block diagram again
</commit_message>
<xml_diff>
--- a/doc/AugRealityMidReview.pptx
+++ b/doc/AugRealityMidReview.pptx
@@ -131,7 +131,7 @@
   </p:defaultTextStyle>
   <p:extLst>
     <p:ext uri="{EFAFB233-063F-42B5-8137-9DF3F51BA10A}">
-      <p15:sldGuideLst xmlns:p15="http://schemas.microsoft.com/office/powerpoint/2012/main" xmlns="">
+      <p15:sldGuideLst xmlns="" xmlns:p15="http://schemas.microsoft.com/office/powerpoint/2012/main">
         <p15:guide id="1" orient="horz" pos="2160">
           <p15:clr>
             <a:srgbClr val="A4A3A4"/>
@@ -230,7 +230,7 @@
           <a:p>
             <a:fld id="{7A466098-8D44-47E3-A6D0-3EBDA642D1D9}" type="datetimeFigureOut">
               <a:rPr lang="en-US" smtClean="0"/>
-              <a:t>2/14/2014</a:t>
+              <a:t>2/15/2014</a:t>
             </a:fld>
             <a:endParaRPr lang="en-US"/>
           </a:p>
@@ -751,7 +751,7 @@
           <a:p>
             <a:fld id="{CC2990F0-8476-4A68-82FA-873BDD6B740E}" type="datetimeFigureOut">
               <a:rPr lang="en-US" smtClean="0"/>
-              <a:t>2/14/2014</a:t>
+              <a:t>2/15/2014</a:t>
             </a:fld>
             <a:endParaRPr lang="en-US"/>
           </a:p>
@@ -964,7 +964,7 @@
           <a:p>
             <a:fld id="{CC2990F0-8476-4A68-82FA-873BDD6B740E}" type="datetimeFigureOut">
               <a:rPr lang="en-US" smtClean="0"/>
-              <a:t>2/14/2014</a:t>
+              <a:t>2/15/2014</a:t>
             </a:fld>
             <a:endParaRPr lang="en-US"/>
           </a:p>
@@ -1231,7 +1231,7 @@
           <a:p>
             <a:fld id="{CC2990F0-8476-4A68-82FA-873BDD6B740E}" type="datetimeFigureOut">
               <a:rPr lang="en-US" smtClean="0"/>
-              <a:t>2/14/2014</a:t>
+              <a:t>2/15/2014</a:t>
             </a:fld>
             <a:endParaRPr lang="en-US"/>
           </a:p>
@@ -1483,7 +1483,7 @@
                 </a:solidFill>
               </a:rPr>
               <a:pPr/>
-              <a:t>2/14/2014</a:t>
+              <a:t>2/15/2014</a:t>
             </a:fld>
             <a:endParaRPr lang="en-US">
               <a:solidFill>
@@ -1685,7 +1685,7 @@
                 </a:solidFill>
               </a:rPr>
               <a:pPr/>
-              <a:t>2/14/2014</a:t>
+              <a:t>2/15/2014</a:t>
             </a:fld>
             <a:endParaRPr lang="en-US">
               <a:solidFill>
@@ -1963,7 +1963,7 @@
                 </a:solidFill>
               </a:rPr>
               <a:pPr/>
-              <a:t>2/14/2014</a:t>
+              <a:t>2/15/2014</a:t>
             </a:fld>
             <a:endParaRPr lang="en-US">
               <a:solidFill>
@@ -2283,7 +2283,7 @@
                 </a:solidFill>
               </a:rPr>
               <a:pPr/>
-              <a:t>2/14/2014</a:t>
+              <a:t>2/15/2014</a:t>
             </a:fld>
             <a:endParaRPr lang="en-US">
               <a:solidFill>
@@ -2737,7 +2737,7 @@
                 </a:solidFill>
               </a:rPr>
               <a:pPr/>
-              <a:t>2/14/2014</a:t>
+              <a:t>2/15/2014</a:t>
             </a:fld>
             <a:endParaRPr lang="en-US">
               <a:solidFill>
@@ -2887,7 +2887,7 @@
                 </a:solidFill>
               </a:rPr>
               <a:pPr/>
-              <a:t>2/14/2014</a:t>
+              <a:t>2/15/2014</a:t>
             </a:fld>
             <a:endParaRPr lang="en-US">
               <a:solidFill>
@@ -3014,7 +3014,7 @@
                 </a:solidFill>
               </a:rPr>
               <a:pPr/>
-              <a:t>2/14/2014</a:t>
+              <a:t>2/15/2014</a:t>
             </a:fld>
             <a:endParaRPr lang="en-US">
               <a:solidFill>
@@ -3323,7 +3323,7 @@
                 </a:solidFill>
               </a:rPr>
               <a:pPr/>
-              <a:t>2/14/2014</a:t>
+              <a:t>2/15/2014</a:t>
             </a:fld>
             <a:endParaRPr lang="en-US">
               <a:solidFill>
@@ -3495,7 +3495,7 @@
           <a:p>
             <a:fld id="{CC2990F0-8476-4A68-82FA-873BDD6B740E}" type="datetimeFigureOut">
               <a:rPr lang="en-US" smtClean="0"/>
-              <a:t>2/14/2014</a:t>
+              <a:t>2/15/2014</a:t>
             </a:fld>
             <a:endParaRPr lang="en-US"/>
           </a:p>
@@ -3780,7 +3780,7 @@
                 </a:solidFill>
               </a:rPr>
               <a:pPr/>
-              <a:t>2/14/2014</a:t>
+              <a:t>2/15/2014</a:t>
             </a:fld>
             <a:endParaRPr lang="en-US">
               <a:solidFill>
@@ -3982,7 +3982,7 @@
                 </a:solidFill>
               </a:rPr>
               <a:pPr/>
-              <a:t>2/14/2014</a:t>
+              <a:t>2/15/2014</a:t>
             </a:fld>
             <a:endParaRPr lang="en-US">
               <a:solidFill>
@@ -4194,7 +4194,7 @@
                 </a:solidFill>
               </a:rPr>
               <a:pPr/>
-              <a:t>2/14/2014</a:t>
+              <a:t>2/15/2014</a:t>
             </a:fld>
             <a:endParaRPr lang="en-US">
               <a:solidFill>
@@ -4531,7 +4531,7 @@
           <a:p>
             <a:fld id="{CC2990F0-8476-4A68-82FA-873BDD6B740E}" type="datetimeFigureOut">
               <a:rPr lang="en-US" smtClean="0"/>
-              <a:t>2/14/2014</a:t>
+              <a:t>2/15/2014</a:t>
             </a:fld>
             <a:endParaRPr lang="en-US"/>
           </a:p>
@@ -4839,7 +4839,7 @@
           <a:p>
             <a:fld id="{CC2990F0-8476-4A68-82FA-873BDD6B740E}" type="datetimeFigureOut">
               <a:rPr lang="en-US" smtClean="0"/>
-              <a:t>2/14/2014</a:t>
+              <a:t>2/15/2014</a:t>
             </a:fld>
             <a:endParaRPr lang="en-US"/>
           </a:p>
@@ -5260,7 +5260,7 @@
           <a:p>
             <a:fld id="{CC2990F0-8476-4A68-82FA-873BDD6B740E}" type="datetimeFigureOut">
               <a:rPr lang="en-US" smtClean="0"/>
-              <a:t>2/14/2014</a:t>
+              <a:t>2/15/2014</a:t>
             </a:fld>
             <a:endParaRPr lang="en-US"/>
           </a:p>
@@ -5373,7 +5373,7 @@
           <a:p>
             <a:fld id="{CC2990F0-8476-4A68-82FA-873BDD6B740E}" type="datetimeFigureOut">
               <a:rPr lang="en-US" smtClean="0"/>
-              <a:t>2/14/2014</a:t>
+              <a:t>2/15/2014</a:t>
             </a:fld>
             <a:endParaRPr lang="en-US"/>
           </a:p>
@@ -5532,7 +5532,7 @@
           <a:p>
             <a:fld id="{CC2990F0-8476-4A68-82FA-873BDD6B740E}" type="datetimeFigureOut">
               <a:rPr lang="en-US" smtClean="0"/>
-              <a:t>2/14/2014</a:t>
+              <a:t>2/15/2014</a:t>
             </a:fld>
             <a:endParaRPr lang="en-US"/>
           </a:p>
@@ -5916,7 +5916,7 @@
           <a:p>
             <a:fld id="{CC2990F0-8476-4A68-82FA-873BDD6B740E}" type="datetimeFigureOut">
               <a:rPr lang="en-US" smtClean="0"/>
-              <a:t>2/14/2014</a:t>
+              <a:t>2/15/2014</a:t>
             </a:fld>
             <a:endParaRPr lang="en-US"/>
           </a:p>
@@ -6278,7 +6278,7 @@
           <a:p>
             <a:fld id="{CC2990F0-8476-4A68-82FA-873BDD6B740E}" type="datetimeFigureOut">
               <a:rPr lang="en-US" smtClean="0"/>
-              <a:t>2/14/2014</a:t>
+              <a:t>2/15/2014</a:t>
             </a:fld>
             <a:endParaRPr lang="en-US"/>
           </a:p>
@@ -6612,7 +6612,7 @@
           <a:p>
             <a:fld id="{CC2990F0-8476-4A68-82FA-873BDD6B740E}" type="datetimeFigureOut">
               <a:rPr lang="en-US" smtClean="0"/>
-              <a:t>2/14/2014</a:t>
+              <a:t>2/15/2014</a:t>
             </a:fld>
             <a:endParaRPr lang="en-US"/>
           </a:p>
@@ -7161,7 +7161,7 @@
                 </a:solidFill>
               </a:rPr>
               <a:pPr/>
-              <a:t>2/14/2014</a:t>
+              <a:t>2/15/2014</a:t>
             </a:fld>
             <a:endParaRPr lang="en-US" smtClean="0">
               <a:solidFill>
@@ -13296,43 +13296,32 @@
       </p:grpSpPr>
       <p:pic>
         <p:nvPicPr>
-          <p:cNvPr id="1186" name="Picture 483" descr="U:\Users\Stephen\Documents\Backup\PRGM\Robotics\STM32\SeniorDesign\doc\BlockDiagram_CC.emf"/>
+          <p:cNvPr id="2" name="Picture 1"/>
           <p:cNvPicPr>
-            <a:picLocks noChangeAspect="1" noChangeArrowheads="1"/>
+            <a:picLocks noChangeAspect="1"/>
           </p:cNvPicPr>
           <p:nvPr/>
         </p:nvPicPr>
         <p:blipFill>
-          <a:blip r:embed="rId3">
+          <a:blip r:embed="rId2">
             <a:extLst>
               <a:ext uri="{28A0092B-C50C-407E-A947-70E740481C1C}">
                 <a14:useLocalDpi xmlns:a14="http://schemas.microsoft.com/office/drawing/2010/main" val="0"/>
               </a:ext>
             </a:extLst>
           </a:blip>
-          <a:srcRect/>
           <a:stretch>
             <a:fillRect/>
           </a:stretch>
         </p:blipFill>
-        <p:spPr bwMode="auto">
+        <p:spPr>
           <a:xfrm>
-            <a:off x="285750" y="539750"/>
-            <a:ext cx="8648700" cy="5778500"/>
+            <a:off x="247928" y="536250"/>
+            <a:ext cx="8648144" cy="5785500"/>
           </a:xfrm>
           <a:prstGeom prst="rect">
             <a:avLst/>
           </a:prstGeom>
-          <a:noFill/>
-          <a:extLst>
-            <a:ext uri="{909E8E84-426E-40DD-AFC4-6F175D3DCCD1}">
-              <a14:hiddenFill xmlns:a14="http://schemas.microsoft.com/office/drawing/2010/main">
-                <a:solidFill>
-                  <a:srgbClr val="FFFFFF"/>
-                </a:solidFill>
-              </a14:hiddenFill>
-            </a:ext>
-          </a:extLst>
         </p:spPr>
       </p:pic>
     </p:spTree>
@@ -14609,7 +14598,7 @@
   <a:extraClrSchemeLst/>
   <a:extLst>
     <a:ext uri="{05A4C25C-085E-4340-85A3-A5531E510DB2}">
-      <thm15:themeFamily xmlns:thm15="http://schemas.microsoft.com/office/thememl/2012/main" xmlns="" name="Office Theme" id="{62F939B6-93AF-4DB8-9C6B-D6C7DFDC589F}" vid="{4A3C46E8-61CC-4603-A589-7422A47A8E4A}"/>
+      <thm15:themeFamily xmlns="" xmlns:thm15="http://schemas.microsoft.com/office/thememl/2012/main" name="Office Theme" id="{62F939B6-93AF-4DB8-9C6B-D6C7DFDC589F}" vid="{4A3C46E8-61CC-4603-A589-7422A47A8E4A}"/>
     </a:ext>
   </a:extLst>
 </a:theme>

</xml_diff>

<commit_message>
Revise most of GH and Dr. J changes
Need:
 - picture replacements
 - timeline with larger font
 - budget audit
</commit_message>
<xml_diff>
--- a/doc/AugRealityMidReview.pptx
+++ b/doc/AugRealityMidReview.pptx
@@ -15,7 +15,7 @@
     <p:sldId id="257" r:id="rId6"/>
     <p:sldId id="275" r:id="rId7"/>
     <p:sldId id="278" r:id="rId8"/>
-    <p:sldId id="288" r:id="rId9"/>
+    <p:sldId id="292" r:id="rId9"/>
     <p:sldId id="269" r:id="rId10"/>
     <p:sldId id="280" r:id="rId11"/>
     <p:sldId id="286" r:id="rId12"/>
@@ -852,6 +852,18 @@
   <p:clrMapOvr>
     <a:masterClrMapping/>
   </p:clrMapOvr>
+  <mc:AlternateContent xmlns:mc="http://schemas.openxmlformats.org/markup-compatibility/2006" xmlns:p14="http://schemas.microsoft.com/office/powerpoint/2010/main">
+    <mc:Choice Requires="p14">
+      <p:transition p14:dur="200">
+        <p:fade/>
+      </p:transition>
+    </mc:Choice>
+    <mc:Fallback xmlns="">
+      <p:transition>
+        <p:fade/>
+      </p:transition>
+    </mc:Fallback>
+  </mc:AlternateContent>
 </p:sldLayout>
 </file>
 
@@ -1017,6 +1029,18 @@
   <p:clrMapOvr>
     <a:masterClrMapping/>
   </p:clrMapOvr>
+  <mc:AlternateContent xmlns:mc="http://schemas.openxmlformats.org/markup-compatibility/2006" xmlns:p14="http://schemas.microsoft.com/office/powerpoint/2010/main">
+    <mc:Choice Requires="p14">
+      <p:transition p14:dur="200">
+        <p:fade/>
+      </p:transition>
+    </mc:Choice>
+    <mc:Fallback xmlns="">
+      <p:transition>
+        <p:fade/>
+      </p:transition>
+    </mc:Fallback>
+  </mc:AlternateContent>
 </p:sldLayout>
 </file>
 
@@ -1292,6 +1316,18 @@
   <p:clrMapOvr>
     <a:masterClrMapping/>
   </p:clrMapOvr>
+  <mc:AlternateContent xmlns:mc="http://schemas.openxmlformats.org/markup-compatibility/2006" xmlns:p14="http://schemas.microsoft.com/office/powerpoint/2010/main">
+    <mc:Choice Requires="p14">
+      <p:transition p14:dur="200">
+        <p:fade/>
+      </p:transition>
+    </mc:Choice>
+    <mc:Fallback xmlns="">
+      <p:transition>
+        <p:fade/>
+      </p:transition>
+    </mc:Fallback>
+  </mc:AlternateContent>
 </p:sldLayout>
 </file>
 
@@ -1566,6 +1602,18 @@
   <p:clrMapOvr>
     <a:masterClrMapping/>
   </p:clrMapOvr>
+  <mc:AlternateContent xmlns:mc="http://schemas.openxmlformats.org/markup-compatibility/2006" xmlns:p14="http://schemas.microsoft.com/office/powerpoint/2010/main">
+    <mc:Choice Requires="p14">
+      <p:transition p14:dur="200">
+        <p:fade/>
+      </p:transition>
+    </mc:Choice>
+    <mc:Fallback xmlns="">
+      <p:transition>
+        <p:fade/>
+      </p:transition>
+    </mc:Fallback>
+  </mc:AlternateContent>
 </p:sldLayout>
 </file>
 
@@ -1768,6 +1816,18 @@
   <p:clrMapOvr>
     <a:masterClrMapping/>
   </p:clrMapOvr>
+  <mc:AlternateContent xmlns:mc="http://schemas.openxmlformats.org/markup-compatibility/2006" xmlns:p14="http://schemas.microsoft.com/office/powerpoint/2010/main">
+    <mc:Choice Requires="p14">
+      <p:transition p14:dur="200">
+        <p:fade/>
+      </p:transition>
+    </mc:Choice>
+    <mc:Fallback xmlns="">
+      <p:transition>
+        <p:fade/>
+      </p:transition>
+    </mc:Fallback>
+  </mc:AlternateContent>
 </p:sldLayout>
 </file>
 
@@ -2046,6 +2106,18 @@
   <p:clrMapOvr>
     <a:masterClrMapping/>
   </p:clrMapOvr>
+  <mc:AlternateContent xmlns:mc="http://schemas.openxmlformats.org/markup-compatibility/2006" xmlns:p14="http://schemas.microsoft.com/office/powerpoint/2010/main">
+    <mc:Choice Requires="p14">
+      <p:transition p14:dur="200">
+        <p:fade/>
+      </p:transition>
+    </mc:Choice>
+    <mc:Fallback xmlns="">
+      <p:transition>
+        <p:fade/>
+      </p:transition>
+    </mc:Fallback>
+  </mc:AlternateContent>
 </p:sldLayout>
 </file>
 
@@ -2366,6 +2438,18 @@
   <p:clrMapOvr>
     <a:masterClrMapping/>
   </p:clrMapOvr>
+  <mc:AlternateContent xmlns:mc="http://schemas.openxmlformats.org/markup-compatibility/2006" xmlns:p14="http://schemas.microsoft.com/office/powerpoint/2010/main">
+    <mc:Choice Requires="p14">
+      <p:transition p14:dur="200">
+        <p:fade/>
+      </p:transition>
+    </mc:Choice>
+    <mc:Fallback xmlns="">
+      <p:transition>
+        <p:fade/>
+      </p:transition>
+    </mc:Fallback>
+  </mc:AlternateContent>
 </p:sldLayout>
 </file>
 
@@ -2820,6 +2904,18 @@
   <p:clrMapOvr>
     <a:masterClrMapping/>
   </p:clrMapOvr>
+  <mc:AlternateContent xmlns:mc="http://schemas.openxmlformats.org/markup-compatibility/2006" xmlns:p14="http://schemas.microsoft.com/office/powerpoint/2010/main">
+    <mc:Choice Requires="p14">
+      <p:transition p14:dur="200">
+        <p:fade/>
+      </p:transition>
+    </mc:Choice>
+    <mc:Fallback xmlns="">
+      <p:transition>
+        <p:fade/>
+      </p:transition>
+    </mc:Fallback>
+  </mc:AlternateContent>
 </p:sldLayout>
 </file>
 
@@ -2970,6 +3066,18 @@
   <p:clrMapOvr>
     <a:masterClrMapping/>
   </p:clrMapOvr>
+  <mc:AlternateContent xmlns:mc="http://schemas.openxmlformats.org/markup-compatibility/2006" xmlns:p14="http://schemas.microsoft.com/office/powerpoint/2010/main">
+    <mc:Choice Requires="p14">
+      <p:transition p14:dur="200">
+        <p:fade/>
+      </p:transition>
+    </mc:Choice>
+    <mc:Fallback xmlns="">
+      <p:transition>
+        <p:fade/>
+      </p:transition>
+    </mc:Fallback>
+  </mc:AlternateContent>
 </p:sldLayout>
 </file>
 
@@ -3097,6 +3205,18 @@
   <p:clrMapOvr>
     <a:masterClrMapping/>
   </p:clrMapOvr>
+  <mc:AlternateContent xmlns:mc="http://schemas.openxmlformats.org/markup-compatibility/2006" xmlns:p14="http://schemas.microsoft.com/office/powerpoint/2010/main">
+    <mc:Choice Requires="p14">
+      <p:transition p14:dur="200">
+        <p:fade/>
+      </p:transition>
+    </mc:Choice>
+    <mc:Fallback xmlns="">
+      <p:transition>
+        <p:fade/>
+      </p:transition>
+    </mc:Fallback>
+  </mc:AlternateContent>
 </p:sldLayout>
 </file>
 
@@ -3406,6 +3526,18 @@
   <p:clrMapOvr>
     <a:masterClrMapping/>
   </p:clrMapOvr>
+  <mc:AlternateContent xmlns:mc="http://schemas.openxmlformats.org/markup-compatibility/2006" xmlns:p14="http://schemas.microsoft.com/office/powerpoint/2010/main">
+    <mc:Choice Requires="p14">
+      <p:transition p14:dur="200">
+        <p:fade/>
+      </p:transition>
+    </mc:Choice>
+    <mc:Fallback xmlns="">
+      <p:transition>
+        <p:fade/>
+      </p:transition>
+    </mc:Fallback>
+  </mc:AlternateContent>
 </p:sldLayout>
 </file>
 
@@ -3571,6 +3703,18 @@
   <p:clrMapOvr>
     <a:masterClrMapping/>
   </p:clrMapOvr>
+  <mc:AlternateContent xmlns:mc="http://schemas.openxmlformats.org/markup-compatibility/2006" xmlns:p14="http://schemas.microsoft.com/office/powerpoint/2010/main">
+    <mc:Choice Requires="p14">
+      <p:transition p14:dur="200">
+        <p:fade/>
+      </p:transition>
+    </mc:Choice>
+    <mc:Fallback xmlns="">
+      <p:transition>
+        <p:fade/>
+      </p:transition>
+    </mc:Fallback>
+  </mc:AlternateContent>
   <p:timing>
     <p:tnLst>
       <p:par>
@@ -3863,6 +4007,18 @@
   <p:clrMapOvr>
     <a:masterClrMapping/>
   </p:clrMapOvr>
+  <mc:AlternateContent xmlns:mc="http://schemas.openxmlformats.org/markup-compatibility/2006" xmlns:p14="http://schemas.microsoft.com/office/powerpoint/2010/main">
+    <mc:Choice Requires="p14">
+      <p:transition p14:dur="200">
+        <p:fade/>
+      </p:transition>
+    </mc:Choice>
+    <mc:Fallback xmlns="">
+      <p:transition>
+        <p:fade/>
+      </p:transition>
+    </mc:Fallback>
+  </mc:AlternateContent>
 </p:sldLayout>
 </file>
 
@@ -4065,6 +4221,18 @@
   <p:clrMapOvr>
     <a:masterClrMapping/>
   </p:clrMapOvr>
+  <mc:AlternateContent xmlns:mc="http://schemas.openxmlformats.org/markup-compatibility/2006" xmlns:p14="http://schemas.microsoft.com/office/powerpoint/2010/main">
+    <mc:Choice Requires="p14">
+      <p:transition p14:dur="200">
+        <p:fade/>
+      </p:transition>
+    </mc:Choice>
+    <mc:Fallback xmlns="">
+      <p:transition>
+        <p:fade/>
+      </p:transition>
+    </mc:Fallback>
+  </mc:AlternateContent>
 </p:sldLayout>
 </file>
 
@@ -4277,6 +4445,18 @@
   <p:clrMapOvr>
     <a:masterClrMapping/>
   </p:clrMapOvr>
+  <mc:AlternateContent xmlns:mc="http://schemas.openxmlformats.org/markup-compatibility/2006" xmlns:p14="http://schemas.microsoft.com/office/powerpoint/2010/main">
+    <mc:Choice Requires="p14">
+      <p:transition p14:dur="200">
+        <p:fade/>
+      </p:transition>
+    </mc:Choice>
+    <mc:Fallback xmlns="">
+      <p:transition>
+        <p:fade/>
+      </p:transition>
+    </mc:Fallback>
+  </mc:AlternateContent>
 </p:sldLayout>
 </file>
 
@@ -4632,6 +4812,18 @@
   <p:clrMapOvr>
     <a:masterClrMapping/>
   </p:clrMapOvr>
+  <mc:AlternateContent xmlns:mc="http://schemas.openxmlformats.org/markup-compatibility/2006" xmlns:p14="http://schemas.microsoft.com/office/powerpoint/2010/main">
+    <mc:Choice Requires="p14">
+      <p:transition p14:dur="200">
+        <p:fade/>
+      </p:transition>
+    </mc:Choice>
+    <mc:Fallback xmlns="">
+      <p:transition>
+        <p:fade/>
+      </p:transition>
+    </mc:Fallback>
+  </mc:AlternateContent>
 </p:sldLayout>
 </file>
 
@@ -4915,6 +5107,18 @@
   <p:clrMapOvr>
     <a:masterClrMapping/>
   </p:clrMapOvr>
+  <mc:AlternateContent xmlns:mc="http://schemas.openxmlformats.org/markup-compatibility/2006" xmlns:p14="http://schemas.microsoft.com/office/powerpoint/2010/main">
+    <mc:Choice Requires="p14">
+      <p:transition p14:dur="200">
+        <p:fade/>
+      </p:transition>
+    </mc:Choice>
+    <mc:Fallback xmlns="">
+      <p:transition>
+        <p:fade/>
+      </p:transition>
+    </mc:Fallback>
+  </mc:AlternateContent>
 </p:sldLayout>
 </file>
 
@@ -5336,6 +5540,18 @@
   <p:clrMapOvr>
     <a:masterClrMapping/>
   </p:clrMapOvr>
+  <mc:AlternateContent xmlns:mc="http://schemas.openxmlformats.org/markup-compatibility/2006" xmlns:p14="http://schemas.microsoft.com/office/powerpoint/2010/main">
+    <mc:Choice Requires="p14">
+      <p:transition p14:dur="200">
+        <p:fade/>
+      </p:transition>
+    </mc:Choice>
+    <mc:Fallback xmlns="">
+      <p:transition>
+        <p:fade/>
+      </p:transition>
+    </mc:Fallback>
+  </mc:AlternateContent>
 </p:sldLayout>
 </file>
 
@@ -5449,6 +5665,18 @@
   <p:clrMapOvr>
     <a:masterClrMapping/>
   </p:clrMapOvr>
+  <mc:AlternateContent xmlns:mc="http://schemas.openxmlformats.org/markup-compatibility/2006" xmlns:p14="http://schemas.microsoft.com/office/powerpoint/2010/main">
+    <mc:Choice Requires="p14">
+      <p:transition p14:dur="200">
+        <p:fade/>
+      </p:transition>
+    </mc:Choice>
+    <mc:Fallback xmlns="">
+      <p:transition>
+        <p:fade/>
+      </p:transition>
+    </mc:Fallback>
+  </mc:AlternateContent>
 </p:sldLayout>
 </file>
 
@@ -5585,6 +5813,18 @@
   <p:clrMapOvr>
     <a:masterClrMapping/>
   </p:clrMapOvr>
+  <mc:AlternateContent xmlns:mc="http://schemas.openxmlformats.org/markup-compatibility/2006" xmlns:p14="http://schemas.microsoft.com/office/powerpoint/2010/main">
+    <mc:Choice Requires="p14">
+      <p:transition p14:dur="200">
+        <p:fade/>
+      </p:transition>
+    </mc:Choice>
+    <mc:Fallback xmlns="">
+      <p:transition>
+        <p:fade/>
+      </p:transition>
+    </mc:Fallback>
+  </mc:AlternateContent>
 </p:sldLayout>
 </file>
 
@@ -6013,6 +6253,18 @@
   <p:clrMapOvr>
     <a:overrideClrMapping bg1="lt1" tx1="dk1" bg2="lt2" tx2="dk2" accent1="accent1" accent2="accent2" accent3="accent3" accent4="accent4" accent5="accent5" accent6="accent6" hlink="hlink" folHlink="folHlink"/>
   </p:clrMapOvr>
+  <mc:AlternateContent xmlns:mc="http://schemas.openxmlformats.org/markup-compatibility/2006" xmlns:p14="http://schemas.microsoft.com/office/powerpoint/2010/main">
+    <mc:Choice Requires="p14">
+      <p:transition p14:dur="200">
+        <p:fade/>
+      </p:transition>
+    </mc:Choice>
+    <mc:Fallback xmlns="">
+      <p:transition>
+        <p:fade/>
+      </p:transition>
+    </mc:Fallback>
+  </mc:AlternateContent>
 </p:sldLayout>
 </file>
 
@@ -6367,6 +6619,18 @@
   <p:clrMapOvr>
     <a:overrideClrMapping bg1="dk1" tx1="lt1" bg2="dk2" tx2="lt2" accent1="accent1" accent2="accent2" accent3="accent3" accent4="accent4" accent5="accent5" accent6="accent6" hlink="hlink" folHlink="folHlink"/>
   </p:clrMapOvr>
+  <mc:AlternateContent xmlns:mc="http://schemas.openxmlformats.org/markup-compatibility/2006" xmlns:p14="http://schemas.microsoft.com/office/powerpoint/2010/main">
+    <mc:Choice Requires="p14">
+      <p:transition p14:dur="200">
+        <p:fade/>
+      </p:transition>
+    </mc:Choice>
+    <mc:Fallback xmlns="">
+      <p:transition>
+        <p:fade/>
+      </p:transition>
+    </mc:Fallback>
+  </mc:AlternateContent>
 </p:sldLayout>
 </file>
 
@@ -6711,6 +6975,18 @@
     <p:sldLayoutId id="2147483706" r:id="rId10"/>
     <p:sldLayoutId id="2147483707" r:id="rId11"/>
   </p:sldLayoutIdLst>
+  <mc:AlternateContent xmlns:mc="http://schemas.openxmlformats.org/markup-compatibility/2006" xmlns:p14="http://schemas.microsoft.com/office/powerpoint/2010/main">
+    <mc:Choice Requires="p14">
+      <p:transition p14:dur="200">
+        <p:fade/>
+      </p:transition>
+    </mc:Choice>
+    <mc:Fallback xmlns="">
+      <p:transition>
+        <p:fade/>
+      </p:transition>
+    </mc:Fallback>
+  </mc:AlternateContent>
   <p:timing>
     <p:tnLst>
       <p:par>
@@ -7291,6 +7567,18 @@
     <p:sldLayoutId id="2147483718" r:id="rId10"/>
     <p:sldLayoutId id="2147483719" r:id="rId11"/>
   </p:sldLayoutIdLst>
+  <mc:AlternateContent xmlns:mc="http://schemas.openxmlformats.org/markup-compatibility/2006" xmlns:p14="http://schemas.microsoft.com/office/powerpoint/2010/main">
+    <mc:Choice Requires="p14">
+      <p:transition p14:dur="200">
+        <p:fade/>
+      </p:transition>
+    </mc:Choice>
+    <mc:Fallback xmlns="">
+      <p:transition>
+        <p:fade/>
+      </p:transition>
+    </mc:Fallback>
+  </mc:AlternateContent>
   <p:txStyles>
     <p:titleStyle>
       <a:lvl1pPr algn="ctr" defTabSz="914400" rtl="0" eaLnBrk="1" latinLnBrk="0" hangingPunct="1">
@@ -7586,7 +7874,7 @@
           <a:p>
             <a:r>
               <a:rPr lang="en-US" sz="1600" dirty="0" smtClean="0"/>
-              <a:t>Stephen Ellis</a:t>
+              <a:t>Steven Ellis</a:t>
             </a:r>
           </a:p>
           <a:p>
@@ -7691,7 +7979,7 @@
         </p:nvSpPr>
         <p:spPr>
           <a:xfrm>
-            <a:off x="5093293" y="5976611"/>
+            <a:off x="5093293" y="5953474"/>
             <a:ext cx="990600" cy="646331"/>
           </a:xfrm>
           <a:prstGeom prst="rect">
@@ -7741,7 +8029,7 @@
         </p:nvSpPr>
         <p:spPr>
           <a:xfrm>
-            <a:off x="1295400" y="5966737"/>
+            <a:off x="1295400" y="5943600"/>
             <a:ext cx="990600" cy="646331"/>
           </a:xfrm>
           <a:prstGeom prst="rect">
@@ -7786,7 +8074,7 @@
         </p:nvSpPr>
         <p:spPr>
           <a:xfrm>
-            <a:off x="3048000" y="5976612"/>
+            <a:off x="3048000" y="5953475"/>
             <a:ext cx="1268963" cy="646331"/>
           </a:xfrm>
           <a:prstGeom prst="rect">
@@ -7838,6 +8126,18 @@
   <p:clrMapOvr>
     <a:masterClrMapping/>
   </p:clrMapOvr>
+  <mc:AlternateContent xmlns:mc="http://schemas.openxmlformats.org/markup-compatibility/2006" xmlns:p14="http://schemas.microsoft.com/office/powerpoint/2010/main">
+    <mc:Choice Requires="p14">
+      <p:transition p14:dur="200">
+        <p:fade/>
+      </p:transition>
+    </mc:Choice>
+    <mc:Fallback xmlns="">
+      <p:transition>
+        <p:fade/>
+      </p:transition>
+    </mc:Fallback>
+  </mc:AlternateContent>
   <p:timing>
     <p:tnLst>
       <p:par>
@@ -7898,14 +8198,14 @@
             <p:ph idx="1"/>
             <p:extLst>
               <p:ext uri="{D42A27DB-BD31-4B8C-83A1-F6EECF244321}">
-                <p14:modId xmlns:p14="http://schemas.microsoft.com/office/powerpoint/2010/main" val="1173024867"/>
+                <p14:modId xmlns:p14="http://schemas.microsoft.com/office/powerpoint/2010/main" val="3378571874"/>
               </p:ext>
             </p:extLst>
           </p:nvPr>
         </p:nvGraphicFramePr>
         <p:xfrm>
-          <a:off x="152400" y="1173729"/>
-          <a:ext cx="8821039" cy="5166111"/>
+          <a:off x="228600" y="1371600"/>
+          <a:ext cx="8686800" cy="3962400"/>
         </p:xfrm>
         <a:graphic>
           <a:graphicData uri="http://schemas.openxmlformats.org/drawingml/2006/table">
@@ -7914,10 +8214,10 @@
                 <a:tableStyleId>{5C22544A-7EE6-4342-B048-85BDC9FD1C3A}</a:tableStyleId>
               </a:tblPr>
               <a:tblGrid>
-                <a:gridCol w="1905000"/>
-                <a:gridCol w="1929447"/>
-                <a:gridCol w="2566353"/>
-                <a:gridCol w="2420239"/>
+                <a:gridCol w="2057400"/>
+                <a:gridCol w="2133600"/>
+                <a:gridCol w="2362200"/>
+                <a:gridCol w="2133600"/>
               </a:tblGrid>
               <a:tr h="209488">
                 <a:tc>
@@ -7934,7 +8234,7 @@
                         </a:spcAft>
                       </a:pPr>
                       <a:r>
-                        <a:rPr lang="en-US" sz="1600" dirty="0">
+                        <a:rPr lang="en-US" sz="1600" dirty="0" smtClean="0">
                           <a:effectLst/>
                         </a:rPr>
                         <a:t>Metric</a:t>
@@ -8023,24 +8323,24 @@
                       <a:r>
                         <a:rPr lang="en-US" sz="1600" dirty="0" smtClean="0">
                           <a:effectLst/>
-                          <a:latin typeface="Calibri" panose="020F0502020204030204" pitchFamily="34" charset="0"/>
+                          <a:latin typeface="+mn-lt"/>
                           <a:ea typeface="Calibri" panose="020F0502020204030204" pitchFamily="34" charset="0"/>
                           <a:cs typeface="Times New Roman" panose="02020603050405020304" pitchFamily="18" charset="0"/>
                         </a:rPr>
-                        <a:t>Phase 2 (Current</a:t>
+                        <a:t>Phase 2 (</a:t>
                       </a:r>
                       <a:r>
                         <a:rPr lang="en-US" sz="1600" baseline="0" dirty="0" smtClean="0">
                           <a:effectLst/>
-                          <a:latin typeface="Calibri" panose="020F0502020204030204" pitchFamily="34" charset="0"/>
+                          <a:latin typeface="+mn-lt"/>
                           <a:ea typeface="Calibri" panose="020F0502020204030204" pitchFamily="34" charset="0"/>
                           <a:cs typeface="Times New Roman" panose="02020603050405020304" pitchFamily="18" charset="0"/>
                         </a:rPr>
-                        <a:t> Estimate)</a:t>
+                        <a:t>Estimate)</a:t>
                       </a:r>
                       <a:endParaRPr lang="en-US" sz="1600" dirty="0">
                         <a:effectLst/>
-                        <a:latin typeface="Calibri" panose="020F0502020204030204" pitchFamily="34" charset="0"/>
+                        <a:latin typeface="+mn-lt"/>
                         <a:ea typeface="Calibri" panose="020F0502020204030204" pitchFamily="34" charset="0"/>
                         <a:cs typeface="Times New Roman" panose="02020603050405020304" pitchFamily="18" charset="0"/>
                       </a:endParaRPr>
@@ -8064,12 +8364,12 @@
                         </a:spcAft>
                       </a:pPr>
                       <a:r>
-                        <a:rPr lang="en-US" sz="1800">
+                        <a:rPr lang="en-US" sz="1800" dirty="0">
                           <a:effectLst/>
                         </a:rPr>
                         <a:t>Mass</a:t>
                       </a:r>
-                      <a:endParaRPr lang="en-US" sz="1800">
+                      <a:endParaRPr lang="en-US" sz="1800" dirty="0">
                         <a:effectLst/>
                         <a:latin typeface="Calibri" panose="020F0502020204030204" pitchFamily="34" charset="0"/>
                         <a:ea typeface="Calibri" panose="020F0502020204030204" pitchFamily="34" charset="0"/>
@@ -8369,7 +8669,7 @@
                   <a:tcPr marL="68580" marR="68580" marT="0" marB="0"/>
                 </a:tc>
               </a:tr>
-              <a:tr h="609600">
+              <a:tr h="381000">
                 <a:tc>
                   <a:txBody>
                     <a:bodyPr/>
@@ -8403,7 +8703,15 @@
                           <a:latin typeface="+mj-lt"/>
                           <a:cs typeface="Times New Roman" panose="02020603050405020304" pitchFamily="18" charset="0"/>
                         </a:rPr>
-                        <a:t>Accuracy</a:t>
+                        <a:t>Precision</a:t>
+                      </a:r>
+                      <a:r>
+                        <a:rPr lang="en-US" sz="1200" b="1" baseline="0" dirty="0" smtClean="0">
+                          <a:effectLst/>
+                          <a:latin typeface="+mj-lt"/>
+                          <a:cs typeface="Times New Roman" panose="02020603050405020304" pitchFamily="18" charset="0"/>
+                        </a:rPr>
+                        <a:t>*</a:t>
                       </a:r>
                       <a:endParaRPr lang="en-US" sz="1800" b="1" dirty="0" smtClean="0">
                         <a:effectLst/>
@@ -8433,7 +8741,7 @@
                           <a:ea typeface="Calibri" panose="020F0502020204030204" pitchFamily="34" charset="0"/>
                           <a:cs typeface="Times New Roman" panose="02020603050405020304" pitchFamily="18" charset="0"/>
                         </a:rPr>
-                        <a:t>TODO</a:t>
+                        <a:t>~1.5 m</a:t>
                       </a:r>
                       <a:endParaRPr lang="en-US" sz="1800" dirty="0">
                         <a:effectLst/>
@@ -8572,7 +8880,7 @@
                           <a:ea typeface="Calibri" panose="020F0502020204030204" pitchFamily="34" charset="0"/>
                           <a:cs typeface="Times New Roman" panose="02020603050405020304" pitchFamily="18" charset="0"/>
                         </a:rPr>
-                        <a:t>250 m</a:t>
+                        <a:t>200 m</a:t>
                       </a:r>
                     </a:p>
                   </a:txBody>
@@ -8595,7 +8903,19 @@
                         <a:rPr lang="en-US" sz="1800" dirty="0">
                           <a:effectLst/>
                         </a:rPr>
-                        <a:t>80 m range, line of sight</a:t>
+                        <a:t>80 </a:t>
+                      </a:r>
+                      <a:r>
+                        <a:rPr lang="en-US" sz="1800" dirty="0" smtClean="0">
+                          <a:effectLst/>
+                        </a:rPr>
+                        <a:t>m, </a:t>
+                      </a:r>
+                      <a:r>
+                        <a:rPr lang="en-US" sz="1800" dirty="0">
+                          <a:effectLst/>
+                        </a:rPr>
+                        <a:t>line of sight</a:t>
                       </a:r>
                       <a:endParaRPr lang="en-US" sz="1800" dirty="0">
                         <a:effectLst/>
@@ -8627,7 +8947,7 @@
                           <a:ea typeface="Calibri" panose="020F0502020204030204" pitchFamily="34" charset="0"/>
                           <a:cs typeface="Times New Roman" panose="02020603050405020304" pitchFamily="18" charset="0"/>
                         </a:rPr>
-                        <a:t>TODO</a:t>
+                        <a:t>200 m</a:t>
                       </a:r>
                       <a:endParaRPr lang="en-US" sz="1800" dirty="0">
                         <a:effectLst/>
@@ -8640,7 +8960,7 @@
                   <a:tcPr marL="68580" marR="68580" marT="0" marB="0"/>
                 </a:tc>
               </a:tr>
-              <a:tr h="609600">
+              <a:tr h="335529">
                 <a:tc>
                   <a:txBody>
                     <a:bodyPr/>
@@ -8672,31 +8992,6 @@
                         </a:rPr>
                         <a:t> Refresh</a:t>
                       </a:r>
-                    </a:p>
-                    <a:p>
-                      <a:pPr marL="0" marR="0" algn="r">
-                        <a:spcBef>
-                          <a:spcPts val="0"/>
-                        </a:spcBef>
-                        <a:spcAft>
-                          <a:spcPts val="0"/>
-                        </a:spcAft>
-                      </a:pPr>
-                      <a:r>
-                        <a:rPr lang="en-US" sz="1800" baseline="0" dirty="0" smtClean="0">
-                          <a:effectLst/>
-                          <a:latin typeface="+mn-lt"/>
-                          <a:ea typeface="+mn-ea"/>
-                          <a:cs typeface="+mn-cs"/>
-                        </a:rPr>
-                        <a:t>Rate</a:t>
-                      </a:r>
-                      <a:endParaRPr lang="en-US" sz="1800" dirty="0">
-                        <a:effectLst/>
-                        <a:latin typeface="Calibri" panose="020F0502020204030204" pitchFamily="34" charset="0"/>
-                        <a:ea typeface="Calibri" panose="020F0502020204030204" pitchFamily="34" charset="0"/>
-                        <a:cs typeface="Times New Roman" panose="02020603050405020304" pitchFamily="18" charset="0"/>
-                      </a:endParaRPr>
                     </a:p>
                   </a:txBody>
                   <a:tcPr marL="68580" marR="68580" marT="0" marB="0"/>
@@ -8801,7 +9096,7 @@
                   <a:tcPr marL="68580" marR="68580" marT="0" marB="0"/>
                 </a:tc>
               </a:tr>
-              <a:tr h="609600">
+              <a:tr h="381000">
                 <a:tc>
                   <a:txBody>
                     <a:bodyPr/>
@@ -8823,15 +9118,6 @@
                           <a:cs typeface="Times New Roman" panose="02020603050405020304" pitchFamily="18" charset="0"/>
                         </a:rPr>
                         <a:t>Network Refresh</a:t>
-                      </a:r>
-                      <a:r>
-                        <a:rPr lang="en-US" sz="1800" b="1" baseline="0" dirty="0" smtClean="0">
-                          <a:effectLst/>
-                          <a:latin typeface="+mj-lt"/>
-                          <a:ea typeface="Calibri" panose="020F0502020204030204" pitchFamily="34" charset="0"/>
-                          <a:cs typeface="Times New Roman" panose="02020603050405020304" pitchFamily="18" charset="0"/>
-                        </a:rPr>
-                        <a:t> Rate</a:t>
                       </a:r>
                       <a:endParaRPr lang="en-US" sz="1800" b="1" dirty="0">
                         <a:effectLst/>
@@ -8940,7 +9226,7 @@
                   <a:tcPr marL="68580" marR="68580" marT="0" marB="0"/>
                 </a:tc>
               </a:tr>
-              <a:tr h="883920">
+              <a:tr h="609600">
                 <a:tc>
                   <a:txBody>
                     <a:bodyPr/>
@@ -9016,10 +9302,40 @@
                         </a:spcAft>
                       </a:pPr>
                       <a:r>
+                        <a:rPr lang="en-US" sz="1800" dirty="0" smtClean="0">
+                          <a:effectLst/>
+                        </a:rPr>
+                        <a:t>User </a:t>
+                      </a:r>
+                      <a:r>
                         <a:rPr lang="en-US" sz="1800" dirty="0">
                           <a:effectLst/>
                         </a:rPr>
-                        <a:t>End user can start up and use device without a technician</a:t>
+                        <a:t>can start </a:t>
+                      </a:r>
+                      <a:r>
+                        <a:rPr lang="en-US" sz="1800" dirty="0" smtClean="0">
+                          <a:effectLst/>
+                        </a:rPr>
+                        <a:t>and </a:t>
+                      </a:r>
+                      <a:r>
+                        <a:rPr lang="en-US" sz="1800" dirty="0">
+                          <a:effectLst/>
+                        </a:rPr>
+                        <a:t>use </a:t>
+                      </a:r>
+                      <a:r>
+                        <a:rPr lang="en-US" sz="1800" dirty="0" smtClean="0">
+                          <a:effectLst/>
+                        </a:rPr>
+                        <a:t>without </a:t>
+                      </a:r>
+                      <a:r>
+                        <a:rPr lang="en-US" sz="1800" dirty="0">
+                          <a:effectLst/>
+                        </a:rPr>
+                        <a:t>a technician</a:t>
                       </a:r>
                       <a:endParaRPr lang="en-US" sz="1800" dirty="0">
                         <a:effectLst/>
@@ -9064,7 +9380,7 @@
                   <a:tcPr marL="68580" marR="68580" marT="0" marB="0"/>
                 </a:tc>
               </a:tr>
-              <a:tr h="883920">
+              <a:tr h="685800">
                 <a:tc>
                   <a:txBody>
                     <a:bodyPr/>
@@ -9079,15 +9395,15 @@
                         </a:spcAft>
                       </a:pPr>
                       <a:r>
-                        <a:rPr lang="en-US" sz="2000" dirty="0" smtClean="0">
+                        <a:rPr lang="en-US" sz="1800" dirty="0" smtClean="0">
                           <a:effectLst/>
                           <a:latin typeface="+mn-lt"/>
                           <a:ea typeface="Calibri" panose="020F0502020204030204" pitchFamily="34" charset="0"/>
                           <a:cs typeface="Times New Roman" panose="02020603050405020304" pitchFamily="18" charset="0"/>
                         </a:rPr>
-                        <a:t># of Simultaneous</a:t>
+                        <a:t>Simultaneous Device Limit</a:t>
                       </a:r>
-                      <a:endParaRPr lang="en-US" sz="2000" dirty="0">
+                      <a:endParaRPr lang="en-US" sz="1800" dirty="0">
                         <a:effectLst/>
                         <a:latin typeface="+mn-lt"/>
                         <a:ea typeface="Calibri" panose="020F0502020204030204" pitchFamily="34" charset="0"/>
@@ -9143,26 +9459,17 @@
                         </a:spcAft>
                       </a:pPr>
                       <a:r>
-                        <a:rPr lang="en-US" sz="1800" dirty="0" smtClean="0">
+                        <a:rPr lang="en-US" sz="1800" b="0" dirty="0" smtClean="0">
                           <a:effectLst/>
-                          <a:latin typeface="Calibri" panose="020F0502020204030204" pitchFamily="34" charset="0"/>
+                          <a:latin typeface="+mn-lt"/>
                           <a:ea typeface="Calibri" panose="020F0502020204030204" pitchFamily="34" charset="0"/>
                           <a:cs typeface="Times New Roman" panose="02020603050405020304" pitchFamily="18" charset="0"/>
                         </a:rPr>
-                        <a:t>&gt;</a:t>
+                        <a:t>16</a:t>
                       </a:r>
-                      <a:r>
-                        <a:rPr lang="en-US" sz="1800" baseline="0" dirty="0" smtClean="0">
-                          <a:effectLst/>
-                          <a:latin typeface="Calibri" panose="020F0502020204030204" pitchFamily="34" charset="0"/>
-                          <a:ea typeface="Calibri" panose="020F0502020204030204" pitchFamily="34" charset="0"/>
-                          <a:cs typeface="Times New Roman" panose="02020603050405020304" pitchFamily="18" charset="0"/>
-                        </a:rPr>
-                        <a:t> Phase 1</a:t>
-                      </a:r>
-                      <a:endParaRPr lang="en-US" sz="1800" dirty="0">
+                      <a:endParaRPr lang="en-US" sz="1800" b="0" dirty="0">
                         <a:effectLst/>
-                        <a:latin typeface="Calibri" panose="020F0502020204030204" pitchFamily="34" charset="0"/>
+                        <a:latin typeface="+mn-lt"/>
                         <a:ea typeface="Calibri" panose="020F0502020204030204" pitchFamily="34" charset="0"/>
                         <a:cs typeface="Times New Roman" panose="02020603050405020304" pitchFamily="18" charset="0"/>
                       </a:endParaRPr>
@@ -9207,6 +9514,37 @@
           </a:graphicData>
         </a:graphic>
       </p:graphicFrame>
+      <p:sp>
+        <p:nvSpPr>
+          <p:cNvPr id="2" name="TextBox 1"/>
+          <p:cNvSpPr txBox="1"/>
+          <p:nvPr/>
+        </p:nvSpPr>
+        <p:spPr>
+          <a:xfrm>
+            <a:off x="609600" y="5410200"/>
+            <a:ext cx="7620000" cy="830997"/>
+          </a:xfrm>
+          <a:prstGeom prst="rect">
+            <a:avLst/>
+          </a:prstGeom>
+          <a:noFill/>
+        </p:spPr>
+        <p:txBody>
+          <a:bodyPr wrap="square" rtlCol="0">
+            <a:spAutoFit/>
+          </a:bodyPr>
+          <a:lstStyle/>
+          <a:p>
+            <a:pPr algn="ctr"/>
+            <a:r>
+              <a:rPr lang="en-US" sz="2400" dirty="0" smtClean="0"/>
+              <a:t>User review process for subjective measures like comfort, eye strain, and response time</a:t>
+            </a:r>
+            <a:endParaRPr lang="en-US" sz="2400" dirty="0"/>
+          </a:p>
+        </p:txBody>
+      </p:sp>
     </p:spTree>
     <p:extLst>
       <p:ext uri="{BB962C8B-B14F-4D97-AF65-F5344CB8AC3E}">
@@ -9217,6 +9555,18 @@
   <p:clrMapOvr>
     <a:masterClrMapping/>
   </p:clrMapOvr>
+  <mc:AlternateContent xmlns:mc="http://schemas.openxmlformats.org/markup-compatibility/2006" xmlns:p14="http://schemas.microsoft.com/office/powerpoint/2010/main">
+    <mc:Choice Requires="p14">
+      <p:transition p14:dur="200">
+        <p:fade/>
+      </p:transition>
+    </mc:Choice>
+    <mc:Fallback xmlns="">
+      <p:transition>
+        <p:fade/>
+      </p:transition>
+    </mc:Fallback>
+  </mc:AlternateContent>
   <p:timing>
     <p:tnLst>
       <p:par>
@@ -9475,6 +9825,18 @@
   <p:clrMapOvr>
     <a:masterClrMapping/>
   </p:clrMapOvr>
+  <mc:AlternateContent xmlns:mc="http://schemas.openxmlformats.org/markup-compatibility/2006" xmlns:p14="http://schemas.microsoft.com/office/powerpoint/2010/main">
+    <mc:Choice Requires="p14">
+      <p:transition p14:dur="200">
+        <p:fade/>
+      </p:transition>
+    </mc:Choice>
+    <mc:Fallback xmlns="">
+      <p:transition>
+        <p:fade/>
+      </p:transition>
+    </mc:Fallback>
+  </mc:AlternateContent>
   <p:timing>
     <p:tnLst>
       <p:par>
@@ -9546,6 +9908,13 @@
             </a:r>
           </a:p>
           <a:p>
+            <a:pPr lvl="1"/>
+            <a:r>
+              <a:rPr lang="en-US" sz="2000" dirty="0" smtClean="0"/>
+              <a:t>Image perceptible to both eyes</a:t>
+            </a:r>
+          </a:p>
+          <a:p>
             <a:r>
               <a:rPr lang="en-US" sz="2400" dirty="0" smtClean="0"/>
               <a:t>User head and position tracking</a:t>
@@ -9612,6 +9981,18 @@
   <p:clrMapOvr>
     <a:masterClrMapping/>
   </p:clrMapOvr>
+  <mc:AlternateContent xmlns:mc="http://schemas.openxmlformats.org/markup-compatibility/2006" xmlns:p14="http://schemas.microsoft.com/office/powerpoint/2010/main">
+    <mc:Choice Requires="p14">
+      <p:transition p14:dur="200">
+        <p:fade/>
+      </p:transition>
+    </mc:Choice>
+    <mc:Fallback xmlns="">
+      <p:transition>
+        <p:fade/>
+      </p:transition>
+    </mc:Fallback>
+  </mc:AlternateContent>
   <p:timing>
     <p:tnLst>
       <p:par>
@@ -9704,6 +10085,18 @@
   <p:clrMapOvr>
     <a:masterClrMapping/>
   </p:clrMapOvr>
+  <mc:AlternateContent xmlns:mc="http://schemas.openxmlformats.org/markup-compatibility/2006" xmlns:p14="http://schemas.microsoft.com/office/powerpoint/2010/main">
+    <mc:Choice Requires="p14">
+      <p:transition p14:dur="200">
+        <p:fade/>
+      </p:transition>
+    </mc:Choice>
+    <mc:Fallback xmlns="">
+      <p:transition>
+        <p:fade/>
+      </p:transition>
+    </mc:Fallback>
+  </mc:AlternateContent>
   <p:timing>
     <p:tnLst>
       <p:par>
@@ -9792,6 +10185,18 @@
   <p:clrMapOvr>
     <a:masterClrMapping/>
   </p:clrMapOvr>
+  <mc:AlternateContent xmlns:mc="http://schemas.openxmlformats.org/markup-compatibility/2006" xmlns:p14="http://schemas.microsoft.com/office/powerpoint/2010/main">
+    <mc:Choice Requires="p14">
+      <p:transition p14:dur="200">
+        <p:fade/>
+      </p:transition>
+    </mc:Choice>
+    <mc:Fallback xmlns="">
+      <p:transition>
+        <p:fade/>
+      </p:transition>
+    </mc:Fallback>
+  </mc:AlternateContent>
   <p:timing>
     <p:tnLst>
       <p:par>
@@ -9880,6 +10285,18 @@
   <p:clrMapOvr>
     <a:masterClrMapping/>
   </p:clrMapOvr>
+  <mc:AlternateContent xmlns:mc="http://schemas.openxmlformats.org/markup-compatibility/2006" xmlns:p14="http://schemas.microsoft.com/office/powerpoint/2010/main">
+    <mc:Choice Requires="p14">
+      <p:transition p14:dur="200">
+        <p:fade/>
+      </p:transition>
+    </mc:Choice>
+    <mc:Fallback xmlns="">
+      <p:transition>
+        <p:fade/>
+      </p:transition>
+    </mc:Fallback>
+  </mc:AlternateContent>
   <p:timing>
     <p:tnLst>
       <p:par>
@@ -9940,14 +10357,14 @@
             <p:ph idx="1"/>
             <p:extLst>
               <p:ext uri="{D42A27DB-BD31-4B8C-83A1-F6EECF244321}">
-                <p14:modId xmlns:p14="http://schemas.microsoft.com/office/powerpoint/2010/main" val="1485766992"/>
+                <p14:modId xmlns:p14="http://schemas.microsoft.com/office/powerpoint/2010/main" val="3223289073"/>
               </p:ext>
             </p:extLst>
           </p:nvPr>
         </p:nvGraphicFramePr>
         <p:xfrm>
-          <a:off x="152400" y="1371599"/>
-          <a:ext cx="5212116" cy="4270000"/>
+          <a:off x="304801" y="1447800"/>
+          <a:ext cx="8610599" cy="5029200"/>
         </p:xfrm>
         <a:graphic>
           <a:graphicData uri="http://schemas.openxmlformats.org/drawingml/2006/table">
@@ -9956,11 +10373,11 @@
                 <a:tableStyleId>{5C22544A-7EE6-4342-B048-85BDC9FD1C3A}</a:tableStyleId>
               </a:tblPr>
               <a:tblGrid>
-                <a:gridCol w="1556019"/>
-                <a:gridCol w="1015583"/>
-                <a:gridCol w="928532"/>
-                <a:gridCol w="928532"/>
-                <a:gridCol w="783450"/>
+                <a:gridCol w="2570598"/>
+                <a:gridCol w="1677779"/>
+                <a:gridCol w="1533967"/>
+                <a:gridCol w="1533967"/>
+                <a:gridCol w="1294288"/>
               </a:tblGrid>
               <a:tr h="280000">
                 <a:tc>
@@ -9970,12 +10387,12 @@
                     <a:p>
                       <a:pPr algn="l" fontAlgn="b"/>
                       <a:r>
-                        <a:rPr lang="en-US" sz="1100" u="none" strike="noStrike" dirty="0">
+                        <a:rPr lang="en-US" sz="2000" u="none" strike="noStrike" dirty="0">
                           <a:effectLst/>
                         </a:rPr>
                         <a:t>Name</a:t>
                       </a:r>
-                      <a:endParaRPr lang="en-US" sz="1100" b="1" i="0" u="none" strike="noStrike" dirty="0">
+                      <a:endParaRPr lang="en-US" sz="2000" b="1" i="0" u="none" strike="noStrike" dirty="0">
                         <a:solidFill>
                           <a:srgbClr val="000000"/>
                         </a:solidFill>
@@ -9993,12 +10410,12 @@
                     <a:p>
                       <a:pPr algn="l" fontAlgn="b"/>
                       <a:r>
-                        <a:rPr lang="en-US" sz="1100" u="none" strike="noStrike" dirty="0">
+                        <a:rPr lang="en-US" sz="2000" u="none" strike="noStrike" dirty="0">
                           <a:effectLst/>
                         </a:rPr>
                         <a:t>Vendor</a:t>
                       </a:r>
-                      <a:endParaRPr lang="en-US" sz="1100" b="1" i="0" u="none" strike="noStrike" dirty="0">
+                      <a:endParaRPr lang="en-US" sz="2000" b="1" i="0" u="none" strike="noStrike" dirty="0">
                         <a:solidFill>
                           <a:srgbClr val="000000"/>
                         </a:solidFill>
@@ -10016,12 +10433,12 @@
                     <a:p>
                       <a:pPr algn="l" fontAlgn="b"/>
                       <a:r>
-                        <a:rPr lang="en-US" sz="1100" u="none" strike="noStrike">
+                        <a:rPr lang="en-US" sz="2000" u="none" strike="noStrike" dirty="0">
                           <a:effectLst/>
                         </a:rPr>
                         <a:t>Unit Price</a:t>
                       </a:r>
-                      <a:endParaRPr lang="en-US" sz="1100" b="1" i="0" u="none" strike="noStrike">
+                      <a:endParaRPr lang="en-US" sz="2000" b="1" i="0" u="none" strike="noStrike" dirty="0">
                         <a:solidFill>
                           <a:srgbClr val="000000"/>
                         </a:solidFill>
@@ -10039,12 +10456,12 @@
                     <a:p>
                       <a:pPr algn="l" fontAlgn="b"/>
                       <a:r>
-                        <a:rPr lang="en-US" sz="1100" u="none" strike="noStrike" dirty="0">
+                        <a:rPr lang="en-US" sz="2000" u="none" strike="noStrike" dirty="0">
                           <a:effectLst/>
                         </a:rPr>
                         <a:t>Quantity</a:t>
                       </a:r>
-                      <a:endParaRPr lang="en-US" sz="1100" b="1" i="0" u="none" strike="noStrike" dirty="0">
+                      <a:endParaRPr lang="en-US" sz="2000" b="1" i="0" u="none" strike="noStrike" dirty="0">
                         <a:solidFill>
                           <a:srgbClr val="000000"/>
                         </a:solidFill>
@@ -10062,12 +10479,12 @@
                     <a:p>
                       <a:pPr algn="l" fontAlgn="b"/>
                       <a:r>
-                        <a:rPr lang="en-US" sz="1100" u="none" strike="noStrike">
+                        <a:rPr lang="en-US" sz="2000" u="none" strike="noStrike" dirty="0">
                           <a:effectLst/>
                         </a:rPr>
                         <a:t>Price</a:t>
                       </a:r>
-                      <a:endParaRPr lang="en-US" sz="1100" b="1" i="0" u="none" strike="noStrike">
+                      <a:endParaRPr lang="en-US" sz="2000" b="1" i="0" u="none" strike="noStrike" dirty="0">
                         <a:solidFill>
                           <a:srgbClr val="000000"/>
                         </a:solidFill>
@@ -10087,12 +10504,12 @@
                     <a:p>
                       <a:pPr algn="l" fontAlgn="b"/>
                       <a:r>
-                        <a:rPr lang="en-US" sz="1100" u="none" strike="noStrike">
+                        <a:rPr lang="en-US" sz="2000" u="none" strike="noStrike">
                           <a:effectLst/>
                         </a:rPr>
                         <a:t>Battery</a:t>
                       </a:r>
-                      <a:endParaRPr lang="en-US" sz="1100" b="0" i="0" u="none" strike="noStrike">
+                      <a:endParaRPr lang="en-US" sz="2000" b="0" i="0" u="none" strike="noStrike">
                         <a:solidFill>
                           <a:srgbClr val="000000"/>
                         </a:solidFill>
@@ -10110,12 +10527,12 @@
                     <a:p>
                       <a:pPr algn="l" fontAlgn="b"/>
                       <a:r>
-                        <a:rPr lang="en-US" sz="1100" u="none" strike="noStrike" dirty="0" err="1">
+                        <a:rPr lang="en-US" sz="2000" u="none" strike="noStrike" dirty="0" err="1">
                           <a:effectLst/>
                         </a:rPr>
                         <a:t>BatterySpace</a:t>
                       </a:r>
-                      <a:endParaRPr lang="en-US" sz="1100" b="0" i="0" u="none" strike="noStrike" dirty="0">
+                      <a:endParaRPr lang="en-US" sz="2000" b="0" i="0" u="none" strike="noStrike" dirty="0">
                         <a:solidFill>
                           <a:srgbClr val="000000"/>
                         </a:solidFill>
@@ -10133,12 +10550,12 @@
                     <a:p>
                       <a:pPr algn="r" fontAlgn="b"/>
                       <a:r>
-                        <a:rPr lang="en-US" sz="1100" u="none" strike="noStrike">
+                        <a:rPr lang="en-US" sz="2000" u="none" strike="noStrike" dirty="0">
                           <a:effectLst/>
                         </a:rPr>
                         <a:t>66.95</a:t>
                       </a:r>
-                      <a:endParaRPr lang="en-US" sz="1100" b="0" i="0" u="none" strike="noStrike">
+                      <a:endParaRPr lang="en-US" sz="2000" b="0" i="0" u="none" strike="noStrike" dirty="0">
                         <a:solidFill>
                           <a:srgbClr val="000000"/>
                         </a:solidFill>
@@ -10156,12 +10573,12 @@
                     <a:p>
                       <a:pPr algn="r" fontAlgn="b"/>
                       <a:r>
-                        <a:rPr lang="en-US" sz="1100" u="none" strike="noStrike">
+                        <a:rPr lang="en-US" sz="2000" u="none" strike="noStrike" dirty="0">
                           <a:effectLst/>
                         </a:rPr>
                         <a:t>2</a:t>
                       </a:r>
-                      <a:endParaRPr lang="en-US" sz="1100" b="0" i="0" u="none" strike="noStrike">
+                      <a:endParaRPr lang="en-US" sz="2000" b="0" i="0" u="none" strike="noStrike" dirty="0">
                         <a:solidFill>
                           <a:srgbClr val="000000"/>
                         </a:solidFill>
@@ -10179,12 +10596,12 @@
                     <a:p>
                       <a:pPr algn="r" fontAlgn="b"/>
                       <a:r>
-                        <a:rPr lang="en-US" sz="1100" u="none" strike="noStrike">
+                        <a:rPr lang="en-US" sz="2000" u="none" strike="noStrike" dirty="0" smtClean="0">
                           <a:effectLst/>
                         </a:rPr>
-                        <a:t>133.9</a:t>
+                        <a:t>133.90</a:t>
                       </a:r>
-                      <a:endParaRPr lang="en-US" sz="1100" b="0" i="0" u="none" strike="noStrike">
+                      <a:endParaRPr lang="en-US" sz="2000" b="0" i="0" u="none" strike="noStrike" dirty="0">
                         <a:solidFill>
                           <a:srgbClr val="000000"/>
                         </a:solidFill>
@@ -10204,12 +10621,12 @@
                     <a:p>
                       <a:pPr algn="l" fontAlgn="b"/>
                       <a:r>
-                        <a:rPr lang="en-US" sz="1100" u="none" strike="noStrike">
+                        <a:rPr lang="en-US" sz="2000" u="none" strike="noStrike" dirty="0" smtClean="0">
                           <a:effectLst/>
                         </a:rPr>
-                        <a:t>Screen1</a:t>
+                        <a:t>Screen 1</a:t>
                       </a:r>
-                      <a:endParaRPr lang="en-US" sz="1100" b="0" i="0" u="none" strike="noStrike">
+                      <a:endParaRPr lang="en-US" sz="2000" b="0" i="0" u="none" strike="noStrike" dirty="0">
                         <a:solidFill>
                           <a:srgbClr val="000000"/>
                         </a:solidFill>
@@ -10227,12 +10644,12 @@
                     <a:p>
                       <a:pPr algn="l" fontAlgn="b"/>
                       <a:r>
-                        <a:rPr lang="en-US" sz="1100" u="none" strike="noStrike" dirty="0" err="1" smtClean="0">
+                        <a:rPr lang="en-US" sz="2000" u="none" strike="noStrike" dirty="0" err="1" smtClean="0">
                           <a:effectLst/>
                         </a:rPr>
                         <a:t>Adafruit</a:t>
                       </a:r>
-                      <a:endParaRPr lang="en-US" sz="1100" b="0" i="0" u="none" strike="noStrike" dirty="0">
+                      <a:endParaRPr lang="en-US" sz="2000" b="0" i="0" u="none" strike="noStrike" dirty="0">
                         <a:solidFill>
                           <a:srgbClr val="000000"/>
                         </a:solidFill>
@@ -10250,12 +10667,12 @@
                     <a:p>
                       <a:pPr algn="r" fontAlgn="b"/>
                       <a:r>
-                        <a:rPr lang="en-US" sz="1100" u="none" strike="noStrike">
+                        <a:rPr lang="en-US" sz="2000" u="none" strike="noStrike" dirty="0">
                           <a:effectLst/>
                         </a:rPr>
                         <a:t>139.95</a:t>
                       </a:r>
-                      <a:endParaRPr lang="en-US" sz="1100" b="0" i="0" u="none" strike="noStrike">
+                      <a:endParaRPr lang="en-US" sz="2000" b="0" i="0" u="none" strike="noStrike" dirty="0">
                         <a:solidFill>
                           <a:srgbClr val="000000"/>
                         </a:solidFill>
@@ -10273,12 +10690,12 @@
                     <a:p>
                       <a:pPr algn="r" fontAlgn="b"/>
                       <a:r>
-                        <a:rPr lang="en-US" sz="1100" u="none" strike="noStrike">
+                        <a:rPr lang="en-US" sz="2000" u="none" strike="noStrike" dirty="0">
                           <a:effectLst/>
                         </a:rPr>
                         <a:t>1</a:t>
                       </a:r>
-                      <a:endParaRPr lang="en-US" sz="1100" b="0" i="0" u="none" strike="noStrike">
+                      <a:endParaRPr lang="en-US" sz="2000" b="0" i="0" u="none" strike="noStrike" dirty="0">
                         <a:solidFill>
                           <a:srgbClr val="000000"/>
                         </a:solidFill>
@@ -10296,12 +10713,12 @@
                     <a:p>
                       <a:pPr algn="r" fontAlgn="b"/>
                       <a:r>
-                        <a:rPr lang="en-US" sz="1100" u="none" strike="noStrike">
+                        <a:rPr lang="en-US" sz="2000" u="none" strike="noStrike" dirty="0">
                           <a:effectLst/>
                         </a:rPr>
                         <a:t>139.95</a:t>
                       </a:r>
-                      <a:endParaRPr lang="en-US" sz="1100" b="0" i="0" u="none" strike="noStrike">
+                      <a:endParaRPr lang="en-US" sz="2000" b="0" i="0" u="none" strike="noStrike" dirty="0">
                         <a:solidFill>
                           <a:srgbClr val="000000"/>
                         </a:solidFill>
@@ -10321,12 +10738,12 @@
                     <a:p>
                       <a:pPr algn="l" fontAlgn="b"/>
                       <a:r>
-                        <a:rPr lang="en-US" sz="1100" u="none" strike="noStrike">
+                        <a:rPr lang="en-US" sz="2000" u="none" strike="noStrike" dirty="0" smtClean="0">
                           <a:effectLst/>
                         </a:rPr>
-                        <a:t>Screen2</a:t>
+                        <a:t>Screen 2</a:t>
                       </a:r>
-                      <a:endParaRPr lang="en-US" sz="1100" b="0" i="0" u="none" strike="noStrike">
+                      <a:endParaRPr lang="en-US" sz="2000" b="0" i="0" u="none" strike="noStrike" dirty="0">
                         <a:solidFill>
                           <a:srgbClr val="000000"/>
                         </a:solidFill>
@@ -10344,12 +10761,12 @@
                     <a:p>
                       <a:pPr algn="l" fontAlgn="b"/>
                       <a:r>
-                        <a:rPr lang="en-US" sz="1100" u="none" strike="noStrike" dirty="0" err="1" smtClean="0">
+                        <a:rPr lang="en-US" sz="2000" u="none" strike="noStrike" dirty="0" err="1" smtClean="0">
                           <a:effectLst/>
                         </a:rPr>
                         <a:t>Adafruit</a:t>
                       </a:r>
-                      <a:endParaRPr lang="en-US" sz="1100" b="0" i="0" u="none" strike="noStrike" dirty="0">
+                      <a:endParaRPr lang="en-US" sz="2000" b="0" i="0" u="none" strike="noStrike" dirty="0">
                         <a:solidFill>
                           <a:srgbClr val="000000"/>
                         </a:solidFill>
@@ -10367,12 +10784,12 @@
                     <a:p>
                       <a:pPr algn="r" fontAlgn="b"/>
                       <a:r>
-                        <a:rPr lang="en-US" sz="1100" u="none" strike="noStrike">
+                        <a:rPr lang="en-US" sz="2000" u="none" strike="noStrike" dirty="0">
                           <a:effectLst/>
                         </a:rPr>
                         <a:t>64.95</a:t>
                       </a:r>
-                      <a:endParaRPr lang="en-US" sz="1100" b="0" i="0" u="none" strike="noStrike">
+                      <a:endParaRPr lang="en-US" sz="2000" b="0" i="0" u="none" strike="noStrike" dirty="0">
                         <a:solidFill>
                           <a:srgbClr val="000000"/>
                         </a:solidFill>
@@ -10390,12 +10807,12 @@
                     <a:p>
                       <a:pPr algn="r" fontAlgn="b"/>
                       <a:r>
-                        <a:rPr lang="en-US" sz="1100" u="none" strike="noStrike">
+                        <a:rPr lang="en-US" sz="2000" u="none" strike="noStrike">
                           <a:effectLst/>
                         </a:rPr>
                         <a:t>1</a:t>
                       </a:r>
-                      <a:endParaRPr lang="en-US" sz="1100" b="0" i="0" u="none" strike="noStrike">
+                      <a:endParaRPr lang="en-US" sz="2000" b="0" i="0" u="none" strike="noStrike">
                         <a:solidFill>
                           <a:srgbClr val="000000"/>
                         </a:solidFill>
@@ -10413,12 +10830,12 @@
                     <a:p>
                       <a:pPr algn="r" fontAlgn="b"/>
                       <a:r>
-                        <a:rPr lang="en-US" sz="1100" u="none" strike="noStrike">
+                        <a:rPr lang="en-US" sz="2000" u="none" strike="noStrike" dirty="0">
                           <a:effectLst/>
                         </a:rPr>
                         <a:t>64.95</a:t>
                       </a:r>
-                      <a:endParaRPr lang="en-US" sz="1100" b="0" i="0" u="none" strike="noStrike">
+                      <a:endParaRPr lang="en-US" sz="2000" b="0" i="0" u="none" strike="noStrike" dirty="0">
                         <a:solidFill>
                           <a:srgbClr val="000000"/>
                         </a:solidFill>
@@ -10438,12 +10855,12 @@
                     <a:p>
                       <a:pPr algn="l" fontAlgn="b"/>
                       <a:r>
-                        <a:rPr lang="en-US" sz="1100" u="none" strike="noStrike">
+                        <a:rPr lang="en-US" sz="2000" u="none" strike="noStrike" dirty="0">
                           <a:effectLst/>
                         </a:rPr>
                         <a:t>IMU</a:t>
                       </a:r>
-                      <a:endParaRPr lang="en-US" sz="1100" b="0" i="0" u="none" strike="noStrike">
+                      <a:endParaRPr lang="en-US" sz="2000" b="0" i="0" u="none" strike="noStrike" dirty="0">
                         <a:solidFill>
                           <a:srgbClr val="000000"/>
                         </a:solidFill>
@@ -10461,12 +10878,12 @@
                     <a:p>
                       <a:pPr algn="l" fontAlgn="b"/>
                       <a:r>
-                        <a:rPr lang="en-US" sz="1100" u="none" strike="noStrike" dirty="0">
+                        <a:rPr lang="en-US" sz="2000" u="none" strike="noStrike" dirty="0">
                           <a:effectLst/>
                         </a:rPr>
                         <a:t>Mouser</a:t>
                       </a:r>
-                      <a:endParaRPr lang="en-US" sz="1100" b="0" i="0" u="none" strike="noStrike" dirty="0">
+                      <a:endParaRPr lang="en-US" sz="2000" b="0" i="0" u="none" strike="noStrike" dirty="0">
                         <a:solidFill>
                           <a:srgbClr val="000000"/>
                         </a:solidFill>
@@ -10484,12 +10901,12 @@
                     <a:p>
                       <a:pPr algn="r" fontAlgn="b"/>
                       <a:r>
-                        <a:rPr lang="en-US" sz="1100" u="none" strike="noStrike">
+                        <a:rPr lang="en-US" sz="2000" u="none" strike="noStrike" dirty="0" smtClean="0">
                           <a:effectLst/>
                         </a:rPr>
-                        <a:t>$28.75 </a:t>
+                        <a:t>28.75 </a:t>
                       </a:r>
-                      <a:endParaRPr lang="en-US" sz="1100" b="0" i="0" u="none" strike="noStrike">
+                      <a:endParaRPr lang="en-US" sz="2000" b="0" i="0" u="none" strike="noStrike" dirty="0">
                         <a:solidFill>
                           <a:srgbClr val="000000"/>
                         </a:solidFill>
@@ -10507,12 +10924,12 @@
                     <a:p>
                       <a:pPr algn="r" fontAlgn="b"/>
                       <a:r>
-                        <a:rPr lang="en-US" sz="1100" u="none" strike="noStrike">
+                        <a:rPr lang="en-US" sz="2000" u="none" strike="noStrike" dirty="0" smtClean="0">
                           <a:effectLst/>
                         </a:rPr>
-                        <a:t>1</a:t>
+                        <a:t>0</a:t>
                       </a:r>
-                      <a:endParaRPr lang="en-US" sz="1100" b="0" i="0" u="none" strike="noStrike">
+                      <a:endParaRPr lang="en-US" sz="2000" b="0" i="0" u="none" strike="noStrike" dirty="0">
                         <a:solidFill>
                           <a:srgbClr val="000000"/>
                         </a:solidFill>
@@ -10530,12 +10947,12 @@
                     <a:p>
                       <a:pPr algn="r" fontAlgn="b"/>
                       <a:r>
-                        <a:rPr lang="en-US" sz="1100" u="none" strike="noStrike">
+                        <a:rPr lang="en-US" sz="2000" u="none" strike="noStrike" dirty="0" smtClean="0">
                           <a:effectLst/>
                         </a:rPr>
-                        <a:t>28.75</a:t>
+                        <a:t>0.00</a:t>
                       </a:r>
-                      <a:endParaRPr lang="en-US" sz="1100" b="0" i="0" u="none" strike="noStrike">
+                      <a:endParaRPr lang="en-US" sz="2000" b="0" i="0" u="none" strike="noStrike" dirty="0">
                         <a:solidFill>
                           <a:srgbClr val="000000"/>
                         </a:solidFill>
@@ -10555,12 +10972,12 @@
                     <a:p>
                       <a:pPr algn="l" fontAlgn="b"/>
                       <a:r>
-                        <a:rPr lang="en-US" sz="1100" u="none" strike="noStrike">
+                        <a:rPr lang="en-US" sz="2000" u="none" strike="noStrike" dirty="0">
                           <a:effectLst/>
                         </a:rPr>
                         <a:t>GPS</a:t>
                       </a:r>
-                      <a:endParaRPr lang="en-US" sz="1100" b="0" i="0" u="none" strike="noStrike">
+                      <a:endParaRPr lang="en-US" sz="2000" b="0" i="0" u="none" strike="noStrike" dirty="0">
                         <a:solidFill>
                           <a:srgbClr val="000000"/>
                         </a:solidFill>
@@ -10578,12 +10995,12 @@
                     <a:p>
                       <a:pPr algn="l" fontAlgn="b"/>
                       <a:r>
-                        <a:rPr lang="en-US" sz="1100" u="none" strike="noStrike" dirty="0" err="1" smtClean="0">
+                        <a:rPr lang="en-US" sz="2000" u="none" strike="noStrike" dirty="0" err="1" smtClean="0">
                           <a:effectLst/>
                         </a:rPr>
                         <a:t>Sparkfun</a:t>
                       </a:r>
-                      <a:endParaRPr lang="en-US" sz="1100" b="0" i="0" u="none" strike="noStrike" dirty="0">
+                      <a:endParaRPr lang="en-US" sz="2000" b="0" i="0" u="none" strike="noStrike" dirty="0">
                         <a:solidFill>
                           <a:srgbClr val="000000"/>
                         </a:solidFill>
@@ -10601,12 +11018,12 @@
                     <a:p>
                       <a:pPr algn="r" fontAlgn="b"/>
                       <a:r>
-                        <a:rPr lang="en-US" sz="1100" u="none" strike="noStrike">
+                        <a:rPr lang="en-US" sz="2000" u="none" strike="noStrike" dirty="0">
                           <a:effectLst/>
                         </a:rPr>
                         <a:t>49.99</a:t>
                       </a:r>
-                      <a:endParaRPr lang="en-US" sz="1100" b="0" i="0" u="none" strike="noStrike">
+                      <a:endParaRPr lang="en-US" sz="2000" b="0" i="0" u="none" strike="noStrike" dirty="0">
                         <a:solidFill>
                           <a:srgbClr val="000000"/>
                         </a:solidFill>
@@ -10624,12 +11041,12 @@
                     <a:p>
                       <a:pPr algn="r" fontAlgn="b"/>
                       <a:r>
-                        <a:rPr lang="en-US" sz="1100" u="none" strike="noStrike">
+                        <a:rPr lang="en-US" sz="2000" u="none" strike="noStrike" dirty="0" smtClean="0">
                           <a:effectLst/>
                         </a:rPr>
-                        <a:t>1</a:t>
+                        <a:t>0</a:t>
                       </a:r>
-                      <a:endParaRPr lang="en-US" sz="1100" b="0" i="0" u="none" strike="noStrike">
+                      <a:endParaRPr lang="en-US" sz="2000" b="0" i="0" u="none" strike="noStrike" dirty="0">
                         <a:solidFill>
                           <a:srgbClr val="000000"/>
                         </a:solidFill>
@@ -10647,12 +11064,12 @@
                     <a:p>
                       <a:pPr algn="r" fontAlgn="b"/>
                       <a:r>
-                        <a:rPr lang="en-US" sz="1100" u="none" strike="noStrike">
+                        <a:rPr lang="en-US" sz="2000" u="none" strike="noStrike" dirty="0" smtClean="0">
                           <a:effectLst/>
                         </a:rPr>
-                        <a:t>49.99</a:t>
+                        <a:t>0.00</a:t>
                       </a:r>
-                      <a:endParaRPr lang="en-US" sz="1100" b="0" i="0" u="none" strike="noStrike">
+                      <a:endParaRPr lang="en-US" sz="2000" b="0" i="0" u="none" strike="noStrike" dirty="0">
                         <a:solidFill>
                           <a:srgbClr val="000000"/>
                         </a:solidFill>
@@ -10672,12 +11089,18 @@
                     <a:p>
                       <a:pPr algn="l" fontAlgn="b"/>
                       <a:r>
-                        <a:rPr lang="en-US" sz="1100" u="none" strike="noStrike">
+                        <a:rPr lang="en-US" sz="2000" u="none" strike="noStrike" dirty="0" smtClean="0">
                           <a:effectLst/>
                         </a:rPr>
-                        <a:t>Passives</a:t>
+                        <a:t>Passive</a:t>
                       </a:r>
-                      <a:endParaRPr lang="en-US" sz="1100" b="0" i="0" u="none" strike="noStrike">
+                      <a:r>
+                        <a:rPr lang="en-US" sz="2000" u="none" strike="noStrike" baseline="0" dirty="0" smtClean="0">
+                          <a:effectLst/>
+                        </a:rPr>
+                        <a:t> Components</a:t>
+                      </a:r>
+                      <a:endParaRPr lang="en-US" sz="2000" b="0" i="0" u="none" strike="noStrike" dirty="0">
                         <a:solidFill>
                           <a:srgbClr val="000000"/>
                         </a:solidFill>
@@ -10695,12 +11118,12 @@
                     <a:p>
                       <a:pPr algn="l" fontAlgn="b"/>
                       <a:r>
-                        <a:rPr lang="en-US" sz="1100" u="none" strike="noStrike" dirty="0">
+                        <a:rPr lang="en-US" sz="2000" u="none" strike="noStrike" dirty="0">
                           <a:effectLst/>
                         </a:rPr>
                         <a:t>Various</a:t>
                       </a:r>
-                      <a:endParaRPr lang="en-US" sz="1100" b="0" i="0" u="none" strike="noStrike" dirty="0">
+                      <a:endParaRPr lang="en-US" sz="2000" b="0" i="0" u="none" strike="noStrike" dirty="0">
                         <a:solidFill>
                           <a:srgbClr val="000000"/>
                         </a:solidFill>
@@ -10718,12 +11141,12 @@
                     <a:p>
                       <a:pPr algn="r" fontAlgn="b"/>
                       <a:r>
-                        <a:rPr lang="en-US" sz="1100" u="none" strike="noStrike">
+                        <a:rPr lang="en-US" sz="2000" u="none" strike="noStrike" dirty="0" smtClean="0">
                           <a:effectLst/>
                         </a:rPr>
-                        <a:t>10</a:t>
+                        <a:t>10.00</a:t>
                       </a:r>
-                      <a:endParaRPr lang="en-US" sz="1100" b="0" i="0" u="none" strike="noStrike">
+                      <a:endParaRPr lang="en-US" sz="2000" b="0" i="0" u="none" strike="noStrike" dirty="0">
                         <a:solidFill>
                           <a:srgbClr val="000000"/>
                         </a:solidFill>
@@ -10741,12 +11164,12 @@
                     <a:p>
                       <a:pPr algn="r" fontAlgn="b"/>
                       <a:r>
-                        <a:rPr lang="en-US" sz="1100" u="none" strike="noStrike">
+                        <a:rPr lang="en-US" sz="2000" u="none" strike="noStrike">
                           <a:effectLst/>
                         </a:rPr>
                         <a:t>2</a:t>
                       </a:r>
-                      <a:endParaRPr lang="en-US" sz="1100" b="0" i="0" u="none" strike="noStrike">
+                      <a:endParaRPr lang="en-US" sz="2000" b="0" i="0" u="none" strike="noStrike">
                         <a:solidFill>
                           <a:srgbClr val="000000"/>
                         </a:solidFill>
@@ -10764,12 +11187,12 @@
                     <a:p>
                       <a:pPr algn="r" fontAlgn="b"/>
                       <a:r>
-                        <a:rPr lang="en-US" sz="1100" u="none" strike="noStrike">
+                        <a:rPr lang="en-US" sz="2000" u="none" strike="noStrike" dirty="0" smtClean="0">
                           <a:effectLst/>
                         </a:rPr>
-                        <a:t>20</a:t>
+                        <a:t>20.00</a:t>
                       </a:r>
-                      <a:endParaRPr lang="en-US" sz="1100" b="0" i="0" u="none" strike="noStrike">
+                      <a:endParaRPr lang="en-US" sz="2000" b="0" i="0" u="none" strike="noStrike" dirty="0">
                         <a:solidFill>
                           <a:srgbClr val="000000"/>
                         </a:solidFill>
@@ -10789,12 +11212,26 @@
                     <a:p>
                       <a:pPr algn="l" fontAlgn="b"/>
                       <a:r>
-                        <a:rPr lang="en-US" sz="1100" u="none" strike="noStrike">
+                        <a:rPr lang="en-US" sz="2000" b="0" i="0" u="none" strike="noStrike" dirty="0" smtClean="0">
+                          <a:solidFill>
+                            <a:schemeClr val="dk1"/>
+                          </a:solidFill>
                           <a:effectLst/>
+                          <a:latin typeface="+mn-lt"/>
                         </a:rPr>
-                        <a:t>PCB</a:t>
+                        <a:t>Circuit</a:t>
                       </a:r>
-                      <a:endParaRPr lang="en-US" sz="1100" b="0" i="0" u="none" strike="noStrike">
+                      <a:r>
+                        <a:rPr lang="en-US" sz="2000" b="0" i="0" u="none" strike="noStrike" baseline="0" dirty="0" smtClean="0">
+                          <a:solidFill>
+                            <a:schemeClr val="dk1"/>
+                          </a:solidFill>
+                          <a:effectLst/>
+                          <a:latin typeface="+mn-lt"/>
+                        </a:rPr>
+                        <a:t> Board (PCB)</a:t>
+                      </a:r>
+                      <a:endParaRPr lang="en-US" sz="2000" b="0" i="0" u="none" strike="noStrike" dirty="0">
                         <a:solidFill>
                           <a:srgbClr val="000000"/>
                         </a:solidFill>
@@ -10812,12 +11249,12 @@
                     <a:p>
                       <a:pPr algn="l" fontAlgn="b"/>
                       <a:r>
-                        <a:rPr lang="en-US" sz="1100" u="none" strike="noStrike" dirty="0" smtClean="0">
+                        <a:rPr lang="en-US" sz="2000" u="none" strike="noStrike" dirty="0" smtClean="0">
                           <a:effectLst/>
                         </a:rPr>
                         <a:t>OSH Park</a:t>
                       </a:r>
-                      <a:endParaRPr lang="en-US" sz="1100" b="0" i="0" u="none" strike="noStrike" dirty="0">
+                      <a:endParaRPr lang="en-US" sz="2000" b="0" i="0" u="none" strike="noStrike" dirty="0">
                         <a:solidFill>
                           <a:srgbClr val="000000"/>
                         </a:solidFill>
@@ -10835,12 +11272,12 @@
                     <a:p>
                       <a:pPr algn="r" fontAlgn="b"/>
                       <a:r>
-                        <a:rPr lang="en-US" sz="1100" u="none" strike="noStrike">
+                        <a:rPr lang="en-US" sz="2000" u="none" strike="noStrike" dirty="0" smtClean="0">
                           <a:effectLst/>
                         </a:rPr>
-                        <a:t>40</a:t>
+                        <a:t>40.00</a:t>
                       </a:r>
-                      <a:endParaRPr lang="en-US" sz="1100" b="0" i="0" u="none" strike="noStrike">
+                      <a:endParaRPr lang="en-US" sz="2000" b="0" i="0" u="none" strike="noStrike" dirty="0">
                         <a:solidFill>
                           <a:srgbClr val="000000"/>
                         </a:solidFill>
@@ -10858,12 +11295,12 @@
                     <a:p>
                       <a:pPr algn="r" fontAlgn="b"/>
                       <a:r>
-                        <a:rPr lang="en-US" sz="1100" u="none" strike="noStrike">
+                        <a:rPr lang="en-US" sz="2000" u="none" strike="noStrike">
                           <a:effectLst/>
                         </a:rPr>
                         <a:t>2</a:t>
                       </a:r>
-                      <a:endParaRPr lang="en-US" sz="1100" b="0" i="0" u="none" strike="noStrike">
+                      <a:endParaRPr lang="en-US" sz="2000" b="0" i="0" u="none" strike="noStrike">
                         <a:solidFill>
                           <a:srgbClr val="000000"/>
                         </a:solidFill>
@@ -10881,12 +11318,12 @@
                     <a:p>
                       <a:pPr algn="r" fontAlgn="b"/>
                       <a:r>
-                        <a:rPr lang="en-US" sz="1100" u="none" strike="noStrike">
+                        <a:rPr lang="en-US" sz="2000" u="none" strike="noStrike" dirty="0" smtClean="0">
                           <a:effectLst/>
                         </a:rPr>
-                        <a:t>80</a:t>
+                        <a:t>80.00</a:t>
                       </a:r>
-                      <a:endParaRPr lang="en-US" sz="1100" b="0" i="0" u="none" strike="noStrike">
+                      <a:endParaRPr lang="en-US" sz="2000" b="0" i="0" u="none" strike="noStrike" dirty="0">
                         <a:solidFill>
                           <a:srgbClr val="000000"/>
                         </a:solidFill>
@@ -10906,12 +11343,12 @@
                     <a:p>
                       <a:pPr algn="l" fontAlgn="b"/>
                       <a:r>
-                        <a:rPr lang="en-US" sz="1100" u="none" strike="noStrike">
+                        <a:rPr lang="en-US" sz="2000" u="none" strike="noStrike" dirty="0">
                           <a:effectLst/>
                         </a:rPr>
                         <a:t>Microcontroller</a:t>
                       </a:r>
-                      <a:endParaRPr lang="en-US" sz="1100" b="0" i="0" u="none" strike="noStrike">
+                      <a:endParaRPr lang="en-US" sz="2000" b="0" i="0" u="none" strike="noStrike" dirty="0">
                         <a:solidFill>
                           <a:srgbClr val="000000"/>
                         </a:solidFill>
@@ -10929,12 +11366,12 @@
                     <a:p>
                       <a:pPr algn="l" fontAlgn="b"/>
                       <a:r>
-                        <a:rPr lang="en-US" sz="1100" u="none" strike="noStrike" dirty="0" err="1">
+                        <a:rPr lang="en-US" sz="2000" u="none" strike="noStrike" dirty="0" err="1">
                           <a:effectLst/>
                         </a:rPr>
                         <a:t>DigiKey</a:t>
                       </a:r>
-                      <a:endParaRPr lang="en-US" sz="1100" b="0" i="0" u="none" strike="noStrike" dirty="0">
+                      <a:endParaRPr lang="en-US" sz="2000" b="0" i="0" u="none" strike="noStrike" dirty="0">
                         <a:solidFill>
                           <a:srgbClr val="000000"/>
                         </a:solidFill>
@@ -10952,12 +11389,12 @@
                     <a:p>
                       <a:pPr algn="r" fontAlgn="b"/>
                       <a:r>
-                        <a:rPr lang="en-US" sz="1100" u="none" strike="noStrike">
+                        <a:rPr lang="en-US" sz="2000" u="none" strike="noStrike" dirty="0">
                           <a:effectLst/>
                         </a:rPr>
                         <a:t>11.45</a:t>
                       </a:r>
-                      <a:endParaRPr lang="en-US" sz="1100" b="0" i="0" u="none" strike="noStrike">
+                      <a:endParaRPr lang="en-US" sz="2000" b="0" i="0" u="none" strike="noStrike" dirty="0">
                         <a:solidFill>
                           <a:srgbClr val="000000"/>
                         </a:solidFill>
@@ -10975,12 +11412,12 @@
                     <a:p>
                       <a:pPr algn="r" fontAlgn="b"/>
                       <a:r>
-                        <a:rPr lang="en-US" sz="1100" u="none" strike="noStrike">
+                        <a:rPr lang="en-US" sz="2000" u="none" strike="noStrike">
                           <a:effectLst/>
                         </a:rPr>
                         <a:t>2</a:t>
                       </a:r>
-                      <a:endParaRPr lang="en-US" sz="1100" b="0" i="0" u="none" strike="noStrike">
+                      <a:endParaRPr lang="en-US" sz="2000" b="0" i="0" u="none" strike="noStrike">
                         <a:solidFill>
                           <a:srgbClr val="000000"/>
                         </a:solidFill>
@@ -10998,12 +11435,12 @@
                     <a:p>
                       <a:pPr algn="r" fontAlgn="b"/>
                       <a:r>
-                        <a:rPr lang="en-US" sz="1100" u="none" strike="noStrike">
+                        <a:rPr lang="en-US" sz="2000" u="none" strike="noStrike" dirty="0" smtClean="0">
                           <a:effectLst/>
                         </a:rPr>
-                        <a:t>22.9</a:t>
+                        <a:t>22.90</a:t>
                       </a:r>
-                      <a:endParaRPr lang="en-US" sz="1100" b="0" i="0" u="none" strike="noStrike">
+                      <a:endParaRPr lang="en-US" sz="2000" b="0" i="0" u="none" strike="noStrike" dirty="0">
                         <a:solidFill>
                           <a:srgbClr val="000000"/>
                         </a:solidFill>
@@ -11023,12 +11460,12 @@
                     <a:p>
                       <a:pPr algn="l" fontAlgn="b"/>
                       <a:r>
-                        <a:rPr lang="en-US" sz="1100" u="none" strike="noStrike">
+                        <a:rPr lang="en-US" sz="2000" u="none" strike="noStrike" dirty="0" smtClean="0">
                           <a:effectLst/>
                         </a:rPr>
-                        <a:t>Charger</a:t>
+                        <a:t>Battery charger</a:t>
                       </a:r>
-                      <a:endParaRPr lang="en-US" sz="1100" b="0" i="0" u="none" strike="noStrike">
+                      <a:endParaRPr lang="en-US" sz="2000" b="0" i="0" u="none" strike="noStrike" dirty="0">
                         <a:solidFill>
                           <a:srgbClr val="000000"/>
                         </a:solidFill>
@@ -11046,12 +11483,12 @@
                     <a:p>
                       <a:pPr algn="l" fontAlgn="b"/>
                       <a:r>
-                        <a:rPr lang="en-US" sz="1100" u="none" strike="noStrike" dirty="0" err="1">
+                        <a:rPr lang="en-US" sz="2000" u="none" strike="noStrike" dirty="0" err="1">
                           <a:effectLst/>
                         </a:rPr>
                         <a:t>BatterySpace</a:t>
                       </a:r>
-                      <a:endParaRPr lang="en-US" sz="1100" b="0" i="0" u="none" strike="noStrike" dirty="0">
+                      <a:endParaRPr lang="en-US" sz="2000" b="0" i="0" u="none" strike="noStrike" dirty="0">
                         <a:solidFill>
                           <a:srgbClr val="000000"/>
                         </a:solidFill>
@@ -11069,12 +11506,12 @@
                     <a:p>
                       <a:pPr algn="r" fontAlgn="b"/>
                       <a:r>
-                        <a:rPr lang="en-US" sz="1100" u="none" strike="noStrike">
+                        <a:rPr lang="en-US" sz="2000" u="none" strike="noStrike" dirty="0">
                           <a:effectLst/>
                         </a:rPr>
                         <a:t>39.95</a:t>
                       </a:r>
-                      <a:endParaRPr lang="en-US" sz="1100" b="0" i="0" u="none" strike="noStrike">
+                      <a:endParaRPr lang="en-US" sz="2000" b="0" i="0" u="none" strike="noStrike" dirty="0">
                         <a:solidFill>
                           <a:srgbClr val="000000"/>
                         </a:solidFill>
@@ -11092,12 +11529,12 @@
                     <a:p>
                       <a:pPr algn="r" fontAlgn="b"/>
                       <a:r>
-                        <a:rPr lang="en-US" sz="1100" u="none" strike="noStrike">
+                        <a:rPr lang="en-US" sz="2000" u="none" strike="noStrike" dirty="0">
                           <a:effectLst/>
                         </a:rPr>
                         <a:t>2</a:t>
                       </a:r>
-                      <a:endParaRPr lang="en-US" sz="1100" b="0" i="0" u="none" strike="noStrike">
+                      <a:endParaRPr lang="en-US" sz="2000" b="0" i="0" u="none" strike="noStrike" dirty="0">
                         <a:solidFill>
                           <a:srgbClr val="000000"/>
                         </a:solidFill>
@@ -11115,12 +11552,12 @@
                     <a:p>
                       <a:pPr algn="r" fontAlgn="b"/>
                       <a:r>
-                        <a:rPr lang="en-US" sz="1100" u="none" strike="noStrike">
+                        <a:rPr lang="en-US" sz="2000" u="none" strike="noStrike" dirty="0" smtClean="0">
                           <a:effectLst/>
                         </a:rPr>
-                        <a:t>79.9</a:t>
+                        <a:t>79.90</a:t>
                       </a:r>
-                      <a:endParaRPr lang="en-US" sz="1100" b="0" i="0" u="none" strike="noStrike">
+                      <a:endParaRPr lang="en-US" sz="2000" b="0" i="0" u="none" strike="noStrike" dirty="0">
                         <a:solidFill>
                           <a:srgbClr val="000000"/>
                         </a:solidFill>
@@ -11140,12 +11577,12 @@
                     <a:p>
                       <a:pPr algn="l" fontAlgn="b"/>
                       <a:r>
-                        <a:rPr lang="en-US" sz="1100" u="none" strike="noStrike">
+                        <a:rPr lang="en-US" sz="2000" u="none" strike="noStrike" dirty="0" smtClean="0">
                           <a:effectLst/>
                         </a:rPr>
-                        <a:t>Regulator</a:t>
+                        <a:t>Voltage regulator</a:t>
                       </a:r>
-                      <a:endParaRPr lang="en-US" sz="1100" b="0" i="0" u="none" strike="noStrike">
+                      <a:endParaRPr lang="en-US" sz="2000" b="0" i="0" u="none" strike="noStrike" dirty="0">
                         <a:solidFill>
                           <a:srgbClr val="000000"/>
                         </a:solidFill>
@@ -11163,12 +11600,12 @@
                     <a:p>
                       <a:pPr algn="l" fontAlgn="b"/>
                       <a:r>
-                        <a:rPr lang="en-US" sz="1100" u="none" strike="noStrike" dirty="0">
+                        <a:rPr lang="en-US" sz="2000" u="none" strike="noStrike" dirty="0">
                           <a:effectLst/>
                         </a:rPr>
                         <a:t>Mouser</a:t>
                       </a:r>
-                      <a:endParaRPr lang="en-US" sz="1100" b="0" i="0" u="none" strike="noStrike" dirty="0">
+                      <a:endParaRPr lang="en-US" sz="2000" b="0" i="0" u="none" strike="noStrike" dirty="0">
                         <a:solidFill>
                           <a:srgbClr val="000000"/>
                         </a:solidFill>
@@ -11186,12 +11623,12 @@
                     <a:p>
                       <a:pPr algn="r" fontAlgn="b"/>
                       <a:r>
-                        <a:rPr lang="en-US" sz="1100" u="none" strike="noStrike">
+                        <a:rPr lang="en-US" sz="2000" u="none" strike="noStrike" dirty="0">
                           <a:effectLst/>
                         </a:rPr>
                         <a:t>13.23</a:t>
                       </a:r>
-                      <a:endParaRPr lang="en-US" sz="1100" b="0" i="0" u="none" strike="noStrike">
+                      <a:endParaRPr lang="en-US" sz="2000" b="0" i="0" u="none" strike="noStrike" dirty="0">
                         <a:solidFill>
                           <a:srgbClr val="000000"/>
                         </a:solidFill>
@@ -11209,12 +11646,12 @@
                     <a:p>
                       <a:pPr algn="r" fontAlgn="b"/>
                       <a:r>
-                        <a:rPr lang="en-US" sz="1100" u="none" strike="noStrike">
+                        <a:rPr lang="en-US" sz="2000" u="none" strike="noStrike">
                           <a:effectLst/>
                         </a:rPr>
                         <a:t>2</a:t>
                       </a:r>
-                      <a:endParaRPr lang="en-US" sz="1100" b="0" i="0" u="none" strike="noStrike">
+                      <a:endParaRPr lang="en-US" sz="2000" b="0" i="0" u="none" strike="noStrike">
                         <a:solidFill>
                           <a:srgbClr val="000000"/>
                         </a:solidFill>
@@ -11232,12 +11669,12 @@
                     <a:p>
                       <a:pPr algn="r" fontAlgn="b"/>
                       <a:r>
-                        <a:rPr lang="en-US" sz="1100" u="none" strike="noStrike">
+                        <a:rPr lang="en-US" sz="2000" u="none" strike="noStrike" dirty="0">
                           <a:effectLst/>
                         </a:rPr>
                         <a:t>26.46</a:t>
                       </a:r>
-                      <a:endParaRPr lang="en-US" sz="1100" b="0" i="0" u="none" strike="noStrike">
+                      <a:endParaRPr lang="en-US" sz="2000" b="0" i="0" u="none" strike="noStrike" dirty="0">
                         <a:solidFill>
                           <a:srgbClr val="000000"/>
                         </a:solidFill>
@@ -11257,12 +11694,18 @@
                     <a:p>
                       <a:pPr algn="l" fontAlgn="b"/>
                       <a:r>
-                        <a:rPr lang="en-US" sz="1100" u="none" strike="noStrike">
+                        <a:rPr lang="en-US" sz="2000" u="none" strike="noStrike" dirty="0">
                           <a:effectLst/>
                         </a:rPr>
-                        <a:t>Fuel Guage</a:t>
+                        <a:t>Fuel </a:t>
                       </a:r>
-                      <a:endParaRPr lang="en-US" sz="1100" b="0" i="0" u="none" strike="noStrike">
+                      <a:r>
+                        <a:rPr lang="en-US" sz="2000" u="none" strike="noStrike" dirty="0" smtClean="0">
+                          <a:effectLst/>
+                        </a:rPr>
+                        <a:t>gauge</a:t>
+                      </a:r>
+                      <a:endParaRPr lang="en-US" sz="2000" b="0" i="0" u="none" strike="noStrike" dirty="0">
                         <a:solidFill>
                           <a:srgbClr val="000000"/>
                         </a:solidFill>
@@ -11280,12 +11723,12 @@
                     <a:p>
                       <a:pPr algn="l" fontAlgn="b"/>
                       <a:r>
-                        <a:rPr lang="en-US" sz="1100" u="none" strike="noStrike" dirty="0" err="1">
+                        <a:rPr lang="en-US" sz="2000" u="none" strike="noStrike" dirty="0" err="1">
                           <a:effectLst/>
                         </a:rPr>
                         <a:t>DigiKey</a:t>
                       </a:r>
-                      <a:endParaRPr lang="en-US" sz="1100" b="0" i="0" u="none" strike="noStrike" dirty="0">
+                      <a:endParaRPr lang="en-US" sz="2000" b="0" i="0" u="none" strike="noStrike" dirty="0">
                         <a:solidFill>
                           <a:srgbClr val="000000"/>
                         </a:solidFill>
@@ -11303,12 +11746,12 @@
                     <a:p>
                       <a:pPr algn="r" fontAlgn="b"/>
                       <a:r>
-                        <a:rPr lang="en-US" sz="1100" u="none" strike="noStrike">
+                        <a:rPr lang="en-US" sz="2000" u="none" strike="noStrike" dirty="0">
                           <a:effectLst/>
                         </a:rPr>
                         <a:t>6.43</a:t>
                       </a:r>
-                      <a:endParaRPr lang="en-US" sz="1100" b="0" i="0" u="none" strike="noStrike">
+                      <a:endParaRPr lang="en-US" sz="2000" b="0" i="0" u="none" strike="noStrike" dirty="0">
                         <a:solidFill>
                           <a:srgbClr val="000000"/>
                         </a:solidFill>
@@ -11326,12 +11769,12 @@
                     <a:p>
                       <a:pPr algn="r" fontAlgn="b"/>
                       <a:r>
-                        <a:rPr lang="en-US" sz="1100" u="none" strike="noStrike">
+                        <a:rPr lang="en-US" sz="2000" u="none" strike="noStrike">
                           <a:effectLst/>
                         </a:rPr>
                         <a:t>2</a:t>
                       </a:r>
-                      <a:endParaRPr lang="en-US" sz="1100" b="0" i="0" u="none" strike="noStrike">
+                      <a:endParaRPr lang="en-US" sz="2000" b="0" i="0" u="none" strike="noStrike">
                         <a:solidFill>
                           <a:srgbClr val="000000"/>
                         </a:solidFill>
@@ -11349,12 +11792,12 @@
                     <a:p>
                       <a:pPr algn="r" fontAlgn="b"/>
                       <a:r>
-                        <a:rPr lang="en-US" sz="1100" u="none" strike="noStrike">
+                        <a:rPr lang="en-US" sz="2000" u="none" strike="noStrike" dirty="0">
                           <a:effectLst/>
                         </a:rPr>
                         <a:t>12.86</a:t>
                       </a:r>
-                      <a:endParaRPr lang="en-US" sz="1100" b="0" i="0" u="none" strike="noStrike">
+                      <a:endParaRPr lang="en-US" sz="2000" b="0" i="0" u="none" strike="noStrike" dirty="0">
                         <a:solidFill>
                           <a:srgbClr val="000000"/>
                         </a:solidFill>
@@ -11374,12 +11817,30 @@
                     <a:p>
                       <a:pPr algn="l" fontAlgn="b"/>
                       <a:r>
-                        <a:rPr lang="en-US" sz="1100" u="none" strike="noStrike">
+                        <a:rPr lang="en-US" sz="2000" u="none" strike="noStrike" dirty="0">
                           <a:effectLst/>
                         </a:rPr>
-                        <a:t>3D printed Box</a:t>
+                        <a:t>3D </a:t>
                       </a:r>
-                      <a:endParaRPr lang="en-US" sz="1100" b="0" i="0" u="none" strike="noStrike">
+                      <a:r>
+                        <a:rPr lang="en-US" sz="2000" u="none" strike="noStrike" dirty="0" smtClean="0">
+                          <a:effectLst/>
+                        </a:rPr>
+                        <a:t>printed</a:t>
+                      </a:r>
+                      <a:r>
+                        <a:rPr lang="en-US" sz="2000" u="none" strike="noStrike" baseline="0" dirty="0" smtClean="0">
+                          <a:effectLst/>
+                        </a:rPr>
+                        <a:t> b</a:t>
+                      </a:r>
+                      <a:r>
+                        <a:rPr lang="en-US" sz="2000" u="none" strike="noStrike" dirty="0" smtClean="0">
+                          <a:effectLst/>
+                        </a:rPr>
+                        <a:t>ox</a:t>
+                      </a:r>
+                      <a:endParaRPr lang="en-US" sz="2000" b="0" i="0" u="none" strike="noStrike" dirty="0">
                         <a:solidFill>
                           <a:srgbClr val="000000"/>
                         </a:solidFill>
@@ -11397,12 +11858,12 @@
                     <a:p>
                       <a:pPr algn="l" fontAlgn="b"/>
                       <a:r>
-                        <a:rPr lang="en-US" sz="1100" u="none" strike="noStrike" dirty="0">
+                        <a:rPr lang="en-US" sz="2000" u="none" strike="noStrike" dirty="0">
                           <a:effectLst/>
                         </a:rPr>
                         <a:t>Purdue IEEE</a:t>
                       </a:r>
-                      <a:endParaRPr lang="en-US" sz="1100" b="0" i="0" u="none" strike="noStrike" dirty="0">
+                      <a:endParaRPr lang="en-US" sz="2000" b="0" i="0" u="none" strike="noStrike" dirty="0">
                         <a:solidFill>
                           <a:srgbClr val="000000"/>
                         </a:solidFill>
@@ -11420,12 +11881,12 @@
                     <a:p>
                       <a:pPr algn="r" fontAlgn="b"/>
                       <a:r>
-                        <a:rPr lang="en-US" sz="1100" u="none" strike="noStrike">
+                        <a:rPr lang="en-US" sz="2000" u="none" strike="noStrike" dirty="0" smtClean="0">
                           <a:effectLst/>
                         </a:rPr>
-                        <a:t>40</a:t>
+                        <a:t>40.00</a:t>
                       </a:r>
-                      <a:endParaRPr lang="en-US" sz="1100" b="0" i="0" u="none" strike="noStrike">
+                      <a:endParaRPr lang="en-US" sz="2000" b="0" i="0" u="none" strike="noStrike" dirty="0">
                         <a:solidFill>
                           <a:srgbClr val="000000"/>
                         </a:solidFill>
@@ -11443,12 +11904,12 @@
                     <a:p>
                       <a:pPr algn="r" fontAlgn="b"/>
                       <a:r>
-                        <a:rPr lang="en-US" sz="1100" u="none" strike="noStrike">
+                        <a:rPr lang="en-US" sz="2000" u="none" strike="noStrike">
                           <a:effectLst/>
                         </a:rPr>
                         <a:t>2</a:t>
                       </a:r>
-                      <a:endParaRPr lang="en-US" sz="1100" b="0" i="0" u="none" strike="noStrike">
+                      <a:endParaRPr lang="en-US" sz="2000" b="0" i="0" u="none" strike="noStrike">
                         <a:solidFill>
                           <a:srgbClr val="000000"/>
                         </a:solidFill>
@@ -11466,12 +11927,12 @@
                     <a:p>
                       <a:pPr algn="r" fontAlgn="b"/>
                       <a:r>
-                        <a:rPr lang="en-US" sz="1100" u="none" strike="noStrike">
+                        <a:rPr lang="en-US" sz="2000" u="none" strike="noStrike" dirty="0" smtClean="0">
                           <a:effectLst/>
                         </a:rPr>
-                        <a:t>80</a:t>
+                        <a:t>80.00</a:t>
                       </a:r>
-                      <a:endParaRPr lang="en-US" sz="1100" b="0" i="0" u="none" strike="noStrike">
+                      <a:endParaRPr lang="en-US" sz="2000" b="0" i="0" u="none" strike="noStrike" dirty="0">
                         <a:solidFill>
                           <a:srgbClr val="000000"/>
                         </a:solidFill>
@@ -11491,12 +11952,12 @@
                     <a:p>
                       <a:pPr algn="l" fontAlgn="b"/>
                       <a:r>
-                        <a:rPr lang="en-US" sz="1100" u="none" strike="noStrike">
+                        <a:rPr lang="en-US" sz="2000" u="none" strike="noStrike" dirty="0">
                           <a:effectLst/>
                         </a:rPr>
                         <a:t>Backpack</a:t>
                       </a:r>
-                      <a:endParaRPr lang="en-US" sz="1100" b="0" i="0" u="none" strike="noStrike">
+                      <a:endParaRPr lang="en-US" sz="2000" b="0" i="0" u="none" strike="noStrike" dirty="0">
                         <a:solidFill>
                           <a:srgbClr val="000000"/>
                         </a:solidFill>
@@ -11514,12 +11975,12 @@
                     <a:p>
                       <a:pPr algn="l" fontAlgn="b"/>
                       <a:r>
-                        <a:rPr lang="en-US" sz="1100" u="none" strike="noStrike" dirty="0" smtClean="0">
+                        <a:rPr lang="en-US" sz="2000" u="none" strike="noStrike" dirty="0" smtClean="0">
                           <a:effectLst/>
                         </a:rPr>
                         <a:t>N/A</a:t>
                       </a:r>
-                      <a:endParaRPr lang="en-US" sz="1100" b="0" i="0" u="none" strike="noStrike" dirty="0">
+                      <a:endParaRPr lang="en-US" sz="2000" b="0" i="0" u="none" strike="noStrike" dirty="0">
                         <a:solidFill>
                           <a:srgbClr val="000000"/>
                         </a:solidFill>
@@ -11537,12 +11998,12 @@
                     <a:p>
                       <a:pPr algn="r" fontAlgn="b"/>
                       <a:r>
-                        <a:rPr lang="en-US" sz="1100" u="none" strike="noStrike">
+                        <a:rPr lang="en-US" sz="2000" u="none" strike="noStrike" dirty="0" smtClean="0">
                           <a:effectLst/>
                         </a:rPr>
-                        <a:t>10</a:t>
+                        <a:t>10.00</a:t>
                       </a:r>
-                      <a:endParaRPr lang="en-US" sz="1100" b="0" i="0" u="none" strike="noStrike">
+                      <a:endParaRPr lang="en-US" sz="2000" b="0" i="0" u="none" strike="noStrike" dirty="0">
                         <a:solidFill>
                           <a:srgbClr val="000000"/>
                         </a:solidFill>
@@ -11560,12 +12021,12 @@
                     <a:p>
                       <a:pPr algn="r" fontAlgn="b"/>
                       <a:r>
-                        <a:rPr lang="en-US" sz="1100" u="none" strike="noStrike">
+                        <a:rPr lang="en-US" sz="2000" u="none" strike="noStrike" dirty="0" smtClean="0">
                           <a:effectLst/>
                         </a:rPr>
                         <a:t>0</a:t>
                       </a:r>
-                      <a:endParaRPr lang="en-US" sz="1100" b="0" i="0" u="none" strike="noStrike">
+                      <a:endParaRPr lang="en-US" sz="2000" b="0" i="0" u="none" strike="noStrike" dirty="0">
                         <a:solidFill>
                           <a:srgbClr val="000000"/>
                         </a:solidFill>
@@ -11583,12 +12044,12 @@
                     <a:p>
                       <a:pPr algn="r" fontAlgn="b"/>
                       <a:r>
-                        <a:rPr lang="en-US" sz="1100" u="none" strike="noStrike">
+                        <a:rPr lang="en-US" sz="2000" u="none" strike="noStrike" dirty="0" smtClean="0">
                           <a:effectLst/>
                         </a:rPr>
-                        <a:t>0</a:t>
+                        <a:t>0.00</a:t>
                       </a:r>
-                      <a:endParaRPr lang="en-US" sz="1100" b="0" i="0" u="none" strike="noStrike">
+                      <a:endParaRPr lang="en-US" sz="2000" b="0" i="0" u="none" strike="noStrike" dirty="0">
                         <a:solidFill>
                           <a:srgbClr val="000000"/>
                         </a:solidFill>
@@ -11607,7 +12068,7 @@
                     <a:lstStyle/>
                     <a:p>
                       <a:pPr algn="l" fontAlgn="b"/>
-                      <a:endParaRPr lang="en-US" sz="1100" b="0" i="0" u="none" strike="noStrike">
+                      <a:endParaRPr lang="en-US" sz="2000" b="0" i="0" u="none" strike="noStrike">
                         <a:solidFill>
                           <a:srgbClr val="000000"/>
                         </a:solidFill>
@@ -11624,7 +12085,7 @@
                     <a:lstStyle/>
                     <a:p>
                       <a:pPr algn="l" fontAlgn="b"/>
-                      <a:endParaRPr lang="en-US" sz="1100" b="0" i="0" u="none" strike="noStrike">
+                      <a:endParaRPr lang="en-US" sz="2000" b="0" i="0" u="none" strike="noStrike">
                         <a:solidFill>
                           <a:srgbClr val="000000"/>
                         </a:solidFill>
@@ -11642,12 +12103,12 @@
                     <a:p>
                       <a:pPr algn="l" fontAlgn="b"/>
                       <a:r>
-                        <a:rPr lang="en-US" sz="1100" u="none" strike="noStrike" dirty="0">
+                        <a:rPr lang="en-US" sz="2000" u="none" strike="noStrike" dirty="0">
                           <a:effectLst/>
                         </a:rPr>
                         <a:t> </a:t>
                       </a:r>
-                      <a:endParaRPr lang="en-US" sz="1100" b="0" i="0" u="none" strike="noStrike" dirty="0">
+                      <a:endParaRPr lang="en-US" sz="2000" b="0" i="0" u="none" strike="noStrike" dirty="0">
                         <a:solidFill>
                           <a:srgbClr val="000000"/>
                         </a:solidFill>
@@ -11664,7 +12125,7 @@
                     <a:lstStyle/>
                     <a:p>
                       <a:pPr algn="l" fontAlgn="b"/>
-                      <a:endParaRPr lang="en-US" sz="1100" b="0" i="0" u="none" strike="noStrike">
+                      <a:endParaRPr lang="en-US" sz="2000" b="0" i="0" u="none" strike="noStrike">
                         <a:solidFill>
                           <a:srgbClr val="000000"/>
                         </a:solidFill>
@@ -11681,7 +12142,7 @@
                     <a:lstStyle/>
                     <a:p>
                       <a:pPr algn="l" fontAlgn="b"/>
-                      <a:endParaRPr lang="en-US" sz="1100" b="0" i="0" u="none" strike="noStrike">
+                      <a:endParaRPr lang="en-US" sz="2000" b="0" i="0" u="none" strike="noStrike">
                         <a:solidFill>
                           <a:srgbClr val="000000"/>
                         </a:solidFill>
@@ -11701,12 +12162,12 @@
                     <a:p>
                       <a:pPr algn="l" fontAlgn="b"/>
                       <a:r>
-                        <a:rPr lang="en-US" sz="1100" u="none" strike="noStrike" dirty="0">
+                        <a:rPr lang="en-US" sz="2000" u="none" strike="noStrike" dirty="0" smtClean="0">
                           <a:effectLst/>
                         </a:rPr>
-                        <a:t>Total</a:t>
+                        <a:t>Development Cost</a:t>
                       </a:r>
-                      <a:endParaRPr lang="en-US" sz="1100" b="0" i="0" u="none" strike="noStrike" dirty="0">
+                      <a:endParaRPr lang="en-US" sz="2000" b="0" i="0" u="none" strike="noStrike" dirty="0">
                         <a:solidFill>
                           <a:srgbClr val="000000"/>
                         </a:solidFill>
@@ -11723,7 +12184,41 @@
                     <a:lstStyle/>
                     <a:p>
                       <a:pPr algn="l" fontAlgn="b"/>
-                      <a:endParaRPr lang="en-US" sz="1100" b="0" i="0" u="none" strike="noStrike">
+                      <a:endParaRPr lang="en-US" sz="2000" b="0" i="0" u="none" strike="noStrike">
+                        <a:solidFill>
+                          <a:srgbClr val="000000"/>
+                        </a:solidFill>
+                        <a:effectLst/>
+                        <a:latin typeface="Liberation Sans"/>
+                      </a:endParaRPr>
+                    </a:p>
+                  </a:txBody>
+                  <a:tcPr marL="9525" marR="9525" marT="9525" marB="0" anchor="b"/>
+                </a:tc>
+                <a:tc>
+                  <a:txBody>
+                    <a:bodyPr/>
+                    <a:lstStyle/>
+                    <a:p>
+                      <a:pPr algn="r" fontAlgn="b"/>
+                      <a:endParaRPr lang="en-US" sz="2000" b="0" i="0" u="none" strike="noStrike" dirty="0">
+                        <a:solidFill>
+                          <a:srgbClr val="000000"/>
+                        </a:solidFill>
+                        <a:effectLst/>
+                        <a:latin typeface="Liberation Sans"/>
+                      </a:endParaRPr>
+                    </a:p>
+                  </a:txBody>
+                  <a:tcPr marL="9525" marR="9525" marT="9525" marB="0" anchor="b"/>
+                </a:tc>
+                <a:tc>
+                  <a:txBody>
+                    <a:bodyPr/>
+                    <a:lstStyle/>
+                    <a:p>
+                      <a:pPr algn="l" fontAlgn="b"/>
+                      <a:endParaRPr lang="en-US" sz="2000" b="0" i="0" u="none" strike="noStrike" dirty="0">
                         <a:solidFill>
                           <a:srgbClr val="000000"/>
                         </a:solidFill>
@@ -11741,52 +12236,12 @@
                     <a:p>
                       <a:pPr algn="r" fontAlgn="b"/>
                       <a:r>
-                        <a:rPr lang="en-US" sz="1100" u="none" strike="noStrike">
-                          <a:effectLst/>
-                        </a:rPr>
-                        <a:t>521.65</a:t>
-                      </a:r>
-                      <a:endParaRPr lang="en-US" sz="1100" b="0" i="0" u="none" strike="noStrike">
-                        <a:solidFill>
-                          <a:srgbClr val="000000"/>
-                        </a:solidFill>
-                        <a:effectLst/>
-                        <a:latin typeface="Liberation Sans"/>
-                      </a:endParaRPr>
-                    </a:p>
-                  </a:txBody>
-                  <a:tcPr marL="9525" marR="9525" marT="9525" marB="0" anchor="b"/>
-                </a:tc>
-                <a:tc>
-                  <a:txBody>
-                    <a:bodyPr/>
-                    <a:lstStyle/>
-                    <a:p>
-                      <a:pPr algn="l" fontAlgn="b"/>
-                      <a:endParaRPr lang="en-US" sz="1100" b="0" i="0" u="none" strike="noStrike">
-                        <a:solidFill>
-                          <a:srgbClr val="000000"/>
-                        </a:solidFill>
-                        <a:effectLst/>
-                        <a:latin typeface="Liberation Sans"/>
-                      </a:endParaRPr>
-                    </a:p>
-                  </a:txBody>
-                  <a:tcPr marL="9525" marR="9525" marT="9525" marB="0" anchor="b"/>
-                </a:tc>
-                <a:tc>
-                  <a:txBody>
-                    <a:bodyPr/>
-                    <a:lstStyle/>
-                    <a:p>
-                      <a:pPr algn="r" fontAlgn="b"/>
-                      <a:r>
-                        <a:rPr lang="en-US" sz="1100" u="none" strike="noStrike" dirty="0">
+                        <a:rPr lang="en-US" sz="2000" u="none" strike="noStrike" dirty="0">
                           <a:effectLst/>
                         </a:rPr>
                         <a:t>739.66</a:t>
                       </a:r>
-                      <a:endParaRPr lang="en-US" sz="1100" b="0" i="0" u="none" strike="noStrike" dirty="0">
+                      <a:endParaRPr lang="en-US" sz="2000" b="0" i="0" u="none" strike="noStrike" dirty="0">
                         <a:solidFill>
                           <a:srgbClr val="000000"/>
                         </a:solidFill>
@@ -11812,6 +12267,18 @@
   <p:clrMapOvr>
     <a:masterClrMapping/>
   </p:clrMapOvr>
+  <mc:AlternateContent xmlns:mc="http://schemas.openxmlformats.org/markup-compatibility/2006" xmlns:p14="http://schemas.microsoft.com/office/powerpoint/2010/main">
+    <mc:Choice Requires="p14">
+      <p:transition p14:dur="200">
+        <p:fade/>
+      </p:transition>
+    </mc:Choice>
+    <mc:Fallback xmlns="">
+      <p:transition>
+        <p:fade/>
+      </p:transition>
+    </mc:Fallback>
+  </mc:AlternateContent>
   <p:timing>
     <p:tnLst>
       <p:par>
@@ -11960,6 +12427,18 @@
   <p:clrMapOvr>
     <a:masterClrMapping/>
   </p:clrMapOvr>
+  <mc:AlternateContent xmlns:mc="http://schemas.openxmlformats.org/markup-compatibility/2006" xmlns:p14="http://schemas.microsoft.com/office/powerpoint/2010/main">
+    <mc:Choice Requires="p14">
+      <p:transition p14:dur="200">
+        <p:fade/>
+      </p:transition>
+    </mc:Choice>
+    <mc:Fallback xmlns="">
+      <p:transition>
+        <p:fade/>
+      </p:transition>
+    </mc:Fallback>
+  </mc:AlternateContent>
   <p:timing>
     <p:tnLst>
       <p:par>
@@ -12067,6 +12546,18 @@
   <p:clrMapOvr>
     <a:masterClrMapping/>
   </p:clrMapOvr>
+  <mc:AlternateContent xmlns:mc="http://schemas.openxmlformats.org/markup-compatibility/2006" xmlns:p14="http://schemas.microsoft.com/office/powerpoint/2010/main">
+    <mc:Choice Requires="p14">
+      <p:transition p14:dur="200">
+        <p:fade/>
+      </p:transition>
+    </mc:Choice>
+    <mc:Fallback xmlns="">
+      <p:transition>
+        <p:fade/>
+      </p:transition>
+    </mc:Fallback>
+  </mc:AlternateContent>
   <p:timing>
     <p:tnLst>
       <p:par>
@@ -12107,73 +12598,98 @@
         <p:spPr/>
         <p:txBody>
           <a:bodyPr>
-            <a:normAutofit/>
+            <a:noAutofit/>
           </a:bodyPr>
           <a:lstStyle/>
           <a:p>
             <a:r>
+              <a:rPr lang="en-US" sz="2800" dirty="0" smtClean="0"/>
+              <a:t>Continued software development</a:t>
+            </a:r>
+          </a:p>
+          <a:p>
+            <a:pPr lvl="1"/>
+            <a:r>
               <a:rPr lang="en-US" sz="2400" dirty="0" smtClean="0"/>
-              <a:t>Continued software development</a:t>
+              <a:t>Improve </a:t>
+            </a:r>
+            <a:r>
+              <a:rPr lang="en-US" sz="2400" dirty="0" smtClean="0"/>
+              <a:t>response time </a:t>
+            </a:r>
+            <a:r>
+              <a:rPr lang="en-US" sz="2400" dirty="0" smtClean="0"/>
+              <a:t>of head orientation</a:t>
             </a:r>
           </a:p>
           <a:p>
             <a:pPr lvl="1"/>
             <a:r>
-              <a:rPr lang="en-US" sz="2000" dirty="0" smtClean="0"/>
-              <a:t>Improve calculation of head orientation</a:t>
+              <a:rPr lang="en-US" sz="2400" dirty="0" smtClean="0"/>
+              <a:t>Improve filtering of GPS </a:t>
+            </a:r>
+            <a:r>
+              <a:rPr lang="en-US" sz="2400" dirty="0" smtClean="0"/>
+              <a:t>data (</a:t>
+            </a:r>
+            <a:r>
+              <a:rPr lang="en-US" sz="2400" smtClean="0"/>
+              <a:t>location precision)</a:t>
+            </a:r>
+            <a:endParaRPr lang="en-US" sz="2400" dirty="0" smtClean="0"/>
+          </a:p>
+          <a:p>
+            <a:pPr lvl="2"/>
+            <a:r>
+              <a:rPr lang="en-US" sz="1800" dirty="0" smtClean="0"/>
+              <a:t>Large “jumps” in position</a:t>
+            </a:r>
+            <a:endParaRPr lang="en-US" sz="1800" dirty="0" smtClean="0"/>
+          </a:p>
+          <a:p>
+            <a:r>
+              <a:rPr lang="en-US" sz="2400" dirty="0"/>
+              <a:t>Migrate software to new motherboard</a:t>
+            </a:r>
+          </a:p>
+          <a:p>
+            <a:r>
+              <a:rPr lang="en-US" sz="2400" dirty="0" smtClean="0"/>
+              <a:t>Finalize packaging modifications for larger display</a:t>
+            </a:r>
+          </a:p>
+          <a:p>
+            <a:r>
+              <a:rPr lang="en-US" sz="2400" dirty="0" smtClean="0"/>
+              <a:t>Testing of new hardware</a:t>
             </a:r>
           </a:p>
           <a:p>
             <a:pPr lvl="1"/>
             <a:r>
-              <a:rPr lang="en-US" sz="2000" dirty="0" smtClean="0"/>
-              <a:t>Improve filtering of GPS data</a:t>
-            </a:r>
-          </a:p>
-          <a:p>
-            <a:r>
-              <a:rPr lang="en-US" sz="2200" dirty="0"/>
-              <a:t>Migrate software to new motherboard</a:t>
-            </a:r>
-          </a:p>
-          <a:p>
-            <a:r>
-              <a:rPr lang="en-US" sz="2200" dirty="0" smtClean="0"/>
-              <a:t>Finalize packaging modifications for larger display</a:t>
-            </a:r>
-          </a:p>
-          <a:p>
-            <a:r>
-              <a:rPr lang="en-US" sz="2200" dirty="0" smtClean="0"/>
-              <a:t>Testing of new hardware</a:t>
+              <a:rPr lang="en-US" sz="2400" dirty="0" smtClean="0"/>
+              <a:t>Battery power and charging</a:t>
             </a:r>
           </a:p>
           <a:p>
             <a:pPr lvl="1"/>
             <a:r>
-              <a:rPr lang="en-US" sz="2000" dirty="0" smtClean="0"/>
-              <a:t>Battery power and charging</a:t>
+              <a:rPr lang="en-US" sz="2400" dirty="0" smtClean="0"/>
+              <a:t>Interfacing of </a:t>
+            </a:r>
+            <a:r>
+              <a:rPr lang="en-US" sz="2400" dirty="0" err="1" smtClean="0"/>
+              <a:t>Terasic</a:t>
+            </a:r>
+            <a:r>
+              <a:rPr lang="en-US" sz="2400" dirty="0" smtClean="0"/>
+              <a:t> board with existing microcontroller</a:t>
             </a:r>
           </a:p>
           <a:p>
             <a:pPr lvl="1"/>
             <a:r>
-              <a:rPr lang="en-US" sz="2000" dirty="0" smtClean="0"/>
-              <a:t>Interfacing of </a:t>
-            </a:r>
-            <a:r>
-              <a:rPr lang="en-US" sz="2000" dirty="0" err="1" smtClean="0"/>
-              <a:t>Terasic</a:t>
-            </a:r>
-            <a:r>
-              <a:rPr lang="en-US" sz="2000" dirty="0" smtClean="0"/>
-              <a:t> board with existing microcontroller</a:t>
-            </a:r>
-          </a:p>
-          <a:p>
-            <a:pPr lvl="1"/>
-            <a:r>
-              <a:rPr lang="en-US" sz="2000" dirty="0" smtClean="0"/>
+              <a:rPr lang="en-US" sz="2400" dirty="0" smtClean="0"/>
               <a:t>Display</a:t>
             </a:r>
           </a:p>
@@ -12212,6 +12728,18 @@
   <p:clrMapOvr>
     <a:masterClrMapping/>
   </p:clrMapOvr>
+  <mc:AlternateContent xmlns:mc="http://schemas.openxmlformats.org/markup-compatibility/2006" xmlns:p14="http://schemas.microsoft.com/office/powerpoint/2010/main">
+    <mc:Choice Requires="p14">
+      <p:transition p14:dur="200">
+        <p:fade/>
+      </p:transition>
+    </mc:Choice>
+    <mc:Fallback xmlns="">
+      <p:transition>
+        <p:fade/>
+      </p:transition>
+    </mc:Fallback>
+  </mc:AlternateContent>
   <p:timing>
     <p:tnLst>
       <p:par>
@@ -12344,6 +12872,18 @@
   <p:clrMapOvr>
     <a:masterClrMapping/>
   </p:clrMapOvr>
+  <mc:AlternateContent xmlns:mc="http://schemas.openxmlformats.org/markup-compatibility/2006" xmlns:p14="http://schemas.microsoft.com/office/powerpoint/2010/main">
+    <mc:Choice Requires="p14">
+      <p:transition p14:dur="200">
+        <p:fade/>
+      </p:transition>
+    </mc:Choice>
+    <mc:Fallback xmlns="">
+      <p:transition>
+        <p:fade/>
+      </p:transition>
+    </mc:Fallback>
+  </mc:AlternateContent>
   <p:timing>
     <p:tnLst>
       <p:par>
@@ -12422,6 +12962,18 @@
   <p:clrMapOvr>
     <a:masterClrMapping/>
   </p:clrMapOvr>
+  <mc:AlternateContent xmlns:mc="http://schemas.openxmlformats.org/markup-compatibility/2006" xmlns:p14="http://schemas.microsoft.com/office/powerpoint/2010/main">
+    <mc:Choice Requires="p14">
+      <p:transition p14:dur="200">
+        <p:fade/>
+      </p:transition>
+    </mc:Choice>
+    <mc:Fallback xmlns="">
+      <p:transition>
+        <p:fade/>
+      </p:transition>
+    </mc:Fallback>
+  </mc:AlternateContent>
   <p:timing>
     <p:tnLst>
       <p:par>
@@ -12511,6 +13063,18 @@
   <p:clrMapOvr>
     <a:masterClrMapping/>
   </p:clrMapOvr>
+  <mc:AlternateContent xmlns:mc="http://schemas.openxmlformats.org/markup-compatibility/2006" xmlns:p14="http://schemas.microsoft.com/office/powerpoint/2010/main">
+    <mc:Choice Requires="p14">
+      <p:transition p14:dur="200">
+        <p:fade/>
+      </p:transition>
+    </mc:Choice>
+    <mc:Fallback xmlns="">
+      <p:transition>
+        <p:fade/>
+      </p:transition>
+    </mc:Fallback>
+  </mc:AlternateContent>
   <p:timing>
     <p:tnLst>
       <p:par>
@@ -12600,6 +13164,18 @@
   <p:clrMapOvr>
     <a:masterClrMapping/>
   </p:clrMapOvr>
+  <mc:AlternateContent xmlns:mc="http://schemas.openxmlformats.org/markup-compatibility/2006" xmlns:p14="http://schemas.microsoft.com/office/powerpoint/2010/main">
+    <mc:Choice Requires="p14">
+      <p:transition p14:dur="200">
+        <p:fade/>
+      </p:transition>
+    </mc:Choice>
+    <mc:Fallback xmlns="">
+      <p:transition>
+        <p:fade/>
+      </p:transition>
+    </mc:Fallback>
+  </mc:AlternateContent>
   <p:timing>
     <p:tnLst>
       <p:par>
@@ -12639,117 +13215,121 @@
         </p:nvSpPr>
         <p:spPr/>
         <p:txBody>
-          <a:bodyPr/>
+          <a:bodyPr>
+            <a:normAutofit/>
+          </a:bodyPr>
           <a:lstStyle/>
           <a:p>
             <a:r>
-              <a:rPr lang="en-US" dirty="0" smtClean="0"/>
+              <a:rPr lang="en-US" sz="2400" dirty="0" smtClean="0"/>
               <a:t>Wearable augmented reality </a:t>
             </a:r>
             <a:r>
-              <a:rPr lang="en-US" dirty="0"/>
+              <a:rPr lang="en-US" sz="2400" dirty="0"/>
               <a:t>is </a:t>
             </a:r>
             <a:r>
-              <a:rPr lang="en-US" dirty="0" smtClean="0"/>
+              <a:rPr lang="en-US" sz="2400" dirty="0" smtClean="0"/>
               <a:t>emerging quickly</a:t>
             </a:r>
           </a:p>
           <a:p>
             <a:pPr lvl="1"/>
             <a:r>
-              <a:rPr lang="en-US" dirty="0" smtClean="0"/>
+              <a:rPr lang="en-US" sz="2000" dirty="0" smtClean="0"/>
               <a:t>Google Glass, Oculus Rift, Epson BT-100</a:t>
             </a:r>
           </a:p>
           <a:p>
             <a:pPr lvl="1"/>
             <a:r>
-              <a:rPr lang="en-US" dirty="0" smtClean="0"/>
+              <a:rPr lang="en-US" sz="2000" dirty="0" smtClean="0"/>
               <a:t>Provide information</a:t>
             </a:r>
           </a:p>
           <a:p>
             <a:pPr lvl="1"/>
             <a:r>
-              <a:rPr lang="en-US" dirty="0" smtClean="0"/>
+              <a:rPr lang="en-US" sz="2000" dirty="0" smtClean="0"/>
               <a:t>Promote teamwork</a:t>
             </a:r>
           </a:p>
           <a:p>
             <a:pPr lvl="1"/>
             <a:r>
-              <a:rPr lang="en-US" dirty="0" smtClean="0"/>
+              <a:rPr lang="en-US" sz="2000" dirty="0" smtClean="0"/>
               <a:t>Decrease need for physical objects</a:t>
             </a:r>
           </a:p>
           <a:p>
             <a:r>
-              <a:rPr lang="en-US" dirty="0" smtClean="0"/>
-              <a:t>Design Requirements:</a:t>
-            </a:r>
+              <a:rPr lang="en-US" sz="2400" dirty="0" smtClean="0"/>
+              <a:t>Design requirements</a:t>
+            </a:r>
+            <a:r>
+              <a:rPr lang="en-US" sz="2400" dirty="0"/>
+              <a:t>:</a:t>
+            </a:r>
+            <a:endParaRPr lang="en-US" sz="2400" dirty="0" smtClean="0"/>
           </a:p>
           <a:p>
             <a:pPr lvl="1"/>
             <a:r>
-              <a:rPr lang="en-US" dirty="0" smtClean="0"/>
+              <a:rPr lang="en-US" sz="2000" dirty="0" smtClean="0"/>
               <a:t>Portable </a:t>
             </a:r>
             <a:r>
-              <a:rPr lang="en-US" dirty="0"/>
+              <a:rPr lang="en-US" sz="2000" dirty="0"/>
               <a:t>and </a:t>
             </a:r>
             <a:r>
-              <a:rPr lang="en-US" dirty="0" smtClean="0"/>
-              <a:t>Comfortable</a:t>
-            </a:r>
-            <a:endParaRPr lang="en-US" dirty="0"/>
+              <a:rPr lang="en-US" sz="2000" dirty="0" smtClean="0"/>
+              <a:t>comfortable</a:t>
+            </a:r>
+            <a:endParaRPr lang="en-US" sz="2000" dirty="0"/>
           </a:p>
           <a:p>
             <a:pPr lvl="1"/>
             <a:r>
-              <a:rPr lang="en-US" dirty="0" smtClean="0"/>
+              <a:rPr lang="en-US" sz="2000" dirty="0" smtClean="0"/>
               <a:t>Track user position </a:t>
             </a:r>
             <a:r>
-              <a:rPr lang="en-US" dirty="0"/>
+              <a:rPr lang="en-US" sz="2000" dirty="0"/>
               <a:t>and </a:t>
             </a:r>
             <a:r>
-              <a:rPr lang="en-US" dirty="0" smtClean="0"/>
+              <a:rPr lang="en-US" sz="2000" dirty="0" smtClean="0"/>
               <a:t>head orientation</a:t>
             </a:r>
-            <a:endParaRPr lang="en-US" dirty="0"/>
+            <a:endParaRPr lang="en-US" sz="2000" dirty="0"/>
           </a:p>
           <a:p>
             <a:pPr lvl="1"/>
             <a:r>
-              <a:rPr lang="en-US" dirty="0" smtClean="0"/>
-              <a:t>Wireless </a:t>
-            </a:r>
-            <a:r>
-              <a:rPr lang="en-US" dirty="0"/>
-              <a:t>Communication</a:t>
-            </a:r>
+              <a:rPr lang="en-US" sz="2000" dirty="0" smtClean="0"/>
+              <a:t>Wireless communication</a:t>
+            </a:r>
+            <a:endParaRPr lang="en-US" sz="2000" dirty="0"/>
           </a:p>
           <a:p>
             <a:pPr lvl="1"/>
             <a:r>
-              <a:rPr lang="en-US" dirty="0" smtClean="0"/>
+              <a:rPr lang="en-US" sz="2000" dirty="0" smtClean="0"/>
               <a:t>Easy </a:t>
             </a:r>
             <a:r>
-              <a:rPr lang="en-US" dirty="0"/>
+              <a:rPr lang="en-US" sz="2000" dirty="0"/>
               <a:t>to set up and use</a:t>
             </a:r>
           </a:p>
           <a:p>
             <a:pPr lvl="1"/>
             <a:r>
-              <a:rPr lang="en-US" dirty="0" smtClean="0"/>
-              <a:t>Transparent display, easy to see</a:t>
-            </a:r>
-            <a:endParaRPr lang="en-US" dirty="0"/>
+              <a:rPr lang="en-US" sz="2000" dirty="0" smtClean="0"/>
+              <a:t>Maintain peripheral vision</a:t>
+            </a:r>
+            <a:endParaRPr lang="en-US" sz="2000" dirty="0"/>
           </a:p>
         </p:txBody>
       </p:sp>
@@ -12786,6 +13366,18 @@
   <p:clrMapOvr>
     <a:masterClrMapping/>
   </p:clrMapOvr>
+  <mc:AlternateContent xmlns:mc="http://schemas.openxmlformats.org/markup-compatibility/2006" xmlns:p14="http://schemas.microsoft.com/office/powerpoint/2010/main">
+    <mc:Choice Requires="p14">
+      <p:transition p14:dur="200">
+        <p:fade/>
+      </p:transition>
+    </mc:Choice>
+    <mc:Fallback xmlns="">
+      <p:transition>
+        <p:fade/>
+      </p:transition>
+    </mc:Fallback>
+  </mc:AlternateContent>
   <p:timing>
     <p:tnLst>
       <p:par>
@@ -12832,7 +13424,7 @@
           <a:p>
             <a:r>
               <a:rPr lang="en-US" sz="2400" dirty="0" smtClean="0"/>
-              <a:t>Artistic Performance</a:t>
+              <a:t>Artistic performance</a:t>
             </a:r>
           </a:p>
           <a:p>
@@ -12862,7 +13454,7 @@
           <a:p>
             <a:r>
               <a:rPr lang="en-US" sz="2400" dirty="0" smtClean="0"/>
-              <a:t>Train a New Employee</a:t>
+              <a:t>Train a new employee</a:t>
             </a:r>
           </a:p>
           <a:p>
@@ -12899,7 +13491,7 @@
           <a:p>
             <a:r>
               <a:rPr lang="en-US" sz="2400" dirty="0" smtClean="0"/>
-              <a:t>Educational Demonstrations</a:t>
+              <a:t>Educational demonstrations</a:t>
             </a:r>
           </a:p>
           <a:p>
@@ -12925,12 +13517,243 @@
           </a:p>
           <a:p>
             <a:r>
+              <a:rPr lang="en-US" sz="2400" dirty="0"/>
+              <a:t>Gaming</a:t>
+            </a:r>
+          </a:p>
+          <a:p>
+            <a:pPr lvl="1"/>
+            <a:r>
+              <a:rPr lang="en-US" sz="2200" dirty="0"/>
+              <a:t>Rely </a:t>
+            </a:r>
+            <a:r>
+              <a:rPr lang="en-US" sz="2200" dirty="0" smtClean="0"/>
+              <a:t>on “imaginary” objects placed in a select location</a:t>
+            </a:r>
+            <a:endParaRPr lang="en-US" sz="2200" dirty="0"/>
+          </a:p>
+        </p:txBody>
+      </p:sp>
+      <p:sp>
+        <p:nvSpPr>
+          <p:cNvPr id="3" name="Title 2"/>
+          <p:cNvSpPr>
+            <a:spLocks noGrp="1"/>
+          </p:cNvSpPr>
+          <p:nvPr>
+            <p:ph type="title"/>
+          </p:nvPr>
+        </p:nvSpPr>
+        <p:spPr/>
+        <p:txBody>
+          <a:bodyPr/>
+          <a:lstStyle/>
+          <a:p>
+            <a:r>
+              <a:rPr lang="en-US" dirty="0" smtClean="0"/>
+              <a:t>USE cases</a:t>
+            </a:r>
+            <a:endParaRPr lang="en-US" dirty="0"/>
+          </a:p>
+        </p:txBody>
+      </p:sp>
+      <p:sp>
+        <p:nvSpPr>
+          <p:cNvPr id="4" name="Content Placeholder 1"/>
+          <p:cNvSpPr txBox="1">
+            <a:spLocks/>
+          </p:cNvSpPr>
+          <p:nvPr/>
+        </p:nvSpPr>
+        <p:spPr>
+          <a:xfrm>
+            <a:off x="381000" y="1524000"/>
+            <a:ext cx="8407893" cy="4602479"/>
+          </a:xfrm>
+          <a:prstGeom prst="rect">
+            <a:avLst/>
+          </a:prstGeom>
+        </p:spPr>
+        <p:txBody>
+          <a:bodyPr vert="horz" lIns="91440" tIns="45720" rIns="91440" bIns="45720" rtlCol="0">
+            <a:noAutofit/>
+          </a:bodyPr>
+          <a:lstStyle>
+            <a:lvl1pPr marL="274320" indent="-228600" algn="l" defTabSz="914400" rtl="0" eaLnBrk="1" latinLnBrk="0" hangingPunct="1">
+              <a:spcBef>
+                <a:spcPct val="20000"/>
+              </a:spcBef>
+              <a:buClr>
+                <a:schemeClr val="accent1"/>
+              </a:buClr>
+              <a:buFont typeface="Wingdings 2" pitchFamily="18" charset="2"/>
+              <a:buChar char=""/>
+              <a:defRPr sz="2000" kern="1200" spc="150" baseline="0">
+                <a:solidFill>
+                  <a:schemeClr val="tx2"/>
+                </a:solidFill>
+                <a:latin typeface="+mn-lt"/>
+                <a:ea typeface="+mn-ea"/>
+                <a:cs typeface="+mn-cs"/>
+              </a:defRPr>
+            </a:lvl1pPr>
+            <a:lvl2pPr marL="548640" indent="-182880" algn="l" defTabSz="914400" rtl="0" eaLnBrk="1" latinLnBrk="0" hangingPunct="1">
+              <a:spcBef>
+                <a:spcPct val="20000"/>
+              </a:spcBef>
+              <a:buClr>
+                <a:schemeClr val="accent2"/>
+              </a:buClr>
+              <a:buFont typeface="Wingdings" pitchFamily="2" charset="2"/>
+              <a:buChar char="§"/>
+              <a:defRPr sz="1800" kern="1200" spc="100" baseline="0">
+                <a:solidFill>
+                  <a:schemeClr val="tx2"/>
+                </a:solidFill>
+                <a:latin typeface="+mn-lt"/>
+                <a:ea typeface="+mn-ea"/>
+                <a:cs typeface="+mn-cs"/>
+              </a:defRPr>
+            </a:lvl2pPr>
+            <a:lvl3pPr marL="822960" indent="-182880" algn="l" defTabSz="914400" rtl="0" eaLnBrk="1" latinLnBrk="0" hangingPunct="1">
+              <a:spcBef>
+                <a:spcPct val="20000"/>
+              </a:spcBef>
+              <a:buClr>
+                <a:schemeClr val="accent3"/>
+              </a:buClr>
+              <a:buFont typeface="Wingdings" pitchFamily="2" charset="2"/>
+              <a:buChar char="§"/>
+              <a:defRPr sz="1600" kern="1200" spc="100" baseline="0">
+                <a:solidFill>
+                  <a:schemeClr val="tx2"/>
+                </a:solidFill>
+                <a:latin typeface="+mn-lt"/>
+                <a:ea typeface="+mn-ea"/>
+                <a:cs typeface="+mn-cs"/>
+              </a:defRPr>
+            </a:lvl3pPr>
+            <a:lvl4pPr marL="1097280" indent="-182880" algn="l" defTabSz="914400" rtl="0" eaLnBrk="1" latinLnBrk="0" hangingPunct="1">
+              <a:spcBef>
+                <a:spcPct val="20000"/>
+              </a:spcBef>
+              <a:buClr>
+                <a:schemeClr val="accent4"/>
+              </a:buClr>
+              <a:buFont typeface="Wingdings" pitchFamily="2" charset="2"/>
+              <a:buChar char="§"/>
+              <a:defRPr sz="1400" kern="1200">
+                <a:solidFill>
+                  <a:schemeClr val="tx2"/>
+                </a:solidFill>
+                <a:latin typeface="+mn-lt"/>
+                <a:ea typeface="+mn-ea"/>
+                <a:cs typeface="+mn-cs"/>
+              </a:defRPr>
+            </a:lvl4pPr>
+            <a:lvl5pPr marL="1280160" indent="-182880" algn="l" defTabSz="914400" rtl="0" eaLnBrk="1" latinLnBrk="0" hangingPunct="1">
+              <a:spcBef>
+                <a:spcPct val="20000"/>
+              </a:spcBef>
+              <a:buClr>
+                <a:schemeClr val="accent6"/>
+              </a:buClr>
+              <a:buFont typeface="Wingdings" pitchFamily="2" charset="2"/>
+              <a:buChar char="§"/>
+              <a:defRPr sz="1300" kern="1200" spc="100" baseline="0">
+                <a:solidFill>
+                  <a:schemeClr val="tx2"/>
+                </a:solidFill>
+                <a:latin typeface="+mn-lt"/>
+                <a:ea typeface="+mn-ea"/>
+                <a:cs typeface="+mn-cs"/>
+              </a:defRPr>
+            </a:lvl5pPr>
+            <a:lvl6pPr marL="1554480" indent="-182880" algn="l" defTabSz="914400" rtl="0" eaLnBrk="1" latinLnBrk="0" hangingPunct="1">
+              <a:spcBef>
+                <a:spcPct val="20000"/>
+              </a:spcBef>
+              <a:buClr>
+                <a:schemeClr val="accent1"/>
+              </a:buClr>
+              <a:buFont typeface="Wingdings" pitchFamily="2" charset="2"/>
+              <a:buChar char="§"/>
+              <a:defRPr sz="1200" kern="1200">
+                <a:solidFill>
+                  <a:schemeClr val="tx2"/>
+                </a:solidFill>
+                <a:latin typeface="+mn-lt"/>
+                <a:ea typeface="+mn-ea"/>
+                <a:cs typeface="+mn-cs"/>
+              </a:defRPr>
+            </a:lvl6pPr>
+            <a:lvl7pPr marL="1828800" indent="-182880" algn="l" defTabSz="914400" rtl="0" eaLnBrk="1" latinLnBrk="0" hangingPunct="1">
+              <a:spcBef>
+                <a:spcPct val="20000"/>
+              </a:spcBef>
+              <a:buClr>
+                <a:schemeClr val="accent2"/>
+              </a:buClr>
+              <a:buFont typeface="Wingdings" pitchFamily="2" charset="2"/>
+              <a:buChar char="§"/>
+              <a:defRPr sz="1200" kern="1200">
+                <a:solidFill>
+                  <a:schemeClr val="tx2"/>
+                </a:solidFill>
+                <a:latin typeface="+mn-lt"/>
+                <a:ea typeface="+mn-ea"/>
+                <a:cs typeface="+mn-cs"/>
+              </a:defRPr>
+            </a:lvl7pPr>
+            <a:lvl8pPr marL="2103120" indent="-182880" algn="l" defTabSz="914400" rtl="0" eaLnBrk="1" latinLnBrk="0" hangingPunct="1">
+              <a:spcBef>
+                <a:spcPct val="20000"/>
+              </a:spcBef>
+              <a:buClr>
+                <a:schemeClr val="accent3"/>
+              </a:buClr>
+              <a:buFont typeface="Wingdings" pitchFamily="2" charset="2"/>
+              <a:buChar char="§"/>
+              <a:defRPr sz="1200" kern="1200">
+                <a:solidFill>
+                  <a:schemeClr val="tx2"/>
+                </a:solidFill>
+                <a:latin typeface="+mn-lt"/>
+                <a:ea typeface="+mn-ea"/>
+                <a:cs typeface="+mn-cs"/>
+              </a:defRPr>
+            </a:lvl8pPr>
+            <a:lvl9pPr marL="2377440" indent="-182880" algn="l" defTabSz="914400" rtl="0" eaLnBrk="1" latinLnBrk="0" hangingPunct="1">
+              <a:spcBef>
+                <a:spcPct val="20000"/>
+              </a:spcBef>
+              <a:buClr>
+                <a:schemeClr val="accent5"/>
+              </a:buClr>
+              <a:buFont typeface="Wingdings" pitchFamily="2" charset="2"/>
+              <a:buChar char="§"/>
+              <a:defRPr sz="1200" kern="1200">
+                <a:solidFill>
+                  <a:schemeClr val="tx2"/>
+                </a:solidFill>
+                <a:latin typeface="+mn-lt"/>
+                <a:ea typeface="+mn-ea"/>
+                <a:cs typeface="+mn-cs"/>
+              </a:defRPr>
+            </a:lvl9pPr>
+          </a:lstStyle>
+          <a:p>
+            <a:r>
               <a:rPr lang="en-US" sz="2400" dirty="0" smtClean="0">
                 <a:solidFill>
-                  <a:srgbClr val="FF0000"/>
+                  <a:schemeClr val="tx2">
+                    <a:lumMod val="60000"/>
+                    <a:lumOff val="40000"/>
+                  </a:schemeClr>
                 </a:solidFill>
               </a:rPr>
-              <a:t>Children Playing Games</a:t>
+              <a:t>Artistic performance</a:t>
             </a:r>
           </a:p>
           <a:p>
@@ -12938,34 +13761,109 @@
             <a:r>
               <a:rPr lang="en-US" sz="2200" dirty="0" smtClean="0">
                 <a:solidFill>
-                  <a:srgbClr val="FF0000"/>
+                  <a:schemeClr val="tx2">
+                    <a:lumMod val="60000"/>
+                    <a:lumOff val="40000"/>
+                  </a:schemeClr>
                 </a:solidFill>
               </a:rPr>
+              <a:t>Performers need to know where to be and when</a:t>
+            </a:r>
+          </a:p>
+          <a:p>
+            <a:r>
+              <a:rPr lang="en-US" sz="2400" dirty="0" smtClean="0">
+                <a:solidFill>
+                  <a:schemeClr val="tx2">
+                    <a:lumMod val="60000"/>
+                    <a:lumOff val="40000"/>
+                  </a:schemeClr>
+                </a:solidFill>
+              </a:rPr>
+              <a:t>Train a new employee</a:t>
+            </a:r>
+          </a:p>
+          <a:p>
+            <a:pPr lvl="1"/>
+            <a:r>
+              <a:rPr lang="en-US" sz="2200" dirty="0" smtClean="0">
+                <a:solidFill>
+                  <a:schemeClr val="tx2">
+                    <a:lumMod val="60000"/>
+                    <a:lumOff val="40000"/>
+                  </a:schemeClr>
+                </a:solidFill>
+              </a:rPr>
+              <a:t>Show a physical demonstration of equipment</a:t>
+            </a:r>
+          </a:p>
+          <a:p>
+            <a:pPr lvl="1"/>
+            <a:r>
+              <a:rPr lang="en-US" sz="2200" dirty="0" smtClean="0">
+                <a:solidFill>
+                  <a:schemeClr val="tx2">
+                    <a:lumMod val="60000"/>
+                    <a:lumOff val="40000"/>
+                  </a:schemeClr>
+                </a:solidFill>
+              </a:rPr>
+              <a:t>Employee may observe machinery in operation</a:t>
+            </a:r>
+          </a:p>
+          <a:p>
+            <a:r>
+              <a:rPr lang="en-US" sz="2400" dirty="0" smtClean="0">
+                <a:solidFill>
+                  <a:schemeClr val="tx2">
+                    <a:lumMod val="60000"/>
+                    <a:lumOff val="40000"/>
+                  </a:schemeClr>
+                </a:solidFill>
+              </a:rPr>
+              <a:t>Educational demonstrations</a:t>
+            </a:r>
+          </a:p>
+          <a:p>
+            <a:pPr lvl="1"/>
+            <a:r>
+              <a:rPr lang="en-US" sz="2200" dirty="0" smtClean="0">
+                <a:solidFill>
+                  <a:schemeClr val="tx2">
+                    <a:lumMod val="60000"/>
+                    <a:lumOff val="40000"/>
+                  </a:schemeClr>
+                </a:solidFill>
+              </a:rPr>
+              <a:t>Place virtual resources in appropriate locations</a:t>
+            </a:r>
+          </a:p>
+          <a:p>
+            <a:r>
+              <a:rPr lang="en-US" sz="2400" dirty="0" smtClean="0">
+                <a:solidFill>
+                  <a:schemeClr val="tx2">
+                    <a:lumMod val="60000"/>
+                    <a:lumOff val="40000"/>
+                  </a:schemeClr>
+                </a:solidFill>
+              </a:rPr>
+              <a:t>Virtual tour, guide, or navigation</a:t>
+            </a:r>
+          </a:p>
+          <a:p>
+            <a:r>
+              <a:rPr lang="en-US" sz="2400" u="sng" dirty="0" smtClean="0"/>
+              <a:t>Gaming</a:t>
+            </a:r>
+          </a:p>
+          <a:p>
+            <a:pPr lvl="1"/>
+            <a:r>
+              <a:rPr lang="en-US" sz="2200" u="sng" dirty="0" smtClean="0"/>
               <a:t>Rely on “imaginary” objects placed in a select location</a:t>
             </a:r>
-          </a:p>
-        </p:txBody>
-      </p:sp>
-      <p:sp>
-        <p:nvSpPr>
-          <p:cNvPr id="3" name="Title 2"/>
-          <p:cNvSpPr>
-            <a:spLocks noGrp="1"/>
-          </p:cNvSpPr>
-          <p:nvPr>
-            <p:ph type="title"/>
-          </p:nvPr>
-        </p:nvSpPr>
-        <p:spPr/>
-        <p:txBody>
-          <a:bodyPr/>
-          <a:lstStyle/>
-          <a:p>
-            <a:r>
-              <a:rPr lang="en-US" dirty="0" smtClean="0"/>
-              <a:t>USE cases</a:t>
-            </a:r>
-            <a:endParaRPr lang="en-US" dirty="0"/>
+            <a:endParaRPr lang="en-US" sz="2200" u="sng" dirty="0"/>
           </a:p>
         </p:txBody>
       </p:sp>
@@ -12979,12 +13877,406 @@
   <p:clrMapOvr>
     <a:masterClrMapping/>
   </p:clrMapOvr>
+  <mc:AlternateContent xmlns:mc="http://schemas.openxmlformats.org/markup-compatibility/2006" xmlns:p14="http://schemas.microsoft.com/office/powerpoint/2010/main">
+    <mc:Choice Requires="p14">
+      <p:transition p14:dur="200">
+        <p:fade/>
+      </p:transition>
+    </mc:Choice>
+    <mc:Fallback xmlns="">
+      <p:transition>
+        <p:fade/>
+      </p:transition>
+    </mc:Fallback>
+  </mc:AlternateContent>
   <p:timing>
     <p:tnLst>
       <p:par>
-        <p:cTn id="1" dur="indefinite" restart="never" nodeType="tmRoot"/>
+        <p:cTn id="1" dur="indefinite" restart="never" nodeType="tmRoot">
+          <p:childTnLst>
+            <p:seq concurrent="1" nextAc="seek">
+              <p:cTn id="2" dur="indefinite" nodeType="mainSeq">
+                <p:childTnLst>
+                  <p:par>
+                    <p:cTn id="3" fill="hold">
+                      <p:stCondLst>
+                        <p:cond delay="indefinite"/>
+                      </p:stCondLst>
+                      <p:childTnLst>
+                        <p:par>
+                          <p:cTn id="4" fill="hold">
+                            <p:stCondLst>
+                              <p:cond delay="0"/>
+                            </p:stCondLst>
+                            <p:childTnLst>
+                              <p:par>
+                                <p:cTn id="5" presetID="1" presetClass="entr" presetSubtype="0" fill="hold" grpId="0" nodeType="clickEffect">
+                                  <p:stCondLst>
+                                    <p:cond delay="0"/>
+                                  </p:stCondLst>
+                                  <p:childTnLst>
+                                    <p:set>
+                                      <p:cBhvr>
+                                        <p:cTn id="6" dur="1" fill="hold">
+                                          <p:stCondLst>
+                                            <p:cond delay="0"/>
+                                          </p:stCondLst>
+                                        </p:cTn>
+                                        <p:tgtEl>
+                                          <p:spTgt spid="4"/>
+                                        </p:tgtEl>
+                                        <p:attrNameLst>
+                                          <p:attrName>style.visibility</p:attrName>
+                                        </p:attrNameLst>
+                                      </p:cBhvr>
+                                      <p:to>
+                                        <p:strVal val="visible"/>
+                                      </p:to>
+                                    </p:set>
+                                  </p:childTnLst>
+                                </p:cTn>
+                              </p:par>
+                              <p:par>
+                                <p:cTn id="7" presetID="1" presetClass="exit" presetSubtype="0" fill="hold" grpId="0" nodeType="withEffect">
+                                  <p:stCondLst>
+                                    <p:cond delay="0"/>
+                                  </p:stCondLst>
+                                  <p:childTnLst>
+                                    <p:set>
+                                      <p:cBhvr>
+                                        <p:cTn id="8" dur="1" fill="hold">
+                                          <p:stCondLst>
+                                            <p:cond delay="0"/>
+                                          </p:stCondLst>
+                                        </p:cTn>
+                                        <p:tgtEl>
+                                          <p:spTgt spid="2">
+                                            <p:txEl>
+                                              <p:pRg st="0" end="0"/>
+                                            </p:txEl>
+                                          </p:spTgt>
+                                        </p:tgtEl>
+                                        <p:attrNameLst>
+                                          <p:attrName>style.visibility</p:attrName>
+                                        </p:attrNameLst>
+                                      </p:cBhvr>
+                                      <p:to>
+                                        <p:strVal val="hidden"/>
+                                      </p:to>
+                                    </p:set>
+                                  </p:childTnLst>
+                                </p:cTn>
+                              </p:par>
+                              <p:par>
+                                <p:cTn id="9" presetID="1" presetClass="exit" presetSubtype="0" fill="hold" grpId="0" nodeType="withEffect">
+                                  <p:stCondLst>
+                                    <p:cond delay="0"/>
+                                  </p:stCondLst>
+                                  <p:childTnLst>
+                                    <p:set>
+                                      <p:cBhvr>
+                                        <p:cTn id="10" dur="1" fill="hold">
+                                          <p:stCondLst>
+                                            <p:cond delay="0"/>
+                                          </p:stCondLst>
+                                        </p:cTn>
+                                        <p:tgtEl>
+                                          <p:spTgt spid="2">
+                                            <p:txEl>
+                                              <p:pRg st="1" end="1"/>
+                                            </p:txEl>
+                                          </p:spTgt>
+                                        </p:tgtEl>
+                                        <p:attrNameLst>
+                                          <p:attrName>style.visibility</p:attrName>
+                                        </p:attrNameLst>
+                                      </p:cBhvr>
+                                      <p:to>
+                                        <p:strVal val="hidden"/>
+                                      </p:to>
+                                    </p:set>
+                                  </p:childTnLst>
+                                </p:cTn>
+                              </p:par>
+                              <p:par>
+                                <p:cTn id="11" presetID="1" presetClass="exit" presetSubtype="0" fill="hold" grpId="0" nodeType="withEffect">
+                                  <p:stCondLst>
+                                    <p:cond delay="0"/>
+                                  </p:stCondLst>
+                                  <p:childTnLst>
+                                    <p:set>
+                                      <p:cBhvr>
+                                        <p:cTn id="12" dur="1" fill="hold">
+                                          <p:stCondLst>
+                                            <p:cond delay="0"/>
+                                          </p:stCondLst>
+                                        </p:cTn>
+                                        <p:tgtEl>
+                                          <p:spTgt spid="2">
+                                            <p:txEl>
+                                              <p:pRg st="2" end="2"/>
+                                            </p:txEl>
+                                          </p:spTgt>
+                                        </p:tgtEl>
+                                        <p:attrNameLst>
+                                          <p:attrName>style.visibility</p:attrName>
+                                        </p:attrNameLst>
+                                      </p:cBhvr>
+                                      <p:to>
+                                        <p:strVal val="hidden"/>
+                                      </p:to>
+                                    </p:set>
+                                  </p:childTnLst>
+                                </p:cTn>
+                              </p:par>
+                              <p:par>
+                                <p:cTn id="13" presetID="1" presetClass="exit" presetSubtype="0" fill="hold" grpId="0" nodeType="withEffect">
+                                  <p:stCondLst>
+                                    <p:cond delay="0"/>
+                                  </p:stCondLst>
+                                  <p:childTnLst>
+                                    <p:set>
+                                      <p:cBhvr>
+                                        <p:cTn id="14" dur="1" fill="hold">
+                                          <p:stCondLst>
+                                            <p:cond delay="0"/>
+                                          </p:stCondLst>
+                                        </p:cTn>
+                                        <p:tgtEl>
+                                          <p:spTgt spid="2">
+                                            <p:txEl>
+                                              <p:pRg st="3" end="3"/>
+                                            </p:txEl>
+                                          </p:spTgt>
+                                        </p:tgtEl>
+                                        <p:attrNameLst>
+                                          <p:attrName>style.visibility</p:attrName>
+                                        </p:attrNameLst>
+                                      </p:cBhvr>
+                                      <p:to>
+                                        <p:strVal val="hidden"/>
+                                      </p:to>
+                                    </p:set>
+                                  </p:childTnLst>
+                                </p:cTn>
+                              </p:par>
+                              <p:par>
+                                <p:cTn id="15" presetID="1" presetClass="exit" presetSubtype="0" fill="hold" grpId="0" nodeType="withEffect">
+                                  <p:stCondLst>
+                                    <p:cond delay="0"/>
+                                  </p:stCondLst>
+                                  <p:childTnLst>
+                                    <p:set>
+                                      <p:cBhvr>
+                                        <p:cTn id="16" dur="1" fill="hold">
+                                          <p:stCondLst>
+                                            <p:cond delay="0"/>
+                                          </p:stCondLst>
+                                        </p:cTn>
+                                        <p:tgtEl>
+                                          <p:spTgt spid="2">
+                                            <p:txEl>
+                                              <p:pRg st="4" end="4"/>
+                                            </p:txEl>
+                                          </p:spTgt>
+                                        </p:tgtEl>
+                                        <p:attrNameLst>
+                                          <p:attrName>style.visibility</p:attrName>
+                                        </p:attrNameLst>
+                                      </p:cBhvr>
+                                      <p:to>
+                                        <p:strVal val="hidden"/>
+                                      </p:to>
+                                    </p:set>
+                                  </p:childTnLst>
+                                </p:cTn>
+                              </p:par>
+                              <p:par>
+                                <p:cTn id="17" presetID="1" presetClass="exit" presetSubtype="0" fill="hold" grpId="0" nodeType="withEffect">
+                                  <p:stCondLst>
+                                    <p:cond delay="0"/>
+                                  </p:stCondLst>
+                                  <p:childTnLst>
+                                    <p:set>
+                                      <p:cBhvr>
+                                        <p:cTn id="18" dur="1" fill="hold">
+                                          <p:stCondLst>
+                                            <p:cond delay="0"/>
+                                          </p:stCondLst>
+                                        </p:cTn>
+                                        <p:tgtEl>
+                                          <p:spTgt spid="2">
+                                            <p:txEl>
+                                              <p:pRg st="5" end="5"/>
+                                            </p:txEl>
+                                          </p:spTgt>
+                                        </p:tgtEl>
+                                        <p:attrNameLst>
+                                          <p:attrName>style.visibility</p:attrName>
+                                        </p:attrNameLst>
+                                      </p:cBhvr>
+                                      <p:to>
+                                        <p:strVal val="hidden"/>
+                                      </p:to>
+                                    </p:set>
+                                  </p:childTnLst>
+                                </p:cTn>
+                              </p:par>
+                              <p:par>
+                                <p:cTn id="19" presetID="1" presetClass="exit" presetSubtype="0" fill="hold" grpId="0" nodeType="withEffect">
+                                  <p:stCondLst>
+                                    <p:cond delay="0"/>
+                                  </p:stCondLst>
+                                  <p:childTnLst>
+                                    <p:set>
+                                      <p:cBhvr>
+                                        <p:cTn id="20" dur="1" fill="hold">
+                                          <p:stCondLst>
+                                            <p:cond delay="0"/>
+                                          </p:stCondLst>
+                                        </p:cTn>
+                                        <p:tgtEl>
+                                          <p:spTgt spid="2">
+                                            <p:txEl>
+                                              <p:pRg st="6" end="6"/>
+                                            </p:txEl>
+                                          </p:spTgt>
+                                        </p:tgtEl>
+                                        <p:attrNameLst>
+                                          <p:attrName>style.visibility</p:attrName>
+                                        </p:attrNameLst>
+                                      </p:cBhvr>
+                                      <p:to>
+                                        <p:strVal val="hidden"/>
+                                      </p:to>
+                                    </p:set>
+                                  </p:childTnLst>
+                                </p:cTn>
+                              </p:par>
+                              <p:par>
+                                <p:cTn id="21" presetID="1" presetClass="exit" presetSubtype="0" fill="hold" grpId="0" nodeType="withEffect">
+                                  <p:stCondLst>
+                                    <p:cond delay="0"/>
+                                  </p:stCondLst>
+                                  <p:childTnLst>
+                                    <p:set>
+                                      <p:cBhvr>
+                                        <p:cTn id="22" dur="1" fill="hold">
+                                          <p:stCondLst>
+                                            <p:cond delay="0"/>
+                                          </p:stCondLst>
+                                        </p:cTn>
+                                        <p:tgtEl>
+                                          <p:spTgt spid="2">
+                                            <p:txEl>
+                                              <p:pRg st="7" end="7"/>
+                                            </p:txEl>
+                                          </p:spTgt>
+                                        </p:tgtEl>
+                                        <p:attrNameLst>
+                                          <p:attrName>style.visibility</p:attrName>
+                                        </p:attrNameLst>
+                                      </p:cBhvr>
+                                      <p:to>
+                                        <p:strVal val="hidden"/>
+                                      </p:to>
+                                    </p:set>
+                                  </p:childTnLst>
+                                </p:cTn>
+                              </p:par>
+                              <p:par>
+                                <p:cTn id="23" presetID="1" presetClass="exit" presetSubtype="0" fill="hold" grpId="0" nodeType="withEffect">
+                                  <p:stCondLst>
+                                    <p:cond delay="0"/>
+                                  </p:stCondLst>
+                                  <p:childTnLst>
+                                    <p:set>
+                                      <p:cBhvr>
+                                        <p:cTn id="24" dur="1" fill="hold">
+                                          <p:stCondLst>
+                                            <p:cond delay="0"/>
+                                          </p:stCondLst>
+                                        </p:cTn>
+                                        <p:tgtEl>
+                                          <p:spTgt spid="2">
+                                            <p:txEl>
+                                              <p:pRg st="8" end="8"/>
+                                            </p:txEl>
+                                          </p:spTgt>
+                                        </p:tgtEl>
+                                        <p:attrNameLst>
+                                          <p:attrName>style.visibility</p:attrName>
+                                        </p:attrNameLst>
+                                      </p:cBhvr>
+                                      <p:to>
+                                        <p:strVal val="hidden"/>
+                                      </p:to>
+                                    </p:set>
+                                  </p:childTnLst>
+                                </p:cTn>
+                              </p:par>
+                              <p:par>
+                                <p:cTn id="25" presetID="1" presetClass="exit" presetSubtype="0" fill="hold" grpId="0" nodeType="withEffect">
+                                  <p:stCondLst>
+                                    <p:cond delay="0"/>
+                                  </p:stCondLst>
+                                  <p:childTnLst>
+                                    <p:set>
+                                      <p:cBhvr>
+                                        <p:cTn id="26" dur="1" fill="hold">
+                                          <p:stCondLst>
+                                            <p:cond delay="0"/>
+                                          </p:stCondLst>
+                                        </p:cTn>
+                                        <p:tgtEl>
+                                          <p:spTgt spid="2">
+                                            <p:txEl>
+                                              <p:pRg st="9" end="9"/>
+                                            </p:txEl>
+                                          </p:spTgt>
+                                        </p:tgtEl>
+                                        <p:attrNameLst>
+                                          <p:attrName>style.visibility</p:attrName>
+                                        </p:attrNameLst>
+                                      </p:cBhvr>
+                                      <p:to>
+                                        <p:strVal val="hidden"/>
+                                      </p:to>
+                                    </p:set>
+                                  </p:childTnLst>
+                                </p:cTn>
+                              </p:par>
+                            </p:childTnLst>
+                          </p:cTn>
+                        </p:par>
+                      </p:childTnLst>
+                    </p:cTn>
+                  </p:par>
+                </p:childTnLst>
+              </p:cTn>
+              <p:prevCondLst>
+                <p:cond evt="onPrev" delay="0">
+                  <p:tgtEl>
+                    <p:sldTgt/>
+                  </p:tgtEl>
+                </p:cond>
+              </p:prevCondLst>
+              <p:nextCondLst>
+                <p:cond evt="onNext" delay="0">
+                  <p:tgtEl>
+                    <p:sldTgt/>
+                  </p:tgtEl>
+                </p:cond>
+              </p:nextCondLst>
+            </p:seq>
+          </p:childTnLst>
+        </p:cTn>
       </p:par>
     </p:tnLst>
+    <p:bldLst>
+      <p:bldP spid="2" grpId="0" build="p"/>
+      <p:bldP spid="4" grpId="0"/>
+    </p:bldLst>
   </p:timing>
 </p:sld>
 </file>
@@ -13033,7 +14325,7 @@
           <a:p>
             <a:r>
               <a:rPr lang="en-US" sz="2800" dirty="0" smtClean="0"/>
-              <a:t>Focus on Gaming</a:t>
+              <a:t>Focus on gaming</a:t>
             </a:r>
           </a:p>
           <a:p>
@@ -13083,8 +14375,8 @@
         </p:nvSpPr>
         <p:spPr>
           <a:xfrm>
-            <a:off x="457200" y="1792579"/>
-            <a:ext cx="3733800" cy="1988237"/>
+            <a:off x="457200" y="1706401"/>
+            <a:ext cx="3733800" cy="2160591"/>
           </a:xfrm>
           <a:prstGeom prst="rect">
             <a:avLst/>
@@ -13093,12 +14385,12 @@
         </p:spPr>
         <p:txBody>
           <a:bodyPr wrap="square" rtlCol="0">
-            <a:spAutoFit/>
+            <a:noAutofit/>
           </a:bodyPr>
           <a:lstStyle/>
           <a:p>
             <a:r>
-              <a:rPr lang="en-US" sz="2800" dirty="0">
+              <a:rPr lang="en-US" sz="2400" dirty="0">
                 <a:solidFill>
                   <a:schemeClr val="tx2"/>
                 </a:solidFill>
@@ -13118,12 +14410,12 @@
               <a:buChar char="§"/>
             </a:pPr>
             <a:r>
-              <a:rPr lang="en-US" sz="2800" dirty="0" smtClean="0">
+              <a:rPr lang="en-US" sz="2400" dirty="0" smtClean="0">
                 <a:solidFill>
                   <a:schemeClr val="tx2"/>
                 </a:solidFill>
               </a:rPr>
-              <a:t>Provide the display</a:t>
+              <a:t>Display</a:t>
             </a:r>
           </a:p>
           <a:p>
@@ -13138,45 +14430,12 @@
               <a:buChar char="§"/>
             </a:pPr>
             <a:r>
-              <a:rPr lang="en-US" sz="2800" dirty="0" smtClean="0">
+              <a:rPr lang="en-US" sz="2400" dirty="0" smtClean="0">
                 <a:solidFill>
                   <a:schemeClr val="tx2"/>
                 </a:solidFill>
               </a:rPr>
-              <a:t>Mounting point for sensors</a:t>
-            </a:r>
-          </a:p>
-        </p:txBody>
-      </p:sp>
-      <p:sp>
-        <p:nvSpPr>
-          <p:cNvPr id="5" name="TextBox 4"/>
-          <p:cNvSpPr txBox="1"/>
-          <p:nvPr/>
-        </p:nvSpPr>
-        <p:spPr>
-          <a:xfrm>
-            <a:off x="4572000" y="1706401"/>
-            <a:ext cx="3505200" cy="2160591"/>
-          </a:xfrm>
-          <a:prstGeom prst="rect">
-            <a:avLst/>
-          </a:prstGeom>
-          <a:noFill/>
-        </p:spPr>
-        <p:txBody>
-          <a:bodyPr wrap="square" rtlCol="0">
-            <a:spAutoFit/>
-          </a:bodyPr>
-          <a:lstStyle/>
-          <a:p>
-            <a:r>
-              <a:rPr lang="en-US" sz="2400" dirty="0">
-                <a:solidFill>
-                  <a:schemeClr val="tx2"/>
-                </a:solidFill>
-              </a:rPr>
-              <a:t>Backpack:</a:t>
+              <a:t>Inertial measurement unit (IMU)</a:t>
             </a:r>
           </a:p>
           <a:p>
@@ -13196,15 +14455,40 @@
                   <a:schemeClr val="tx2"/>
                 </a:solidFill>
               </a:rPr>
-              <a:t>Wireless </a:t>
-            </a:r>
+              <a:t>GPS receiver</a:t>
+            </a:r>
+          </a:p>
+        </p:txBody>
+      </p:sp>
+      <p:sp>
+        <p:nvSpPr>
+          <p:cNvPr id="5" name="TextBox 4"/>
+          <p:cNvSpPr txBox="1"/>
+          <p:nvPr/>
+        </p:nvSpPr>
+        <p:spPr>
+          <a:xfrm>
+            <a:off x="4419600" y="1706401"/>
+            <a:ext cx="3581400" cy="2160591"/>
+          </a:xfrm>
+          <a:prstGeom prst="rect">
+            <a:avLst/>
+          </a:prstGeom>
+          <a:noFill/>
+        </p:spPr>
+        <p:txBody>
+          <a:bodyPr wrap="square" rtlCol="0">
+            <a:spAutoFit/>
+          </a:bodyPr>
+          <a:lstStyle/>
+          <a:p>
             <a:r>
               <a:rPr lang="en-US" sz="2400" dirty="0">
                 <a:solidFill>
                   <a:schemeClr val="tx2"/>
                 </a:solidFill>
               </a:rPr>
-              <a:t>communication</a:t>
+              <a:t>Backpack:</a:t>
             </a:r>
           </a:p>
           <a:p>
@@ -13224,7 +14508,15 @@
                   <a:schemeClr val="tx2"/>
                 </a:solidFill>
               </a:rPr>
-              <a:t>Graphics rendering</a:t>
+              <a:t>Wireless </a:t>
+            </a:r>
+            <a:r>
+              <a:rPr lang="en-US" sz="2400" dirty="0">
+                <a:solidFill>
+                  <a:schemeClr val="tx2"/>
+                </a:solidFill>
+              </a:rPr>
+              <a:t>communication</a:t>
             </a:r>
           </a:p>
           <a:p>
@@ -13244,7 +14536,27 @@
                   <a:schemeClr val="tx2"/>
                 </a:solidFill>
               </a:rPr>
-              <a:t>Simulation Logic</a:t>
+              <a:t>Graphics rendering</a:t>
+            </a:r>
+          </a:p>
+          <a:p>
+            <a:pPr marL="548640" lvl="1" indent="-182880">
+              <a:spcBef>
+                <a:spcPct val="20000"/>
+              </a:spcBef>
+              <a:buClr>
+                <a:srgbClr val="BF974D"/>
+              </a:buClr>
+              <a:buFont typeface="Wingdings" pitchFamily="2" charset="2"/>
+              <a:buChar char="§"/>
+            </a:pPr>
+            <a:r>
+              <a:rPr lang="en-US" sz="2400" dirty="0" smtClean="0">
+                <a:solidFill>
+                  <a:schemeClr val="tx2"/>
+                </a:solidFill>
+              </a:rPr>
+              <a:t>Simulation logic</a:t>
             </a:r>
           </a:p>
         </p:txBody>
@@ -13259,6 +14571,18 @@
   <p:clrMapOvr>
     <a:masterClrMapping/>
   </p:clrMapOvr>
+  <mc:AlternateContent xmlns:mc="http://schemas.openxmlformats.org/markup-compatibility/2006" xmlns:p14="http://schemas.microsoft.com/office/powerpoint/2010/main">
+    <mc:Choice Requires="p14">
+      <p:transition p14:dur="200">
+        <p:fade/>
+      </p:transition>
+    </mc:Choice>
+    <mc:Fallback xmlns="">
+      <p:transition>
+        <p:fade/>
+      </p:transition>
+    </mc:Fallback>
+  </mc:AlternateContent>
   <p:timing>
     <p:tnLst>
       <p:par>
@@ -13334,6 +14658,18 @@
   <p:clrMapOvr>
     <a:masterClrMapping/>
   </p:clrMapOvr>
+  <mc:AlternateContent xmlns:mc="http://schemas.openxmlformats.org/markup-compatibility/2006" xmlns:p14="http://schemas.microsoft.com/office/powerpoint/2010/main">
+    <mc:Choice Requires="p14">
+      <p:transition p14:dur="200">
+        <p:fade/>
+      </p:transition>
+    </mc:Choice>
+    <mc:Fallback xmlns="">
+      <p:transition>
+        <p:fade/>
+      </p:transition>
+    </mc:Fallback>
+  </mc:AlternateContent>
   <p:timing>
     <p:tnLst>
       <p:par>
@@ -13379,19 +14715,22 @@
           <a:lstStyle/>
           <a:p>
             <a:r>
-              <a:rPr lang="en-US" sz="8000" dirty="0" smtClean="0"/>
-              <a:t>PHASE 1 S/D</a:t>
-            </a:r>
-          </a:p>
-          <a:p>
-            <a:endParaRPr lang="en-US" sz="8000" dirty="0"/>
-          </a:p>
-          <a:p>
-            <a:r>
-              <a:rPr lang="en-US" sz="8000" dirty="0" smtClean="0"/>
-              <a:t>PHASE 2 CCUP</a:t>
-            </a:r>
-            <a:endParaRPr lang="en-US" sz="8000" dirty="0"/>
+              <a:rPr lang="en-US" sz="4800" dirty="0" smtClean="0"/>
+              <a:t>Phase 1: Senior Design</a:t>
+            </a:r>
+          </a:p>
+          <a:p>
+            <a:endParaRPr lang="en-US" sz="4800" dirty="0" smtClean="0"/>
+          </a:p>
+          <a:p>
+            <a:endParaRPr lang="en-US" sz="4800" dirty="0"/>
+          </a:p>
+          <a:p>
+            <a:r>
+              <a:rPr lang="en-US" sz="4800" dirty="0" smtClean="0"/>
+              <a:t>Phase 2: Cornell Cup</a:t>
+            </a:r>
+            <a:endParaRPr lang="en-US" sz="4800" dirty="0"/>
           </a:p>
         </p:txBody>
       </p:sp>
@@ -13421,13 +14760,25 @@
     </p:spTree>
     <p:extLst>
       <p:ext uri="{BB962C8B-B14F-4D97-AF65-F5344CB8AC3E}">
-        <p14:creationId xmlns:p14="http://schemas.microsoft.com/office/powerpoint/2010/main" val="2966193515"/>
+        <p14:creationId xmlns:p14="http://schemas.microsoft.com/office/powerpoint/2010/main" val="2996634737"/>
       </p:ext>
     </p:extLst>
   </p:cSld>
   <p:clrMapOvr>
     <a:masterClrMapping/>
   </p:clrMapOvr>
+  <mc:AlternateContent xmlns:mc="http://schemas.openxmlformats.org/markup-compatibility/2006" xmlns:p14="http://schemas.microsoft.com/office/powerpoint/2010/main">
+    <mc:Choice Requires="p14">
+      <p:transition p14:dur="200">
+        <p:fade/>
+      </p:transition>
+    </mc:Choice>
+    <mc:Fallback xmlns="">
+      <p:transition>
+        <p:fade/>
+      </p:transition>
+    </mc:Fallback>
+  </mc:AlternateContent>
   <p:timing>
     <p:tnLst>
       <p:par>
@@ -13473,49 +14824,49 @@
           <a:lstStyle/>
           <a:p>
             <a:r>
+              <a:rPr lang="en-US" sz="2800" dirty="0" smtClean="0"/>
+              <a:t>Hardware</a:t>
+            </a:r>
+          </a:p>
+          <a:p>
+            <a:pPr lvl="1"/>
+            <a:r>
               <a:rPr lang="en-US" sz="2400" dirty="0" smtClean="0"/>
-              <a:t>Hardware</a:t>
+              <a:t>Interfacing to IMU</a:t>
             </a:r>
           </a:p>
           <a:p>
             <a:pPr lvl="1"/>
             <a:r>
-              <a:rPr lang="en-US" sz="2000" dirty="0" smtClean="0"/>
-              <a:t>Interfacing to Inertial Measurement Unit</a:t>
+              <a:rPr lang="en-US" sz="2400" dirty="0" smtClean="0"/>
+              <a:t>Interfacing to GPS</a:t>
             </a:r>
           </a:p>
           <a:p>
             <a:pPr lvl="1"/>
             <a:r>
-              <a:rPr lang="en-US" sz="2000" dirty="0" smtClean="0"/>
-              <a:t>Interfacing to GPS</a:t>
-            </a:r>
-          </a:p>
-          <a:p>
-            <a:pPr lvl="1"/>
-            <a:r>
-              <a:rPr lang="en-US" sz="2000" dirty="0" smtClean="0"/>
+              <a:rPr lang="en-US" sz="2400" dirty="0" smtClean="0"/>
               <a:t>Power management</a:t>
             </a:r>
           </a:p>
           <a:p>
             <a:pPr lvl="2"/>
             <a:r>
-              <a:rPr lang="en-US" dirty="0" smtClean="0"/>
+              <a:rPr lang="en-US" sz="1800" dirty="0" smtClean="0"/>
               <a:t>Battery charging</a:t>
             </a:r>
           </a:p>
           <a:p>
             <a:pPr lvl="2"/>
             <a:r>
-              <a:rPr lang="en-US" dirty="0" smtClean="0"/>
+              <a:rPr lang="en-US" sz="1800" dirty="0" smtClean="0"/>
               <a:t>Battery fuel gauge</a:t>
             </a:r>
           </a:p>
           <a:p>
             <a:pPr lvl="2"/>
             <a:r>
-              <a:rPr lang="en-US" dirty="0" smtClean="0"/>
+              <a:rPr lang="en-US" sz="1800" dirty="0" smtClean="0"/>
               <a:t>Voltage regulation</a:t>
             </a:r>
           </a:p>
@@ -13560,13 +14911,13 @@
               </a:ext>
             </a:extLst>
           </a:blip>
-          <a:srcRect/>
+          <a:srcRect l="5172"/>
           <a:stretch/>
         </p:blipFill>
         <p:spPr bwMode="auto">
           <a:xfrm>
-            <a:off x="1905000" y="3991730"/>
-            <a:ext cx="5562601" cy="2518087"/>
+            <a:off x="3411940" y="3991730"/>
+            <a:ext cx="5274861" cy="2518087"/>
           </a:xfrm>
           <a:prstGeom prst="rect">
             <a:avLst/>
@@ -13593,6 +14944,18 @@
   <p:clrMapOvr>
     <a:masterClrMapping/>
   </p:clrMapOvr>
+  <mc:AlternateContent xmlns:mc="http://schemas.openxmlformats.org/markup-compatibility/2006" xmlns:p14="http://schemas.microsoft.com/office/powerpoint/2010/main">
+    <mc:Choice Requires="p14">
+      <p:transition p14:dur="200">
+        <p:fade/>
+      </p:transition>
+    </mc:Choice>
+    <mc:Fallback xmlns="">
+      <p:transition>
+        <p:fade/>
+      </p:transition>
+    </mc:Fallback>
+  </mc:AlternateContent>
   <p:timing>
     <p:tnLst>
       <p:par>
@@ -13630,7 +14993,12 @@
             <p:ph idx="1"/>
           </p:nvPr>
         </p:nvSpPr>
-        <p:spPr/>
+        <p:spPr>
+          <a:xfrm>
+            <a:off x="380999" y="1524000"/>
+            <a:ext cx="4724401" cy="4602479"/>
+          </a:xfrm>
+        </p:spPr>
         <p:txBody>
           <a:bodyPr>
             <a:normAutofit/>
@@ -13646,20 +15014,21 @@
             <a:pPr lvl="1"/>
             <a:r>
               <a:rPr lang="en-US" sz="2000" dirty="0" smtClean="0"/>
-              <a:t>Hard hat with display and all</a:t>
-            </a:r>
-          </a:p>
-          <a:p>
-            <a:pPr marL="365760" lvl="1" indent="0">
-              <a:buNone/>
-            </a:pPr>
-            <a:r>
-              <a:rPr lang="en-US" sz="2000" dirty="0"/>
-              <a:t> </a:t>
-            </a:r>
+              <a:t>Adjustable hard hat</a:t>
+            </a:r>
+          </a:p>
+          <a:p>
+            <a:pPr lvl="1"/>
             <a:r>
               <a:rPr lang="en-US" sz="2000" dirty="0" smtClean="0"/>
-              <a:t>  electronics mounted to rails</a:t>
+              <a:t>Display mounted to rails</a:t>
+            </a:r>
+          </a:p>
+          <a:p>
+            <a:pPr lvl="1"/>
+            <a:r>
+              <a:rPr lang="en-US" sz="2000" dirty="0" smtClean="0"/>
+              <a:t>Electronics in back for balance</a:t>
             </a:r>
           </a:p>
           <a:p>
@@ -13682,7 +15051,7 @@
             <a:pPr lvl="1"/>
             <a:r>
               <a:rPr lang="en-US" sz="2000" dirty="0" smtClean="0"/>
-              <a:t>Networking: </a:t>
+              <a:t>Networking using </a:t>
             </a:r>
             <a:r>
               <a:rPr lang="en-US" sz="2000" dirty="0" err="1" smtClean="0"/>
@@ -13701,7 +15070,7 @@
             </a:br>
             <a:r>
               <a:rPr lang="en-US" sz="2000" dirty="0" smtClean="0"/>
-              <a:t>Pi and micro</a:t>
+              <a:t>Raspberry Pi and microcontroller</a:t>
             </a:r>
           </a:p>
           <a:p>
@@ -13814,6 +15183,18 @@
   <p:clrMapOvr>
     <a:masterClrMapping/>
   </p:clrMapOvr>
+  <mc:AlternateContent xmlns:mc="http://schemas.openxmlformats.org/markup-compatibility/2006" xmlns:p14="http://schemas.microsoft.com/office/powerpoint/2010/main">
+    <mc:Choice Requires="p14">
+      <p:transition p14:dur="200">
+        <p:fade/>
+      </p:transition>
+    </mc:Choice>
+    <mc:Fallback xmlns="">
+      <p:transition>
+        <p:fade/>
+      </p:transition>
+    </mc:Fallback>
+  </mc:AlternateContent>
   <p:timing>
     <p:tnLst>
       <p:par>

</xml_diff>

<commit_message>
midreview updated with new timeline, new pictures, improved opportunies and complications slides
</commit_message>
<xml_diff>
--- a/doc/AugRealityMidReview.pptx
+++ b/doc/AugRealityMidReview.pptx
@@ -6,7 +6,7 @@
     <p:sldMasterId id="2147483708" r:id="rId2"/>
   </p:sldMasterIdLst>
   <p:notesMasterIdLst>
-    <p:notesMasterId r:id="rId25"/>
+    <p:notesMasterId r:id="rId26"/>
   </p:notesMasterIdLst>
   <p:sldIdLst>
     <p:sldId id="256" r:id="rId3"/>
@@ -21,9 +21,9 @@
     <p:sldId id="286" r:id="rId12"/>
     <p:sldId id="279" r:id="rId13"/>
     <p:sldId id="270" r:id="rId14"/>
-    <p:sldId id="285" r:id="rId15"/>
-    <p:sldId id="271" r:id="rId16"/>
-    <p:sldId id="289" r:id="rId17"/>
+    <p:sldId id="293" r:id="rId15"/>
+    <p:sldId id="294" r:id="rId16"/>
+    <p:sldId id="295" r:id="rId17"/>
     <p:sldId id="284" r:id="rId18"/>
     <p:sldId id="282" r:id="rId19"/>
     <p:sldId id="283" r:id="rId20"/>
@@ -31,6 +31,7 @@
     <p:sldId id="267" r:id="rId22"/>
     <p:sldId id="290" r:id="rId23"/>
     <p:sldId id="291" r:id="rId24"/>
+    <p:sldId id="296" r:id="rId25"/>
   </p:sldIdLst>
   <p:sldSz cx="9144000" cy="6858000" type="screen4x3"/>
   <p:notesSz cx="6858000" cy="9144000"/>
@@ -8198,14 +8199,14 @@
             <p:ph idx="1"/>
             <p:extLst>
               <p:ext uri="{D42A27DB-BD31-4B8C-83A1-F6EECF244321}">
-                <p14:modId xmlns:p14="http://schemas.microsoft.com/office/powerpoint/2010/main" val="3378571874"/>
+                <p14:modId xmlns:p14="http://schemas.microsoft.com/office/powerpoint/2010/main" val="1482844895"/>
               </p:ext>
             </p:extLst>
           </p:nvPr>
         </p:nvGraphicFramePr>
         <p:xfrm>
           <a:off x="228600" y="1371600"/>
-          <a:ext cx="8686800" cy="3962400"/>
+          <a:ext cx="8686800" cy="4648200"/>
         </p:xfrm>
         <a:graphic>
           <a:graphicData uri="http://schemas.openxmlformats.org/drawingml/2006/table">
@@ -8401,40 +8402,6 @@
                         </a:rPr>
                         <a:t>Headset: 1.3kg</a:t>
                       </a:r>
-                    </a:p>
-                    <a:p>
-                      <a:pPr marL="0" marR="0">
-                        <a:spcBef>
-                          <a:spcPts val="0"/>
-                        </a:spcBef>
-                        <a:spcAft>
-                          <a:spcPts val="0"/>
-                        </a:spcAft>
-                      </a:pPr>
-                      <a:r>
-                        <a:rPr lang="en-US" sz="1800" dirty="0" smtClean="0">
-                          <a:effectLst/>
-                          <a:latin typeface="Calibri" panose="020F0502020204030204" pitchFamily="34" charset="0"/>
-                          <a:ea typeface="Calibri" panose="020F0502020204030204" pitchFamily="34" charset="0"/>
-                          <a:cs typeface="Times New Roman" panose="02020603050405020304" pitchFamily="18" charset="0"/>
-                        </a:rPr>
-                        <a:t>Backpack:</a:t>
-                      </a:r>
-                      <a:r>
-                        <a:rPr lang="en-US" sz="1800" baseline="0" dirty="0" smtClean="0">
-                          <a:effectLst/>
-                          <a:latin typeface="Calibri" panose="020F0502020204030204" pitchFamily="34" charset="0"/>
-                          <a:ea typeface="Calibri" panose="020F0502020204030204" pitchFamily="34" charset="0"/>
-                          <a:cs typeface="Times New Roman" panose="02020603050405020304" pitchFamily="18" charset="0"/>
-                        </a:rPr>
-                        <a:t> N/A</a:t>
-                      </a:r>
-                      <a:endParaRPr lang="en-US" sz="1800" dirty="0">
-                        <a:effectLst/>
-                        <a:latin typeface="Calibri" panose="020F0502020204030204" pitchFamily="34" charset="0"/>
-                        <a:ea typeface="Calibri" panose="020F0502020204030204" pitchFamily="34" charset="0"/>
-                        <a:cs typeface="Times New Roman" panose="02020603050405020304" pitchFamily="18" charset="0"/>
-                      </a:endParaRPr>
                     </a:p>
                   </a:txBody>
                   <a:tcPr marL="68580" marR="68580" marT="0" marB="0"/>
@@ -8802,7 +8769,7 @@
                           <a:ea typeface="Calibri" panose="020F0502020204030204" pitchFamily="34" charset="0"/>
                           <a:cs typeface="Times New Roman" panose="02020603050405020304" pitchFamily="18" charset="0"/>
                         </a:rPr>
-                        <a:t>Same as Phase 1</a:t>
+                        <a:t>~1.5m</a:t>
                       </a:r>
                       <a:endParaRPr lang="en-US" sz="1800" dirty="0">
                         <a:effectLst/>
@@ -9149,7 +9116,7 @@
                           <a:ea typeface="Calibri" panose="020F0502020204030204" pitchFamily="34" charset="0"/>
                           <a:cs typeface="Times New Roman" panose="02020603050405020304" pitchFamily="18" charset="0"/>
                         </a:rPr>
-                        <a:t>N/A</a:t>
+                        <a:t>Unimplemented</a:t>
                       </a:r>
                       <a:endParaRPr lang="en-US" sz="1800" dirty="0">
                         <a:effectLst/>
@@ -9510,6 +9477,118 @@
                   <a:tcPr marL="68580" marR="68580" marT="0" marB="0"/>
                 </a:tc>
               </a:tr>
+              <a:tr h="685800">
+                <a:tc>
+                  <a:txBody>
+                    <a:bodyPr/>
+                    <a:lstStyle/>
+                    <a:p>
+                      <a:pPr marL="0" marR="0" algn="r">
+                        <a:spcBef>
+                          <a:spcPts val="0"/>
+                        </a:spcBef>
+                        <a:spcAft>
+                          <a:spcPts val="0"/>
+                        </a:spcAft>
+                      </a:pPr>
+                      <a:r>
+                        <a:rPr lang="en-US" sz="1800" dirty="0" smtClean="0">
+                          <a:effectLst/>
+                          <a:latin typeface="+mn-lt"/>
+                          <a:ea typeface="Calibri" panose="020F0502020204030204" pitchFamily="34" charset="0"/>
+                          <a:cs typeface="Times New Roman" panose="02020603050405020304" pitchFamily="18" charset="0"/>
+                        </a:rPr>
+                        <a:t>Head Tracking</a:t>
+                      </a:r>
+                      <a:r>
+                        <a:rPr lang="en-US" sz="1800" baseline="0" dirty="0" smtClean="0">
+                          <a:effectLst/>
+                          <a:latin typeface="+mn-lt"/>
+                          <a:ea typeface="Calibri" panose="020F0502020204030204" pitchFamily="34" charset="0"/>
+                          <a:cs typeface="Times New Roman" panose="02020603050405020304" pitchFamily="18" charset="0"/>
+                        </a:rPr>
+                        <a:t> Latency</a:t>
+                      </a:r>
+                      <a:endParaRPr lang="en-US" sz="1800" dirty="0">
+                        <a:effectLst/>
+                        <a:latin typeface="+mn-lt"/>
+                        <a:ea typeface="Calibri" panose="020F0502020204030204" pitchFamily="34" charset="0"/>
+                        <a:cs typeface="Times New Roman" panose="02020603050405020304" pitchFamily="18" charset="0"/>
+                      </a:endParaRPr>
+                    </a:p>
+                  </a:txBody>
+                  <a:tcPr marL="68580" marR="68580" marT="0" marB="0"/>
+                </a:tc>
+                <a:tc>
+                  <a:txBody>
+                    <a:bodyPr/>
+                    <a:lstStyle/>
+                    <a:p>
+                      <a:pPr marL="0" marR="0">
+                        <a:spcBef>
+                          <a:spcPts val="0"/>
+                        </a:spcBef>
+                        <a:spcAft>
+                          <a:spcPts val="0"/>
+                        </a:spcAft>
+                      </a:pPr>
+                      <a:endParaRPr lang="en-US" sz="1800" dirty="0">
+                        <a:effectLst/>
+                        <a:latin typeface="Calibri" panose="020F0502020204030204" pitchFamily="34" charset="0"/>
+                        <a:ea typeface="Calibri" panose="020F0502020204030204" pitchFamily="34" charset="0"/>
+                        <a:cs typeface="Times New Roman" panose="02020603050405020304" pitchFamily="18" charset="0"/>
+                      </a:endParaRPr>
+                    </a:p>
+                  </a:txBody>
+                  <a:tcPr marL="68580" marR="68580" marT="0" marB="0"/>
+                </a:tc>
+                <a:tc>
+                  <a:txBody>
+                    <a:bodyPr/>
+                    <a:lstStyle/>
+                    <a:p>
+                      <a:pPr marL="0" marR="0">
+                        <a:spcBef>
+                          <a:spcPts val="0"/>
+                        </a:spcBef>
+                        <a:spcAft>
+                          <a:spcPts val="0"/>
+                        </a:spcAft>
+                      </a:pPr>
+                      <a:endParaRPr lang="en-US" sz="1800" b="0" dirty="0">
+                        <a:effectLst/>
+                        <a:latin typeface="+mn-lt"/>
+                        <a:ea typeface="Calibri" panose="020F0502020204030204" pitchFamily="34" charset="0"/>
+                        <a:cs typeface="Times New Roman" panose="02020603050405020304" pitchFamily="18" charset="0"/>
+                      </a:endParaRPr>
+                    </a:p>
+                  </a:txBody>
+                  <a:tcPr marL="68580" marR="68580" marT="0" marB="0"/>
+                </a:tc>
+                <a:tc>
+                  <a:txBody>
+                    <a:bodyPr/>
+                    <a:lstStyle/>
+                    <a:p>
+                      <a:pPr marL="0" marR="0">
+                        <a:spcBef>
+                          <a:spcPts val="0"/>
+                        </a:spcBef>
+                        <a:spcAft>
+                          <a:spcPts val="0"/>
+                        </a:spcAft>
+                      </a:pPr>
+                      <a:endParaRPr lang="en-US" sz="1800" dirty="0">
+                        <a:effectLst/>
+                        <a:latin typeface="Calibri" panose="020F0502020204030204" pitchFamily="34" charset="0"/>
+                        <a:ea typeface="Calibri" panose="020F0502020204030204" pitchFamily="34" charset="0"/>
+                        <a:cs typeface="Times New Roman" panose="02020603050405020304" pitchFamily="18" charset="0"/>
+                      </a:endParaRPr>
+                    </a:p>
+                  </a:txBody>
+                  <a:tcPr marL="68580" marR="68580" marT="0" marB="0"/>
+                </a:tc>
+              </a:tr>
             </a:tbl>
           </a:graphicData>
         </a:graphic>
@@ -9522,8 +9601,8 @@
         </p:nvSpPr>
         <p:spPr>
           <a:xfrm>
-            <a:off x="609600" y="5410200"/>
-            <a:ext cx="7620000" cy="830997"/>
+            <a:off x="497006" y="6118240"/>
+            <a:ext cx="8153400" cy="461665"/>
           </a:xfrm>
           <a:prstGeom prst="rect">
             <a:avLst/>
@@ -9539,7 +9618,7 @@
             <a:pPr algn="ctr"/>
             <a:r>
               <a:rPr lang="en-US" sz="2400" dirty="0" smtClean="0"/>
-              <a:t>User review process for subjective measures like comfort, eye strain, and response time</a:t>
+              <a:t>User survey for subjective measures like comfort, eye strain</a:t>
             </a:r>
             <a:endParaRPr lang="en-US" sz="2400" dirty="0"/>
           </a:p>
@@ -9748,13 +9827,13 @@
       </p:sp>
       <p:pic>
         <p:nvPicPr>
-          <p:cNvPr id="1026" name="Picture 2" descr="D:\DSC00999.JPG"/>
+          <p:cNvPr id="7" name="Content Placeholder 3"/>
           <p:cNvPicPr>
-            <a:picLocks noChangeAspect="1" noChangeArrowheads="1"/>
+            <a:picLocks noChangeAspect="1"/>
           </p:cNvPicPr>
           <p:nvPr/>
         </p:nvPicPr>
-        <p:blipFill rotWithShape="1">
+        <p:blipFill>
           <a:blip r:embed="rId2" cstate="print">
             <a:extLst>
               <a:ext uri="{28A0092B-C50C-407E-A947-70E740481C1C}">
@@ -9762,13 +9841,45 @@
               </a:ext>
             </a:extLst>
           </a:blip>
+          <a:stretch>
+            <a:fillRect/>
+          </a:stretch>
+        </p:blipFill>
+        <p:spPr>
+          <a:xfrm>
+            <a:off x="5904430" y="4572000"/>
+            <a:ext cx="2035427" cy="1845515"/>
+          </a:xfrm>
+          <a:prstGeom prst="rect">
+            <a:avLst/>
+          </a:prstGeom>
+        </p:spPr>
+      </p:pic>
+      <p:pic>
+        <p:nvPicPr>
+          <p:cNvPr id="4" name="Picture 2" descr="D:\headset.jpg"/>
+          <p:cNvPicPr>
+            <a:picLocks noChangeAspect="1" noChangeArrowheads="1"/>
+          </p:cNvPicPr>
+          <p:nvPr/>
+        </p:nvPicPr>
+        <p:blipFill>
+          <a:blip r:embed="rId3" cstate="print">
+            <a:extLst>
+              <a:ext uri="{28A0092B-C50C-407E-A947-70E740481C1C}">
+                <a14:useLocalDpi xmlns:a14="http://schemas.microsoft.com/office/drawing/2010/main" val="0"/>
+              </a:ext>
+            </a:extLst>
+          </a:blip>
           <a:srcRect/>
-          <a:stretch/>
+          <a:stretch>
+            <a:fillRect/>
+          </a:stretch>
         </p:blipFill>
         <p:spPr bwMode="auto">
           <a:xfrm>
-            <a:off x="5749752" y="2667000"/>
-            <a:ext cx="2559802" cy="1935952"/>
+            <a:off x="5904430" y="2743200"/>
+            <a:ext cx="2035427" cy="1676400"/>
           </a:xfrm>
           <a:prstGeom prst="rect">
             <a:avLst/>
@@ -9783,36 +9894,6 @@
               </a14:hiddenFill>
             </a:ext>
           </a:extLst>
-        </p:spPr>
-      </p:pic>
-      <p:pic>
-        <p:nvPicPr>
-          <p:cNvPr id="7" name="Content Placeholder 3"/>
-          <p:cNvPicPr>
-            <a:picLocks noChangeAspect="1"/>
-          </p:cNvPicPr>
-          <p:nvPr/>
-        </p:nvPicPr>
-        <p:blipFill>
-          <a:blip r:embed="rId3" cstate="print">
-            <a:extLst>
-              <a:ext uri="{28A0092B-C50C-407E-A947-70E740481C1C}">
-                <a14:useLocalDpi xmlns:a14="http://schemas.microsoft.com/office/drawing/2010/main"/>
-              </a:ext>
-            </a:extLst>
-          </a:blip>
-          <a:stretch>
-            <a:fillRect/>
-          </a:stretch>
-        </p:blipFill>
-        <p:spPr>
-          <a:xfrm>
-            <a:off x="6172200" y="4814786"/>
-            <a:ext cx="1714907" cy="1554901"/>
-          </a:xfrm>
-          <a:prstGeom prst="rect">
-            <a:avLst/>
-          </a:prstGeom>
         </p:spPr>
       </p:pic>
     </p:spTree>
@@ -10057,7 +10138,7 @@
             <p:ph idx="1"/>
           </p:nvPr>
         </p:nvPicPr>
-        <p:blipFill rotWithShape="1">
+        <p:blipFill>
           <a:blip r:embed="rId2">
             <a:extLst>
               <a:ext uri="{28A0092B-C50C-407E-A947-70E740481C1C}">
@@ -10065,20 +10146,21 @@
               </a:ext>
             </a:extLst>
           </a:blip>
-          <a:srcRect t="36219" b="-207"/>
-          <a:stretch/>
+          <a:stretch>
+            <a:fillRect/>
+          </a:stretch>
         </p:blipFill>
         <p:spPr>
           <a:xfrm>
-            <a:off x="152400" y="1371600"/>
-            <a:ext cx="8834213" cy="5334000"/>
+            <a:off x="276074" y="1371600"/>
+            <a:ext cx="8586865" cy="5334000"/>
           </a:xfrm>
         </p:spPr>
       </p:pic>
     </p:spTree>
     <p:extLst>
       <p:ext uri="{BB962C8B-B14F-4D97-AF65-F5344CB8AC3E}">
-        <p14:creationId xmlns:p14="http://schemas.microsoft.com/office/powerpoint/2010/main" val="3042760565"/>
+        <p14:creationId xmlns:p14="http://schemas.microsoft.com/office/powerpoint/2010/main" val="2679507746"/>
       </p:ext>
     </p:extLst>
   </p:cSld>
@@ -10097,13 +10179,6 @@
       </p:transition>
     </mc:Fallback>
   </mc:AlternateContent>
-  <p:timing>
-    <p:tnLst>
-      <p:par>
-        <p:cTn id="1" dur="indefinite" restart="never" nodeType="tmRoot"/>
-      </p:par>
-    </p:tnLst>
-  </p:timing>
 </p:sld>
 </file>
 
@@ -10149,7 +10224,7 @@
       </p:sp>
       <p:pic>
         <p:nvPicPr>
-          <p:cNvPr id="5" name="Content Placeholder 4"/>
+          <p:cNvPr id="7" name="Content Placeholder 6"/>
           <p:cNvPicPr>
             <a:picLocks noGrp="1" noChangeAspect="1"/>
           </p:cNvPicPr>
@@ -10157,7 +10232,7 @@
             <p:ph idx="1"/>
           </p:nvPr>
         </p:nvPicPr>
-        <p:blipFill rotWithShape="1">
+        <p:blipFill>
           <a:blip r:embed="rId2">
             <a:extLst>
               <a:ext uri="{28A0092B-C50C-407E-A947-70E740481C1C}">
@@ -10165,20 +10240,21 @@
               </a:ext>
             </a:extLst>
           </a:blip>
-          <a:srcRect t="40359"/>
-          <a:stretch/>
+          <a:stretch>
+            <a:fillRect/>
+          </a:stretch>
         </p:blipFill>
         <p:spPr>
           <a:xfrm>
-            <a:off x="152400" y="1371600"/>
-            <a:ext cx="8839200" cy="5334000"/>
+            <a:off x="304430" y="1371600"/>
+            <a:ext cx="8534400" cy="5301409"/>
           </a:xfrm>
         </p:spPr>
       </p:pic>
     </p:spTree>
     <p:extLst>
       <p:ext uri="{BB962C8B-B14F-4D97-AF65-F5344CB8AC3E}">
-        <p14:creationId xmlns:p14="http://schemas.microsoft.com/office/powerpoint/2010/main" val="4157361893"/>
+        <p14:creationId xmlns:p14="http://schemas.microsoft.com/office/powerpoint/2010/main" val="1394389937"/>
       </p:ext>
     </p:extLst>
   </p:cSld>
@@ -10197,13 +10273,6 @@
       </p:transition>
     </mc:Fallback>
   </mc:AlternateContent>
-  <p:timing>
-    <p:tnLst>
-      <p:par>
-        <p:cTn id="1" dur="indefinite" restart="never" nodeType="tmRoot"/>
-      </p:par>
-    </p:tnLst>
-  </p:timing>
 </p:sld>
 </file>
 
@@ -10234,7 +10303,7 @@
             <p:ph idx="1"/>
           </p:nvPr>
         </p:nvPicPr>
-        <p:blipFill rotWithShape="1">
+        <p:blipFill>
           <a:blip r:embed="rId2">
             <a:extLst>
               <a:ext uri="{28A0092B-C50C-407E-A947-70E740481C1C}">
@@ -10242,13 +10311,14 @@
               </a:ext>
             </a:extLst>
           </a:blip>
-          <a:srcRect t="40359"/>
-          <a:stretch/>
+          <a:stretch>
+            <a:fillRect/>
+          </a:stretch>
         </p:blipFill>
         <p:spPr>
           <a:xfrm>
-            <a:off x="152400" y="1371600"/>
-            <a:ext cx="8839200" cy="5334000"/>
+            <a:off x="278567" y="1371600"/>
+            <a:ext cx="8586865" cy="5334000"/>
           </a:xfrm>
         </p:spPr>
       </p:pic>
@@ -10278,7 +10348,7 @@
     </p:spTree>
     <p:extLst>
       <p:ext uri="{BB962C8B-B14F-4D97-AF65-F5344CB8AC3E}">
-        <p14:creationId xmlns:p14="http://schemas.microsoft.com/office/powerpoint/2010/main" val="1351510714"/>
+        <p14:creationId xmlns:p14="http://schemas.microsoft.com/office/powerpoint/2010/main" val="2562319914"/>
       </p:ext>
     </p:extLst>
   </p:cSld>
@@ -10297,13 +10367,6 @@
       </p:transition>
     </mc:Fallback>
   </mc:AlternateContent>
-  <p:timing>
-    <p:tnLst>
-      <p:par>
-        <p:cTn id="1" dur="indefinite" restart="never" nodeType="tmRoot"/>
-      </p:par>
-    </p:tnLst>
-  </p:timing>
 </p:sld>
 </file>
 
@@ -12332,14 +12395,7 @@
             <a:pPr lvl="1"/>
             <a:r>
               <a:rPr lang="en-US" sz="2400" dirty="0" smtClean="0"/>
-              <a:t>Novelty of design avoids many AR patents</a:t>
-            </a:r>
-          </a:p>
-          <a:p>
-            <a:pPr lvl="2"/>
-            <a:r>
-              <a:rPr lang="en-US" sz="2000" dirty="0" smtClean="0"/>
-              <a:t>Large fraction specifically mention cameras</a:t>
+              <a:t>Many AR patents exist</a:t>
             </a:r>
           </a:p>
           <a:p>
@@ -12478,38 +12534,74 @@
         </p:nvSpPr>
         <p:spPr/>
         <p:txBody>
-          <a:bodyPr/>
+          <a:bodyPr>
+            <a:normAutofit/>
+          </a:bodyPr>
           <a:lstStyle/>
           <a:p>
             <a:r>
-              <a:rPr lang="en-US" dirty="0" smtClean="0"/>
-              <a:t>Selling software to users after purchase of device</a:t>
+              <a:rPr lang="en-US" sz="3200" dirty="0" smtClean="0"/>
+              <a:t>Selling software after device purchase</a:t>
             </a:r>
           </a:p>
           <a:p>
             <a:pPr lvl="1"/>
             <a:r>
-              <a:rPr lang="en-US" dirty="0" smtClean="0"/>
-              <a:t>Need to set up distribution network</a:t>
+              <a:rPr lang="en-US" sz="2400" dirty="0" smtClean="0"/>
+              <a:t>Create app store</a:t>
             </a:r>
           </a:p>
           <a:p>
             <a:pPr lvl="1"/>
             <a:r>
-              <a:rPr lang="en-US" dirty="0" smtClean="0"/>
+              <a:rPr lang="en-US" sz="2400" dirty="0" smtClean="0"/>
               <a:t>Encourage third party development</a:t>
             </a:r>
           </a:p>
           <a:p>
+            <a:r>
+              <a:rPr lang="en-US" sz="2800" dirty="0" smtClean="0"/>
+              <a:t>Creation of alternative input devices</a:t>
+            </a:r>
+          </a:p>
+          <a:p>
             <a:pPr lvl="1"/>
             <a:r>
-              <a:rPr lang="en-US" dirty="0" smtClean="0"/>
-              <a:t>Anti-piracy solutions</a:t>
+              <a:rPr lang="en-US" sz="2400" dirty="0" smtClean="0"/>
+              <a:t>Gloves for tracking hand movement</a:t>
             </a:r>
           </a:p>
           <a:p>
             <a:pPr lvl="1"/>
-            <a:endParaRPr lang="en-US" dirty="0"/>
+            <a:r>
+              <a:rPr lang="en-US" sz="2400" dirty="0" smtClean="0"/>
+              <a:t>Gun controller for shooting games</a:t>
+            </a:r>
+          </a:p>
+          <a:p>
+            <a:r>
+              <a:rPr lang="en-US" sz="2800" dirty="0" smtClean="0"/>
+              <a:t>Business to business sales</a:t>
+            </a:r>
+            <a:endParaRPr lang="en-US" sz="2800" dirty="0"/>
+          </a:p>
+          <a:p>
+            <a:pPr lvl="1"/>
+            <a:r>
+              <a:rPr lang="en-US" sz="2400" dirty="0" smtClean="0"/>
+              <a:t>Sell to schools for education</a:t>
+            </a:r>
+          </a:p>
+          <a:p>
+            <a:pPr lvl="1"/>
+            <a:r>
+              <a:rPr lang="en-US" sz="2400" dirty="0" smtClean="0"/>
+              <a:t>Sell to businesses for employee training</a:t>
+            </a:r>
+          </a:p>
+          <a:p>
+            <a:pPr lvl="1"/>
+            <a:endParaRPr lang="en-US" sz="2400" dirty="0" smtClean="0"/>
           </a:p>
         </p:txBody>
       </p:sp>
@@ -12611,26 +12703,14 @@
             <a:pPr lvl="1"/>
             <a:r>
               <a:rPr lang="en-US" sz="2400" dirty="0" smtClean="0"/>
-              <a:t>Improve </a:t>
-            </a:r>
+              <a:t>Improve response time of head orientation</a:t>
+            </a:r>
+          </a:p>
+          <a:p>
+            <a:pPr lvl="1"/>
             <a:r>
               <a:rPr lang="en-US" sz="2400" dirty="0" smtClean="0"/>
-              <a:t>response time </a:t>
-            </a:r>
-            <a:r>
-              <a:rPr lang="en-US" sz="2400" dirty="0" smtClean="0"/>
-              <a:t>of head orientation</a:t>
-            </a:r>
-          </a:p>
-          <a:p>
-            <a:pPr lvl="1"/>
-            <a:r>
-              <a:rPr lang="en-US" sz="2400" dirty="0" smtClean="0"/>
-              <a:t>Improve filtering of GPS </a:t>
-            </a:r>
-            <a:r>
-              <a:rPr lang="en-US" sz="2400" dirty="0" smtClean="0"/>
-              <a:t>data (</a:t>
+              <a:t>Improve filtering of GPS data (</a:t>
             </a:r>
             <a:r>
               <a:rPr lang="en-US" sz="2400" smtClean="0"/>
@@ -12644,7 +12724,6 @@
               <a:rPr lang="en-US" sz="1800" dirty="0" smtClean="0"/>
               <a:t>Large “jumps” in position</a:t>
             </a:r>
-            <a:endParaRPr lang="en-US" sz="1800" dirty="0" smtClean="0"/>
           </a:p>
           <a:p>
             <a:r>
@@ -13183,6 +13262,157 @@
       </p:par>
     </p:tnLst>
   </p:timing>
+</p:sld>
+</file>
+
+<file path=ppt/slides/slide23.xml><?xml version="1.0" encoding="utf-8"?>
+<p:sld xmlns:a="http://schemas.openxmlformats.org/drawingml/2006/main" xmlns:r="http://schemas.openxmlformats.org/officeDocument/2006/relationships" xmlns:p="http://schemas.openxmlformats.org/presentationml/2006/main">
+  <p:cSld>
+    <p:spTree>
+      <p:nvGrpSpPr>
+        <p:cNvPr id="1" name=""/>
+        <p:cNvGrpSpPr/>
+        <p:nvPr/>
+      </p:nvGrpSpPr>
+      <p:grpSpPr>
+        <a:xfrm>
+          <a:off x="0" y="0"/>
+          <a:ext cx="0" cy="0"/>
+          <a:chOff x="0" y="0"/>
+          <a:chExt cx="0" cy="0"/>
+        </a:xfrm>
+      </p:grpSpPr>
+      <p:sp>
+        <p:nvSpPr>
+          <p:cNvPr id="2" name="Content Placeholder 1"/>
+          <p:cNvSpPr>
+            <a:spLocks noGrp="1"/>
+          </p:cNvSpPr>
+          <p:nvPr>
+            <p:ph idx="1"/>
+          </p:nvPr>
+        </p:nvSpPr>
+        <p:spPr/>
+        <p:txBody>
+          <a:bodyPr>
+            <a:normAutofit/>
+          </a:bodyPr>
+          <a:lstStyle/>
+          <a:p>
+            <a:r>
+              <a:rPr lang="en-US" sz="2800" dirty="0"/>
+              <a:t>US 8585476 B2</a:t>
+            </a:r>
+          </a:p>
+          <a:p>
+            <a:pPr lvl="1"/>
+            <a:r>
+              <a:rPr lang="en-US" sz="2800" dirty="0" smtClean="0"/>
+              <a:t>Location-based </a:t>
+            </a:r>
+            <a:r>
+              <a:rPr lang="en-US" sz="2800" dirty="0"/>
+              <a:t>games and augmented reality </a:t>
+            </a:r>
+            <a:r>
+              <a:rPr lang="en-US" sz="2800" dirty="0" smtClean="0"/>
+              <a:t>systems</a:t>
+            </a:r>
+            <a:endParaRPr lang="en-US" sz="2800" dirty="0"/>
+          </a:p>
+          <a:p>
+            <a:r>
+              <a:rPr lang="en-US" sz="2800" dirty="0"/>
+              <a:t>US 20130267309 A1</a:t>
+            </a:r>
+          </a:p>
+          <a:p>
+            <a:pPr lvl="1"/>
+            <a:r>
+              <a:rPr lang="en-US" sz="2800" dirty="0" smtClean="0"/>
+              <a:t>Augmented </a:t>
+            </a:r>
+            <a:r>
+              <a:rPr lang="en-US" sz="2800" dirty="0"/>
+              <a:t>reality and physical </a:t>
+            </a:r>
+            <a:r>
+              <a:rPr lang="en-US" sz="2800" dirty="0" smtClean="0"/>
+              <a:t>games</a:t>
+            </a:r>
+          </a:p>
+          <a:p>
+            <a:r>
+              <a:rPr lang="en-US" sz="2800" dirty="0"/>
+              <a:t>US 8519844 </a:t>
+            </a:r>
+            <a:r>
+              <a:rPr lang="en-US" sz="2800" dirty="0" smtClean="0"/>
+              <a:t>B2</a:t>
+            </a:r>
+          </a:p>
+          <a:p>
+            <a:pPr lvl="1"/>
+            <a:r>
+              <a:rPr lang="en-US" sz="2800" dirty="0" smtClean="0"/>
+              <a:t>Augmented </a:t>
+            </a:r>
+            <a:r>
+              <a:rPr lang="en-US" sz="2800" dirty="0"/>
+              <a:t>reality and location determination methods and </a:t>
+            </a:r>
+            <a:r>
+              <a:rPr lang="en-US" sz="2800" dirty="0" smtClean="0"/>
+              <a:t>apparatus</a:t>
+            </a:r>
+          </a:p>
+        </p:txBody>
+      </p:sp>
+      <p:sp>
+        <p:nvSpPr>
+          <p:cNvPr id="3" name="Title 2"/>
+          <p:cNvSpPr>
+            <a:spLocks noGrp="1"/>
+          </p:cNvSpPr>
+          <p:nvPr>
+            <p:ph type="title"/>
+          </p:nvPr>
+        </p:nvSpPr>
+        <p:spPr/>
+        <p:txBody>
+          <a:bodyPr/>
+          <a:lstStyle/>
+          <a:p>
+            <a:r>
+              <a:rPr lang="en-US" dirty="0" smtClean="0"/>
+              <a:t>Patents</a:t>
+            </a:r>
+            <a:endParaRPr lang="en-US" dirty="0"/>
+          </a:p>
+        </p:txBody>
+      </p:sp>
+    </p:spTree>
+    <p:extLst>
+      <p:ext uri="{BB962C8B-B14F-4D97-AF65-F5344CB8AC3E}">
+        <p14:creationId xmlns:p14="http://schemas.microsoft.com/office/powerpoint/2010/main" val="3176867565"/>
+      </p:ext>
+    </p:extLst>
+  </p:cSld>
+  <p:clrMapOvr>
+    <a:masterClrMapping/>
+  </p:clrMapOvr>
+  <mc:AlternateContent xmlns:mc="http://schemas.openxmlformats.org/markup-compatibility/2006" xmlns:p14="http://schemas.microsoft.com/office/powerpoint/2010/main">
+    <mc:Choice Requires="p14">
+      <p:transition p14:dur="200">
+        <p:fade/>
+      </p:transition>
+    </mc:Choice>
+    <mc:Fallback xmlns="">
+      <p:transition>
+        <p:fade/>
+      </p:transition>
+    </mc:Fallback>
+  </mc:AlternateContent>
 </p:sld>
 </file>
 
@@ -15115,9 +15345,9 @@
       </p:sp>
       <p:pic>
         <p:nvPicPr>
-          <p:cNvPr id="5" name="Picture 4"/>
+          <p:cNvPr id="2050" name="Picture 2" descr="D:\100MSDCF\DSC01009.JPG"/>
           <p:cNvPicPr>
-            <a:picLocks noChangeAspect="1"/>
+            <a:picLocks noChangeAspect="1" noChangeArrowheads="1"/>
           </p:cNvPicPr>
           <p:nvPr/>
         </p:nvPicPr>
@@ -15125,29 +15355,40 @@
           <a:blip r:embed="rId2" cstate="print">
             <a:extLst>
               <a:ext uri="{28A0092B-C50C-407E-A947-70E740481C1C}">
-                <a14:useLocalDpi xmlns:a14="http://schemas.microsoft.com/office/drawing/2010/main"/>
+                <a14:useLocalDpi xmlns:a14="http://schemas.microsoft.com/office/drawing/2010/main" val="0"/>
               </a:ext>
             </a:extLst>
           </a:blip>
+          <a:srcRect/>
           <a:stretch>
             <a:fillRect/>
           </a:stretch>
         </p:blipFill>
-        <p:spPr>
+        <p:spPr bwMode="auto">
           <a:xfrm>
-            <a:off x="5257800" y="1524000"/>
-            <a:ext cx="3096186" cy="2057400"/>
+            <a:off x="5257800" y="4190999"/>
+            <a:ext cx="3481743" cy="2313601"/>
           </a:xfrm>
           <a:prstGeom prst="rect">
             <a:avLst/>
           </a:prstGeom>
+          <a:noFill/>
+          <a:extLst>
+            <a:ext uri="{909E8E84-426E-40DD-AFC4-6F175D3DCCD1}">
+              <a14:hiddenFill xmlns:a14="http://schemas.microsoft.com/office/drawing/2010/main">
+                <a:solidFill>
+                  <a:srgbClr val="FFFFFF"/>
+                </a:solidFill>
+              </a14:hiddenFill>
+            </a:ext>
+          </a:extLst>
         </p:spPr>
       </p:pic>
       <p:pic>
         <p:nvPicPr>
-          <p:cNvPr id="6" name="Picture 5"/>
+          <p:cNvPr id="2051" name="Picture 3" descr="D:\100MSDCF\DSC01023.JPG"/>
           <p:cNvPicPr>
-            <a:picLocks noChangeAspect="1"/>
+            <a:picLocks noChangeAspect="1" noChangeArrowheads="1"/>
           </p:cNvPicPr>
           <p:nvPr/>
         </p:nvPicPr>
@@ -15155,22 +15396,33 @@
           <a:blip r:embed="rId3" cstate="print">
             <a:extLst>
               <a:ext uri="{28A0092B-C50C-407E-A947-70E740481C1C}">
-                <a14:useLocalDpi xmlns:a14="http://schemas.microsoft.com/office/drawing/2010/main"/>
+                <a14:useLocalDpi xmlns:a14="http://schemas.microsoft.com/office/drawing/2010/main" val="0"/>
               </a:ext>
             </a:extLst>
           </a:blip>
+          <a:srcRect/>
           <a:stretch>
             <a:fillRect/>
           </a:stretch>
         </p:blipFill>
-        <p:spPr>
+        <p:spPr bwMode="auto">
           <a:xfrm>
-            <a:off x="5257800" y="3886200"/>
-            <a:ext cx="3128279" cy="2133600"/>
+            <a:off x="5257800" y="1600200"/>
+            <a:ext cx="3481743" cy="2313601"/>
           </a:xfrm>
           <a:prstGeom prst="rect">
             <a:avLst/>
           </a:prstGeom>
+          <a:noFill/>
+          <a:extLst>
+            <a:ext uri="{909E8E84-426E-40DD-AFC4-6F175D3DCCD1}">
+              <a14:hiddenFill xmlns:a14="http://schemas.microsoft.com/office/drawing/2010/main">
+                <a:solidFill>
+                  <a:srgbClr val="FFFFFF"/>
+                </a:solidFill>
+              </a14:hiddenFill>
+            </a:ext>
+          </a:extLst>
         </p:spPr>
       </p:pic>
     </p:spTree>

</xml_diff>

<commit_message>
Add slide sorter and fix table background colors to match the theme
</commit_message>
<xml_diff>
--- a/doc/AugRealityMidReview.pptx
+++ b/doc/AugRealityMidReview.pptx
@@ -7,7 +7,7 @@
     <p:sldMasterId id="2147483720" r:id="rId3"/>
   </p:sldMasterIdLst>
   <p:notesMasterIdLst>
-    <p:notesMasterId r:id="rId27"/>
+    <p:notesMasterId r:id="rId28"/>
   </p:notesMasterIdLst>
   <p:sldIdLst>
     <p:sldId id="256" r:id="rId4"/>
@@ -30,9 +30,10 @@
     <p:sldId id="283" r:id="rId21"/>
     <p:sldId id="274" r:id="rId22"/>
     <p:sldId id="267" r:id="rId23"/>
-    <p:sldId id="290" r:id="rId24"/>
-    <p:sldId id="291" r:id="rId25"/>
-    <p:sldId id="296" r:id="rId26"/>
+    <p:sldId id="301" r:id="rId24"/>
+    <p:sldId id="290" r:id="rId25"/>
+    <p:sldId id="291" r:id="rId26"/>
+    <p:sldId id="296" r:id="rId27"/>
   </p:sldIdLst>
   <p:sldSz cx="9144000" cy="6858000" type="screen4x3"/>
   <p:notesSz cx="6858000" cy="9144000"/>
@@ -133,7 +134,7 @@
   </p:defaultTextStyle>
   <p:extLst>
     <p:ext uri="{EFAFB233-063F-42B5-8137-9DF3F51BA10A}">
-      <p15:sldGuideLst xmlns:p15="http://schemas.microsoft.com/office/powerpoint/2012/main" xmlns="">
+      <p15:sldGuideLst xmlns="" xmlns:p15="http://schemas.microsoft.com/office/powerpoint/2012/main">
         <p15:guide id="1" orient="horz" pos="2160">
           <p15:clr>
             <a:srgbClr val="A4A3A4"/>
@@ -12123,7 +12124,6 @@
               <a:rPr lang="en-US" dirty="0"/>
               <a:t>Spring 2014</a:t>
             </a:r>
-            <a:endParaRPr lang="en-US" dirty="0"/>
           </a:p>
         </p:txBody>
       </p:sp>
@@ -12139,7 +12139,7 @@
           <a:blip r:embed="rId2" cstate="print">
             <a:extLst>
               <a:ext uri="{28A0092B-C50C-407E-A947-70E740481C1C}">
-                <a14:useLocalDpi xmlns:a14="http://schemas.microsoft.com/office/drawing/2010/main"/>
+                <a14:useLocalDpi xmlns:a14="http://schemas.microsoft.com/office/drawing/2010/main" val="0"/>
               </a:ext>
             </a:extLst>
           </a:blip>
@@ -12384,7 +12384,7 @@
             <p:ph idx="1"/>
             <p:extLst>
               <p:ext uri="{D42A27DB-BD31-4B8C-83A1-F6EECF244321}">
-                <p14:modId xmlns:p14="http://schemas.microsoft.com/office/powerpoint/2010/main" val="2081516656"/>
+                <p14:modId xmlns:p14="http://schemas.microsoft.com/office/powerpoint/2010/main" val="3449538270"/>
               </p:ext>
             </p:extLst>
           </p:nvPr>
@@ -12421,11 +12421,17 @@
                       </a:pPr>
                       <a:r>
                         <a:rPr lang="en-US" sz="1600" dirty="0" smtClean="0">
+                          <a:solidFill>
+                            <a:schemeClr val="tx1"/>
+                          </a:solidFill>
                           <a:effectLst/>
                         </a:rPr>
                         <a:t>Metric</a:t>
                       </a:r>
                       <a:endParaRPr lang="en-US" sz="1600" dirty="0">
+                        <a:solidFill>
+                          <a:schemeClr val="tx1"/>
+                        </a:solidFill>
                         <a:effectLst/>
                         <a:latin typeface="Calibri" panose="020F0502020204030204" pitchFamily="34" charset="0"/>
                         <a:ea typeface="Calibri" panose="020F0502020204030204" pitchFamily="34" charset="0"/>
@@ -12433,7 +12439,9 @@
                       </a:endParaRPr>
                     </a:p>
                   </a:txBody>
-                  <a:tcPr marL="68580" marR="68580" marT="0" marB="0"/>
+                  <a:tcPr marL="68580" marR="68580" marT="0" marB="0">
+                    <a:noFill/>
+                  </a:tcPr>
                 </a:tc>
                 <a:tc>
                   <a:txBody>
@@ -12450,11 +12458,17 @@
                       </a:pPr>
                       <a:r>
                         <a:rPr lang="en-US" sz="1600" dirty="0" smtClean="0">
+                          <a:solidFill>
+                            <a:schemeClr val="tx1"/>
+                          </a:solidFill>
                           <a:effectLst/>
                         </a:rPr>
                         <a:t>Phase 1 (Measured)</a:t>
                       </a:r>
                       <a:endParaRPr lang="en-US" sz="1600" dirty="0">
+                        <a:solidFill>
+                          <a:schemeClr val="tx1"/>
+                        </a:solidFill>
                         <a:effectLst/>
                         <a:latin typeface="Calibri" panose="020F0502020204030204" pitchFamily="34" charset="0"/>
                         <a:ea typeface="Calibri" panose="020F0502020204030204" pitchFamily="34" charset="0"/>
@@ -12462,7 +12476,9 @@
                       </a:endParaRPr>
                     </a:p>
                   </a:txBody>
-                  <a:tcPr marL="68580" marR="68580" marT="0" marB="0"/>
+                  <a:tcPr marL="68580" marR="68580" marT="0" marB="0">
+                    <a:noFill/>
+                  </a:tcPr>
                 </a:tc>
                 <a:tc>
                   <a:txBody>
@@ -12479,11 +12495,17 @@
                       </a:pPr>
                       <a:r>
                         <a:rPr lang="en-US" sz="1600" dirty="0" smtClean="0">
+                          <a:solidFill>
+                            <a:schemeClr val="tx1"/>
+                          </a:solidFill>
                           <a:effectLst/>
                         </a:rPr>
                         <a:t>Phase 2 Target</a:t>
                       </a:r>
                       <a:endParaRPr lang="en-US" sz="1600" dirty="0">
+                        <a:solidFill>
+                          <a:schemeClr val="tx1"/>
+                        </a:solidFill>
                         <a:effectLst/>
                         <a:latin typeface="Calibri" panose="020F0502020204030204" pitchFamily="34" charset="0"/>
                         <a:ea typeface="Calibri" panose="020F0502020204030204" pitchFamily="34" charset="0"/>
@@ -12491,7 +12513,9 @@
                       </a:endParaRPr>
                     </a:p>
                   </a:txBody>
-                  <a:tcPr marL="68580" marR="68580" marT="0" marB="0"/>
+                  <a:tcPr marL="68580" marR="68580" marT="0" marB="0">
+                    <a:noFill/>
+                  </a:tcPr>
                 </a:tc>
                 <a:tc>
                   <a:txBody>
@@ -12508,6 +12532,9 @@
                       </a:pPr>
                       <a:r>
                         <a:rPr lang="en-US" sz="1600" dirty="0" smtClean="0">
+                          <a:solidFill>
+                            <a:schemeClr val="tx1"/>
+                          </a:solidFill>
                           <a:effectLst/>
                           <a:latin typeface="+mn-lt"/>
                           <a:ea typeface="Calibri" panose="020F0502020204030204" pitchFamily="34" charset="0"/>
@@ -12517,6 +12544,9 @@
                       </a:r>
                       <a:r>
                         <a:rPr lang="en-US" sz="1600" baseline="0" dirty="0" smtClean="0">
+                          <a:solidFill>
+                            <a:schemeClr val="tx1"/>
+                          </a:solidFill>
                           <a:effectLst/>
                           <a:latin typeface="+mn-lt"/>
                           <a:ea typeface="Calibri" panose="020F0502020204030204" pitchFamily="34" charset="0"/>
@@ -12525,6 +12555,9 @@
                         <a:t>Estimate)</a:t>
                       </a:r>
                       <a:endParaRPr lang="en-US" sz="1600" dirty="0">
+                        <a:solidFill>
+                          <a:schemeClr val="tx1"/>
+                        </a:solidFill>
                         <a:effectLst/>
                         <a:latin typeface="+mn-lt"/>
                         <a:ea typeface="Calibri" panose="020F0502020204030204" pitchFamily="34" charset="0"/>
@@ -12532,7 +12565,9 @@
                       </a:endParaRPr>
                     </a:p>
                   </a:txBody>
-                  <a:tcPr marL="68580" marR="68580" marT="0" marB="0"/>
+                  <a:tcPr marL="68580" marR="68580" marT="0" marB="0">
+                    <a:noFill/>
+                  </a:tcPr>
                 </a:tc>
               </a:tr>
               <a:tr h="628712">
@@ -12551,11 +12586,17 @@
                       </a:pPr>
                       <a:r>
                         <a:rPr lang="en-US" sz="1800" dirty="0">
+                          <a:solidFill>
+                            <a:schemeClr val="tx1"/>
+                          </a:solidFill>
                           <a:effectLst/>
                         </a:rPr>
                         <a:t>Mass</a:t>
                       </a:r>
                       <a:endParaRPr lang="en-US" sz="1800" dirty="0">
+                        <a:solidFill>
+                          <a:schemeClr val="tx1"/>
+                        </a:solidFill>
                         <a:effectLst/>
                         <a:latin typeface="Calibri" panose="020F0502020204030204" pitchFamily="34" charset="0"/>
                         <a:ea typeface="Calibri" panose="020F0502020204030204" pitchFamily="34" charset="0"/>
@@ -12563,7 +12604,9 @@
                       </a:endParaRPr>
                     </a:p>
                   </a:txBody>
-                  <a:tcPr marL="68580" marR="68580" marT="0" marB="0"/>
+                  <a:tcPr marL="68580" marR="68580" marT="0" marB="0">
+                    <a:noFill/>
+                  </a:tcPr>
                 </a:tc>
                 <a:tc>
                   <a:txBody>
@@ -12589,7 +12632,9 @@
                       </a:r>
                     </a:p>
                   </a:txBody>
-                  <a:tcPr marL="68580" marR="68580" marT="0" marB="0"/>
+                  <a:tcPr marL="68580" marR="68580" marT="0" marB="0">
+                    <a:noFill/>
+                  </a:tcPr>
                 </a:tc>
                 <a:tc>
                   <a:txBody>
@@ -12634,7 +12679,9 @@
                       </a:endParaRPr>
                     </a:p>
                   </a:txBody>
-                  <a:tcPr marL="68580" marR="68580" marT="0" marB="0"/>
+                  <a:tcPr marL="68580" marR="68580" marT="0" marB="0">
+                    <a:noFill/>
+                  </a:tcPr>
                 </a:tc>
                 <a:tc>
                   <a:txBody>
@@ -12694,7 +12741,9 @@
                       </a:endParaRPr>
                     </a:p>
                   </a:txBody>
-                  <a:tcPr marL="68580" marR="68580" marT="0" marB="0"/>
+                  <a:tcPr marL="68580" marR="68580" marT="0" marB="0">
+                    <a:noFill/>
+                  </a:tcPr>
                 </a:tc>
               </a:tr>
               <a:tr h="315919">
@@ -12712,12 +12761,18 @@
                         </a:spcAft>
                       </a:pPr>
                       <a:r>
-                        <a:rPr lang="en-US" sz="1800">
+                        <a:rPr lang="en-US" sz="1800" dirty="0">
+                          <a:solidFill>
+                            <a:schemeClr val="tx1"/>
+                          </a:solidFill>
                           <a:effectLst/>
                         </a:rPr>
                         <a:t>Power</a:t>
                       </a:r>
-                      <a:endParaRPr lang="en-US" sz="1800">
+                      <a:endParaRPr lang="en-US" sz="1800" dirty="0">
+                        <a:solidFill>
+                          <a:schemeClr val="tx1"/>
+                        </a:solidFill>
                         <a:effectLst/>
                         <a:latin typeface="Calibri" panose="020F0502020204030204" pitchFamily="34" charset="0"/>
                         <a:ea typeface="Calibri" panose="020F0502020204030204" pitchFamily="34" charset="0"/>
@@ -12725,7 +12780,9 @@
                       </a:endParaRPr>
                     </a:p>
                   </a:txBody>
-                  <a:tcPr marL="68580" marR="68580" marT="0" marB="0"/>
+                  <a:tcPr marL="68580" marR="68580" marT="0" marB="0">
+                    <a:noFill/>
+                  </a:tcPr>
                 </a:tc>
                 <a:tc>
                   <a:txBody>
@@ -12757,7 +12814,9 @@
                       </a:endParaRPr>
                     </a:p>
                   </a:txBody>
-                  <a:tcPr marL="68580" marR="68580" marT="0" marB="0"/>
+                  <a:tcPr marL="68580" marR="68580" marT="0" marB="0">
+                    <a:noFill/>
+                  </a:tcPr>
                 </a:tc>
                 <a:tc>
                   <a:txBody>
@@ -12786,7 +12845,9 @@
                       </a:endParaRPr>
                     </a:p>
                   </a:txBody>
-                  <a:tcPr marL="68580" marR="68580" marT="0" marB="0"/>
+                  <a:tcPr marL="68580" marR="68580" marT="0" marB="0">
+                    <a:noFill/>
+                  </a:tcPr>
                 </a:tc>
                 <a:tc>
                   <a:txBody>
@@ -12818,7 +12879,9 @@
                       </a:endParaRPr>
                     </a:p>
                   </a:txBody>
-                  <a:tcPr marL="68580" marR="68580" marT="0" marB="0"/>
+                  <a:tcPr marL="68580" marR="68580" marT="0" marB="0">
+                    <a:noFill/>
+                  </a:tcPr>
                 </a:tc>
               </a:tr>
               <a:tr h="381000">
@@ -12837,12 +12900,18 @@
                       </a:pPr>
                       <a:r>
                         <a:rPr lang="en-US" sz="1800" dirty="0" smtClean="0">
+                          <a:solidFill>
+                            <a:schemeClr val="tx1"/>
+                          </a:solidFill>
                           <a:effectLst/>
                         </a:rPr>
                         <a:t>Location</a:t>
                       </a:r>
                       <a:r>
                         <a:rPr lang="en-US" sz="1800" baseline="0" dirty="0">
+                          <a:solidFill>
+                            <a:schemeClr val="tx1"/>
+                          </a:solidFill>
                           <a:effectLst/>
                           <a:latin typeface="Calibri" panose="020F0502020204030204" pitchFamily="34" charset="0"/>
                           <a:cs typeface="Times New Roman" panose="02020603050405020304" pitchFamily="18" charset="0"/>
@@ -12851,6 +12920,9 @@
                       </a:r>
                       <a:r>
                         <a:rPr lang="en-US" sz="1800" b="1" baseline="0" dirty="0" smtClean="0">
+                          <a:solidFill>
+                            <a:schemeClr val="tx1"/>
+                          </a:solidFill>
                           <a:effectLst/>
                           <a:latin typeface="+mj-lt"/>
                           <a:cs typeface="Times New Roman" panose="02020603050405020304" pitchFamily="18" charset="0"/>
@@ -12859,6 +12931,9 @@
                       </a:r>
                       <a:r>
                         <a:rPr lang="en-US" sz="1200" b="1" baseline="0" dirty="0" smtClean="0">
+                          <a:solidFill>
+                            <a:schemeClr val="tx1"/>
+                          </a:solidFill>
                           <a:effectLst/>
                           <a:latin typeface="+mj-lt"/>
                           <a:cs typeface="Times New Roman" panose="02020603050405020304" pitchFamily="18" charset="0"/>
@@ -12866,12 +12941,17 @@
                         <a:t>*</a:t>
                       </a:r>
                       <a:endParaRPr lang="en-US" sz="1800" b="1" dirty="0" smtClean="0">
+                        <a:solidFill>
+                          <a:schemeClr val="tx1"/>
+                        </a:solidFill>
                         <a:effectLst/>
                         <a:latin typeface="+mj-lt"/>
                       </a:endParaRPr>
                     </a:p>
                   </a:txBody>
-                  <a:tcPr marL="68580" marR="68580" marT="0" marB="0"/>
+                  <a:tcPr marL="68580" marR="68580" marT="0" marB="0">
+                    <a:noFill/>
+                  </a:tcPr>
                 </a:tc>
                 <a:tc>
                   <a:txBody>
@@ -12903,7 +12983,9 @@
                       </a:endParaRPr>
                     </a:p>
                   </a:txBody>
-                  <a:tcPr marL="68580" marR="68580" marT="0" marB="0"/>
+                  <a:tcPr marL="68580" marR="68580" marT="0" marB="0">
+                    <a:noFill/>
+                  </a:tcPr>
                 </a:tc>
                 <a:tc>
                   <a:txBody>
@@ -12932,7 +13014,9 @@
                       </a:endParaRPr>
                     </a:p>
                   </a:txBody>
-                  <a:tcPr marL="68580" marR="68580" marT="0" marB="0"/>
+                  <a:tcPr marL="68580" marR="68580" marT="0" marB="0">
+                    <a:noFill/>
+                  </a:tcPr>
                 </a:tc>
                 <a:tc>
                   <a:txBody>
@@ -12964,7 +13048,9 @@
                       </a:endParaRPr>
                     </a:p>
                   </a:txBody>
-                  <a:tcPr marL="68580" marR="68580" marT="0" marB="0"/>
+                  <a:tcPr marL="68580" marR="68580" marT="0" marB="0">
+                    <a:noFill/>
+                  </a:tcPr>
                 </a:tc>
               </a:tr>
               <a:tr h="381000">
@@ -12983,12 +13069,18 @@
                       </a:pPr>
                       <a:r>
                         <a:rPr lang="en-US" sz="1800" dirty="0" smtClean="0">
+                          <a:solidFill>
+                            <a:schemeClr val="tx1"/>
+                          </a:solidFill>
                           <a:effectLst/>
                         </a:rPr>
                         <a:t>Wireless </a:t>
                       </a:r>
                       <a:r>
                         <a:rPr lang="en-US" sz="1800" dirty="0" smtClean="0">
+                          <a:solidFill>
+                            <a:schemeClr val="tx1"/>
+                          </a:solidFill>
                           <a:effectLst/>
                           <a:latin typeface="+mj-lt"/>
                           <a:cs typeface="Times New Roman" panose="02020603050405020304" pitchFamily="18" charset="0"/>
@@ -12996,12 +13088,17 @@
                         <a:t>Range</a:t>
                       </a:r>
                       <a:endParaRPr lang="en-US" sz="1800" dirty="0" smtClean="0">
+                        <a:solidFill>
+                          <a:schemeClr val="tx1"/>
+                        </a:solidFill>
                         <a:effectLst/>
                         <a:latin typeface="+mj-lt"/>
                       </a:endParaRPr>
                     </a:p>
                   </a:txBody>
-                  <a:tcPr marL="68580" marR="68580" marT="0" marB="0"/>
+                  <a:tcPr marL="68580" marR="68580" marT="0" marB="0">
+                    <a:noFill/>
+                  </a:tcPr>
                 </a:tc>
                 <a:tc>
                   <a:txBody>
@@ -13036,7 +13133,9 @@
                       </a:r>
                     </a:p>
                   </a:txBody>
-                  <a:tcPr marL="68580" marR="68580" marT="0" marB="0"/>
+                  <a:tcPr marL="68580" marR="68580" marT="0" marB="0">
+                    <a:noFill/>
+                  </a:tcPr>
                 </a:tc>
                 <a:tc>
                   <a:txBody>
@@ -13077,7 +13176,9 @@
                       </a:endParaRPr>
                     </a:p>
                   </a:txBody>
-                  <a:tcPr marL="68580" marR="68580" marT="0" marB="0"/>
+                  <a:tcPr marL="68580" marR="68580" marT="0" marB="0">
+                    <a:noFill/>
+                  </a:tcPr>
                 </a:tc>
                 <a:tc>
                   <a:txBody>
@@ -13109,7 +13210,9 @@
                       </a:endParaRPr>
                     </a:p>
                   </a:txBody>
-                  <a:tcPr marL="68580" marR="68580" marT="0" marB="0"/>
+                  <a:tcPr marL="68580" marR="68580" marT="0" marB="0">
+                    <a:noFill/>
+                  </a:tcPr>
                 </a:tc>
               </a:tr>
               <a:tr h="335529">
@@ -13128,6 +13231,9 @@
                       </a:pPr>
                       <a:r>
                         <a:rPr lang="en-US" sz="1800" dirty="0" smtClean="0">
+                          <a:solidFill>
+                            <a:schemeClr val="tx1"/>
+                          </a:solidFill>
                           <a:effectLst/>
                           <a:latin typeface="+mn-lt"/>
                           <a:ea typeface="+mn-ea"/>
@@ -13137,6 +13243,9 @@
                       </a:r>
                       <a:r>
                         <a:rPr lang="en-US" sz="1800" baseline="0" dirty="0" smtClean="0">
+                          <a:solidFill>
+                            <a:schemeClr val="tx1"/>
+                          </a:solidFill>
                           <a:effectLst/>
                           <a:latin typeface="+mn-lt"/>
                           <a:ea typeface="+mn-ea"/>
@@ -13146,7 +13255,9 @@
                       </a:r>
                     </a:p>
                   </a:txBody>
-                  <a:tcPr marL="68580" marR="68580" marT="0" marB="0"/>
+                  <a:tcPr marL="68580" marR="68580" marT="0" marB="0">
+                    <a:noFill/>
+                  </a:tcPr>
                 </a:tc>
                 <a:tc>
                   <a:txBody>
@@ -13178,7 +13289,9 @@
                       </a:endParaRPr>
                     </a:p>
                   </a:txBody>
-                  <a:tcPr marL="68580" marR="68580" marT="0" marB="0"/>
+                  <a:tcPr marL="68580" marR="68580" marT="0" marB="0">
+                    <a:noFill/>
+                  </a:tcPr>
                 </a:tc>
                 <a:tc>
                   <a:txBody>
@@ -13213,7 +13326,9 @@
                       </a:endParaRPr>
                     </a:p>
                   </a:txBody>
-                  <a:tcPr marL="68580" marR="68580" marT="0" marB="0"/>
+                  <a:tcPr marL="68580" marR="68580" marT="0" marB="0">
+                    <a:noFill/>
+                  </a:tcPr>
                 </a:tc>
                 <a:tc>
                   <a:txBody>
@@ -13245,7 +13360,9 @@
                       </a:endParaRPr>
                     </a:p>
                   </a:txBody>
-                  <a:tcPr marL="68580" marR="68580" marT="0" marB="0"/>
+                  <a:tcPr marL="68580" marR="68580" marT="0" marB="0">
+                    <a:noFill/>
+                  </a:tcPr>
                 </a:tc>
               </a:tr>
               <a:tr h="381000">
@@ -13264,6 +13381,9 @@
                       </a:pPr>
                       <a:r>
                         <a:rPr lang="en-US" sz="1800" b="1" dirty="0" smtClean="0">
+                          <a:solidFill>
+                            <a:schemeClr val="tx1"/>
+                          </a:solidFill>
                           <a:effectLst/>
                           <a:latin typeface="+mj-lt"/>
                           <a:ea typeface="Calibri" panose="020F0502020204030204" pitchFamily="34" charset="0"/>
@@ -13272,6 +13392,9 @@
                         <a:t>Network Refresh</a:t>
                       </a:r>
                       <a:endParaRPr lang="en-US" sz="1800" b="1" dirty="0">
+                        <a:solidFill>
+                          <a:schemeClr val="tx1"/>
+                        </a:solidFill>
                         <a:effectLst/>
                         <a:latin typeface="+mj-lt"/>
                         <a:ea typeface="Calibri" panose="020F0502020204030204" pitchFamily="34" charset="0"/>
@@ -13279,7 +13402,9 @@
                       </a:endParaRPr>
                     </a:p>
                   </a:txBody>
-                  <a:tcPr marL="68580" marR="68580" marT="0" marB="0"/>
+                  <a:tcPr marL="68580" marR="68580" marT="0" marB="0">
+                    <a:noFill/>
+                  </a:tcPr>
                 </a:tc>
                 <a:tc>
                   <a:txBody>
@@ -13311,7 +13436,9 @@
                       </a:endParaRPr>
                     </a:p>
                   </a:txBody>
-                  <a:tcPr marL="68580" marR="68580" marT="0" marB="0"/>
+                  <a:tcPr marL="68580" marR="68580" marT="0" marB="0">
+                    <a:noFill/>
+                  </a:tcPr>
                 </a:tc>
                 <a:tc>
                   <a:txBody>
@@ -13343,7 +13470,9 @@
                       </a:endParaRPr>
                     </a:p>
                   </a:txBody>
-                  <a:tcPr marL="68580" marR="68580" marT="0" marB="0"/>
+                  <a:tcPr marL="68580" marR="68580" marT="0" marB="0">
+                    <a:noFill/>
+                  </a:tcPr>
                 </a:tc>
                 <a:tc>
                   <a:txBody>
@@ -13375,7 +13504,9 @@
                       </a:endParaRPr>
                     </a:p>
                   </a:txBody>
-                  <a:tcPr marL="68580" marR="68580" marT="0" marB="0"/>
+                  <a:tcPr marL="68580" marR="68580" marT="0" marB="0">
+                    <a:noFill/>
+                  </a:tcPr>
                 </a:tc>
               </a:tr>
               <a:tr h="609600">
@@ -13394,11 +13525,17 @@
                       </a:pPr>
                       <a:r>
                         <a:rPr lang="en-US" sz="1800" dirty="0">
+                          <a:solidFill>
+                            <a:schemeClr val="tx1"/>
+                          </a:solidFill>
                           <a:effectLst/>
                         </a:rPr>
                         <a:t>Usability</a:t>
                       </a:r>
                       <a:endParaRPr lang="en-US" sz="1800" dirty="0">
+                        <a:solidFill>
+                          <a:schemeClr val="tx1"/>
+                        </a:solidFill>
                         <a:effectLst/>
                         <a:latin typeface="Calibri" panose="020F0502020204030204" pitchFamily="34" charset="0"/>
                         <a:ea typeface="Calibri" panose="020F0502020204030204" pitchFamily="34" charset="0"/>
@@ -13406,7 +13543,9 @@
                       </a:endParaRPr>
                     </a:p>
                   </a:txBody>
-                  <a:tcPr marL="68580" marR="68580" marT="0" marB="0"/>
+                  <a:tcPr marL="68580" marR="68580" marT="0" marB="0">
+                    <a:noFill/>
+                  </a:tcPr>
                 </a:tc>
                 <a:tc>
                   <a:txBody>
@@ -13438,7 +13577,9 @@
                       </a:endParaRPr>
                     </a:p>
                   </a:txBody>
-                  <a:tcPr marL="68580" marR="68580" marT="0" marB="0"/>
+                  <a:tcPr marL="68580" marR="68580" marT="0" marB="0">
+                    <a:noFill/>
+                  </a:tcPr>
                 </a:tc>
                 <a:tc>
                   <a:txBody>
@@ -13497,7 +13638,9 @@
                       </a:endParaRPr>
                     </a:p>
                   </a:txBody>
-                  <a:tcPr marL="68580" marR="68580" marT="0" marB="0"/>
+                  <a:tcPr marL="68580" marR="68580" marT="0" marB="0">
+                    <a:noFill/>
+                  </a:tcPr>
                 </a:tc>
                 <a:tc>
                   <a:txBody>
@@ -13529,7 +13672,9 @@
                       </a:endParaRPr>
                     </a:p>
                   </a:txBody>
-                  <a:tcPr marL="68580" marR="68580" marT="0" marB="0"/>
+                  <a:tcPr marL="68580" marR="68580" marT="0" marB="0">
+                    <a:noFill/>
+                  </a:tcPr>
                 </a:tc>
               </a:tr>
               <a:tr h="685800">
@@ -13548,6 +13693,9 @@
                       </a:pPr>
                       <a:r>
                         <a:rPr lang="en-US" sz="1800" dirty="0" smtClean="0">
+                          <a:solidFill>
+                            <a:schemeClr val="tx1"/>
+                          </a:solidFill>
                           <a:effectLst/>
                           <a:latin typeface="+mn-lt"/>
                           <a:ea typeface="Calibri" panose="020F0502020204030204" pitchFamily="34" charset="0"/>
@@ -13556,6 +13704,9 @@
                         <a:t>Simultaneous Device Limit</a:t>
                       </a:r>
                       <a:endParaRPr lang="en-US" sz="1800" dirty="0">
+                        <a:solidFill>
+                          <a:schemeClr val="tx1"/>
+                        </a:solidFill>
                         <a:effectLst/>
                         <a:latin typeface="+mn-lt"/>
                         <a:ea typeface="Calibri" panose="020F0502020204030204" pitchFamily="34" charset="0"/>
@@ -13563,7 +13714,9 @@
                       </a:endParaRPr>
                     </a:p>
                   </a:txBody>
-                  <a:tcPr marL="68580" marR="68580" marT="0" marB="0"/>
+                  <a:tcPr marL="68580" marR="68580" marT="0" marB="0">
+                    <a:noFill/>
+                  </a:tcPr>
                 </a:tc>
                 <a:tc>
                   <a:txBody>
@@ -13595,7 +13748,9 @@
                       </a:endParaRPr>
                     </a:p>
                   </a:txBody>
-                  <a:tcPr marL="68580" marR="68580" marT="0" marB="0"/>
+                  <a:tcPr marL="68580" marR="68580" marT="0" marB="0">
+                    <a:noFill/>
+                  </a:tcPr>
                 </a:tc>
                 <a:tc>
                   <a:txBody>
@@ -13627,7 +13782,9 @@
                       </a:endParaRPr>
                     </a:p>
                   </a:txBody>
-                  <a:tcPr marL="68580" marR="68580" marT="0" marB="0"/>
+                  <a:tcPr marL="68580" marR="68580" marT="0" marB="0">
+                    <a:noFill/>
+                  </a:tcPr>
                 </a:tc>
                 <a:tc>
                   <a:txBody>
@@ -13659,7 +13816,9 @@
                       </a:endParaRPr>
                     </a:p>
                   </a:txBody>
-                  <a:tcPr marL="68580" marR="68580" marT="0" marB="0"/>
+                  <a:tcPr marL="68580" marR="68580" marT="0" marB="0">
+                    <a:noFill/>
+                  </a:tcPr>
                 </a:tc>
               </a:tr>
               <a:tr h="685800">
@@ -13678,6 +13837,9 @@
                       </a:pPr>
                       <a:r>
                         <a:rPr lang="en-US" sz="1800" dirty="0" smtClean="0">
+                          <a:solidFill>
+                            <a:schemeClr val="tx1"/>
+                          </a:solidFill>
                           <a:effectLst/>
                           <a:latin typeface="+mn-lt"/>
                           <a:ea typeface="Calibri" panose="020F0502020204030204" pitchFamily="34" charset="0"/>
@@ -13687,6 +13849,9 @@
                       </a:r>
                       <a:r>
                         <a:rPr lang="en-US" sz="1800" baseline="0" dirty="0" smtClean="0">
+                          <a:solidFill>
+                            <a:schemeClr val="tx1"/>
+                          </a:solidFill>
                           <a:effectLst/>
                           <a:latin typeface="+mn-lt"/>
                           <a:ea typeface="Calibri" panose="020F0502020204030204" pitchFamily="34" charset="0"/>
@@ -13695,6 +13860,9 @@
                         <a:t> Latency</a:t>
                       </a:r>
                       <a:endParaRPr lang="en-US" sz="1800" dirty="0">
+                        <a:solidFill>
+                          <a:schemeClr val="tx1"/>
+                        </a:solidFill>
                         <a:effectLst/>
                         <a:latin typeface="+mn-lt"/>
                         <a:ea typeface="Calibri" panose="020F0502020204030204" pitchFamily="34" charset="0"/>
@@ -13702,7 +13870,9 @@
                       </a:endParaRPr>
                     </a:p>
                   </a:txBody>
-                  <a:tcPr marL="68580" marR="68580" marT="0" marB="0"/>
+                  <a:tcPr marL="68580" marR="68580" marT="0" marB="0">
+                    <a:noFill/>
+                  </a:tcPr>
                 </a:tc>
                 <a:tc>
                   <a:txBody>
@@ -13734,7 +13904,9 @@
                       </a:endParaRPr>
                     </a:p>
                   </a:txBody>
-                  <a:tcPr marL="68580" marR="68580" marT="0" marB="0"/>
+                  <a:tcPr marL="68580" marR="68580" marT="0" marB="0">
+                    <a:noFill/>
+                  </a:tcPr>
                 </a:tc>
                 <a:tc>
                   <a:txBody>
@@ -13766,7 +13938,9 @@
                       </a:endParaRPr>
                     </a:p>
                   </a:txBody>
-                  <a:tcPr marL="68580" marR="68580" marT="0" marB="0"/>
+                  <a:tcPr marL="68580" marR="68580" marT="0" marB="0">
+                    <a:noFill/>
+                  </a:tcPr>
                 </a:tc>
                 <a:tc>
                   <a:txBody>
@@ -13798,7 +13972,9 @@
                       </a:endParaRPr>
                     </a:p>
                   </a:txBody>
-                  <a:tcPr marL="68580" marR="68580" marT="0" marB="0"/>
+                  <a:tcPr marL="68580" marR="68580" marT="0" marB="0">
+                    <a:noFill/>
+                  </a:tcPr>
                 </a:tc>
               </a:tr>
             </a:tbl>
@@ -14049,7 +14225,7 @@
           <a:blip r:embed="rId2" cstate="print">
             <a:extLst>
               <a:ext uri="{28A0092B-C50C-407E-A947-70E740481C1C}">
-                <a14:useLocalDpi xmlns:a14="http://schemas.microsoft.com/office/drawing/2010/main"/>
+                <a14:useLocalDpi xmlns:a14="http://schemas.microsoft.com/office/drawing/2010/main" val="0"/>
               </a:ext>
             </a:extLst>
           </a:blip>
@@ -14330,7 +14506,15 @@
           <a:p>
             <a:r>
               <a:rPr lang="en-US" dirty="0"/>
-              <a:t>Execution overview – </a:t>
+              <a:t>Execution </a:t>
+            </a:r>
+            <a:r>
+              <a:rPr lang="en-US" dirty="0" smtClean="0"/>
+              <a:t>Overview </a:t>
+            </a:r>
+            <a:r>
+              <a:rPr lang="en-US" dirty="0"/>
+              <a:t>– </a:t>
             </a:r>
             <a:r>
               <a:rPr lang="en-US" dirty="0" smtClean="0"/>
@@ -14435,7 +14619,15 @@
           <a:p>
             <a:r>
               <a:rPr lang="en-US" dirty="0" smtClean="0"/>
-              <a:t>Execution overview – Timeline 2/3</a:t>
+              <a:t>Execution </a:t>
+            </a:r>
+            <a:r>
+              <a:rPr lang="en-US" dirty="0" smtClean="0"/>
+              <a:t>Overview </a:t>
+            </a:r>
+            <a:r>
+              <a:rPr lang="en-US" dirty="0" smtClean="0"/>
+              <a:t>– Timeline 2/3</a:t>
             </a:r>
             <a:endParaRPr lang="en-US" dirty="0"/>
           </a:p>
@@ -14637,7 +14829,15 @@
           <a:p>
             <a:r>
               <a:rPr lang="en-US" dirty="0" smtClean="0"/>
-              <a:t>Execution overview - BUDGET</a:t>
+              <a:t>Execution </a:t>
+            </a:r>
+            <a:r>
+              <a:rPr lang="en-US" dirty="0" smtClean="0"/>
+              <a:t>Overview </a:t>
+            </a:r>
+            <a:r>
+              <a:rPr lang="en-US" dirty="0" smtClean="0"/>
+              <a:t>- BUDGET</a:t>
             </a:r>
             <a:endParaRPr lang="en-US" dirty="0"/>
           </a:p>
@@ -14653,7 +14853,7 @@
             <p:ph idx="1"/>
             <p:extLst>
               <p:ext uri="{D42A27DB-BD31-4B8C-83A1-F6EECF244321}">
-                <p14:modId xmlns:p14="http://schemas.microsoft.com/office/powerpoint/2010/main" val="3223289073"/>
+                <p14:modId xmlns:p14="http://schemas.microsoft.com/office/powerpoint/2010/main" val="2573199993"/>
               </p:ext>
             </p:extLst>
           </p:nvPr>
@@ -14681,9 +14881,9 @@
                     <a:bodyPr/>
                     <a:lstStyle/>
                     <a:p>
-                      <a:pPr algn="l" fontAlgn="b"/>
+                      <a:pPr algn="ctr" fontAlgn="b"/>
                       <a:r>
-                        <a:rPr lang="en-US" sz="2000" u="none" strike="noStrike" dirty="0">
+                        <a:rPr lang="en-US" sz="2000" b="1" u="none" strike="noStrike" dirty="0">
                           <a:effectLst/>
                         </a:rPr>
                         <a:t>Name</a:t>
@@ -14697,16 +14897,18 @@
                       </a:endParaRPr>
                     </a:p>
                   </a:txBody>
-                  <a:tcPr marL="9525" marR="9525" marT="9525" marB="0" anchor="b"/>
+                  <a:tcPr marL="9525" marR="9525" marT="9525" marB="0" anchor="b">
+                    <a:noFill/>
+                  </a:tcPr>
                 </a:tc>
                 <a:tc>
                   <a:txBody>
                     <a:bodyPr/>
                     <a:lstStyle/>
                     <a:p>
-                      <a:pPr algn="l" fontAlgn="b"/>
+                      <a:pPr algn="ctr" fontAlgn="b"/>
                       <a:r>
-                        <a:rPr lang="en-US" sz="2000" u="none" strike="noStrike" dirty="0">
+                        <a:rPr lang="en-US" sz="2000" b="1" u="none" strike="noStrike" dirty="0">
                           <a:effectLst/>
                         </a:rPr>
                         <a:t>Vendor</a:t>
@@ -14720,16 +14922,18 @@
                       </a:endParaRPr>
                     </a:p>
                   </a:txBody>
-                  <a:tcPr marL="9525" marR="9525" marT="9525" marB="0" anchor="b"/>
+                  <a:tcPr marL="9525" marR="9525" marT="9525" marB="0" anchor="b">
+                    <a:noFill/>
+                  </a:tcPr>
                 </a:tc>
                 <a:tc>
                   <a:txBody>
                     <a:bodyPr/>
                     <a:lstStyle/>
                     <a:p>
-                      <a:pPr algn="l" fontAlgn="b"/>
+                      <a:pPr algn="ctr" fontAlgn="b"/>
                       <a:r>
-                        <a:rPr lang="en-US" sz="2000" u="none" strike="noStrike" dirty="0">
+                        <a:rPr lang="en-US" sz="2000" b="1" u="none" strike="noStrike" dirty="0">
                           <a:effectLst/>
                         </a:rPr>
                         <a:t>Unit Price</a:t>
@@ -14743,16 +14947,18 @@
                       </a:endParaRPr>
                     </a:p>
                   </a:txBody>
-                  <a:tcPr marL="9525" marR="9525" marT="9525" marB="0" anchor="b"/>
+                  <a:tcPr marL="9525" marR="9525" marT="9525" marB="0" anchor="b">
+                    <a:noFill/>
+                  </a:tcPr>
                 </a:tc>
                 <a:tc>
                   <a:txBody>
                     <a:bodyPr/>
                     <a:lstStyle/>
                     <a:p>
-                      <a:pPr algn="l" fontAlgn="b"/>
+                      <a:pPr algn="ctr" fontAlgn="b"/>
                       <a:r>
-                        <a:rPr lang="en-US" sz="2000" u="none" strike="noStrike" dirty="0">
+                        <a:rPr lang="en-US" sz="2000" b="1" u="none" strike="noStrike" dirty="0">
                           <a:effectLst/>
                         </a:rPr>
                         <a:t>Quantity</a:t>
@@ -14766,8 +14972,37 @@
                       </a:endParaRPr>
                     </a:p>
                   </a:txBody>
-                  <a:tcPr marL="9525" marR="9525" marT="9525" marB="0" anchor="b"/>
+                  <a:tcPr marL="9525" marR="9525" marT="9525" marB="0" anchor="b">
+                    <a:noFill/>
+                  </a:tcPr>
                 </a:tc>
+                <a:tc>
+                  <a:txBody>
+                    <a:bodyPr/>
+                    <a:lstStyle/>
+                    <a:p>
+                      <a:pPr algn="ctr" fontAlgn="b"/>
+                      <a:r>
+                        <a:rPr lang="en-US" sz="2000" b="1" u="none" strike="noStrike" dirty="0" smtClean="0">
+                          <a:effectLst/>
+                        </a:rPr>
+                        <a:t>Total</a:t>
+                      </a:r>
+                      <a:endParaRPr lang="en-US" sz="2000" b="1" i="0" u="none" strike="noStrike" dirty="0">
+                        <a:solidFill>
+                          <a:srgbClr val="000000"/>
+                        </a:solidFill>
+                        <a:effectLst/>
+                        <a:latin typeface="Liberation Sans"/>
+                      </a:endParaRPr>
+                    </a:p>
+                  </a:txBody>
+                  <a:tcPr marL="9525" marR="9525" marT="9525" marB="0" anchor="b">
+                    <a:noFill/>
+                  </a:tcPr>
+                </a:tc>
+              </a:tr>
+              <a:tr h="266000">
                 <a:tc>
                   <a:txBody>
                     <a:bodyPr/>
@@ -14778,9 +15013,9 @@
                         <a:rPr lang="en-US" sz="2000" u="none" strike="noStrike" dirty="0">
                           <a:effectLst/>
                         </a:rPr>
-                        <a:t>Price</a:t>
+                        <a:t>Battery</a:t>
                       </a:r>
-                      <a:endParaRPr lang="en-US" sz="2000" b="1" i="0" u="none" strike="noStrike" dirty="0">
+                      <a:endParaRPr lang="en-US" sz="2000" b="0" i="0" u="none" strike="noStrike" dirty="0">
                         <a:solidFill>
                           <a:srgbClr val="000000"/>
                         </a:solidFill>
@@ -14789,32 +15024,9 @@
                       </a:endParaRPr>
                     </a:p>
                   </a:txBody>
-                  <a:tcPr marL="9525" marR="9525" marT="9525" marB="0" anchor="b"/>
-                </a:tc>
-              </a:tr>
-              <a:tr h="266000">
-                <a:tc>
-                  <a:txBody>
-                    <a:bodyPr/>
-                    <a:lstStyle/>
-                    <a:p>
-                      <a:pPr algn="l" fontAlgn="b"/>
-                      <a:r>
-                        <a:rPr lang="en-US" sz="2000" u="none" strike="noStrike">
-                          <a:effectLst/>
-                        </a:rPr>
-                        <a:t>Battery</a:t>
-                      </a:r>
-                      <a:endParaRPr lang="en-US" sz="2000" b="0" i="0" u="none" strike="noStrike">
-                        <a:solidFill>
-                          <a:srgbClr val="000000"/>
-                        </a:solidFill>
-                        <a:effectLst/>
-                        <a:latin typeface="Liberation Sans"/>
-                      </a:endParaRPr>
-                    </a:p>
-                  </a:txBody>
-                  <a:tcPr marL="9525" marR="9525" marT="9525" marB="0" anchor="b"/>
+                  <a:tcPr marL="9525" marR="9525" marT="9525" marB="0" anchor="b">
+                    <a:noFill/>
+                  </a:tcPr>
                 </a:tc>
                 <a:tc>
                   <a:txBody>
@@ -14837,7 +15049,9 @@
                       </a:endParaRPr>
                     </a:p>
                   </a:txBody>
-                  <a:tcPr marL="9525" marR="9525" marT="9525" marB="0" anchor="b"/>
+                  <a:tcPr marL="9525" marR="9525" marT="9525" marB="0" anchor="b">
+                    <a:noFill/>
+                  </a:tcPr>
                 </a:tc>
                 <a:tc>
                   <a:txBody>
@@ -14860,7 +15074,9 @@
                       </a:endParaRPr>
                     </a:p>
                   </a:txBody>
-                  <a:tcPr marL="9525" marR="9525" marT="9525" marB="0" anchor="b"/>
+                  <a:tcPr marL="9525" marR="9525" marT="9525" marB="0" anchor="b">
+                    <a:noFill/>
+                  </a:tcPr>
                 </a:tc>
                 <a:tc>
                   <a:txBody>
@@ -14883,7 +15099,9 @@
                       </a:endParaRPr>
                     </a:p>
                   </a:txBody>
-                  <a:tcPr marL="9525" marR="9525" marT="9525" marB="0" anchor="b"/>
+                  <a:tcPr marL="9525" marR="9525" marT="9525" marB="0" anchor="b">
+                    <a:noFill/>
+                  </a:tcPr>
                 </a:tc>
                 <a:tc>
                   <a:txBody>
@@ -14906,7 +15124,9 @@
                       </a:endParaRPr>
                     </a:p>
                   </a:txBody>
-                  <a:tcPr marL="9525" marR="9525" marT="9525" marB="0" anchor="b"/>
+                  <a:tcPr marL="9525" marR="9525" marT="9525" marB="0" anchor="b">
+                    <a:noFill/>
+                  </a:tcPr>
                 </a:tc>
               </a:tr>
               <a:tr h="266000">
@@ -14931,7 +15151,9 @@
                       </a:endParaRPr>
                     </a:p>
                   </a:txBody>
-                  <a:tcPr marL="9525" marR="9525" marT="9525" marB="0" anchor="b"/>
+                  <a:tcPr marL="9525" marR="9525" marT="9525" marB="0" anchor="b">
+                    <a:noFill/>
+                  </a:tcPr>
                 </a:tc>
                 <a:tc>
                   <a:txBody>
@@ -14954,7 +15176,9 @@
                       </a:endParaRPr>
                     </a:p>
                   </a:txBody>
-                  <a:tcPr marL="9525" marR="9525" marT="9525" marB="0" anchor="b"/>
+                  <a:tcPr marL="9525" marR="9525" marT="9525" marB="0" anchor="b">
+                    <a:noFill/>
+                  </a:tcPr>
                 </a:tc>
                 <a:tc>
                   <a:txBody>
@@ -14977,7 +15201,9 @@
                       </a:endParaRPr>
                     </a:p>
                   </a:txBody>
-                  <a:tcPr marL="9525" marR="9525" marT="9525" marB="0" anchor="b"/>
+                  <a:tcPr marL="9525" marR="9525" marT="9525" marB="0" anchor="b">
+                    <a:noFill/>
+                  </a:tcPr>
                 </a:tc>
                 <a:tc>
                   <a:txBody>
@@ -15000,7 +15226,9 @@
                       </a:endParaRPr>
                     </a:p>
                   </a:txBody>
-                  <a:tcPr marL="9525" marR="9525" marT="9525" marB="0" anchor="b"/>
+                  <a:tcPr marL="9525" marR="9525" marT="9525" marB="0" anchor="b">
+                    <a:noFill/>
+                  </a:tcPr>
                 </a:tc>
                 <a:tc>
                   <a:txBody>
@@ -15023,7 +15251,9 @@
                       </a:endParaRPr>
                     </a:p>
                   </a:txBody>
-                  <a:tcPr marL="9525" marR="9525" marT="9525" marB="0" anchor="b"/>
+                  <a:tcPr marL="9525" marR="9525" marT="9525" marB="0" anchor="b">
+                    <a:noFill/>
+                  </a:tcPr>
                 </a:tc>
               </a:tr>
               <a:tr h="266000">
@@ -15048,7 +15278,9 @@
                       </a:endParaRPr>
                     </a:p>
                   </a:txBody>
-                  <a:tcPr marL="9525" marR="9525" marT="9525" marB="0" anchor="b"/>
+                  <a:tcPr marL="9525" marR="9525" marT="9525" marB="0" anchor="b">
+                    <a:noFill/>
+                  </a:tcPr>
                 </a:tc>
                 <a:tc>
                   <a:txBody>
@@ -15071,7 +15303,9 @@
                       </a:endParaRPr>
                     </a:p>
                   </a:txBody>
-                  <a:tcPr marL="9525" marR="9525" marT="9525" marB="0" anchor="b"/>
+                  <a:tcPr marL="9525" marR="9525" marT="9525" marB="0" anchor="b">
+                    <a:noFill/>
+                  </a:tcPr>
                 </a:tc>
                 <a:tc>
                   <a:txBody>
@@ -15094,7 +15328,9 @@
                       </a:endParaRPr>
                     </a:p>
                   </a:txBody>
-                  <a:tcPr marL="9525" marR="9525" marT="9525" marB="0" anchor="b"/>
+                  <a:tcPr marL="9525" marR="9525" marT="9525" marB="0" anchor="b">
+                    <a:noFill/>
+                  </a:tcPr>
                 </a:tc>
                 <a:tc>
                   <a:txBody>
@@ -15117,7 +15353,9 @@
                       </a:endParaRPr>
                     </a:p>
                   </a:txBody>
-                  <a:tcPr marL="9525" marR="9525" marT="9525" marB="0" anchor="b"/>
+                  <a:tcPr marL="9525" marR="9525" marT="9525" marB="0" anchor="b">
+                    <a:noFill/>
+                  </a:tcPr>
                 </a:tc>
                 <a:tc>
                   <a:txBody>
@@ -15140,7 +15378,9 @@
                       </a:endParaRPr>
                     </a:p>
                   </a:txBody>
-                  <a:tcPr marL="9525" marR="9525" marT="9525" marB="0" anchor="b"/>
+                  <a:tcPr marL="9525" marR="9525" marT="9525" marB="0" anchor="b">
+                    <a:noFill/>
+                  </a:tcPr>
                 </a:tc>
               </a:tr>
               <a:tr h="266000">
@@ -15165,7 +15405,9 @@
                       </a:endParaRPr>
                     </a:p>
                   </a:txBody>
-                  <a:tcPr marL="9525" marR="9525" marT="9525" marB="0" anchor="b"/>
+                  <a:tcPr marL="9525" marR="9525" marT="9525" marB="0" anchor="b">
+                    <a:noFill/>
+                  </a:tcPr>
                 </a:tc>
                 <a:tc>
                   <a:txBody>
@@ -15188,7 +15430,9 @@
                       </a:endParaRPr>
                     </a:p>
                   </a:txBody>
-                  <a:tcPr marL="9525" marR="9525" marT="9525" marB="0" anchor="b"/>
+                  <a:tcPr marL="9525" marR="9525" marT="9525" marB="0" anchor="b">
+                    <a:noFill/>
+                  </a:tcPr>
                 </a:tc>
                 <a:tc>
                   <a:txBody>
@@ -15211,7 +15455,9 @@
                       </a:endParaRPr>
                     </a:p>
                   </a:txBody>
-                  <a:tcPr marL="9525" marR="9525" marT="9525" marB="0" anchor="b"/>
+                  <a:tcPr marL="9525" marR="9525" marT="9525" marB="0" anchor="b">
+                    <a:noFill/>
+                  </a:tcPr>
                 </a:tc>
                 <a:tc>
                   <a:txBody>
@@ -15234,7 +15480,9 @@
                       </a:endParaRPr>
                     </a:p>
                   </a:txBody>
-                  <a:tcPr marL="9525" marR="9525" marT="9525" marB="0" anchor="b"/>
+                  <a:tcPr marL="9525" marR="9525" marT="9525" marB="0" anchor="b">
+                    <a:noFill/>
+                  </a:tcPr>
                 </a:tc>
                 <a:tc>
                   <a:txBody>
@@ -15257,7 +15505,9 @@
                       </a:endParaRPr>
                     </a:p>
                   </a:txBody>
-                  <a:tcPr marL="9525" marR="9525" marT="9525" marB="0" anchor="b"/>
+                  <a:tcPr marL="9525" marR="9525" marT="9525" marB="0" anchor="b">
+                    <a:noFill/>
+                  </a:tcPr>
                 </a:tc>
               </a:tr>
               <a:tr h="266000">
@@ -15282,7 +15532,9 @@
                       </a:endParaRPr>
                     </a:p>
                   </a:txBody>
-                  <a:tcPr marL="9525" marR="9525" marT="9525" marB="0" anchor="b"/>
+                  <a:tcPr marL="9525" marR="9525" marT="9525" marB="0" anchor="b">
+                    <a:noFill/>
+                  </a:tcPr>
                 </a:tc>
                 <a:tc>
                   <a:txBody>
@@ -15305,7 +15557,9 @@
                       </a:endParaRPr>
                     </a:p>
                   </a:txBody>
-                  <a:tcPr marL="9525" marR="9525" marT="9525" marB="0" anchor="b"/>
+                  <a:tcPr marL="9525" marR="9525" marT="9525" marB="0" anchor="b">
+                    <a:noFill/>
+                  </a:tcPr>
                 </a:tc>
                 <a:tc>
                   <a:txBody>
@@ -15328,7 +15582,9 @@
                       </a:endParaRPr>
                     </a:p>
                   </a:txBody>
-                  <a:tcPr marL="9525" marR="9525" marT="9525" marB="0" anchor="b"/>
+                  <a:tcPr marL="9525" marR="9525" marT="9525" marB="0" anchor="b">
+                    <a:noFill/>
+                  </a:tcPr>
                 </a:tc>
                 <a:tc>
                   <a:txBody>
@@ -15351,7 +15607,9 @@
                       </a:endParaRPr>
                     </a:p>
                   </a:txBody>
-                  <a:tcPr marL="9525" marR="9525" marT="9525" marB="0" anchor="b"/>
+                  <a:tcPr marL="9525" marR="9525" marT="9525" marB="0" anchor="b">
+                    <a:noFill/>
+                  </a:tcPr>
                 </a:tc>
                 <a:tc>
                   <a:txBody>
@@ -15374,7 +15632,9 @@
                       </a:endParaRPr>
                     </a:p>
                   </a:txBody>
-                  <a:tcPr marL="9525" marR="9525" marT="9525" marB="0" anchor="b"/>
+                  <a:tcPr marL="9525" marR="9525" marT="9525" marB="0" anchor="b">
+                    <a:noFill/>
+                  </a:tcPr>
                 </a:tc>
               </a:tr>
               <a:tr h="266000">
@@ -15405,7 +15665,9 @@
                       </a:endParaRPr>
                     </a:p>
                   </a:txBody>
-                  <a:tcPr marL="9525" marR="9525" marT="9525" marB="0" anchor="b"/>
+                  <a:tcPr marL="9525" marR="9525" marT="9525" marB="0" anchor="b">
+                    <a:noFill/>
+                  </a:tcPr>
                 </a:tc>
                 <a:tc>
                   <a:txBody>
@@ -15428,7 +15690,9 @@
                       </a:endParaRPr>
                     </a:p>
                   </a:txBody>
-                  <a:tcPr marL="9525" marR="9525" marT="9525" marB="0" anchor="b"/>
+                  <a:tcPr marL="9525" marR="9525" marT="9525" marB="0" anchor="b">
+                    <a:noFill/>
+                  </a:tcPr>
                 </a:tc>
                 <a:tc>
                   <a:txBody>
@@ -15451,7 +15715,9 @@
                       </a:endParaRPr>
                     </a:p>
                   </a:txBody>
-                  <a:tcPr marL="9525" marR="9525" marT="9525" marB="0" anchor="b"/>
+                  <a:tcPr marL="9525" marR="9525" marT="9525" marB="0" anchor="b">
+                    <a:noFill/>
+                  </a:tcPr>
                 </a:tc>
                 <a:tc>
                   <a:txBody>
@@ -15474,7 +15740,9 @@
                       </a:endParaRPr>
                     </a:p>
                   </a:txBody>
-                  <a:tcPr marL="9525" marR="9525" marT="9525" marB="0" anchor="b"/>
+                  <a:tcPr marL="9525" marR="9525" marT="9525" marB="0" anchor="b">
+                    <a:noFill/>
+                  </a:tcPr>
                 </a:tc>
                 <a:tc>
                   <a:txBody>
@@ -15497,7 +15765,9 @@
                       </a:endParaRPr>
                     </a:p>
                   </a:txBody>
-                  <a:tcPr marL="9525" marR="9525" marT="9525" marB="0" anchor="b"/>
+                  <a:tcPr marL="9525" marR="9525" marT="9525" marB="0" anchor="b">
+                    <a:noFill/>
+                  </a:tcPr>
                 </a:tc>
               </a:tr>
               <a:tr h="266000">
@@ -15536,7 +15806,9 @@
                       </a:endParaRPr>
                     </a:p>
                   </a:txBody>
-                  <a:tcPr marL="9525" marR="9525" marT="9525" marB="0" anchor="b"/>
+                  <a:tcPr marL="9525" marR="9525" marT="9525" marB="0" anchor="b">
+                    <a:noFill/>
+                  </a:tcPr>
                 </a:tc>
                 <a:tc>
                   <a:txBody>
@@ -15559,7 +15831,9 @@
                       </a:endParaRPr>
                     </a:p>
                   </a:txBody>
-                  <a:tcPr marL="9525" marR="9525" marT="9525" marB="0" anchor="b"/>
+                  <a:tcPr marL="9525" marR="9525" marT="9525" marB="0" anchor="b">
+                    <a:noFill/>
+                  </a:tcPr>
                 </a:tc>
                 <a:tc>
                   <a:txBody>
@@ -15582,7 +15856,9 @@
                       </a:endParaRPr>
                     </a:p>
                   </a:txBody>
-                  <a:tcPr marL="9525" marR="9525" marT="9525" marB="0" anchor="b"/>
+                  <a:tcPr marL="9525" marR="9525" marT="9525" marB="0" anchor="b">
+                    <a:noFill/>
+                  </a:tcPr>
                 </a:tc>
                 <a:tc>
                   <a:txBody>
@@ -15605,7 +15881,9 @@
                       </a:endParaRPr>
                     </a:p>
                   </a:txBody>
-                  <a:tcPr marL="9525" marR="9525" marT="9525" marB="0" anchor="b"/>
+                  <a:tcPr marL="9525" marR="9525" marT="9525" marB="0" anchor="b">
+                    <a:noFill/>
+                  </a:tcPr>
                 </a:tc>
                 <a:tc>
                   <a:txBody>
@@ -15628,7 +15906,9 @@
                       </a:endParaRPr>
                     </a:p>
                   </a:txBody>
-                  <a:tcPr marL="9525" marR="9525" marT="9525" marB="0" anchor="b"/>
+                  <a:tcPr marL="9525" marR="9525" marT="9525" marB="0" anchor="b">
+                    <a:noFill/>
+                  </a:tcPr>
                 </a:tc>
               </a:tr>
               <a:tr h="266000">
@@ -15653,7 +15933,9 @@
                       </a:endParaRPr>
                     </a:p>
                   </a:txBody>
-                  <a:tcPr marL="9525" marR="9525" marT="9525" marB="0" anchor="b"/>
+                  <a:tcPr marL="9525" marR="9525" marT="9525" marB="0" anchor="b">
+                    <a:noFill/>
+                  </a:tcPr>
                 </a:tc>
                 <a:tc>
                   <a:txBody>
@@ -15676,7 +15958,9 @@
                       </a:endParaRPr>
                     </a:p>
                   </a:txBody>
-                  <a:tcPr marL="9525" marR="9525" marT="9525" marB="0" anchor="b"/>
+                  <a:tcPr marL="9525" marR="9525" marT="9525" marB="0" anchor="b">
+                    <a:noFill/>
+                  </a:tcPr>
                 </a:tc>
                 <a:tc>
                   <a:txBody>
@@ -15699,7 +15983,9 @@
                       </a:endParaRPr>
                     </a:p>
                   </a:txBody>
-                  <a:tcPr marL="9525" marR="9525" marT="9525" marB="0" anchor="b"/>
+                  <a:tcPr marL="9525" marR="9525" marT="9525" marB="0" anchor="b">
+                    <a:noFill/>
+                  </a:tcPr>
                 </a:tc>
                 <a:tc>
                   <a:txBody>
@@ -15708,12 +15994,12 @@
                     <a:p>
                       <a:pPr algn="r" fontAlgn="b"/>
                       <a:r>
-                        <a:rPr lang="en-US" sz="2000" u="none" strike="noStrike">
+                        <a:rPr lang="en-US" sz="2000" u="none" strike="noStrike" dirty="0">
                           <a:effectLst/>
                         </a:rPr>
                         <a:t>2</a:t>
                       </a:r>
-                      <a:endParaRPr lang="en-US" sz="2000" b="0" i="0" u="none" strike="noStrike">
+                      <a:endParaRPr lang="en-US" sz="2000" b="0" i="0" u="none" strike="noStrike" dirty="0">
                         <a:solidFill>
                           <a:srgbClr val="000000"/>
                         </a:solidFill>
@@ -15722,7 +16008,9 @@
                       </a:endParaRPr>
                     </a:p>
                   </a:txBody>
-                  <a:tcPr marL="9525" marR="9525" marT="9525" marB="0" anchor="b"/>
+                  <a:tcPr marL="9525" marR="9525" marT="9525" marB="0" anchor="b">
+                    <a:noFill/>
+                  </a:tcPr>
                 </a:tc>
                 <a:tc>
                   <a:txBody>
@@ -15745,7 +16033,9 @@
                       </a:endParaRPr>
                     </a:p>
                   </a:txBody>
-                  <a:tcPr marL="9525" marR="9525" marT="9525" marB="0" anchor="b"/>
+                  <a:tcPr marL="9525" marR="9525" marT="9525" marB="0" anchor="b">
+                    <a:noFill/>
+                  </a:tcPr>
                 </a:tc>
               </a:tr>
               <a:tr h="266000">
@@ -15770,7 +16060,9 @@
                       </a:endParaRPr>
                     </a:p>
                   </a:txBody>
-                  <a:tcPr marL="9525" marR="9525" marT="9525" marB="0" anchor="b"/>
+                  <a:tcPr marL="9525" marR="9525" marT="9525" marB="0" anchor="b">
+                    <a:noFill/>
+                  </a:tcPr>
                 </a:tc>
                 <a:tc>
                   <a:txBody>
@@ -15793,7 +16085,9 @@
                       </a:endParaRPr>
                     </a:p>
                   </a:txBody>
-                  <a:tcPr marL="9525" marR="9525" marT="9525" marB="0" anchor="b"/>
+                  <a:tcPr marL="9525" marR="9525" marT="9525" marB="0" anchor="b">
+                    <a:noFill/>
+                  </a:tcPr>
                 </a:tc>
                 <a:tc>
                   <a:txBody>
@@ -15816,7 +16110,9 @@
                       </a:endParaRPr>
                     </a:p>
                   </a:txBody>
-                  <a:tcPr marL="9525" marR="9525" marT="9525" marB="0" anchor="b"/>
+                  <a:tcPr marL="9525" marR="9525" marT="9525" marB="0" anchor="b">
+                    <a:noFill/>
+                  </a:tcPr>
                 </a:tc>
                 <a:tc>
                   <a:txBody>
@@ -15839,7 +16135,9 @@
                       </a:endParaRPr>
                     </a:p>
                   </a:txBody>
-                  <a:tcPr marL="9525" marR="9525" marT="9525" marB="0" anchor="b"/>
+                  <a:tcPr marL="9525" marR="9525" marT="9525" marB="0" anchor="b">
+                    <a:noFill/>
+                  </a:tcPr>
                 </a:tc>
                 <a:tc>
                   <a:txBody>
@@ -15862,7 +16160,9 @@
                       </a:endParaRPr>
                     </a:p>
                   </a:txBody>
-                  <a:tcPr marL="9525" marR="9525" marT="9525" marB="0" anchor="b"/>
+                  <a:tcPr marL="9525" marR="9525" marT="9525" marB="0" anchor="b">
+                    <a:noFill/>
+                  </a:tcPr>
                 </a:tc>
               </a:tr>
               <a:tr h="266000">
@@ -15887,7 +16187,9 @@
                       </a:endParaRPr>
                     </a:p>
                   </a:txBody>
-                  <a:tcPr marL="9525" marR="9525" marT="9525" marB="0" anchor="b"/>
+                  <a:tcPr marL="9525" marR="9525" marT="9525" marB="0" anchor="b">
+                    <a:noFill/>
+                  </a:tcPr>
                 </a:tc>
                 <a:tc>
                   <a:txBody>
@@ -15910,7 +16212,9 @@
                       </a:endParaRPr>
                     </a:p>
                   </a:txBody>
-                  <a:tcPr marL="9525" marR="9525" marT="9525" marB="0" anchor="b"/>
+                  <a:tcPr marL="9525" marR="9525" marT="9525" marB="0" anchor="b">
+                    <a:noFill/>
+                  </a:tcPr>
                 </a:tc>
                 <a:tc>
                   <a:txBody>
@@ -15933,7 +16237,9 @@
                       </a:endParaRPr>
                     </a:p>
                   </a:txBody>
-                  <a:tcPr marL="9525" marR="9525" marT="9525" marB="0" anchor="b"/>
+                  <a:tcPr marL="9525" marR="9525" marT="9525" marB="0" anchor="b">
+                    <a:noFill/>
+                  </a:tcPr>
                 </a:tc>
                 <a:tc>
                   <a:txBody>
@@ -15942,12 +16248,12 @@
                     <a:p>
                       <a:pPr algn="r" fontAlgn="b"/>
                       <a:r>
-                        <a:rPr lang="en-US" sz="2000" u="none" strike="noStrike">
+                        <a:rPr lang="en-US" sz="2000" u="none" strike="noStrike" dirty="0">
                           <a:effectLst/>
                         </a:rPr>
                         <a:t>2</a:t>
                       </a:r>
-                      <a:endParaRPr lang="en-US" sz="2000" b="0" i="0" u="none" strike="noStrike">
+                      <a:endParaRPr lang="en-US" sz="2000" b="0" i="0" u="none" strike="noStrike" dirty="0">
                         <a:solidFill>
                           <a:srgbClr val="000000"/>
                         </a:solidFill>
@@ -15956,7 +16262,9 @@
                       </a:endParaRPr>
                     </a:p>
                   </a:txBody>
-                  <a:tcPr marL="9525" marR="9525" marT="9525" marB="0" anchor="b"/>
+                  <a:tcPr marL="9525" marR="9525" marT="9525" marB="0" anchor="b">
+                    <a:noFill/>
+                  </a:tcPr>
                 </a:tc>
                 <a:tc>
                   <a:txBody>
@@ -15979,7 +16287,9 @@
                       </a:endParaRPr>
                     </a:p>
                   </a:txBody>
-                  <a:tcPr marL="9525" marR="9525" marT="9525" marB="0" anchor="b"/>
+                  <a:tcPr marL="9525" marR="9525" marT="9525" marB="0" anchor="b">
+                    <a:noFill/>
+                  </a:tcPr>
                 </a:tc>
               </a:tr>
               <a:tr h="266000">
@@ -16010,7 +16320,9 @@
                       </a:endParaRPr>
                     </a:p>
                   </a:txBody>
-                  <a:tcPr marL="9525" marR="9525" marT="9525" marB="0" anchor="b"/>
+                  <a:tcPr marL="9525" marR="9525" marT="9525" marB="0" anchor="b">
+                    <a:noFill/>
+                  </a:tcPr>
                 </a:tc>
                 <a:tc>
                   <a:txBody>
@@ -16033,7 +16345,9 @@
                       </a:endParaRPr>
                     </a:p>
                   </a:txBody>
-                  <a:tcPr marL="9525" marR="9525" marT="9525" marB="0" anchor="b"/>
+                  <a:tcPr marL="9525" marR="9525" marT="9525" marB="0" anchor="b">
+                    <a:noFill/>
+                  </a:tcPr>
                 </a:tc>
                 <a:tc>
                   <a:txBody>
@@ -16056,7 +16370,9 @@
                       </a:endParaRPr>
                     </a:p>
                   </a:txBody>
-                  <a:tcPr marL="9525" marR="9525" marT="9525" marB="0" anchor="b"/>
+                  <a:tcPr marL="9525" marR="9525" marT="9525" marB="0" anchor="b">
+                    <a:noFill/>
+                  </a:tcPr>
                 </a:tc>
                 <a:tc>
                   <a:txBody>
@@ -16065,12 +16381,12 @@
                     <a:p>
                       <a:pPr algn="r" fontAlgn="b"/>
                       <a:r>
-                        <a:rPr lang="en-US" sz="2000" u="none" strike="noStrike">
+                        <a:rPr lang="en-US" sz="2000" u="none" strike="noStrike" dirty="0">
                           <a:effectLst/>
                         </a:rPr>
                         <a:t>2</a:t>
                       </a:r>
-                      <a:endParaRPr lang="en-US" sz="2000" b="0" i="0" u="none" strike="noStrike">
+                      <a:endParaRPr lang="en-US" sz="2000" b="0" i="0" u="none" strike="noStrike" dirty="0">
                         <a:solidFill>
                           <a:srgbClr val="000000"/>
                         </a:solidFill>
@@ -16079,7 +16395,9 @@
                       </a:endParaRPr>
                     </a:p>
                   </a:txBody>
-                  <a:tcPr marL="9525" marR="9525" marT="9525" marB="0" anchor="b"/>
+                  <a:tcPr marL="9525" marR="9525" marT="9525" marB="0" anchor="b">
+                    <a:noFill/>
+                  </a:tcPr>
                 </a:tc>
                 <a:tc>
                   <a:txBody>
@@ -16102,7 +16420,9 @@
                       </a:endParaRPr>
                     </a:p>
                   </a:txBody>
-                  <a:tcPr marL="9525" marR="9525" marT="9525" marB="0" anchor="b"/>
+                  <a:tcPr marL="9525" marR="9525" marT="9525" marB="0" anchor="b">
+                    <a:noFill/>
+                  </a:tcPr>
                 </a:tc>
               </a:tr>
               <a:tr h="266000">
@@ -16145,7 +16465,9 @@
                       </a:endParaRPr>
                     </a:p>
                   </a:txBody>
-                  <a:tcPr marL="9525" marR="9525" marT="9525" marB="0" anchor="b"/>
+                  <a:tcPr marL="9525" marR="9525" marT="9525" marB="0" anchor="b">
+                    <a:noFill/>
+                  </a:tcPr>
                 </a:tc>
                 <a:tc>
                   <a:txBody>
@@ -16168,7 +16490,9 @@
                       </a:endParaRPr>
                     </a:p>
                   </a:txBody>
-                  <a:tcPr marL="9525" marR="9525" marT="9525" marB="0" anchor="b"/>
+                  <a:tcPr marL="9525" marR="9525" marT="9525" marB="0" anchor="b">
+                    <a:noFill/>
+                  </a:tcPr>
                 </a:tc>
                 <a:tc>
                   <a:txBody>
@@ -16191,7 +16515,9 @@
                       </a:endParaRPr>
                     </a:p>
                   </a:txBody>
-                  <a:tcPr marL="9525" marR="9525" marT="9525" marB="0" anchor="b"/>
+                  <a:tcPr marL="9525" marR="9525" marT="9525" marB="0" anchor="b">
+                    <a:noFill/>
+                  </a:tcPr>
                 </a:tc>
                 <a:tc>
                   <a:txBody>
@@ -16214,7 +16540,9 @@
                       </a:endParaRPr>
                     </a:p>
                   </a:txBody>
-                  <a:tcPr marL="9525" marR="9525" marT="9525" marB="0" anchor="b"/>
+                  <a:tcPr marL="9525" marR="9525" marT="9525" marB="0" anchor="b">
+                    <a:noFill/>
+                  </a:tcPr>
                 </a:tc>
                 <a:tc>
                   <a:txBody>
@@ -16237,7 +16565,9 @@
                       </a:endParaRPr>
                     </a:p>
                   </a:txBody>
-                  <a:tcPr marL="9525" marR="9525" marT="9525" marB="0" anchor="b"/>
+                  <a:tcPr marL="9525" marR="9525" marT="9525" marB="0" anchor="b">
+                    <a:noFill/>
+                  </a:tcPr>
                 </a:tc>
               </a:tr>
               <a:tr h="266000">
@@ -16262,7 +16592,9 @@
                       </a:endParaRPr>
                     </a:p>
                   </a:txBody>
-                  <a:tcPr marL="9525" marR="9525" marT="9525" marB="0" anchor="b"/>
+                  <a:tcPr marL="9525" marR="9525" marT="9525" marB="0" anchor="b">
+                    <a:noFill/>
+                  </a:tcPr>
                 </a:tc>
                 <a:tc>
                   <a:txBody>
@@ -16285,7 +16617,9 @@
                       </a:endParaRPr>
                     </a:p>
                   </a:txBody>
-                  <a:tcPr marL="9525" marR="9525" marT="9525" marB="0" anchor="b"/>
+                  <a:tcPr marL="9525" marR="9525" marT="9525" marB="0" anchor="b">
+                    <a:noFill/>
+                  </a:tcPr>
                 </a:tc>
                 <a:tc>
                   <a:txBody>
@@ -16308,7 +16642,9 @@
                       </a:endParaRPr>
                     </a:p>
                   </a:txBody>
-                  <a:tcPr marL="9525" marR="9525" marT="9525" marB="0" anchor="b"/>
+                  <a:tcPr marL="9525" marR="9525" marT="9525" marB="0" anchor="b">
+                    <a:noFill/>
+                  </a:tcPr>
                 </a:tc>
                 <a:tc>
                   <a:txBody>
@@ -16331,7 +16667,9 @@
                       </a:endParaRPr>
                     </a:p>
                   </a:txBody>
-                  <a:tcPr marL="9525" marR="9525" marT="9525" marB="0" anchor="b"/>
+                  <a:tcPr marL="9525" marR="9525" marT="9525" marB="0" anchor="b">
+                    <a:noFill/>
+                  </a:tcPr>
                 </a:tc>
                 <a:tc>
                   <a:txBody>
@@ -16354,7 +16692,9 @@
                       </a:endParaRPr>
                     </a:p>
                   </a:txBody>
-                  <a:tcPr marL="9525" marR="9525" marT="9525" marB="0" anchor="b"/>
+                  <a:tcPr marL="9525" marR="9525" marT="9525" marB="0" anchor="b">
+                    <a:noFill/>
+                  </a:tcPr>
                 </a:tc>
               </a:tr>
               <a:tr h="266000">
@@ -16373,7 +16713,9 @@
                       </a:endParaRPr>
                     </a:p>
                   </a:txBody>
-                  <a:tcPr marL="9525" marR="9525" marT="9525" marB="0" anchor="b"/>
+                  <a:tcPr marL="9525" marR="9525" marT="9525" marB="0" anchor="b">
+                    <a:noFill/>
+                  </a:tcPr>
                 </a:tc>
                 <a:tc>
                   <a:txBody>
@@ -16390,7 +16732,9 @@
                       </a:endParaRPr>
                     </a:p>
                   </a:txBody>
-                  <a:tcPr marL="9525" marR="9525" marT="9525" marB="0" anchor="b"/>
+                  <a:tcPr marL="9525" marR="9525" marT="9525" marB="0" anchor="b">
+                    <a:noFill/>
+                  </a:tcPr>
                 </a:tc>
                 <a:tc>
                   <a:txBody>
@@ -16413,7 +16757,9 @@
                       </a:endParaRPr>
                     </a:p>
                   </a:txBody>
-                  <a:tcPr marL="9525" marR="9525" marT="9525" marB="0" anchor="b"/>
+                  <a:tcPr marL="9525" marR="9525" marT="9525" marB="0" anchor="b">
+                    <a:noFill/>
+                  </a:tcPr>
                 </a:tc>
                 <a:tc>
                   <a:txBody>
@@ -16430,7 +16776,9 @@
                       </a:endParaRPr>
                     </a:p>
                   </a:txBody>
-                  <a:tcPr marL="9525" marR="9525" marT="9525" marB="0" anchor="b"/>
+                  <a:tcPr marL="9525" marR="9525" marT="9525" marB="0" anchor="b">
+                    <a:noFill/>
+                  </a:tcPr>
                 </a:tc>
                 <a:tc>
                   <a:txBody>
@@ -16438,7 +16786,7 @@
                     <a:lstStyle/>
                     <a:p>
                       <a:pPr algn="l" fontAlgn="b"/>
-                      <a:endParaRPr lang="en-US" sz="2000" b="0" i="0" u="none" strike="noStrike">
+                      <a:endParaRPr lang="en-US" sz="2000" b="0" i="0" u="none" strike="noStrike" dirty="0">
                         <a:solidFill>
                           <a:srgbClr val="000000"/>
                         </a:solidFill>
@@ -16447,7 +16795,9 @@
                       </a:endParaRPr>
                     </a:p>
                   </a:txBody>
-                  <a:tcPr marL="9525" marR="9525" marT="9525" marB="0" anchor="b"/>
+                  <a:tcPr marL="9525" marR="9525" marT="9525" marB="0" anchor="b">
+                    <a:noFill/>
+                  </a:tcPr>
                 </a:tc>
               </a:tr>
               <a:tr h="266000">
@@ -16472,7 +16822,9 @@
                       </a:endParaRPr>
                     </a:p>
                   </a:txBody>
-                  <a:tcPr marL="9525" marR="9525" marT="9525" marB="0" anchor="b"/>
+                  <a:tcPr marL="9525" marR="9525" marT="9525" marB="0" anchor="b">
+                    <a:noFill/>
+                  </a:tcPr>
                 </a:tc>
                 <a:tc>
                   <a:txBody>
@@ -16489,7 +16841,9 @@
                       </a:endParaRPr>
                     </a:p>
                   </a:txBody>
-                  <a:tcPr marL="9525" marR="9525" marT="9525" marB="0" anchor="b"/>
+                  <a:tcPr marL="9525" marR="9525" marT="9525" marB="0" anchor="b">
+                    <a:noFill/>
+                  </a:tcPr>
                 </a:tc>
                 <a:tc>
                   <a:txBody>
@@ -16506,7 +16860,9 @@
                       </a:endParaRPr>
                     </a:p>
                   </a:txBody>
-                  <a:tcPr marL="9525" marR="9525" marT="9525" marB="0" anchor="b"/>
+                  <a:tcPr marL="9525" marR="9525" marT="9525" marB="0" anchor="b">
+                    <a:noFill/>
+                  </a:tcPr>
                 </a:tc>
                 <a:tc>
                   <a:txBody>
@@ -16523,7 +16879,9 @@
                       </a:endParaRPr>
                     </a:p>
                   </a:txBody>
-                  <a:tcPr marL="9525" marR="9525" marT="9525" marB="0" anchor="b"/>
+                  <a:tcPr marL="9525" marR="9525" marT="9525" marB="0" anchor="b">
+                    <a:noFill/>
+                  </a:tcPr>
                 </a:tc>
                 <a:tc>
                   <a:txBody>
@@ -16546,7 +16904,9 @@
                       </a:endParaRPr>
                     </a:p>
                   </a:txBody>
-                  <a:tcPr marL="9525" marR="9525" marT="9525" marB="0" anchor="b"/>
+                  <a:tcPr marL="9525" marR="9525" marT="9525" marB="0" anchor="b">
+                    <a:noFill/>
+                  </a:tcPr>
                 </a:tc>
               </a:tr>
             </a:tbl>
@@ -16635,11 +16995,7 @@
             <a:pPr lvl="1"/>
             <a:r>
               <a:rPr lang="en-US" sz="2400" dirty="0" smtClean="0"/>
-              <a:t>Licensing </a:t>
-            </a:r>
-            <a:r>
-              <a:rPr lang="en-US" sz="2400" dirty="0" smtClean="0"/>
-              <a:t>may be required</a:t>
+              <a:t>Licensing may be required</a:t>
             </a:r>
           </a:p>
           <a:p>
@@ -16704,7 +17060,7 @@
           <a:p>
             <a:r>
               <a:rPr lang="en-US" dirty="0" smtClean="0"/>
-              <a:t>COMPLICATIONS</a:t>
+              <a:t>Complications</a:t>
             </a:r>
             <a:endParaRPr lang="en-US" dirty="0"/>
           </a:p>
@@ -16778,7 +17134,11 @@
           <a:p>
             <a:r>
               <a:rPr lang="en-US" sz="3200" dirty="0" smtClean="0"/>
-              <a:t>Selling software after device purchase</a:t>
+              <a:t>Software sales after </a:t>
+            </a:r>
+            <a:r>
+              <a:rPr lang="en-US" sz="3200" dirty="0" smtClean="0"/>
+              <a:t>device purchase</a:t>
             </a:r>
           </a:p>
           <a:p>
@@ -17312,74 +17672,1086 @@
       </p:grpSpPr>
       <p:pic>
         <p:nvPicPr>
-          <p:cNvPr id="4" name="Content Placeholder 3"/>
+          <p:cNvPr id="1028" name="Picture 4"/>
           <p:cNvPicPr>
-            <a:picLocks noGrp="1" noChangeAspect="1"/>
+            <a:picLocks noChangeAspect="1" noChangeArrowheads="1"/>
           </p:cNvPicPr>
-          <p:nvPr>
-            <p:ph idx="1"/>
-          </p:nvPr>
+          <p:nvPr/>
         </p:nvPicPr>
-        <p:blipFill>
-          <a:blip r:embed="rId2" cstate="print">
+        <p:blipFill rotWithShape="1">
+          <a:blip r:embed="rId2">
             <a:extLst>
               <a:ext uri="{28A0092B-C50C-407E-A947-70E740481C1C}">
                 <a14:useLocalDpi xmlns:a14="http://schemas.microsoft.com/office/drawing/2010/main" val="0"/>
               </a:ext>
             </a:extLst>
           </a:blip>
-          <a:stretch>
-            <a:fillRect/>
-          </a:stretch>
+          <a:srcRect l="1316" t="5598" r="1170" b="9803"/>
+          <a:stretch/>
         </p:blipFill>
+        <p:spPr bwMode="auto">
+          <a:xfrm>
+            <a:off x="167802" y="842513"/>
+            <a:ext cx="8827806" cy="4802038"/>
+          </a:xfrm>
+          <a:prstGeom prst="rect">
+            <a:avLst/>
+          </a:prstGeom>
+          <a:noFill/>
+          <a:ln>
+            <a:noFill/>
+          </a:ln>
+          <a:extLst>
+            <a:ext uri="{909E8E84-426E-40DD-AFC4-6F175D3DCCD1}">
+              <a14:hiddenFill xmlns:a14="http://schemas.microsoft.com/office/drawing/2010/main">
+                <a:solidFill>
+                  <a:schemeClr val="accent1"/>
+                </a:solidFill>
+              </a14:hiddenFill>
+            </a:ext>
+            <a:ext uri="{91240B29-F687-4F45-9708-019B960494DF}">
+              <a14:hiddenLine xmlns:a14="http://schemas.microsoft.com/office/drawing/2010/main" w="9525">
+                <a:solidFill>
+                  <a:schemeClr val="tx1"/>
+                </a:solidFill>
+                <a:miter lim="800000"/>
+                <a:headEnd/>
+                <a:tailEnd/>
+              </a14:hiddenLine>
+            </a:ext>
+          </a:extLst>
+        </p:spPr>
+      </p:pic>
+      <p:sp>
+        <p:nvSpPr>
+          <p:cNvPr id="4" name="Rectangle 3">
+            <a:hlinkClick r:id="rId3" action="ppaction://hlinksldjump"/>
+          </p:cNvPr>
+          <p:cNvSpPr/>
+          <p:nvPr/>
+        </p:nvSpPr>
         <p:spPr>
           <a:xfrm>
-            <a:off x="1637930" y="1371600"/>
-            <a:ext cx="5867400" cy="5319954"/>
+            <a:off x="152400" y="838200"/>
+            <a:ext cx="1447800" cy="1143000"/>
           </a:xfrm>
+          <a:prstGeom prst="rect">
+            <a:avLst/>
+          </a:prstGeom>
+          <a:noFill/>
+          <a:ln>
+            <a:noFill/>
+          </a:ln>
         </p:spPr>
-      </p:pic>
-      <p:sp>
-        <p:nvSpPr>
-          <p:cNvPr id="3" name="Title 2"/>
-          <p:cNvSpPr>
-            <a:spLocks noGrp="1"/>
-          </p:cNvSpPr>
-          <p:nvPr>
-            <p:ph type="title"/>
-          </p:nvPr>
-        </p:nvSpPr>
-        <p:spPr/>
-        <p:txBody>
-          <a:bodyPr/>
+        <p:style>
+          <a:lnRef idx="2">
+            <a:schemeClr val="accent1">
+              <a:shade val="50000"/>
+            </a:schemeClr>
+          </a:lnRef>
+          <a:fillRef idx="1">
+            <a:schemeClr val="accent1"/>
+          </a:fillRef>
+          <a:effectRef idx="0">
+            <a:schemeClr val="accent1"/>
+          </a:effectRef>
+          <a:fontRef idx="minor">
+            <a:schemeClr val="lt1"/>
+          </a:fontRef>
+        </p:style>
+        <p:txBody>
+          <a:bodyPr rtlCol="0" anchor="ctr"/>
           <a:lstStyle/>
           <a:p>
-            <a:r>
-              <a:rPr lang="en-US" dirty="0" smtClean="0"/>
-              <a:t>PCB</a:t>
-            </a:r>
-            <a:endParaRPr lang="en-US" dirty="0"/>
+            <a:pPr algn="ctr"/>
+            <a:endParaRPr lang="en-US"/>
+          </a:p>
+        </p:txBody>
+      </p:sp>
+      <p:sp>
+        <p:nvSpPr>
+          <p:cNvPr id="6" name="Rectangle 5">
+            <a:hlinkClick r:id="rId4" action="ppaction://hlinksldjump"/>
+          </p:cNvPr>
+          <p:cNvSpPr/>
+          <p:nvPr/>
+        </p:nvSpPr>
+        <p:spPr>
+          <a:xfrm>
+            <a:off x="1600200" y="838200"/>
+            <a:ext cx="1447800" cy="1143000"/>
+          </a:xfrm>
+          <a:prstGeom prst="rect">
+            <a:avLst/>
+          </a:prstGeom>
+          <a:noFill/>
+          <a:ln>
+            <a:noFill/>
+          </a:ln>
+        </p:spPr>
+        <p:style>
+          <a:lnRef idx="2">
+            <a:schemeClr val="accent1">
+              <a:shade val="50000"/>
+            </a:schemeClr>
+          </a:lnRef>
+          <a:fillRef idx="1">
+            <a:schemeClr val="accent1"/>
+          </a:fillRef>
+          <a:effectRef idx="0">
+            <a:schemeClr val="accent1"/>
+          </a:effectRef>
+          <a:fontRef idx="minor">
+            <a:schemeClr val="lt1"/>
+          </a:fontRef>
+        </p:style>
+        <p:txBody>
+          <a:bodyPr rtlCol="0" anchor="ctr"/>
+          <a:lstStyle/>
+          <a:p>
+            <a:pPr algn="ctr"/>
+            <a:endParaRPr lang="en-US"/>
+          </a:p>
+        </p:txBody>
+      </p:sp>
+      <p:sp>
+        <p:nvSpPr>
+          <p:cNvPr id="7" name="Rectangle 6">
+            <a:hlinkClick r:id="rId5" action="ppaction://hlinksldjump"/>
+          </p:cNvPr>
+          <p:cNvSpPr/>
+          <p:nvPr/>
+        </p:nvSpPr>
+        <p:spPr>
+          <a:xfrm>
+            <a:off x="3126204" y="838200"/>
+            <a:ext cx="1447800" cy="1143000"/>
+          </a:xfrm>
+          <a:prstGeom prst="rect">
+            <a:avLst/>
+          </a:prstGeom>
+          <a:noFill/>
+          <a:ln>
+            <a:noFill/>
+          </a:ln>
+        </p:spPr>
+        <p:style>
+          <a:lnRef idx="2">
+            <a:schemeClr val="accent1">
+              <a:shade val="50000"/>
+            </a:schemeClr>
+          </a:lnRef>
+          <a:fillRef idx="1">
+            <a:schemeClr val="accent1"/>
+          </a:fillRef>
+          <a:effectRef idx="0">
+            <a:schemeClr val="accent1"/>
+          </a:effectRef>
+          <a:fontRef idx="minor">
+            <a:schemeClr val="lt1"/>
+          </a:fontRef>
+        </p:style>
+        <p:txBody>
+          <a:bodyPr rtlCol="0" anchor="ctr"/>
+          <a:lstStyle/>
+          <a:p>
+            <a:pPr algn="ctr"/>
+            <a:endParaRPr lang="en-US"/>
+          </a:p>
+        </p:txBody>
+      </p:sp>
+      <p:sp>
+        <p:nvSpPr>
+          <p:cNvPr id="8" name="Rectangle 7">
+            <a:hlinkClick r:id="rId6" action="ppaction://hlinksldjump"/>
+          </p:cNvPr>
+          <p:cNvSpPr/>
+          <p:nvPr/>
+        </p:nvSpPr>
+        <p:spPr>
+          <a:xfrm>
+            <a:off x="4574004" y="838200"/>
+            <a:ext cx="1447800" cy="1143000"/>
+          </a:xfrm>
+          <a:prstGeom prst="rect">
+            <a:avLst/>
+          </a:prstGeom>
+          <a:noFill/>
+          <a:ln>
+            <a:noFill/>
+          </a:ln>
+        </p:spPr>
+        <p:style>
+          <a:lnRef idx="2">
+            <a:schemeClr val="accent1">
+              <a:shade val="50000"/>
+            </a:schemeClr>
+          </a:lnRef>
+          <a:fillRef idx="1">
+            <a:schemeClr val="accent1"/>
+          </a:fillRef>
+          <a:effectRef idx="0">
+            <a:schemeClr val="accent1"/>
+          </a:effectRef>
+          <a:fontRef idx="minor">
+            <a:schemeClr val="lt1"/>
+          </a:fontRef>
+        </p:style>
+        <p:txBody>
+          <a:bodyPr rtlCol="0" anchor="ctr"/>
+          <a:lstStyle/>
+          <a:p>
+            <a:pPr algn="ctr"/>
+            <a:endParaRPr lang="en-US"/>
+          </a:p>
+        </p:txBody>
+      </p:sp>
+      <p:sp>
+        <p:nvSpPr>
+          <p:cNvPr id="9" name="Rectangle 8">
+            <a:hlinkClick r:id="rId7" action="ppaction://hlinksldjump"/>
+          </p:cNvPr>
+          <p:cNvSpPr/>
+          <p:nvPr/>
+        </p:nvSpPr>
+        <p:spPr>
+          <a:xfrm>
+            <a:off x="6096000" y="847545"/>
+            <a:ext cx="1447800" cy="1143000"/>
+          </a:xfrm>
+          <a:prstGeom prst="rect">
+            <a:avLst/>
+          </a:prstGeom>
+          <a:noFill/>
+          <a:ln>
+            <a:noFill/>
+          </a:ln>
+        </p:spPr>
+        <p:style>
+          <a:lnRef idx="2">
+            <a:schemeClr val="accent1">
+              <a:shade val="50000"/>
+            </a:schemeClr>
+          </a:lnRef>
+          <a:fillRef idx="1">
+            <a:schemeClr val="accent1"/>
+          </a:fillRef>
+          <a:effectRef idx="0">
+            <a:schemeClr val="accent1"/>
+          </a:effectRef>
+          <a:fontRef idx="minor">
+            <a:schemeClr val="lt1"/>
+          </a:fontRef>
+        </p:style>
+        <p:txBody>
+          <a:bodyPr rtlCol="0" anchor="ctr"/>
+          <a:lstStyle/>
+          <a:p>
+            <a:pPr algn="ctr"/>
+            <a:endParaRPr lang="en-US"/>
+          </a:p>
+        </p:txBody>
+      </p:sp>
+      <p:sp>
+        <p:nvSpPr>
+          <p:cNvPr id="10" name="Rectangle 9">
+            <a:hlinkClick r:id="rId8" action="ppaction://hlinksldjump"/>
+          </p:cNvPr>
+          <p:cNvSpPr/>
+          <p:nvPr/>
+        </p:nvSpPr>
+        <p:spPr>
+          <a:xfrm>
+            <a:off x="7547808" y="842513"/>
+            <a:ext cx="1447800" cy="1143000"/>
+          </a:xfrm>
+          <a:prstGeom prst="rect">
+            <a:avLst/>
+          </a:prstGeom>
+          <a:noFill/>
+          <a:ln>
+            <a:noFill/>
+          </a:ln>
+        </p:spPr>
+        <p:style>
+          <a:lnRef idx="2">
+            <a:schemeClr val="accent1">
+              <a:shade val="50000"/>
+            </a:schemeClr>
+          </a:lnRef>
+          <a:fillRef idx="1">
+            <a:schemeClr val="accent1"/>
+          </a:fillRef>
+          <a:effectRef idx="0">
+            <a:schemeClr val="accent1"/>
+          </a:effectRef>
+          <a:fontRef idx="minor">
+            <a:schemeClr val="lt1"/>
+          </a:fontRef>
+        </p:style>
+        <p:txBody>
+          <a:bodyPr rtlCol="0" anchor="ctr"/>
+          <a:lstStyle/>
+          <a:p>
+            <a:pPr algn="ctr"/>
+            <a:endParaRPr lang="en-US"/>
+          </a:p>
+        </p:txBody>
+      </p:sp>
+      <p:sp>
+        <p:nvSpPr>
+          <p:cNvPr id="11" name="Rectangle 10">
+            <a:hlinkClick r:id="rId9" action="ppaction://hlinksldjump"/>
+          </p:cNvPr>
+          <p:cNvSpPr/>
+          <p:nvPr/>
+        </p:nvSpPr>
+        <p:spPr>
+          <a:xfrm>
+            <a:off x="152400" y="1985513"/>
+            <a:ext cx="1447800" cy="1143000"/>
+          </a:xfrm>
+          <a:prstGeom prst="rect">
+            <a:avLst/>
+          </a:prstGeom>
+          <a:noFill/>
+          <a:ln>
+            <a:noFill/>
+          </a:ln>
+        </p:spPr>
+        <p:style>
+          <a:lnRef idx="2">
+            <a:schemeClr val="accent1">
+              <a:shade val="50000"/>
+            </a:schemeClr>
+          </a:lnRef>
+          <a:fillRef idx="1">
+            <a:schemeClr val="accent1"/>
+          </a:fillRef>
+          <a:effectRef idx="0">
+            <a:schemeClr val="accent1"/>
+          </a:effectRef>
+          <a:fontRef idx="minor">
+            <a:schemeClr val="lt1"/>
+          </a:fontRef>
+        </p:style>
+        <p:txBody>
+          <a:bodyPr rtlCol="0" anchor="ctr"/>
+          <a:lstStyle/>
+          <a:p>
+            <a:pPr algn="ctr"/>
+            <a:endParaRPr lang="en-US"/>
+          </a:p>
+        </p:txBody>
+      </p:sp>
+      <p:sp>
+        <p:nvSpPr>
+          <p:cNvPr id="12" name="Rectangle 11">
+            <a:hlinkClick r:id="rId10" action="ppaction://hlinksldjump"/>
+          </p:cNvPr>
+          <p:cNvSpPr/>
+          <p:nvPr/>
+        </p:nvSpPr>
+        <p:spPr>
+          <a:xfrm>
+            <a:off x="1600200" y="1985513"/>
+            <a:ext cx="1447800" cy="1143000"/>
+          </a:xfrm>
+          <a:prstGeom prst="rect">
+            <a:avLst/>
+          </a:prstGeom>
+          <a:noFill/>
+          <a:ln>
+            <a:noFill/>
+          </a:ln>
+        </p:spPr>
+        <p:style>
+          <a:lnRef idx="2">
+            <a:schemeClr val="accent1">
+              <a:shade val="50000"/>
+            </a:schemeClr>
+          </a:lnRef>
+          <a:fillRef idx="1">
+            <a:schemeClr val="accent1"/>
+          </a:fillRef>
+          <a:effectRef idx="0">
+            <a:schemeClr val="accent1"/>
+          </a:effectRef>
+          <a:fontRef idx="minor">
+            <a:schemeClr val="lt1"/>
+          </a:fontRef>
+        </p:style>
+        <p:txBody>
+          <a:bodyPr rtlCol="0" anchor="ctr"/>
+          <a:lstStyle/>
+          <a:p>
+            <a:pPr algn="ctr"/>
+            <a:endParaRPr lang="en-US"/>
+          </a:p>
+        </p:txBody>
+      </p:sp>
+      <p:sp>
+        <p:nvSpPr>
+          <p:cNvPr id="13" name="Rectangle 12">
+            <a:hlinkClick r:id="rId11" action="ppaction://hlinksldjump"/>
+          </p:cNvPr>
+          <p:cNvSpPr/>
+          <p:nvPr/>
+        </p:nvSpPr>
+        <p:spPr>
+          <a:xfrm>
+            <a:off x="3126204" y="1985513"/>
+            <a:ext cx="1447800" cy="1143000"/>
+          </a:xfrm>
+          <a:prstGeom prst="rect">
+            <a:avLst/>
+          </a:prstGeom>
+          <a:noFill/>
+          <a:ln>
+            <a:noFill/>
+          </a:ln>
+        </p:spPr>
+        <p:style>
+          <a:lnRef idx="2">
+            <a:schemeClr val="accent1">
+              <a:shade val="50000"/>
+            </a:schemeClr>
+          </a:lnRef>
+          <a:fillRef idx="1">
+            <a:schemeClr val="accent1"/>
+          </a:fillRef>
+          <a:effectRef idx="0">
+            <a:schemeClr val="accent1"/>
+          </a:effectRef>
+          <a:fontRef idx="minor">
+            <a:schemeClr val="lt1"/>
+          </a:fontRef>
+        </p:style>
+        <p:txBody>
+          <a:bodyPr rtlCol="0" anchor="ctr"/>
+          <a:lstStyle/>
+          <a:p>
+            <a:pPr algn="ctr"/>
+            <a:endParaRPr lang="en-US"/>
+          </a:p>
+        </p:txBody>
+      </p:sp>
+      <p:sp>
+        <p:nvSpPr>
+          <p:cNvPr id="14" name="Rectangle 13">
+            <a:hlinkClick r:id="rId12" action="ppaction://hlinksldjump"/>
+          </p:cNvPr>
+          <p:cNvSpPr/>
+          <p:nvPr/>
+        </p:nvSpPr>
+        <p:spPr>
+          <a:xfrm>
+            <a:off x="4574004" y="1985513"/>
+            <a:ext cx="1447800" cy="1143000"/>
+          </a:xfrm>
+          <a:prstGeom prst="rect">
+            <a:avLst/>
+          </a:prstGeom>
+          <a:noFill/>
+          <a:ln>
+            <a:noFill/>
+          </a:ln>
+        </p:spPr>
+        <p:style>
+          <a:lnRef idx="2">
+            <a:schemeClr val="accent1">
+              <a:shade val="50000"/>
+            </a:schemeClr>
+          </a:lnRef>
+          <a:fillRef idx="1">
+            <a:schemeClr val="accent1"/>
+          </a:fillRef>
+          <a:effectRef idx="0">
+            <a:schemeClr val="accent1"/>
+          </a:effectRef>
+          <a:fontRef idx="minor">
+            <a:schemeClr val="lt1"/>
+          </a:fontRef>
+        </p:style>
+        <p:txBody>
+          <a:bodyPr rtlCol="0" anchor="ctr"/>
+          <a:lstStyle/>
+          <a:p>
+            <a:pPr algn="ctr"/>
+            <a:endParaRPr lang="en-US"/>
+          </a:p>
+        </p:txBody>
+      </p:sp>
+      <p:sp>
+        <p:nvSpPr>
+          <p:cNvPr id="15" name="Rectangle 14">
+            <a:hlinkClick r:id="rId13" action="ppaction://hlinksldjump"/>
+          </p:cNvPr>
+          <p:cNvSpPr/>
+          <p:nvPr/>
+        </p:nvSpPr>
+        <p:spPr>
+          <a:xfrm>
+            <a:off x="6096000" y="1994858"/>
+            <a:ext cx="1447800" cy="1143000"/>
+          </a:xfrm>
+          <a:prstGeom prst="rect">
+            <a:avLst/>
+          </a:prstGeom>
+          <a:noFill/>
+          <a:ln>
+            <a:noFill/>
+          </a:ln>
+        </p:spPr>
+        <p:style>
+          <a:lnRef idx="2">
+            <a:schemeClr val="accent1">
+              <a:shade val="50000"/>
+            </a:schemeClr>
+          </a:lnRef>
+          <a:fillRef idx="1">
+            <a:schemeClr val="accent1"/>
+          </a:fillRef>
+          <a:effectRef idx="0">
+            <a:schemeClr val="accent1"/>
+          </a:effectRef>
+          <a:fontRef idx="minor">
+            <a:schemeClr val="lt1"/>
+          </a:fontRef>
+        </p:style>
+        <p:txBody>
+          <a:bodyPr rtlCol="0" anchor="ctr"/>
+          <a:lstStyle/>
+          <a:p>
+            <a:pPr algn="ctr"/>
+            <a:endParaRPr lang="en-US"/>
+          </a:p>
+        </p:txBody>
+      </p:sp>
+      <p:sp>
+        <p:nvSpPr>
+          <p:cNvPr id="16" name="Rectangle 15">
+            <a:hlinkClick r:id="rId14" action="ppaction://hlinksldjump"/>
+          </p:cNvPr>
+          <p:cNvSpPr/>
+          <p:nvPr/>
+        </p:nvSpPr>
+        <p:spPr>
+          <a:xfrm>
+            <a:off x="7547808" y="1989826"/>
+            <a:ext cx="1447800" cy="1143000"/>
+          </a:xfrm>
+          <a:prstGeom prst="rect">
+            <a:avLst/>
+          </a:prstGeom>
+          <a:noFill/>
+          <a:ln>
+            <a:noFill/>
+          </a:ln>
+        </p:spPr>
+        <p:style>
+          <a:lnRef idx="2">
+            <a:schemeClr val="accent1">
+              <a:shade val="50000"/>
+            </a:schemeClr>
+          </a:lnRef>
+          <a:fillRef idx="1">
+            <a:schemeClr val="accent1"/>
+          </a:fillRef>
+          <a:effectRef idx="0">
+            <a:schemeClr val="accent1"/>
+          </a:effectRef>
+          <a:fontRef idx="minor">
+            <a:schemeClr val="lt1"/>
+          </a:fontRef>
+        </p:style>
+        <p:txBody>
+          <a:bodyPr rtlCol="0" anchor="ctr"/>
+          <a:lstStyle/>
+          <a:p>
+            <a:pPr algn="ctr"/>
+            <a:endParaRPr lang="en-US"/>
+          </a:p>
+        </p:txBody>
+      </p:sp>
+      <p:sp>
+        <p:nvSpPr>
+          <p:cNvPr id="17" name="Rectangle 16">
+            <a:hlinkClick r:id="rId15" action="ppaction://hlinksldjump"/>
+          </p:cNvPr>
+          <p:cNvSpPr/>
+          <p:nvPr/>
+        </p:nvSpPr>
+        <p:spPr>
+          <a:xfrm>
+            <a:off x="152400" y="3237062"/>
+            <a:ext cx="1447800" cy="1143000"/>
+          </a:xfrm>
+          <a:prstGeom prst="rect">
+            <a:avLst/>
+          </a:prstGeom>
+          <a:noFill/>
+          <a:ln>
+            <a:noFill/>
+          </a:ln>
+        </p:spPr>
+        <p:style>
+          <a:lnRef idx="2">
+            <a:schemeClr val="accent1">
+              <a:shade val="50000"/>
+            </a:schemeClr>
+          </a:lnRef>
+          <a:fillRef idx="1">
+            <a:schemeClr val="accent1"/>
+          </a:fillRef>
+          <a:effectRef idx="0">
+            <a:schemeClr val="accent1"/>
+          </a:effectRef>
+          <a:fontRef idx="minor">
+            <a:schemeClr val="lt1"/>
+          </a:fontRef>
+        </p:style>
+        <p:txBody>
+          <a:bodyPr rtlCol="0" anchor="ctr"/>
+          <a:lstStyle/>
+          <a:p>
+            <a:pPr algn="ctr"/>
+            <a:endParaRPr lang="en-US"/>
+          </a:p>
+        </p:txBody>
+      </p:sp>
+      <p:sp>
+        <p:nvSpPr>
+          <p:cNvPr id="18" name="Rectangle 17">
+            <a:hlinkClick r:id="rId16" action="ppaction://hlinksldjump"/>
+          </p:cNvPr>
+          <p:cNvSpPr/>
+          <p:nvPr/>
+        </p:nvSpPr>
+        <p:spPr>
+          <a:xfrm>
+            <a:off x="1600200" y="3237062"/>
+            <a:ext cx="1447800" cy="1143000"/>
+          </a:xfrm>
+          <a:prstGeom prst="rect">
+            <a:avLst/>
+          </a:prstGeom>
+          <a:noFill/>
+          <a:ln>
+            <a:noFill/>
+          </a:ln>
+        </p:spPr>
+        <p:style>
+          <a:lnRef idx="2">
+            <a:schemeClr val="accent1">
+              <a:shade val="50000"/>
+            </a:schemeClr>
+          </a:lnRef>
+          <a:fillRef idx="1">
+            <a:schemeClr val="accent1"/>
+          </a:fillRef>
+          <a:effectRef idx="0">
+            <a:schemeClr val="accent1"/>
+          </a:effectRef>
+          <a:fontRef idx="minor">
+            <a:schemeClr val="lt1"/>
+          </a:fontRef>
+        </p:style>
+        <p:txBody>
+          <a:bodyPr rtlCol="0" anchor="ctr"/>
+          <a:lstStyle/>
+          <a:p>
+            <a:pPr algn="ctr"/>
+            <a:endParaRPr lang="en-US"/>
+          </a:p>
+        </p:txBody>
+      </p:sp>
+      <p:sp>
+        <p:nvSpPr>
+          <p:cNvPr id="19" name="Rectangle 18">
+            <a:hlinkClick r:id="rId17" action="ppaction://hlinksldjump"/>
+          </p:cNvPr>
+          <p:cNvSpPr/>
+          <p:nvPr/>
+        </p:nvSpPr>
+        <p:spPr>
+          <a:xfrm>
+            <a:off x="3126204" y="3237062"/>
+            <a:ext cx="1447800" cy="1143000"/>
+          </a:xfrm>
+          <a:prstGeom prst="rect">
+            <a:avLst/>
+          </a:prstGeom>
+          <a:noFill/>
+          <a:ln>
+            <a:noFill/>
+          </a:ln>
+        </p:spPr>
+        <p:style>
+          <a:lnRef idx="2">
+            <a:schemeClr val="accent1">
+              <a:shade val="50000"/>
+            </a:schemeClr>
+          </a:lnRef>
+          <a:fillRef idx="1">
+            <a:schemeClr val="accent1"/>
+          </a:fillRef>
+          <a:effectRef idx="0">
+            <a:schemeClr val="accent1"/>
+          </a:effectRef>
+          <a:fontRef idx="minor">
+            <a:schemeClr val="lt1"/>
+          </a:fontRef>
+        </p:style>
+        <p:txBody>
+          <a:bodyPr rtlCol="0" anchor="ctr"/>
+          <a:lstStyle/>
+          <a:p>
+            <a:pPr algn="ctr"/>
+            <a:endParaRPr lang="en-US"/>
+          </a:p>
+        </p:txBody>
+      </p:sp>
+      <p:sp>
+        <p:nvSpPr>
+          <p:cNvPr id="20" name="Rectangle 19">
+            <a:hlinkClick r:id="rId18" action="ppaction://hlinksldjump"/>
+          </p:cNvPr>
+          <p:cNvSpPr/>
+          <p:nvPr/>
+        </p:nvSpPr>
+        <p:spPr>
+          <a:xfrm>
+            <a:off x="4574004" y="3237062"/>
+            <a:ext cx="1447800" cy="1143000"/>
+          </a:xfrm>
+          <a:prstGeom prst="rect">
+            <a:avLst/>
+          </a:prstGeom>
+          <a:noFill/>
+          <a:ln>
+            <a:noFill/>
+          </a:ln>
+        </p:spPr>
+        <p:style>
+          <a:lnRef idx="2">
+            <a:schemeClr val="accent1">
+              <a:shade val="50000"/>
+            </a:schemeClr>
+          </a:lnRef>
+          <a:fillRef idx="1">
+            <a:schemeClr val="accent1"/>
+          </a:fillRef>
+          <a:effectRef idx="0">
+            <a:schemeClr val="accent1"/>
+          </a:effectRef>
+          <a:fontRef idx="minor">
+            <a:schemeClr val="lt1"/>
+          </a:fontRef>
+        </p:style>
+        <p:txBody>
+          <a:bodyPr rtlCol="0" anchor="ctr"/>
+          <a:lstStyle/>
+          <a:p>
+            <a:pPr algn="ctr"/>
+            <a:endParaRPr lang="en-US"/>
+          </a:p>
+        </p:txBody>
+      </p:sp>
+      <p:sp>
+        <p:nvSpPr>
+          <p:cNvPr id="21" name="Rectangle 20">
+            <a:hlinkClick r:id="rId19" action="ppaction://hlinksldjump"/>
+          </p:cNvPr>
+          <p:cNvSpPr/>
+          <p:nvPr/>
+        </p:nvSpPr>
+        <p:spPr>
+          <a:xfrm>
+            <a:off x="6096000" y="3246407"/>
+            <a:ext cx="1447800" cy="1143000"/>
+          </a:xfrm>
+          <a:prstGeom prst="rect">
+            <a:avLst/>
+          </a:prstGeom>
+          <a:noFill/>
+          <a:ln>
+            <a:noFill/>
+          </a:ln>
+        </p:spPr>
+        <p:style>
+          <a:lnRef idx="2">
+            <a:schemeClr val="accent1">
+              <a:shade val="50000"/>
+            </a:schemeClr>
+          </a:lnRef>
+          <a:fillRef idx="1">
+            <a:schemeClr val="accent1"/>
+          </a:fillRef>
+          <a:effectRef idx="0">
+            <a:schemeClr val="accent1"/>
+          </a:effectRef>
+          <a:fontRef idx="minor">
+            <a:schemeClr val="lt1"/>
+          </a:fontRef>
+        </p:style>
+        <p:txBody>
+          <a:bodyPr rtlCol="0" anchor="ctr"/>
+          <a:lstStyle/>
+          <a:p>
+            <a:pPr algn="ctr"/>
+            <a:endParaRPr lang="en-US"/>
+          </a:p>
+        </p:txBody>
+      </p:sp>
+      <p:sp>
+        <p:nvSpPr>
+          <p:cNvPr id="22" name="Rectangle 21">
+            <a:hlinkClick r:id="rId20" action="ppaction://hlinksldjump"/>
+          </p:cNvPr>
+          <p:cNvSpPr/>
+          <p:nvPr/>
+        </p:nvSpPr>
+        <p:spPr>
+          <a:xfrm>
+            <a:off x="7547808" y="3241375"/>
+            <a:ext cx="1447800" cy="1143000"/>
+          </a:xfrm>
+          <a:prstGeom prst="rect">
+            <a:avLst/>
+          </a:prstGeom>
+          <a:noFill/>
+          <a:ln>
+            <a:noFill/>
+          </a:ln>
+        </p:spPr>
+        <p:style>
+          <a:lnRef idx="2">
+            <a:schemeClr val="accent1">
+              <a:shade val="50000"/>
+            </a:schemeClr>
+          </a:lnRef>
+          <a:fillRef idx="1">
+            <a:schemeClr val="accent1"/>
+          </a:fillRef>
+          <a:effectRef idx="0">
+            <a:schemeClr val="accent1"/>
+          </a:effectRef>
+          <a:fontRef idx="minor">
+            <a:schemeClr val="lt1"/>
+          </a:fontRef>
+        </p:style>
+        <p:txBody>
+          <a:bodyPr rtlCol="0" anchor="ctr"/>
+          <a:lstStyle/>
+          <a:p>
+            <a:pPr algn="ctr"/>
+            <a:endParaRPr lang="en-US"/>
+          </a:p>
+        </p:txBody>
+      </p:sp>
+      <p:sp>
+        <p:nvSpPr>
+          <p:cNvPr id="23" name="Rectangle 22">
+            <a:hlinkClick r:id="rId21" action="ppaction://hlinksldjump"/>
+          </p:cNvPr>
+          <p:cNvSpPr/>
+          <p:nvPr/>
+        </p:nvSpPr>
+        <p:spPr>
+          <a:xfrm>
+            <a:off x="142336" y="4413130"/>
+            <a:ext cx="1447800" cy="1143000"/>
+          </a:xfrm>
+          <a:prstGeom prst="rect">
+            <a:avLst/>
+          </a:prstGeom>
+          <a:noFill/>
+          <a:ln>
+            <a:noFill/>
+          </a:ln>
+        </p:spPr>
+        <p:style>
+          <a:lnRef idx="2">
+            <a:schemeClr val="accent1">
+              <a:shade val="50000"/>
+            </a:schemeClr>
+          </a:lnRef>
+          <a:fillRef idx="1">
+            <a:schemeClr val="accent1"/>
+          </a:fillRef>
+          <a:effectRef idx="0">
+            <a:schemeClr val="accent1"/>
+          </a:effectRef>
+          <a:fontRef idx="minor">
+            <a:schemeClr val="lt1"/>
+          </a:fontRef>
+        </p:style>
+        <p:txBody>
+          <a:bodyPr rtlCol="0" anchor="ctr"/>
+          <a:lstStyle/>
+          <a:p>
+            <a:pPr algn="ctr"/>
+            <a:endParaRPr lang="en-US"/>
+          </a:p>
+        </p:txBody>
+      </p:sp>
+      <p:sp>
+        <p:nvSpPr>
+          <p:cNvPr id="25" name="Rectangle 24">
+            <a:hlinkClick r:id="rId22" action="ppaction://hlinksldjump"/>
+          </p:cNvPr>
+          <p:cNvSpPr/>
+          <p:nvPr/>
+        </p:nvSpPr>
+        <p:spPr>
+          <a:xfrm>
+            <a:off x="4574004" y="4428945"/>
+            <a:ext cx="1447800" cy="1143000"/>
+          </a:xfrm>
+          <a:prstGeom prst="rect">
+            <a:avLst/>
+          </a:prstGeom>
+          <a:noFill/>
+          <a:ln>
+            <a:noFill/>
+          </a:ln>
+        </p:spPr>
+        <p:style>
+          <a:lnRef idx="2">
+            <a:schemeClr val="accent1">
+              <a:shade val="50000"/>
+            </a:schemeClr>
+          </a:lnRef>
+          <a:fillRef idx="1">
+            <a:schemeClr val="accent1"/>
+          </a:fillRef>
+          <a:effectRef idx="0">
+            <a:schemeClr val="accent1"/>
+          </a:effectRef>
+          <a:fontRef idx="minor">
+            <a:schemeClr val="lt1"/>
+          </a:fontRef>
+        </p:style>
+        <p:txBody>
+          <a:bodyPr rtlCol="0" anchor="ctr"/>
+          <a:lstStyle/>
+          <a:p>
+            <a:pPr algn="ctr"/>
+            <a:endParaRPr lang="en-US"/>
+          </a:p>
+        </p:txBody>
+      </p:sp>
+      <p:sp>
+        <p:nvSpPr>
+          <p:cNvPr id="26" name="Rectangle 25">
+            <a:hlinkClick r:id="rId23" action="ppaction://hlinksldjump"/>
+          </p:cNvPr>
+          <p:cNvSpPr/>
+          <p:nvPr/>
+        </p:nvSpPr>
+        <p:spPr>
+          <a:xfrm>
+            <a:off x="6096000" y="4428226"/>
+            <a:ext cx="1447800" cy="1143000"/>
+          </a:xfrm>
+          <a:prstGeom prst="rect">
+            <a:avLst/>
+          </a:prstGeom>
+          <a:noFill/>
+          <a:ln>
+            <a:noFill/>
+          </a:ln>
+        </p:spPr>
+        <p:style>
+          <a:lnRef idx="2">
+            <a:schemeClr val="accent1">
+              <a:shade val="50000"/>
+            </a:schemeClr>
+          </a:lnRef>
+          <a:fillRef idx="1">
+            <a:schemeClr val="accent1"/>
+          </a:fillRef>
+          <a:effectRef idx="0">
+            <a:schemeClr val="accent1"/>
+          </a:effectRef>
+          <a:fontRef idx="minor">
+            <a:schemeClr val="lt1"/>
+          </a:fontRef>
+        </p:style>
+        <p:txBody>
+          <a:bodyPr rtlCol="0" anchor="ctr"/>
+          <a:lstStyle/>
+          <a:p>
+            <a:pPr algn="ctr"/>
+            <a:endParaRPr lang="en-US"/>
+          </a:p>
+        </p:txBody>
+      </p:sp>
+      <p:sp>
+        <p:nvSpPr>
+          <p:cNvPr id="27" name="Rectangle 26">
+            <a:hlinkClick r:id="rId24" action="ppaction://hlinksldjump"/>
+          </p:cNvPr>
+          <p:cNvSpPr/>
+          <p:nvPr/>
+        </p:nvSpPr>
+        <p:spPr>
+          <a:xfrm>
+            <a:off x="7555410" y="4413130"/>
+            <a:ext cx="1447800" cy="1143000"/>
+          </a:xfrm>
+          <a:prstGeom prst="rect">
+            <a:avLst/>
+          </a:prstGeom>
+          <a:noFill/>
+          <a:ln>
+            <a:noFill/>
+          </a:ln>
+        </p:spPr>
+        <p:style>
+          <a:lnRef idx="2">
+            <a:schemeClr val="accent1">
+              <a:shade val="50000"/>
+            </a:schemeClr>
+          </a:lnRef>
+          <a:fillRef idx="1">
+            <a:schemeClr val="accent1"/>
+          </a:fillRef>
+          <a:effectRef idx="0">
+            <a:schemeClr val="accent1"/>
+          </a:effectRef>
+          <a:fontRef idx="minor">
+            <a:schemeClr val="lt1"/>
+          </a:fontRef>
+        </p:style>
+        <p:txBody>
+          <a:bodyPr rtlCol="0" anchor="ctr"/>
+          <a:lstStyle/>
+          <a:p>
+            <a:pPr algn="ctr"/>
+            <a:endParaRPr lang="en-US"/>
           </a:p>
         </p:txBody>
       </p:sp>
     </p:spTree>
     <p:extLst>
       <p:ext uri="{BB962C8B-B14F-4D97-AF65-F5344CB8AC3E}">
-        <p14:creationId xmlns:p14="http://schemas.microsoft.com/office/powerpoint/2010/main" val="2623386836"/>
+        <p14:creationId xmlns:p14="http://schemas.microsoft.com/office/powerpoint/2010/main" val="4165087838"/>
       </p:ext>
     </p:extLst>
   </p:cSld>
   <p:clrMapOvr>
     <a:masterClrMapping/>
   </p:clrMapOvr>
-  <mc:AlternateContent xmlns:mc="http://schemas.openxmlformats.org/markup-compatibility/2006" xmlns:p14="http://schemas.microsoft.com/office/powerpoint/2010/main">
-    <mc:Choice Requires="p14">
-      <p:transition p14:dur="200">
+  <mc:AlternateContent xmlns:mc="http://schemas.openxmlformats.org/markup-compatibility/2006">
+    <mc:Choice xmlns:p14="http://schemas.microsoft.com/office/powerpoint/2010/main" Requires="p14">
+      <p:transition p14:dur="200" advClick="0">
         <p:fade/>
       </p:transition>
     </mc:Choice>
-    <mc:Fallback xmlns="">
-      <p:transition>
+    <mc:Fallback>
+      <p:transition advClick="0">
         <p:fade/>
       </p:transition>
     </mc:Fallback>
@@ -17435,8 +18807,8 @@
         </p:blipFill>
         <p:spPr>
           <a:xfrm>
-            <a:off x="685800" y="1371600"/>
-            <a:ext cx="7696570" cy="5304242"/>
+            <a:off x="1637930" y="1371600"/>
+            <a:ext cx="5867400" cy="5319954"/>
           </a:xfrm>
         </p:spPr>
       </p:pic>
@@ -17457,7 +18829,7 @@
           <a:p>
             <a:r>
               <a:rPr lang="en-US" dirty="0" smtClean="0"/>
-              <a:t>Schematic</a:t>
+              <a:t>PCB</a:t>
             </a:r>
             <a:endParaRPr lang="en-US" dirty="0"/>
           </a:p>
@@ -17466,7 +18838,7 @@
     </p:spTree>
     <p:extLst>
       <p:ext uri="{BB962C8B-B14F-4D97-AF65-F5344CB8AC3E}">
-        <p14:creationId xmlns:p14="http://schemas.microsoft.com/office/powerpoint/2010/main" val="1278752022"/>
+        <p14:creationId xmlns:p14="http://schemas.microsoft.com/office/powerpoint/2010/main" val="2623386836"/>
       </p:ext>
     </p:extLst>
   </p:cSld>
@@ -17512,6 +18884,107 @@
           <a:chExt cx="0" cy="0"/>
         </a:xfrm>
       </p:grpSpPr>
+      <p:pic>
+        <p:nvPicPr>
+          <p:cNvPr id="4" name="Content Placeholder 3"/>
+          <p:cNvPicPr>
+            <a:picLocks noGrp="1" noChangeAspect="1"/>
+          </p:cNvPicPr>
+          <p:nvPr>
+            <p:ph idx="1"/>
+          </p:nvPr>
+        </p:nvPicPr>
+        <p:blipFill>
+          <a:blip r:embed="rId2" cstate="print">
+            <a:extLst>
+              <a:ext uri="{28A0092B-C50C-407E-A947-70E740481C1C}">
+                <a14:useLocalDpi xmlns:a14="http://schemas.microsoft.com/office/drawing/2010/main" val="0"/>
+              </a:ext>
+            </a:extLst>
+          </a:blip>
+          <a:stretch>
+            <a:fillRect/>
+          </a:stretch>
+        </p:blipFill>
+        <p:spPr>
+          <a:xfrm>
+            <a:off x="685800" y="1371600"/>
+            <a:ext cx="7696570" cy="5304242"/>
+          </a:xfrm>
+        </p:spPr>
+      </p:pic>
+      <p:sp>
+        <p:nvSpPr>
+          <p:cNvPr id="3" name="Title 2"/>
+          <p:cNvSpPr>
+            <a:spLocks noGrp="1"/>
+          </p:cNvSpPr>
+          <p:nvPr>
+            <p:ph type="title"/>
+          </p:nvPr>
+        </p:nvSpPr>
+        <p:spPr/>
+        <p:txBody>
+          <a:bodyPr/>
+          <a:lstStyle/>
+          <a:p>
+            <a:r>
+              <a:rPr lang="en-US" dirty="0" smtClean="0"/>
+              <a:t>Schematic</a:t>
+            </a:r>
+            <a:endParaRPr lang="en-US" dirty="0"/>
+          </a:p>
+        </p:txBody>
+      </p:sp>
+    </p:spTree>
+    <p:extLst>
+      <p:ext uri="{BB962C8B-B14F-4D97-AF65-F5344CB8AC3E}">
+        <p14:creationId xmlns:p14="http://schemas.microsoft.com/office/powerpoint/2010/main" val="1278752022"/>
+      </p:ext>
+    </p:extLst>
+  </p:cSld>
+  <p:clrMapOvr>
+    <a:masterClrMapping/>
+  </p:clrMapOvr>
+  <mc:AlternateContent xmlns:mc="http://schemas.openxmlformats.org/markup-compatibility/2006" xmlns:p14="http://schemas.microsoft.com/office/powerpoint/2010/main">
+    <mc:Choice Requires="p14">
+      <p:transition p14:dur="200">
+        <p:fade/>
+      </p:transition>
+    </mc:Choice>
+    <mc:Fallback xmlns="">
+      <p:transition>
+        <p:fade/>
+      </p:transition>
+    </mc:Fallback>
+  </mc:AlternateContent>
+  <p:timing>
+    <p:tnLst>
+      <p:par>
+        <p:cTn id="1" dur="indefinite" restart="never" nodeType="tmRoot"/>
+      </p:par>
+    </p:tnLst>
+  </p:timing>
+</p:sld>
+</file>
+
+<file path=ppt/slides/slide24.xml><?xml version="1.0" encoding="utf-8"?>
+<p:sld xmlns:a="http://schemas.openxmlformats.org/drawingml/2006/main" xmlns:r="http://schemas.openxmlformats.org/officeDocument/2006/relationships" xmlns:p="http://schemas.openxmlformats.org/presentationml/2006/main">
+  <p:cSld>
+    <p:spTree>
+      <p:nvGrpSpPr>
+        <p:cNvPr id="1" name=""/>
+        <p:cNvGrpSpPr/>
+        <p:nvPr/>
+      </p:nvGrpSpPr>
+      <p:grpSpPr>
+        <a:xfrm>
+          <a:off x="0" y="0"/>
+          <a:ext cx="0" cy="0"/>
+          <a:chOff x="0" y="0"/>
+          <a:chExt cx="0" cy="0"/>
+        </a:xfrm>
+      </p:grpSpPr>
       <p:sp>
         <p:nvSpPr>
           <p:cNvPr id="2" name="Content Placeholder 1"/>
@@ -17553,8 +19026,13 @@
           <a:p>
             <a:r>
               <a:rPr lang="en-US" sz="2800" dirty="0"/>
-              <a:t>US 20130267309 A1</a:t>
-            </a:r>
+              <a:t>US 20130267309 </a:t>
+            </a:r>
+            <a:r>
+              <a:rPr lang="en-US" sz="2800" dirty="0" smtClean="0"/>
+              <a:t>A1 [pending]</a:t>
+            </a:r>
+            <a:endParaRPr lang="en-US" sz="2800" dirty="0"/>
           </a:p>
           <a:p>
             <a:pPr lvl="1"/>
@@ -17643,6 +19121,13 @@
       </p:transition>
     </mc:Fallback>
   </mc:AlternateContent>
+  <p:timing>
+    <p:tnLst>
+      <p:par>
+        <p:cTn id="1" dur="indefinite" restart="never" nodeType="tmRoot"/>
+      </p:par>
+    </p:tnLst>
+  </p:timing>
 </p:sld>
 </file>
 
@@ -18012,7 +19497,11 @@
           <a:p>
             <a:r>
               <a:rPr lang="en-US" dirty="0" smtClean="0"/>
-              <a:t>USE cases</a:t>
+              <a:t>Use </a:t>
+            </a:r>
+            <a:r>
+              <a:rPr lang="en-US" dirty="0" smtClean="0"/>
+              <a:t>cases</a:t>
             </a:r>
             <a:endParaRPr lang="en-US" dirty="0"/>
           </a:p>
@@ -19365,11 +20854,11 @@
           <a:blip r:embed="rId2" cstate="print">
             <a:extLst>
               <a:ext uri="{28A0092B-C50C-407E-A947-70E740481C1C}">
-                <a14:useLocalDpi xmlns:a14="http://schemas.microsoft.com/office/drawing/2010/main"/>
+                <a14:useLocalDpi xmlns:a14="http://schemas.microsoft.com/office/drawing/2010/main" val="0"/>
               </a:ext>
             </a:extLst>
           </a:blip>
-          <a:srcRect l="5172"/>
+          <a:srcRect/>
           <a:stretch/>
         </p:blipFill>
         <p:spPr bwMode="auto">
@@ -20693,7 +22182,7 @@
   <a:extraClrSchemeLst/>
   <a:extLst>
     <a:ext uri="{05A4C25C-085E-4340-85A3-A5531E510DB2}">
-      <thm15:themeFamily xmlns:thm15="http://schemas.microsoft.com/office/thememl/2012/main" xmlns="" name="Office Theme" id="{62F939B6-93AF-4DB8-9C6B-D6C7DFDC589F}" vid="{4A3C46E8-61CC-4603-A589-7422A47A8E4A}"/>
+      <thm15:themeFamily xmlns="" xmlns:thm15="http://schemas.microsoft.com/office/thememl/2012/main" name="Office Theme" id="{62F939B6-93AF-4DB8-9C6B-D6C7DFDC589F}" vid="{4A3C46E8-61CC-4603-A589-7422A47A8E4A}"/>
     </a:ext>
   </a:extLst>
 </a:theme>

</xml_diff>